<commit_message>
Setup made. Some changes on the presentation made. Added the new design.
</commit_message>
<xml_diff>
--- a/Presentation/Presentation new style.pptx
+++ b/Presentation/Presentation new style.pptx
@@ -5,7 +5,7 @@
     <p:sldMasterId id="2147483648" r:id="rId1"/>
   </p:sldMasterIdLst>
   <p:notesMasterIdLst>
-    <p:notesMasterId r:id="rId19"/>
+    <p:notesMasterId r:id="rId20"/>
   </p:notesMasterIdLst>
   <p:sldIdLst>
     <p:sldId id="256" r:id="rId2"/>
@@ -20,11 +20,12 @@
     <p:sldId id="267" r:id="rId11"/>
     <p:sldId id="269" r:id="rId12"/>
     <p:sldId id="268" r:id="rId13"/>
-    <p:sldId id="270" r:id="rId14"/>
-    <p:sldId id="271" r:id="rId15"/>
-    <p:sldId id="272" r:id="rId16"/>
-    <p:sldId id="273" r:id="rId17"/>
-    <p:sldId id="274" r:id="rId18"/>
+    <p:sldId id="276" r:id="rId14"/>
+    <p:sldId id="270" r:id="rId15"/>
+    <p:sldId id="271" r:id="rId16"/>
+    <p:sldId id="272" r:id="rId17"/>
+    <p:sldId id="273" r:id="rId18"/>
+    <p:sldId id="274" r:id="rId19"/>
   </p:sldIdLst>
   <p:sldSz cx="9144000" cy="6858000" type="screen4x3"/>
   <p:notesSz cx="6858000" cy="9144000"/>
@@ -2445,6 +2446,13 @@
         </dgm:presLayoutVars>
       </dgm:prSet>
       <dgm:spPr/>
+      <dgm:t>
+        <a:bodyPr/>
+        <a:lstStyle/>
+        <a:p>
+          <a:endParaRPr lang="en-US"/>
+        </a:p>
+      </dgm:t>
     </dgm:pt>
     <dgm:pt modelId="{0B5EB589-F308-4085-A615-37DFB01BFF2B}" type="pres">
       <dgm:prSet presAssocID="{1565F46A-33E8-4FDB-836B-D3F88AA217D6}" presName="hierFlow" presStyleCnt="0"/>
@@ -2471,6 +2479,13 @@
         </dgm:presLayoutVars>
       </dgm:prSet>
       <dgm:spPr/>
+      <dgm:t>
+        <a:bodyPr/>
+        <a:lstStyle/>
+        <a:p>
+          <a:endParaRPr lang="en-US"/>
+        </a:p>
+      </dgm:t>
     </dgm:pt>
     <dgm:pt modelId="{3106B1C6-A5E8-4311-9DAA-16BFE0F894ED}" type="pres">
       <dgm:prSet presAssocID="{29ED1BD8-A9E7-4C67-873E-405A4AF25EE9}" presName="hierChild2" presStyleCnt="0"/>
@@ -2479,6 +2494,13 @@
     <dgm:pt modelId="{85CDC8C9-66F5-477F-8620-D18C62C05FD8}" type="pres">
       <dgm:prSet presAssocID="{E48153EC-E2FA-408B-8E7C-22B22D651AAD}" presName="Name19" presStyleLbl="parChTrans1D2" presStyleIdx="0" presStyleCnt="1"/>
       <dgm:spPr/>
+      <dgm:t>
+        <a:bodyPr/>
+        <a:lstStyle/>
+        <a:p>
+          <a:endParaRPr lang="en-US"/>
+        </a:p>
+      </dgm:t>
     </dgm:pt>
     <dgm:pt modelId="{02C84682-DDF2-417E-A271-DBA47CC5E2B5}" type="pres">
       <dgm:prSet presAssocID="{62461A88-BE74-49D3-AC7E-AEE5A612166B}" presName="Name21" presStyleCnt="0"/>
@@ -2487,6 +2509,13 @@
     <dgm:pt modelId="{7FFE00B5-FB63-4647-B86D-7F6898C2ABAF}" type="pres">
       <dgm:prSet presAssocID="{62461A88-BE74-49D3-AC7E-AEE5A612166B}" presName="level2Shape" presStyleLbl="node2" presStyleIdx="0" presStyleCnt="1"/>
       <dgm:spPr/>
+      <dgm:t>
+        <a:bodyPr/>
+        <a:lstStyle/>
+        <a:p>
+          <a:endParaRPr lang="en-US"/>
+        </a:p>
+      </dgm:t>
     </dgm:pt>
     <dgm:pt modelId="{AD809608-331E-4009-B75F-C4F9FFC72EF4}" type="pres">
       <dgm:prSet presAssocID="{62461A88-BE74-49D3-AC7E-AEE5A612166B}" presName="hierChild3" presStyleCnt="0"/>
@@ -2495,6 +2524,13 @@
     <dgm:pt modelId="{3ED92A81-5FF7-4BBB-AE0A-29442DBAFA8B}" type="pres">
       <dgm:prSet presAssocID="{7A7E8FDD-A9C0-4725-BC34-3F5C43CB3CF9}" presName="Name19" presStyleLbl="parChTrans1D3" presStyleIdx="0" presStyleCnt="3"/>
       <dgm:spPr/>
+      <dgm:t>
+        <a:bodyPr/>
+        <a:lstStyle/>
+        <a:p>
+          <a:endParaRPr lang="en-US"/>
+        </a:p>
+      </dgm:t>
     </dgm:pt>
     <dgm:pt modelId="{D11A7926-7260-4750-8676-6D1BE734366C}" type="pres">
       <dgm:prSet presAssocID="{936808E1-78FF-415A-8C6D-B8D366E7E94B}" presName="Name21" presStyleCnt="0"/>
@@ -2503,6 +2539,13 @@
     <dgm:pt modelId="{D0C888DE-0CAA-4426-B613-BB51F6DAA8DF}" type="pres">
       <dgm:prSet presAssocID="{936808E1-78FF-415A-8C6D-B8D366E7E94B}" presName="level2Shape" presStyleLbl="node3" presStyleIdx="0" presStyleCnt="3"/>
       <dgm:spPr/>
+      <dgm:t>
+        <a:bodyPr/>
+        <a:lstStyle/>
+        <a:p>
+          <a:endParaRPr lang="en-US"/>
+        </a:p>
+      </dgm:t>
     </dgm:pt>
     <dgm:pt modelId="{8553E43B-7542-4C07-9D02-2AA432A1C40C}" type="pres">
       <dgm:prSet presAssocID="{936808E1-78FF-415A-8C6D-B8D366E7E94B}" presName="hierChild3" presStyleCnt="0"/>
@@ -2511,6 +2554,13 @@
     <dgm:pt modelId="{30DEC963-A63E-4CF4-8BC8-BCCC54B50307}" type="pres">
       <dgm:prSet presAssocID="{BFFCE8B3-4141-4F92-BE7A-A1EAF853840D}" presName="Name19" presStyleLbl="parChTrans1D4" presStyleIdx="0" presStyleCnt="16"/>
       <dgm:spPr/>
+      <dgm:t>
+        <a:bodyPr/>
+        <a:lstStyle/>
+        <a:p>
+          <a:endParaRPr lang="en-US"/>
+        </a:p>
+      </dgm:t>
     </dgm:pt>
     <dgm:pt modelId="{DCDBB41F-E1D2-44CA-8E08-F445721EA050}" type="pres">
       <dgm:prSet presAssocID="{DD123432-B415-4B22-814C-D6B426117991}" presName="Name21" presStyleCnt="0"/>
@@ -2519,6 +2569,13 @@
     <dgm:pt modelId="{B9277DAC-F9CA-4E71-B63F-3F16B430F309}" type="pres">
       <dgm:prSet presAssocID="{DD123432-B415-4B22-814C-D6B426117991}" presName="level2Shape" presStyleLbl="node4" presStyleIdx="0" presStyleCnt="16"/>
       <dgm:spPr/>
+      <dgm:t>
+        <a:bodyPr/>
+        <a:lstStyle/>
+        <a:p>
+          <a:endParaRPr lang="en-US"/>
+        </a:p>
+      </dgm:t>
     </dgm:pt>
     <dgm:pt modelId="{D20BB183-27DF-4D85-BA07-892721578BBB}" type="pres">
       <dgm:prSet presAssocID="{DD123432-B415-4B22-814C-D6B426117991}" presName="hierChild3" presStyleCnt="0"/>
@@ -2527,6 +2584,13 @@
     <dgm:pt modelId="{55BDA48D-D577-402D-B265-2D98DC9968AF}" type="pres">
       <dgm:prSet presAssocID="{EA7FE5AF-FF75-442B-B746-865641E95FAD}" presName="Name19" presStyleLbl="parChTrans1D4" presStyleIdx="1" presStyleCnt="16"/>
       <dgm:spPr/>
+      <dgm:t>
+        <a:bodyPr/>
+        <a:lstStyle/>
+        <a:p>
+          <a:endParaRPr lang="en-US"/>
+        </a:p>
+      </dgm:t>
     </dgm:pt>
     <dgm:pt modelId="{CF582DAE-904E-4099-965D-BB0308663B79}" type="pres">
       <dgm:prSet presAssocID="{299EB561-97C7-4BAC-B7EB-DB28C33DA60A}" presName="Name21" presStyleCnt="0"/>
@@ -2535,6 +2599,13 @@
     <dgm:pt modelId="{C4FAC167-4C6C-4E30-956B-62E586336272}" type="pres">
       <dgm:prSet presAssocID="{299EB561-97C7-4BAC-B7EB-DB28C33DA60A}" presName="level2Shape" presStyleLbl="node4" presStyleIdx="1" presStyleCnt="16"/>
       <dgm:spPr/>
+      <dgm:t>
+        <a:bodyPr/>
+        <a:lstStyle/>
+        <a:p>
+          <a:endParaRPr lang="en-US"/>
+        </a:p>
+      </dgm:t>
     </dgm:pt>
     <dgm:pt modelId="{9926DAF7-BE3A-4FB6-97B5-2083D1D469CC}" type="pres">
       <dgm:prSet presAssocID="{299EB561-97C7-4BAC-B7EB-DB28C33DA60A}" presName="hierChild3" presStyleCnt="0"/>
@@ -2543,6 +2614,13 @@
     <dgm:pt modelId="{A89A8AFA-C3FB-40F4-A8F8-026146D78588}" type="pres">
       <dgm:prSet presAssocID="{690B4BB5-43DB-4342-B5A4-23B9AC7FC042}" presName="Name19" presStyleLbl="parChTrans1D4" presStyleIdx="2" presStyleCnt="16"/>
       <dgm:spPr/>
+      <dgm:t>
+        <a:bodyPr/>
+        <a:lstStyle/>
+        <a:p>
+          <a:endParaRPr lang="en-US"/>
+        </a:p>
+      </dgm:t>
     </dgm:pt>
     <dgm:pt modelId="{8909B0A0-A200-41C3-B51C-76245A60639D}" type="pres">
       <dgm:prSet presAssocID="{B5616882-C45F-4116-A8B7-E0FF2BC78404}" presName="Name21" presStyleCnt="0"/>
@@ -2551,6 +2629,13 @@
     <dgm:pt modelId="{5E06239B-1E51-4EB4-BAEB-09F5EF1F334C}" type="pres">
       <dgm:prSet presAssocID="{B5616882-C45F-4116-A8B7-E0FF2BC78404}" presName="level2Shape" presStyleLbl="node4" presStyleIdx="2" presStyleCnt="16"/>
       <dgm:spPr/>
+      <dgm:t>
+        <a:bodyPr/>
+        <a:lstStyle/>
+        <a:p>
+          <a:endParaRPr lang="en-US"/>
+        </a:p>
+      </dgm:t>
     </dgm:pt>
     <dgm:pt modelId="{0F56F55E-302A-42DD-9932-AEA555A5A2BD}" type="pres">
       <dgm:prSet presAssocID="{B5616882-C45F-4116-A8B7-E0FF2BC78404}" presName="hierChild3" presStyleCnt="0"/>
@@ -2559,6 +2644,13 @@
     <dgm:pt modelId="{4697DA84-ECF6-4003-9834-CE181F277FBB}" type="pres">
       <dgm:prSet presAssocID="{2A8D573A-B194-44E7-806C-4E7169F3ED3F}" presName="Name19" presStyleLbl="parChTrans1D4" presStyleIdx="3" presStyleCnt="16"/>
       <dgm:spPr/>
+      <dgm:t>
+        <a:bodyPr/>
+        <a:lstStyle/>
+        <a:p>
+          <a:endParaRPr lang="en-US"/>
+        </a:p>
+      </dgm:t>
     </dgm:pt>
     <dgm:pt modelId="{842122EC-7D04-493B-8AF6-72FBFA482822}" type="pres">
       <dgm:prSet presAssocID="{1153B68D-8017-4FD2-B763-2BE2FFBFC9C4}" presName="Name21" presStyleCnt="0"/>
@@ -2567,6 +2659,13 @@
     <dgm:pt modelId="{F6D58E2E-40CE-4F2C-8885-5BDDD1172BE8}" type="pres">
       <dgm:prSet presAssocID="{1153B68D-8017-4FD2-B763-2BE2FFBFC9C4}" presName="level2Shape" presStyleLbl="node4" presStyleIdx="3" presStyleCnt="16"/>
       <dgm:spPr/>
+      <dgm:t>
+        <a:bodyPr/>
+        <a:lstStyle/>
+        <a:p>
+          <a:endParaRPr lang="en-US"/>
+        </a:p>
+      </dgm:t>
     </dgm:pt>
     <dgm:pt modelId="{C4753B4D-E7F8-4585-A74E-545CC1A42724}" type="pres">
       <dgm:prSet presAssocID="{1153B68D-8017-4FD2-B763-2BE2FFBFC9C4}" presName="hierChild3" presStyleCnt="0"/>
@@ -2575,6 +2674,13 @@
     <dgm:pt modelId="{5962983C-0FD2-4E96-8C1C-E39F1E4C568F}" type="pres">
       <dgm:prSet presAssocID="{3380550B-F545-409E-8728-3E2080D1DE8E}" presName="Name19" presStyleLbl="parChTrans1D4" presStyleIdx="4" presStyleCnt="16"/>
       <dgm:spPr/>
+      <dgm:t>
+        <a:bodyPr/>
+        <a:lstStyle/>
+        <a:p>
+          <a:endParaRPr lang="en-US"/>
+        </a:p>
+      </dgm:t>
     </dgm:pt>
     <dgm:pt modelId="{46F9AB34-ABC5-4D19-B985-669727991E0A}" type="pres">
       <dgm:prSet presAssocID="{4895BF14-2446-4B8C-B1A9-9780BC55D8B3}" presName="Name21" presStyleCnt="0"/>
@@ -2583,6 +2689,13 @@
     <dgm:pt modelId="{E257627A-BB36-4F01-A617-C92E4B946BE3}" type="pres">
       <dgm:prSet presAssocID="{4895BF14-2446-4B8C-B1A9-9780BC55D8B3}" presName="level2Shape" presStyleLbl="node4" presStyleIdx="4" presStyleCnt="16"/>
       <dgm:spPr/>
+      <dgm:t>
+        <a:bodyPr/>
+        <a:lstStyle/>
+        <a:p>
+          <a:endParaRPr lang="en-US"/>
+        </a:p>
+      </dgm:t>
     </dgm:pt>
     <dgm:pt modelId="{E538D3DC-7FCC-4F9D-8F30-2E20B0BE53C6}" type="pres">
       <dgm:prSet presAssocID="{4895BF14-2446-4B8C-B1A9-9780BC55D8B3}" presName="hierChild3" presStyleCnt="0"/>
@@ -2591,6 +2704,13 @@
     <dgm:pt modelId="{CD809B7E-A368-46C6-AAFB-1EDABED2B127}" type="pres">
       <dgm:prSet presAssocID="{F75DAD21-9BFC-4948-9203-F5848E0A8B96}" presName="Name19" presStyleLbl="parChTrans1D4" presStyleIdx="5" presStyleCnt="16"/>
       <dgm:spPr/>
+      <dgm:t>
+        <a:bodyPr/>
+        <a:lstStyle/>
+        <a:p>
+          <a:endParaRPr lang="en-US"/>
+        </a:p>
+      </dgm:t>
     </dgm:pt>
     <dgm:pt modelId="{3D681F7A-4C25-4C2C-BDF2-7C848C59DB58}" type="pres">
       <dgm:prSet presAssocID="{174B66DE-A4C5-4262-B9FF-3DB70DD760B4}" presName="Name21" presStyleCnt="0"/>
@@ -2599,6 +2719,13 @@
     <dgm:pt modelId="{B215FB30-8694-4C29-B7FC-A88B9190FB5A}" type="pres">
       <dgm:prSet presAssocID="{174B66DE-A4C5-4262-B9FF-3DB70DD760B4}" presName="level2Shape" presStyleLbl="node4" presStyleIdx="5" presStyleCnt="16"/>
       <dgm:spPr/>
+      <dgm:t>
+        <a:bodyPr/>
+        <a:lstStyle/>
+        <a:p>
+          <a:endParaRPr lang="en-US"/>
+        </a:p>
+      </dgm:t>
     </dgm:pt>
     <dgm:pt modelId="{2DCF731D-7D81-4E1A-933F-BC9AE4179E67}" type="pres">
       <dgm:prSet presAssocID="{174B66DE-A4C5-4262-B9FF-3DB70DD760B4}" presName="hierChild3" presStyleCnt="0"/>
@@ -2607,6 +2734,13 @@
     <dgm:pt modelId="{6FF85653-6460-4756-A629-C1326052BA6B}" type="pres">
       <dgm:prSet presAssocID="{4C2075A7-8E8D-4212-AEF2-FA2BFC036D54}" presName="Name19" presStyleLbl="parChTrans1D4" presStyleIdx="6" presStyleCnt="16"/>
       <dgm:spPr/>
+      <dgm:t>
+        <a:bodyPr/>
+        <a:lstStyle/>
+        <a:p>
+          <a:endParaRPr lang="en-US"/>
+        </a:p>
+      </dgm:t>
     </dgm:pt>
     <dgm:pt modelId="{B4D5D9A6-1525-48BD-B05D-25E324BE70F8}" type="pres">
       <dgm:prSet presAssocID="{59ECBF1E-327F-4C3E-A1AC-C8ADD56A60A6}" presName="Name21" presStyleCnt="0"/>
@@ -2615,6 +2749,13 @@
     <dgm:pt modelId="{43337737-EF2B-4E98-84B4-D16409A4EA80}" type="pres">
       <dgm:prSet presAssocID="{59ECBF1E-327F-4C3E-A1AC-C8ADD56A60A6}" presName="level2Shape" presStyleLbl="node4" presStyleIdx="6" presStyleCnt="16"/>
       <dgm:spPr/>
+      <dgm:t>
+        <a:bodyPr/>
+        <a:lstStyle/>
+        <a:p>
+          <a:endParaRPr lang="en-US"/>
+        </a:p>
+      </dgm:t>
     </dgm:pt>
     <dgm:pt modelId="{BD05290B-10DC-45A6-8CD3-ECB4A89C5A51}" type="pres">
       <dgm:prSet presAssocID="{59ECBF1E-327F-4C3E-A1AC-C8ADD56A60A6}" presName="hierChild3" presStyleCnt="0"/>
@@ -2623,6 +2764,13 @@
     <dgm:pt modelId="{54588B55-EECC-466F-9237-F2D13FCF3C12}" type="pres">
       <dgm:prSet presAssocID="{DFCC83F9-0185-4FAC-9C8B-DC9E59A90181}" presName="Name19" presStyleLbl="parChTrans1D4" presStyleIdx="7" presStyleCnt="16"/>
       <dgm:spPr/>
+      <dgm:t>
+        <a:bodyPr/>
+        <a:lstStyle/>
+        <a:p>
+          <a:endParaRPr lang="en-US"/>
+        </a:p>
+      </dgm:t>
     </dgm:pt>
     <dgm:pt modelId="{ECAB5310-1709-4C07-A010-1C9C530AFC30}" type="pres">
       <dgm:prSet presAssocID="{C7CF69AB-CFAF-42DF-807F-2486B4A2B61E}" presName="Name21" presStyleCnt="0"/>
@@ -2631,6 +2779,13 @@
     <dgm:pt modelId="{1D6A2535-EE4C-47C7-BB0B-B5758CDDC053}" type="pres">
       <dgm:prSet presAssocID="{C7CF69AB-CFAF-42DF-807F-2486B4A2B61E}" presName="level2Shape" presStyleLbl="node4" presStyleIdx="7" presStyleCnt="16"/>
       <dgm:spPr/>
+      <dgm:t>
+        <a:bodyPr/>
+        <a:lstStyle/>
+        <a:p>
+          <a:endParaRPr lang="en-US"/>
+        </a:p>
+      </dgm:t>
     </dgm:pt>
     <dgm:pt modelId="{5E0B0C0C-40AC-417E-9998-41674CD5AFA3}" type="pres">
       <dgm:prSet presAssocID="{C7CF69AB-CFAF-42DF-807F-2486B4A2B61E}" presName="hierChild3" presStyleCnt="0"/>
@@ -2639,6 +2794,13 @@
     <dgm:pt modelId="{41D334FC-DC88-4297-988A-B6A3A5BF7DD8}" type="pres">
       <dgm:prSet presAssocID="{CCF9276B-DD30-4A31-97E0-374BC2F33936}" presName="Name19" presStyleLbl="parChTrans1D3" presStyleIdx="1" presStyleCnt="3"/>
       <dgm:spPr/>
+      <dgm:t>
+        <a:bodyPr/>
+        <a:lstStyle/>
+        <a:p>
+          <a:endParaRPr lang="en-US"/>
+        </a:p>
+      </dgm:t>
     </dgm:pt>
     <dgm:pt modelId="{22674A47-3DFC-4FC1-B31D-0A38D6D03F12}" type="pres">
       <dgm:prSet presAssocID="{6F9C22BB-A951-4593-904B-133B05B88043}" presName="Name21" presStyleCnt="0"/>
@@ -2647,6 +2809,13 @@
     <dgm:pt modelId="{B8E2EB32-E5D0-4D49-BCD7-A48568B971EC}" type="pres">
       <dgm:prSet presAssocID="{6F9C22BB-A951-4593-904B-133B05B88043}" presName="level2Shape" presStyleLbl="node3" presStyleIdx="1" presStyleCnt="3"/>
       <dgm:spPr/>
+      <dgm:t>
+        <a:bodyPr/>
+        <a:lstStyle/>
+        <a:p>
+          <a:endParaRPr lang="en-US"/>
+        </a:p>
+      </dgm:t>
     </dgm:pt>
     <dgm:pt modelId="{F6CA198E-1ACF-4862-A543-93A1004095AA}" type="pres">
       <dgm:prSet presAssocID="{6F9C22BB-A951-4593-904B-133B05B88043}" presName="hierChild3" presStyleCnt="0"/>
@@ -2655,6 +2824,13 @@
     <dgm:pt modelId="{857F7289-7B4E-4003-AC3D-69AFF400B1F1}" type="pres">
       <dgm:prSet presAssocID="{971CF5ED-AFF3-482E-A74A-0BF989CA19A9}" presName="Name19" presStyleLbl="parChTrans1D4" presStyleIdx="8" presStyleCnt="16"/>
       <dgm:spPr/>
+      <dgm:t>
+        <a:bodyPr/>
+        <a:lstStyle/>
+        <a:p>
+          <a:endParaRPr lang="en-US"/>
+        </a:p>
+      </dgm:t>
     </dgm:pt>
     <dgm:pt modelId="{D6FA5811-0E33-4B61-A61F-A5B69D82054A}" type="pres">
       <dgm:prSet presAssocID="{2E82ED61-2C38-4B5F-BBA6-C193A1299B2B}" presName="Name21" presStyleCnt="0"/>
@@ -2663,6 +2839,13 @@
     <dgm:pt modelId="{712470A4-8189-46E3-8952-B9DFA4D0FD5B}" type="pres">
       <dgm:prSet presAssocID="{2E82ED61-2C38-4B5F-BBA6-C193A1299B2B}" presName="level2Shape" presStyleLbl="node4" presStyleIdx="8" presStyleCnt="16"/>
       <dgm:spPr/>
+      <dgm:t>
+        <a:bodyPr/>
+        <a:lstStyle/>
+        <a:p>
+          <a:endParaRPr lang="en-US"/>
+        </a:p>
+      </dgm:t>
     </dgm:pt>
     <dgm:pt modelId="{AA1CC6B3-57A1-4BC1-86E6-484FDE0B13B5}" type="pres">
       <dgm:prSet presAssocID="{2E82ED61-2C38-4B5F-BBA6-C193A1299B2B}" presName="hierChild3" presStyleCnt="0"/>
@@ -2671,6 +2854,13 @@
     <dgm:pt modelId="{7D20DB9F-D5B1-4696-ACEA-D430084773AA}" type="pres">
       <dgm:prSet presAssocID="{4029C3B0-0896-45B8-8180-9AF91F9BB120}" presName="Name19" presStyleLbl="parChTrans1D4" presStyleIdx="9" presStyleCnt="16"/>
       <dgm:spPr/>
+      <dgm:t>
+        <a:bodyPr/>
+        <a:lstStyle/>
+        <a:p>
+          <a:endParaRPr lang="en-US"/>
+        </a:p>
+      </dgm:t>
     </dgm:pt>
     <dgm:pt modelId="{F4C652DF-2219-4736-820B-106C9BBE7706}" type="pres">
       <dgm:prSet presAssocID="{49000756-D061-4D71-8CA0-31F9974ECF1A}" presName="Name21" presStyleCnt="0"/>
@@ -2679,6 +2869,13 @@
     <dgm:pt modelId="{F1F1265C-A072-48C6-85E4-0B0E9EEBF7A9}" type="pres">
       <dgm:prSet presAssocID="{49000756-D061-4D71-8CA0-31F9974ECF1A}" presName="level2Shape" presStyleLbl="node4" presStyleIdx="9" presStyleCnt="16"/>
       <dgm:spPr/>
+      <dgm:t>
+        <a:bodyPr/>
+        <a:lstStyle/>
+        <a:p>
+          <a:endParaRPr lang="en-US"/>
+        </a:p>
+      </dgm:t>
     </dgm:pt>
     <dgm:pt modelId="{3EA4173A-D89A-4720-80D6-EE0317D504ED}" type="pres">
       <dgm:prSet presAssocID="{49000756-D061-4D71-8CA0-31F9974ECF1A}" presName="hierChild3" presStyleCnt="0"/>
@@ -2687,6 +2884,13 @@
     <dgm:pt modelId="{4051F676-1C76-472E-B793-42A16DDEB179}" type="pres">
       <dgm:prSet presAssocID="{5148951C-C1B0-434D-90F2-1F2128DF3563}" presName="Name19" presStyleLbl="parChTrans1D4" presStyleIdx="10" presStyleCnt="16"/>
       <dgm:spPr/>
+      <dgm:t>
+        <a:bodyPr/>
+        <a:lstStyle/>
+        <a:p>
+          <a:endParaRPr lang="en-US"/>
+        </a:p>
+      </dgm:t>
     </dgm:pt>
     <dgm:pt modelId="{E7898B7A-884B-49C8-B590-44DAA9793239}" type="pres">
       <dgm:prSet presAssocID="{35AF10B0-5D0C-488A-8DA7-F73BE8FC5D85}" presName="Name21" presStyleCnt="0"/>
@@ -2695,6 +2899,13 @@
     <dgm:pt modelId="{535C48B3-87DE-4354-B7E8-FD38DC14560D}" type="pres">
       <dgm:prSet presAssocID="{35AF10B0-5D0C-488A-8DA7-F73BE8FC5D85}" presName="level2Shape" presStyleLbl="node4" presStyleIdx="10" presStyleCnt="16"/>
       <dgm:spPr/>
+      <dgm:t>
+        <a:bodyPr/>
+        <a:lstStyle/>
+        <a:p>
+          <a:endParaRPr lang="en-US"/>
+        </a:p>
+      </dgm:t>
     </dgm:pt>
     <dgm:pt modelId="{52BE81F7-1D92-4FE3-8DCA-38183B6059B5}" type="pres">
       <dgm:prSet presAssocID="{35AF10B0-5D0C-488A-8DA7-F73BE8FC5D85}" presName="hierChild3" presStyleCnt="0"/>
@@ -2703,6 +2914,13 @@
     <dgm:pt modelId="{4694D937-0134-4A93-9211-341C9D99867A}" type="pres">
       <dgm:prSet presAssocID="{60AFF6D8-66C2-4ABA-9ACB-2D4DD35559D1}" presName="Name19" presStyleLbl="parChTrans1D4" presStyleIdx="11" presStyleCnt="16"/>
       <dgm:spPr/>
+      <dgm:t>
+        <a:bodyPr/>
+        <a:lstStyle/>
+        <a:p>
+          <a:endParaRPr lang="en-US"/>
+        </a:p>
+      </dgm:t>
     </dgm:pt>
     <dgm:pt modelId="{2EAC0003-0D68-4513-8419-232C13573B40}" type="pres">
       <dgm:prSet presAssocID="{7261F8F1-733F-4542-93C9-75D3C32A9639}" presName="Name21" presStyleCnt="0"/>
@@ -2711,6 +2929,13 @@
     <dgm:pt modelId="{72A1B322-E366-4DB2-B1F2-D6E2B08456E6}" type="pres">
       <dgm:prSet presAssocID="{7261F8F1-733F-4542-93C9-75D3C32A9639}" presName="level2Shape" presStyleLbl="node4" presStyleIdx="11" presStyleCnt="16"/>
       <dgm:spPr/>
+      <dgm:t>
+        <a:bodyPr/>
+        <a:lstStyle/>
+        <a:p>
+          <a:endParaRPr lang="en-US"/>
+        </a:p>
+      </dgm:t>
     </dgm:pt>
     <dgm:pt modelId="{1A74468D-4C13-441D-B478-C80DD82D9E1F}" type="pres">
       <dgm:prSet presAssocID="{7261F8F1-733F-4542-93C9-75D3C32A9639}" presName="hierChild3" presStyleCnt="0"/>
@@ -2719,6 +2944,13 @@
     <dgm:pt modelId="{D3916319-D670-48BE-8E7C-73EFD501C140}" type="pres">
       <dgm:prSet presAssocID="{577A5865-3120-46AD-84D7-B481646DDA51}" presName="Name19" presStyleLbl="parChTrans1D4" presStyleIdx="12" presStyleCnt="16"/>
       <dgm:spPr/>
+      <dgm:t>
+        <a:bodyPr/>
+        <a:lstStyle/>
+        <a:p>
+          <a:endParaRPr lang="en-US"/>
+        </a:p>
+      </dgm:t>
     </dgm:pt>
     <dgm:pt modelId="{1DB0B725-3A65-4205-9916-99A8AFC716F8}" type="pres">
       <dgm:prSet presAssocID="{F1C739AF-6551-4FE4-9091-30A25A3579C1}" presName="Name21" presStyleCnt="0"/>
@@ -2727,6 +2959,13 @@
     <dgm:pt modelId="{ECACF06E-0D77-42BB-B120-CAE787F5BE8E}" type="pres">
       <dgm:prSet presAssocID="{F1C739AF-6551-4FE4-9091-30A25A3579C1}" presName="level2Shape" presStyleLbl="node4" presStyleIdx="12" presStyleCnt="16"/>
       <dgm:spPr/>
+      <dgm:t>
+        <a:bodyPr/>
+        <a:lstStyle/>
+        <a:p>
+          <a:endParaRPr lang="en-US"/>
+        </a:p>
+      </dgm:t>
     </dgm:pt>
     <dgm:pt modelId="{F7939D3D-516E-49E7-81CD-A7CD770C11B5}" type="pres">
       <dgm:prSet presAssocID="{F1C739AF-6551-4FE4-9091-30A25A3579C1}" presName="hierChild3" presStyleCnt="0"/>
@@ -2735,6 +2974,13 @@
     <dgm:pt modelId="{F064F509-5960-48D4-BB13-231EDCC76B94}" type="pres">
       <dgm:prSet presAssocID="{E5010613-837B-41EE-B31B-DA18AD9AB298}" presName="Name19" presStyleLbl="parChTrans1D4" presStyleIdx="13" presStyleCnt="16"/>
       <dgm:spPr/>
+      <dgm:t>
+        <a:bodyPr/>
+        <a:lstStyle/>
+        <a:p>
+          <a:endParaRPr lang="en-US"/>
+        </a:p>
+      </dgm:t>
     </dgm:pt>
     <dgm:pt modelId="{3E59E307-AAD7-41EF-A97B-112AA4CAA33F}" type="pres">
       <dgm:prSet presAssocID="{3152CBFA-D90F-4370-98D8-CBB96716A74F}" presName="Name21" presStyleCnt="0"/>
@@ -2743,6 +2989,13 @@
     <dgm:pt modelId="{DE52B5AB-E58B-46E6-9C09-E32ABFBD8A69}" type="pres">
       <dgm:prSet presAssocID="{3152CBFA-D90F-4370-98D8-CBB96716A74F}" presName="level2Shape" presStyleLbl="node4" presStyleIdx="13" presStyleCnt="16"/>
       <dgm:spPr/>
+      <dgm:t>
+        <a:bodyPr/>
+        <a:lstStyle/>
+        <a:p>
+          <a:endParaRPr lang="en-US"/>
+        </a:p>
+      </dgm:t>
     </dgm:pt>
     <dgm:pt modelId="{058F4737-0BFF-4464-BF09-8D1DB030260A}" type="pres">
       <dgm:prSet presAssocID="{3152CBFA-D90F-4370-98D8-CBB96716A74F}" presName="hierChild3" presStyleCnt="0"/>
@@ -2751,6 +3004,13 @@
     <dgm:pt modelId="{D19A60F2-8B64-4F9B-B220-0126805DB7E3}" type="pres">
       <dgm:prSet presAssocID="{0C638C6E-8B89-484E-99A7-0F0008F44C1B}" presName="Name19" presStyleLbl="parChTrans1D4" presStyleIdx="14" presStyleCnt="16"/>
       <dgm:spPr/>
+      <dgm:t>
+        <a:bodyPr/>
+        <a:lstStyle/>
+        <a:p>
+          <a:endParaRPr lang="en-US"/>
+        </a:p>
+      </dgm:t>
     </dgm:pt>
     <dgm:pt modelId="{216836E7-FD4A-4094-BC14-A39ACB5EFB70}" type="pres">
       <dgm:prSet presAssocID="{A0836253-59AD-4823-969B-C27091CC6D31}" presName="Name21" presStyleCnt="0"/>
@@ -2759,6 +3019,13 @@
     <dgm:pt modelId="{288A98C4-8794-4D98-9D7E-6D757471075D}" type="pres">
       <dgm:prSet presAssocID="{A0836253-59AD-4823-969B-C27091CC6D31}" presName="level2Shape" presStyleLbl="node4" presStyleIdx="14" presStyleCnt="16"/>
       <dgm:spPr/>
+      <dgm:t>
+        <a:bodyPr/>
+        <a:lstStyle/>
+        <a:p>
+          <a:endParaRPr lang="en-US"/>
+        </a:p>
+      </dgm:t>
     </dgm:pt>
     <dgm:pt modelId="{383C281D-1146-49A5-AFA5-42B5C76597A1}" type="pres">
       <dgm:prSet presAssocID="{A0836253-59AD-4823-969B-C27091CC6D31}" presName="hierChild3" presStyleCnt="0"/>
@@ -2767,6 +3034,13 @@
     <dgm:pt modelId="{1E3B8822-CBE7-4FB4-91BA-A1997FD8D194}" type="pres">
       <dgm:prSet presAssocID="{016EF344-7E15-4844-97F5-F8DC735DFEAA}" presName="Name19" presStyleLbl="parChTrans1D4" presStyleIdx="15" presStyleCnt="16"/>
       <dgm:spPr/>
+      <dgm:t>
+        <a:bodyPr/>
+        <a:lstStyle/>
+        <a:p>
+          <a:endParaRPr lang="en-US"/>
+        </a:p>
+      </dgm:t>
     </dgm:pt>
     <dgm:pt modelId="{E8996980-9BA7-4F55-AE8A-1D3E2ACCFB5F}" type="pres">
       <dgm:prSet presAssocID="{1CCD693B-DAB4-4D47-B7CC-492ACAC7B1DD}" presName="Name21" presStyleCnt="0"/>
@@ -2775,6 +3049,13 @@
     <dgm:pt modelId="{33A0C656-9415-4F4D-9065-7D26BDA0B663}" type="pres">
       <dgm:prSet presAssocID="{1CCD693B-DAB4-4D47-B7CC-492ACAC7B1DD}" presName="level2Shape" presStyleLbl="node4" presStyleIdx="15" presStyleCnt="16"/>
       <dgm:spPr/>
+      <dgm:t>
+        <a:bodyPr/>
+        <a:lstStyle/>
+        <a:p>
+          <a:endParaRPr lang="en-US"/>
+        </a:p>
+      </dgm:t>
     </dgm:pt>
     <dgm:pt modelId="{D094AAA5-3647-480B-8880-A1D8F8A58319}" type="pres">
       <dgm:prSet presAssocID="{1CCD693B-DAB4-4D47-B7CC-492ACAC7B1DD}" presName="hierChild3" presStyleCnt="0"/>
@@ -2783,6 +3064,13 @@
     <dgm:pt modelId="{FE466D77-DD52-415A-921F-5B6F5A281D0A}" type="pres">
       <dgm:prSet presAssocID="{38C43D82-97EB-4B2F-BBE6-E7BEF32D4865}" presName="Name19" presStyleLbl="parChTrans1D3" presStyleIdx="2" presStyleCnt="3"/>
       <dgm:spPr/>
+      <dgm:t>
+        <a:bodyPr/>
+        <a:lstStyle/>
+        <a:p>
+          <a:endParaRPr lang="en-US"/>
+        </a:p>
+      </dgm:t>
     </dgm:pt>
     <dgm:pt modelId="{482A201E-D9FF-46E2-8D9D-C129E856AD3B}" type="pres">
       <dgm:prSet presAssocID="{FF1E3CB0-BAF2-4ADD-8990-0573B415F378}" presName="Name21" presStyleCnt="0"/>
@@ -2809,69 +3097,69 @@
     </dgm:pt>
   </dgm:ptLst>
   <dgm:cxnLst>
+    <dgm:cxn modelId="{51FC22CF-4DA7-4532-ADE2-5E9DD781BA57}" srcId="{299EB561-97C7-4BAC-B7EB-DB28C33DA60A}" destId="{B5616882-C45F-4116-A8B7-E0FF2BC78404}" srcOrd="0" destOrd="0" parTransId="{690B4BB5-43DB-4342-B5A4-23B9AC7FC042}" sibTransId="{8130ACB8-192A-48F7-B311-73CF415BD6AF}"/>
+    <dgm:cxn modelId="{D2D279A0-4C6C-4C4E-8E56-41F0631352C7}" srcId="{6F9C22BB-A951-4593-904B-133B05B88043}" destId="{2E82ED61-2C38-4B5F-BBA6-C193A1299B2B}" srcOrd="0" destOrd="0" parTransId="{971CF5ED-AFF3-482E-A74A-0BF989CA19A9}" sibTransId="{7D73BB3C-F02E-4D32-8C3F-AABB7D49AB2A}"/>
+    <dgm:cxn modelId="{25CF7C5E-5B26-4D19-9B68-FCF1F0136388}" srcId="{299EB561-97C7-4BAC-B7EB-DB28C33DA60A}" destId="{1153B68D-8017-4FD2-B763-2BE2FFBFC9C4}" srcOrd="1" destOrd="0" parTransId="{2A8D573A-B194-44E7-806C-4E7169F3ED3F}" sibTransId="{298039BD-8A67-4C84-8B34-18A6CE646C65}"/>
+    <dgm:cxn modelId="{D95C32C0-9E86-43A3-B632-26C922CD11EA}" type="presOf" srcId="{174B66DE-A4C5-4262-B9FF-3DB70DD760B4}" destId="{B215FB30-8694-4C29-B7FC-A88B9190FB5A}" srcOrd="0" destOrd="0" presId="urn:microsoft.com/office/officeart/2005/8/layout/hierarchy6"/>
+    <dgm:cxn modelId="{3F0A6D4D-072A-4A91-A9E7-0B548D888292}" srcId="{49000756-D061-4D71-8CA0-31F9974ECF1A}" destId="{7261F8F1-733F-4542-93C9-75D3C32A9639}" srcOrd="1" destOrd="0" parTransId="{60AFF6D8-66C2-4ABA-9ACB-2D4DD35559D1}" sibTransId="{FA44700B-C9E2-4012-B96F-040BCB7FA66C}"/>
+    <dgm:cxn modelId="{86A0356E-AC14-45EC-B127-08EF57FDA833}" srcId="{4895BF14-2446-4B8C-B1A9-9780BC55D8B3}" destId="{174B66DE-A4C5-4262-B9FF-3DB70DD760B4}" srcOrd="0" destOrd="0" parTransId="{F75DAD21-9BFC-4948-9203-F5848E0A8B96}" sibTransId="{8C8068DF-3B6B-44FE-B536-A1297581E869}"/>
+    <dgm:cxn modelId="{B84ECF1D-A6CB-4A74-93B0-8833CAC3DD2C}" srcId="{62461A88-BE74-49D3-AC7E-AEE5A612166B}" destId="{6F9C22BB-A951-4593-904B-133B05B88043}" srcOrd="1" destOrd="0" parTransId="{CCF9276B-DD30-4A31-97E0-374BC2F33936}" sibTransId="{8A4F2D8F-12C0-41E0-A37F-E5C90C9E13B5}"/>
+    <dgm:cxn modelId="{E3B1A65A-DB8F-4728-B949-8C8B3DF5A367}" type="presOf" srcId="{6F9C22BB-A951-4593-904B-133B05B88043}" destId="{B8E2EB32-E5D0-4D49-BCD7-A48568B971EC}" srcOrd="0" destOrd="0" presId="urn:microsoft.com/office/officeart/2005/8/layout/hierarchy6"/>
+    <dgm:cxn modelId="{865A41CC-0A8A-4C12-AFB0-614771B25982}" srcId="{F1C739AF-6551-4FE4-9091-30A25A3579C1}" destId="{3152CBFA-D90F-4370-98D8-CBB96716A74F}" srcOrd="0" destOrd="0" parTransId="{E5010613-837B-41EE-B31B-DA18AD9AB298}" sibTransId="{2CC84CC8-915A-415D-B845-A5F35975D5C6}"/>
+    <dgm:cxn modelId="{34C104DB-041C-433F-A6E2-353333FECE96}" type="presOf" srcId="{DFCC83F9-0185-4FAC-9C8B-DC9E59A90181}" destId="{54588B55-EECC-466F-9237-F2D13FCF3C12}" srcOrd="0" destOrd="0" presId="urn:microsoft.com/office/officeart/2005/8/layout/hierarchy6"/>
+    <dgm:cxn modelId="{78FEDABF-5AD0-4AD9-B82B-6C575BD4B9DB}" srcId="{29ED1BD8-A9E7-4C67-873E-405A4AF25EE9}" destId="{62461A88-BE74-49D3-AC7E-AEE5A612166B}" srcOrd="0" destOrd="0" parTransId="{E48153EC-E2FA-408B-8E7C-22B22D651AAD}" sibTransId="{86D73EE1-2C83-4EE2-9590-2C2EAE653F54}"/>
+    <dgm:cxn modelId="{A6607A16-C5C8-4B8F-B392-782E9B6D2A1C}" type="presOf" srcId="{4029C3B0-0896-45B8-8180-9AF91F9BB120}" destId="{7D20DB9F-D5B1-4696-ACEA-D430084773AA}" srcOrd="0" destOrd="0" presId="urn:microsoft.com/office/officeart/2005/8/layout/hierarchy6"/>
+    <dgm:cxn modelId="{F623D2E4-4CA9-4C3F-962B-F864AE6CF11D}" srcId="{936808E1-78FF-415A-8C6D-B8D366E7E94B}" destId="{4895BF14-2446-4B8C-B1A9-9780BC55D8B3}" srcOrd="1" destOrd="0" parTransId="{3380550B-F545-409E-8728-3E2080D1DE8E}" sibTransId="{64C3886D-ADEC-45CC-8A16-B91E3EDBC043}"/>
+    <dgm:cxn modelId="{6E76E6FB-58E9-46C6-8744-B495C7F39F02}" srcId="{3152CBFA-D90F-4370-98D8-CBB96716A74F}" destId="{1CCD693B-DAB4-4D47-B7CC-492ACAC7B1DD}" srcOrd="1" destOrd="0" parTransId="{016EF344-7E15-4844-97F5-F8DC735DFEAA}" sibTransId="{4FEAB3D8-05EC-4606-8CF8-001A6A2CDE21}"/>
+    <dgm:cxn modelId="{2B6366A6-CE5C-4243-A6E8-54605E62E31B}" type="presOf" srcId="{35AF10B0-5D0C-488A-8DA7-F73BE8FC5D85}" destId="{535C48B3-87DE-4354-B7E8-FD38DC14560D}" srcOrd="0" destOrd="0" presId="urn:microsoft.com/office/officeart/2005/8/layout/hierarchy6"/>
+    <dgm:cxn modelId="{DCC80803-3D97-49AC-84B5-2FDC8AB5D01E}" type="presOf" srcId="{F1C739AF-6551-4FE4-9091-30A25A3579C1}" destId="{ECACF06E-0D77-42BB-B120-CAE787F5BE8E}" srcOrd="0" destOrd="0" presId="urn:microsoft.com/office/officeart/2005/8/layout/hierarchy6"/>
+    <dgm:cxn modelId="{D2A430F1-8FBB-4131-9B41-DF297C34C52B}" type="presOf" srcId="{299EB561-97C7-4BAC-B7EB-DB28C33DA60A}" destId="{C4FAC167-4C6C-4E30-956B-62E586336272}" srcOrd="0" destOrd="0" presId="urn:microsoft.com/office/officeart/2005/8/layout/hierarchy6"/>
+    <dgm:cxn modelId="{0BAE7DFD-F964-4DFC-A375-71D2EB87BEAB}" srcId="{DD123432-B415-4B22-814C-D6B426117991}" destId="{299EB561-97C7-4BAC-B7EB-DB28C33DA60A}" srcOrd="0" destOrd="0" parTransId="{EA7FE5AF-FF75-442B-B746-865641E95FAD}" sibTransId="{C5CE8850-2156-436C-B62B-15537E575CB9}"/>
+    <dgm:cxn modelId="{5E557175-EC6C-4467-ADA7-B8607C493CA4}" type="presOf" srcId="{F75DAD21-9BFC-4948-9203-F5848E0A8B96}" destId="{CD809B7E-A368-46C6-AAFB-1EDABED2B127}" srcOrd="0" destOrd="0" presId="urn:microsoft.com/office/officeart/2005/8/layout/hierarchy6"/>
+    <dgm:cxn modelId="{5C4E60E0-1AAE-47E7-B184-880644FC4FA7}" type="presOf" srcId="{1CCD693B-DAB4-4D47-B7CC-492ACAC7B1DD}" destId="{33A0C656-9415-4F4D-9065-7D26BDA0B663}" srcOrd="0" destOrd="0" presId="urn:microsoft.com/office/officeart/2005/8/layout/hierarchy6"/>
+    <dgm:cxn modelId="{72B2A304-F408-4776-BB76-40A4C38A433A}" type="presOf" srcId="{DD123432-B415-4B22-814C-D6B426117991}" destId="{B9277DAC-F9CA-4E71-B63F-3F16B430F309}" srcOrd="0" destOrd="0" presId="urn:microsoft.com/office/officeart/2005/8/layout/hierarchy6"/>
+    <dgm:cxn modelId="{C3A2A93F-57A7-4ED5-8AF6-6941E4C31CFA}" srcId="{62461A88-BE74-49D3-AC7E-AEE5A612166B}" destId="{FF1E3CB0-BAF2-4ADD-8990-0573B415F378}" srcOrd="2" destOrd="0" parTransId="{38C43D82-97EB-4B2F-BBE6-E7BEF32D4865}" sibTransId="{86C4E3F9-7F37-4BDE-8DFB-AE2CE79C71A7}"/>
+    <dgm:cxn modelId="{8F2364D8-EB83-4C73-B29E-8B7EE1CEC84E}" srcId="{1565F46A-33E8-4FDB-836B-D3F88AA217D6}" destId="{29ED1BD8-A9E7-4C67-873E-405A4AF25EE9}" srcOrd="0" destOrd="0" parTransId="{011F36AE-F9DC-4279-9D0A-C5A84D645C9C}" sibTransId="{A5009B00-7923-40A4-B24B-4FF0A4275F7D}"/>
+    <dgm:cxn modelId="{201F5D71-86A4-4FF2-B0F2-7C2A24CB4A5F}" type="presOf" srcId="{2A8D573A-B194-44E7-806C-4E7169F3ED3F}" destId="{4697DA84-ECF6-4003-9834-CE181F277FBB}" srcOrd="0" destOrd="0" presId="urn:microsoft.com/office/officeart/2005/8/layout/hierarchy6"/>
+    <dgm:cxn modelId="{49F56405-A866-40F7-A502-8C10781A4A19}" type="presOf" srcId="{29ED1BD8-A9E7-4C67-873E-405A4AF25EE9}" destId="{F486E78D-8AE6-4C6E-873C-B84E22BEDAEE}" srcOrd="0" destOrd="0" presId="urn:microsoft.com/office/officeart/2005/8/layout/hierarchy6"/>
+    <dgm:cxn modelId="{9DF437E5-3046-4BE6-B752-8B97A9BC9078}" type="presOf" srcId="{4C2075A7-8E8D-4212-AEF2-FA2BFC036D54}" destId="{6FF85653-6460-4756-A629-C1326052BA6B}" srcOrd="0" destOrd="0" presId="urn:microsoft.com/office/officeart/2005/8/layout/hierarchy6"/>
+    <dgm:cxn modelId="{420784FE-7DA6-4920-A0DA-B993152B0C0D}" srcId="{936808E1-78FF-415A-8C6D-B8D366E7E94B}" destId="{DD123432-B415-4B22-814C-D6B426117991}" srcOrd="0" destOrd="0" parTransId="{BFFCE8B3-4141-4F92-BE7A-A1EAF853840D}" sibTransId="{0726F1BA-C470-42B0-9598-FCC87F422C27}"/>
+    <dgm:cxn modelId="{22CF2E35-F00E-4A57-82FB-DA0CABD3360F}" type="presOf" srcId="{1153B68D-8017-4FD2-B763-2BE2FFBFC9C4}" destId="{F6D58E2E-40CE-4F2C-8885-5BDDD1172BE8}" srcOrd="0" destOrd="0" presId="urn:microsoft.com/office/officeart/2005/8/layout/hierarchy6"/>
+    <dgm:cxn modelId="{B1978F76-7C1F-4341-A399-C6056FD97662}" type="presOf" srcId="{60AFF6D8-66C2-4ABA-9ACB-2D4DD35559D1}" destId="{4694D937-0134-4A93-9211-341C9D99867A}" srcOrd="0" destOrd="0" presId="urn:microsoft.com/office/officeart/2005/8/layout/hierarchy6"/>
+    <dgm:cxn modelId="{9DD7FAD5-F49C-4B8B-A49A-58E711DCA903}" type="presOf" srcId="{3380550B-F545-409E-8728-3E2080D1DE8E}" destId="{5962983C-0FD2-4E96-8C1C-E39F1E4C568F}" srcOrd="0" destOrd="0" presId="urn:microsoft.com/office/officeart/2005/8/layout/hierarchy6"/>
+    <dgm:cxn modelId="{CDC12802-18B7-4C39-AEB4-9451B29096AB}" type="presOf" srcId="{3152CBFA-D90F-4370-98D8-CBB96716A74F}" destId="{DE52B5AB-E58B-46E6-9C09-E32ABFBD8A69}" srcOrd="0" destOrd="0" presId="urn:microsoft.com/office/officeart/2005/8/layout/hierarchy6"/>
+    <dgm:cxn modelId="{956ED43B-CF59-48BF-A994-C00DF476202B}" type="presOf" srcId="{E5010613-837B-41EE-B31B-DA18AD9AB298}" destId="{F064F509-5960-48D4-BB13-231EDCC76B94}" srcOrd="0" destOrd="0" presId="urn:microsoft.com/office/officeart/2005/8/layout/hierarchy6"/>
+    <dgm:cxn modelId="{7BE8DFC3-CFB9-4598-9973-8AAB8C0E76B7}" type="presOf" srcId="{971CF5ED-AFF3-482E-A74A-0BF989CA19A9}" destId="{857F7289-7B4E-4003-AC3D-69AFF400B1F1}" srcOrd="0" destOrd="0" presId="urn:microsoft.com/office/officeart/2005/8/layout/hierarchy6"/>
+    <dgm:cxn modelId="{A932358F-721F-47ED-B8E1-0CE7D336A7A7}" type="presOf" srcId="{4895BF14-2446-4B8C-B1A9-9780BC55D8B3}" destId="{E257627A-BB36-4F01-A617-C92E4B946BE3}" srcOrd="0" destOrd="0" presId="urn:microsoft.com/office/officeart/2005/8/layout/hierarchy6"/>
+    <dgm:cxn modelId="{161F3D0C-EF08-4AD9-A64D-BAD34F4BF803}" type="presOf" srcId="{577A5865-3120-46AD-84D7-B481646DDA51}" destId="{D3916319-D670-48BE-8E7C-73EFD501C140}" srcOrd="0" destOrd="0" presId="urn:microsoft.com/office/officeart/2005/8/layout/hierarchy6"/>
+    <dgm:cxn modelId="{79842A2A-6046-40D7-B058-C5A40EF11B30}" type="presOf" srcId="{0C638C6E-8B89-484E-99A7-0F0008F44C1B}" destId="{D19A60F2-8B64-4F9B-B220-0126805DB7E3}" srcOrd="0" destOrd="0" presId="urn:microsoft.com/office/officeart/2005/8/layout/hierarchy6"/>
+    <dgm:cxn modelId="{D14D06FD-C82E-4CCB-9A47-153F8CB5D937}" type="presOf" srcId="{BFFCE8B3-4141-4F92-BE7A-A1EAF853840D}" destId="{30DEC963-A63E-4CF4-8BC8-BCCC54B50307}" srcOrd="0" destOrd="0" presId="urn:microsoft.com/office/officeart/2005/8/layout/hierarchy6"/>
+    <dgm:cxn modelId="{E229B6AD-E60D-4C66-857E-C2034F959486}" type="presOf" srcId="{2E82ED61-2C38-4B5F-BBA6-C193A1299B2B}" destId="{712470A4-8189-46E3-8952-B9DFA4D0FD5B}" srcOrd="0" destOrd="0" presId="urn:microsoft.com/office/officeart/2005/8/layout/hierarchy6"/>
+    <dgm:cxn modelId="{1644F148-8C25-483D-8E8C-CEFF92406E02}" srcId="{62461A88-BE74-49D3-AC7E-AEE5A612166B}" destId="{936808E1-78FF-415A-8C6D-B8D366E7E94B}" srcOrd="0" destOrd="0" parTransId="{7A7E8FDD-A9C0-4725-BC34-3F5C43CB3CF9}" sibTransId="{41C6E207-932A-446C-BED6-6532EF373271}"/>
+    <dgm:cxn modelId="{C3FF5911-6747-4743-AE6C-863F32F5B0E2}" srcId="{174B66DE-A4C5-4262-B9FF-3DB70DD760B4}" destId="{59ECBF1E-327F-4C3E-A1AC-C8ADD56A60A6}" srcOrd="0" destOrd="0" parTransId="{4C2075A7-8E8D-4212-AEF2-FA2BFC036D54}" sibTransId="{AD56F4E0-33B2-4CFD-B0FE-7E9084C10718}"/>
+    <dgm:cxn modelId="{7B0AAED2-3450-4FB9-9CBB-2209712C7CD9}" type="presOf" srcId="{E48153EC-E2FA-408B-8E7C-22B22D651AAD}" destId="{85CDC8C9-66F5-477F-8620-D18C62C05FD8}" srcOrd="0" destOrd="0" presId="urn:microsoft.com/office/officeart/2005/8/layout/hierarchy6"/>
+    <dgm:cxn modelId="{2B6DE801-D737-4C50-A815-E41BDA356FD0}" srcId="{174B66DE-A4C5-4262-B9FF-3DB70DD760B4}" destId="{C7CF69AB-CFAF-42DF-807F-2486B4A2B61E}" srcOrd="1" destOrd="0" parTransId="{DFCC83F9-0185-4FAC-9C8B-DC9E59A90181}" sibTransId="{F11F8D29-D862-41A4-A441-237B83759010}"/>
+    <dgm:cxn modelId="{03E410BF-18FA-49A6-8E94-6DFC92388C18}" type="presOf" srcId="{62461A88-BE74-49D3-AC7E-AEE5A612166B}" destId="{7FFE00B5-FB63-4647-B86D-7F6898C2ABAF}" srcOrd="0" destOrd="0" presId="urn:microsoft.com/office/officeart/2005/8/layout/hierarchy6"/>
+    <dgm:cxn modelId="{7ADCB353-3418-49AF-AEAA-730E1AA8024A}" type="presOf" srcId="{49000756-D061-4D71-8CA0-31F9974ECF1A}" destId="{F1F1265C-A072-48C6-85E4-0B0E9EEBF7A9}" srcOrd="0" destOrd="0" presId="urn:microsoft.com/office/officeart/2005/8/layout/hierarchy6"/>
+    <dgm:cxn modelId="{40BC4807-C2DB-4739-853E-EBB894390EB0}" type="presOf" srcId="{38C43D82-97EB-4B2F-BBE6-E7BEF32D4865}" destId="{FE466D77-DD52-415A-921F-5B6F5A281D0A}" srcOrd="0" destOrd="0" presId="urn:microsoft.com/office/officeart/2005/8/layout/hierarchy6"/>
+    <dgm:cxn modelId="{3C878166-0A9A-4A22-8F4C-BF882CDB14B6}" type="presOf" srcId="{A0836253-59AD-4823-969B-C27091CC6D31}" destId="{288A98C4-8794-4D98-9D7E-6D757471075D}" srcOrd="0" destOrd="0" presId="urn:microsoft.com/office/officeart/2005/8/layout/hierarchy6"/>
+    <dgm:cxn modelId="{3FE7DF85-7176-45EC-8F0C-A4317BD0714D}" type="presOf" srcId="{690B4BB5-43DB-4342-B5A4-23B9AC7FC042}" destId="{A89A8AFA-C3FB-40F4-A8F8-026146D78588}" srcOrd="0" destOrd="0" presId="urn:microsoft.com/office/officeart/2005/8/layout/hierarchy6"/>
+    <dgm:cxn modelId="{835EE9B5-B185-4B8D-909B-865A90D9D03B}" srcId="{49000756-D061-4D71-8CA0-31F9974ECF1A}" destId="{35AF10B0-5D0C-488A-8DA7-F73BE8FC5D85}" srcOrd="0" destOrd="0" parTransId="{5148951C-C1B0-434D-90F2-1F2128DF3563}" sibTransId="{C862EED3-BF96-43F1-8671-B3A05E19D8F0}"/>
+    <dgm:cxn modelId="{13E1E6C9-782D-4B5A-93B5-C0CF2AAE1EF3}" type="presOf" srcId="{936808E1-78FF-415A-8C6D-B8D366E7E94B}" destId="{D0C888DE-0CAA-4426-B613-BB51F6DAA8DF}" srcOrd="0" destOrd="0" presId="urn:microsoft.com/office/officeart/2005/8/layout/hierarchy6"/>
+    <dgm:cxn modelId="{91491415-3C28-4151-9272-716089DA1524}" type="presOf" srcId="{EA7FE5AF-FF75-442B-B746-865641E95FAD}" destId="{55BDA48D-D577-402D-B265-2D98DC9968AF}" srcOrd="0" destOrd="0" presId="urn:microsoft.com/office/officeart/2005/8/layout/hierarchy6"/>
+    <dgm:cxn modelId="{2BC76922-BACF-4B39-9A5A-6652060A7CFC}" type="presOf" srcId="{C7CF69AB-CFAF-42DF-807F-2486B4A2B61E}" destId="{1D6A2535-EE4C-47C7-BB0B-B5758CDDC053}" srcOrd="0" destOrd="0" presId="urn:microsoft.com/office/officeart/2005/8/layout/hierarchy6"/>
     <dgm:cxn modelId="{00344D45-D33F-4371-8639-FEC63EAF7505}" type="presOf" srcId="{59ECBF1E-327F-4C3E-A1AC-C8ADD56A60A6}" destId="{43337737-EF2B-4E98-84B4-D16409A4EA80}" srcOrd="0" destOrd="0" presId="urn:microsoft.com/office/officeart/2005/8/layout/hierarchy6"/>
-    <dgm:cxn modelId="{40BC4807-C2DB-4739-853E-EBB894390EB0}" type="presOf" srcId="{38C43D82-97EB-4B2F-BBE6-E7BEF32D4865}" destId="{FE466D77-DD52-415A-921F-5B6F5A281D0A}" srcOrd="0" destOrd="0" presId="urn:microsoft.com/office/officeart/2005/8/layout/hierarchy6"/>
-    <dgm:cxn modelId="{D2D279A0-4C6C-4C4E-8E56-41F0631352C7}" srcId="{6F9C22BB-A951-4593-904B-133B05B88043}" destId="{2E82ED61-2C38-4B5F-BBA6-C193A1299B2B}" srcOrd="0" destOrd="0" parTransId="{971CF5ED-AFF3-482E-A74A-0BF989CA19A9}" sibTransId="{7D73BB3C-F02E-4D32-8C3F-AABB7D49AB2A}"/>
+    <dgm:cxn modelId="{9C4F6D87-2627-4E1F-B1A2-60BBA220C37B}" type="presOf" srcId="{FF1E3CB0-BAF2-4ADD-8990-0573B415F378}" destId="{F2D53BBD-D4ED-4E64-8C17-98D5B8879CBF}" srcOrd="0" destOrd="0" presId="urn:microsoft.com/office/officeart/2005/8/layout/hierarchy6"/>
+    <dgm:cxn modelId="{F6FE52B9-5E83-4752-93FE-F01D16574890}" srcId="{3152CBFA-D90F-4370-98D8-CBB96716A74F}" destId="{A0836253-59AD-4823-969B-C27091CC6D31}" srcOrd="0" destOrd="0" parTransId="{0C638C6E-8B89-484E-99A7-0F0008F44C1B}" sibTransId="{C52AF91B-87E7-4CFB-A4B1-9C351C99B152}"/>
+    <dgm:cxn modelId="{E728E43E-2491-4591-B4EA-106453CBEF00}" type="presOf" srcId="{7261F8F1-733F-4542-93C9-75D3C32A9639}" destId="{72A1B322-E366-4DB2-B1F2-D6E2B08456E6}" srcOrd="0" destOrd="0" presId="urn:microsoft.com/office/officeart/2005/8/layout/hierarchy6"/>
+    <dgm:cxn modelId="{D593B8FC-BE41-47B1-A178-A5B641C03169}" type="presOf" srcId="{B5616882-C45F-4116-A8B7-E0FF2BC78404}" destId="{5E06239B-1E51-4EB4-BAEB-09F5EF1F334C}" srcOrd="0" destOrd="0" presId="urn:microsoft.com/office/officeart/2005/8/layout/hierarchy6"/>
+    <dgm:cxn modelId="{F8D94765-8E0D-4D47-A5DD-1F48CBDDEA29}" type="presOf" srcId="{7A7E8FDD-A9C0-4725-BC34-3F5C43CB3CF9}" destId="{3ED92A81-5FF7-4BBB-AE0A-29442DBAFA8B}" srcOrd="0" destOrd="0" presId="urn:microsoft.com/office/officeart/2005/8/layout/hierarchy6"/>
+    <dgm:cxn modelId="{42180F2B-3212-44A9-B532-89ED5CAC0D99}" type="presOf" srcId="{016EF344-7E15-4844-97F5-F8DC735DFEAA}" destId="{1E3B8822-CBE7-4FB4-91BA-A1997FD8D194}" srcOrd="0" destOrd="0" presId="urn:microsoft.com/office/officeart/2005/8/layout/hierarchy6"/>
+    <dgm:cxn modelId="{0A06234C-3240-4F9B-9F28-DC34D36A966B}" type="presOf" srcId="{5148951C-C1B0-434D-90F2-1F2128DF3563}" destId="{4051F676-1C76-472E-B793-42A16DDEB179}" srcOrd="0" destOrd="0" presId="urn:microsoft.com/office/officeart/2005/8/layout/hierarchy6"/>
+    <dgm:cxn modelId="{5B4B2E33-DBC3-495B-9AB8-2919CDFF8376}" srcId="{6F9C22BB-A951-4593-904B-133B05B88043}" destId="{F1C739AF-6551-4FE4-9091-30A25A3579C1}" srcOrd="1" destOrd="0" parTransId="{577A5865-3120-46AD-84D7-B481646DDA51}" sibTransId="{8D3704BA-B5FB-4734-9A57-BEEAB9C053D1}"/>
+    <dgm:cxn modelId="{61F41AFD-CDAC-4C09-8C4F-612F706B2167}" type="presOf" srcId="{CCF9276B-DD30-4A31-97E0-374BC2F33936}" destId="{41D334FC-DC88-4297-988A-B6A3A5BF7DD8}" srcOrd="0" destOrd="0" presId="urn:microsoft.com/office/officeart/2005/8/layout/hierarchy6"/>
+    <dgm:cxn modelId="{F5987033-F94E-4179-91EB-56E0B7E6DEFB}" type="presOf" srcId="{1565F46A-33E8-4FDB-836B-D3F88AA217D6}" destId="{8BE94AF5-9234-41C9-8505-87E9ECE3D97A}" srcOrd="0" destOrd="0" presId="urn:microsoft.com/office/officeart/2005/8/layout/hierarchy6"/>
     <dgm:cxn modelId="{AB602225-58AD-450B-9A62-E9CB769391F3}" srcId="{2E82ED61-2C38-4B5F-BBA6-C193A1299B2B}" destId="{49000756-D061-4D71-8CA0-31F9974ECF1A}" srcOrd="0" destOrd="0" parTransId="{4029C3B0-0896-45B8-8180-9AF91F9BB120}" sibTransId="{AF8E81E6-DE3C-4549-975B-359FD53157DB}"/>
-    <dgm:cxn modelId="{5C4E60E0-1AAE-47E7-B184-880644FC4FA7}" type="presOf" srcId="{1CCD693B-DAB4-4D47-B7CC-492ACAC7B1DD}" destId="{33A0C656-9415-4F4D-9065-7D26BDA0B663}" srcOrd="0" destOrd="0" presId="urn:microsoft.com/office/officeart/2005/8/layout/hierarchy6"/>
-    <dgm:cxn modelId="{91491415-3C28-4151-9272-716089DA1524}" type="presOf" srcId="{EA7FE5AF-FF75-442B-B746-865641E95FAD}" destId="{55BDA48D-D577-402D-B265-2D98DC9968AF}" srcOrd="0" destOrd="0" presId="urn:microsoft.com/office/officeart/2005/8/layout/hierarchy6"/>
-    <dgm:cxn modelId="{F623D2E4-4CA9-4C3F-962B-F864AE6CF11D}" srcId="{936808E1-78FF-415A-8C6D-B8D366E7E94B}" destId="{4895BF14-2446-4B8C-B1A9-9780BC55D8B3}" srcOrd="1" destOrd="0" parTransId="{3380550B-F545-409E-8728-3E2080D1DE8E}" sibTransId="{64C3886D-ADEC-45CC-8A16-B91E3EDBC043}"/>
-    <dgm:cxn modelId="{D14D06FD-C82E-4CCB-9A47-153F8CB5D937}" type="presOf" srcId="{BFFCE8B3-4141-4F92-BE7A-A1EAF853840D}" destId="{30DEC963-A63E-4CF4-8BC8-BCCC54B50307}" srcOrd="0" destOrd="0" presId="urn:microsoft.com/office/officeart/2005/8/layout/hierarchy6"/>
-    <dgm:cxn modelId="{79842A2A-6046-40D7-B058-C5A40EF11B30}" type="presOf" srcId="{0C638C6E-8B89-484E-99A7-0F0008F44C1B}" destId="{D19A60F2-8B64-4F9B-B220-0126805DB7E3}" srcOrd="0" destOrd="0" presId="urn:microsoft.com/office/officeart/2005/8/layout/hierarchy6"/>
-    <dgm:cxn modelId="{8F2364D8-EB83-4C73-B29E-8B7EE1CEC84E}" srcId="{1565F46A-33E8-4FDB-836B-D3F88AA217D6}" destId="{29ED1BD8-A9E7-4C67-873E-405A4AF25EE9}" srcOrd="0" destOrd="0" parTransId="{011F36AE-F9DC-4279-9D0A-C5A84D645C9C}" sibTransId="{A5009B00-7923-40A4-B24B-4FF0A4275F7D}"/>
-    <dgm:cxn modelId="{F6FE52B9-5E83-4752-93FE-F01D16574890}" srcId="{3152CBFA-D90F-4370-98D8-CBB96716A74F}" destId="{A0836253-59AD-4823-969B-C27091CC6D31}" srcOrd="0" destOrd="0" parTransId="{0C638C6E-8B89-484E-99A7-0F0008F44C1B}" sibTransId="{C52AF91B-87E7-4CFB-A4B1-9C351C99B152}"/>
-    <dgm:cxn modelId="{7BE8DFC3-CFB9-4598-9973-8AAB8C0E76B7}" type="presOf" srcId="{971CF5ED-AFF3-482E-A74A-0BF989CA19A9}" destId="{857F7289-7B4E-4003-AC3D-69AFF400B1F1}" srcOrd="0" destOrd="0" presId="urn:microsoft.com/office/officeart/2005/8/layout/hierarchy6"/>
-    <dgm:cxn modelId="{D95C32C0-9E86-43A3-B632-26C922CD11EA}" type="presOf" srcId="{174B66DE-A4C5-4262-B9FF-3DB70DD760B4}" destId="{B215FB30-8694-4C29-B7FC-A88B9190FB5A}" srcOrd="0" destOrd="0" presId="urn:microsoft.com/office/officeart/2005/8/layout/hierarchy6"/>
-    <dgm:cxn modelId="{34C104DB-041C-433F-A6E2-353333FECE96}" type="presOf" srcId="{DFCC83F9-0185-4FAC-9C8B-DC9E59A90181}" destId="{54588B55-EECC-466F-9237-F2D13FCF3C12}" srcOrd="0" destOrd="0" presId="urn:microsoft.com/office/officeart/2005/8/layout/hierarchy6"/>
-    <dgm:cxn modelId="{C3A2A93F-57A7-4ED5-8AF6-6941E4C31CFA}" srcId="{62461A88-BE74-49D3-AC7E-AEE5A612166B}" destId="{FF1E3CB0-BAF2-4ADD-8990-0573B415F378}" srcOrd="2" destOrd="0" parTransId="{38C43D82-97EB-4B2F-BBE6-E7BEF32D4865}" sibTransId="{86C4E3F9-7F37-4BDE-8DFB-AE2CE79C71A7}"/>
-    <dgm:cxn modelId="{2B6DE801-D737-4C50-A815-E41BDA356FD0}" srcId="{174B66DE-A4C5-4262-B9FF-3DB70DD760B4}" destId="{C7CF69AB-CFAF-42DF-807F-2486B4A2B61E}" srcOrd="1" destOrd="0" parTransId="{DFCC83F9-0185-4FAC-9C8B-DC9E59A90181}" sibTransId="{F11F8D29-D862-41A4-A441-237B83759010}"/>
-    <dgm:cxn modelId="{865A41CC-0A8A-4C12-AFB0-614771B25982}" srcId="{F1C739AF-6551-4FE4-9091-30A25A3579C1}" destId="{3152CBFA-D90F-4370-98D8-CBB96716A74F}" srcOrd="0" destOrd="0" parTransId="{E5010613-837B-41EE-B31B-DA18AD9AB298}" sibTransId="{2CC84CC8-915A-415D-B845-A5F35975D5C6}"/>
-    <dgm:cxn modelId="{956ED43B-CF59-48BF-A994-C00DF476202B}" type="presOf" srcId="{E5010613-837B-41EE-B31B-DA18AD9AB298}" destId="{F064F509-5960-48D4-BB13-231EDCC76B94}" srcOrd="0" destOrd="0" presId="urn:microsoft.com/office/officeart/2005/8/layout/hierarchy6"/>
-    <dgm:cxn modelId="{F8D94765-8E0D-4D47-A5DD-1F48CBDDEA29}" type="presOf" srcId="{7A7E8FDD-A9C0-4725-BC34-3F5C43CB3CF9}" destId="{3ED92A81-5FF7-4BBB-AE0A-29442DBAFA8B}" srcOrd="0" destOrd="0" presId="urn:microsoft.com/office/officeart/2005/8/layout/hierarchy6"/>
-    <dgm:cxn modelId="{03E410BF-18FA-49A6-8E94-6DFC92388C18}" type="presOf" srcId="{62461A88-BE74-49D3-AC7E-AEE5A612166B}" destId="{7FFE00B5-FB63-4647-B86D-7F6898C2ABAF}" srcOrd="0" destOrd="0" presId="urn:microsoft.com/office/officeart/2005/8/layout/hierarchy6"/>
-    <dgm:cxn modelId="{E3B1A65A-DB8F-4728-B949-8C8B3DF5A367}" type="presOf" srcId="{6F9C22BB-A951-4593-904B-133B05B88043}" destId="{B8E2EB32-E5D0-4D49-BCD7-A48568B971EC}" srcOrd="0" destOrd="0" presId="urn:microsoft.com/office/officeart/2005/8/layout/hierarchy6"/>
-    <dgm:cxn modelId="{3FE7DF85-7176-45EC-8F0C-A4317BD0714D}" type="presOf" srcId="{690B4BB5-43DB-4342-B5A4-23B9AC7FC042}" destId="{A89A8AFA-C3FB-40F4-A8F8-026146D78588}" srcOrd="0" destOrd="0" presId="urn:microsoft.com/office/officeart/2005/8/layout/hierarchy6"/>
-    <dgm:cxn modelId="{2BC76922-BACF-4B39-9A5A-6652060A7CFC}" type="presOf" srcId="{C7CF69AB-CFAF-42DF-807F-2486B4A2B61E}" destId="{1D6A2535-EE4C-47C7-BB0B-B5758CDDC053}" srcOrd="0" destOrd="0" presId="urn:microsoft.com/office/officeart/2005/8/layout/hierarchy6"/>
-    <dgm:cxn modelId="{49F56405-A866-40F7-A502-8C10781A4A19}" type="presOf" srcId="{29ED1BD8-A9E7-4C67-873E-405A4AF25EE9}" destId="{F486E78D-8AE6-4C6E-873C-B84E22BEDAEE}" srcOrd="0" destOrd="0" presId="urn:microsoft.com/office/officeart/2005/8/layout/hierarchy6"/>
-    <dgm:cxn modelId="{0A06234C-3240-4F9B-9F28-DC34D36A966B}" type="presOf" srcId="{5148951C-C1B0-434D-90F2-1F2128DF3563}" destId="{4051F676-1C76-472E-B793-42A16DDEB179}" srcOrd="0" destOrd="0" presId="urn:microsoft.com/office/officeart/2005/8/layout/hierarchy6"/>
-    <dgm:cxn modelId="{86A0356E-AC14-45EC-B127-08EF57FDA833}" srcId="{4895BF14-2446-4B8C-B1A9-9780BC55D8B3}" destId="{174B66DE-A4C5-4262-B9FF-3DB70DD760B4}" srcOrd="0" destOrd="0" parTransId="{F75DAD21-9BFC-4948-9203-F5848E0A8B96}" sibTransId="{8C8068DF-3B6B-44FE-B536-A1297581E869}"/>
-    <dgm:cxn modelId="{78FEDABF-5AD0-4AD9-B82B-6C575BD4B9DB}" srcId="{29ED1BD8-A9E7-4C67-873E-405A4AF25EE9}" destId="{62461A88-BE74-49D3-AC7E-AEE5A612166B}" srcOrd="0" destOrd="0" parTransId="{E48153EC-E2FA-408B-8E7C-22B22D651AAD}" sibTransId="{86D73EE1-2C83-4EE2-9590-2C2EAE653F54}"/>
-    <dgm:cxn modelId="{7ADCB353-3418-49AF-AEAA-730E1AA8024A}" type="presOf" srcId="{49000756-D061-4D71-8CA0-31F9974ECF1A}" destId="{F1F1265C-A072-48C6-85E4-0B0E9EEBF7A9}" srcOrd="0" destOrd="0" presId="urn:microsoft.com/office/officeart/2005/8/layout/hierarchy6"/>
-    <dgm:cxn modelId="{D593B8FC-BE41-47B1-A178-A5B641C03169}" type="presOf" srcId="{B5616882-C45F-4116-A8B7-E0FF2BC78404}" destId="{5E06239B-1E51-4EB4-BAEB-09F5EF1F334C}" srcOrd="0" destOrd="0" presId="urn:microsoft.com/office/officeart/2005/8/layout/hierarchy6"/>
-    <dgm:cxn modelId="{5B4B2E33-DBC3-495B-9AB8-2919CDFF8376}" srcId="{6F9C22BB-A951-4593-904B-133B05B88043}" destId="{F1C739AF-6551-4FE4-9091-30A25A3579C1}" srcOrd="1" destOrd="0" parTransId="{577A5865-3120-46AD-84D7-B481646DDA51}" sibTransId="{8D3704BA-B5FB-4734-9A57-BEEAB9C053D1}"/>
-    <dgm:cxn modelId="{42180F2B-3212-44A9-B532-89ED5CAC0D99}" type="presOf" srcId="{016EF344-7E15-4844-97F5-F8DC735DFEAA}" destId="{1E3B8822-CBE7-4FB4-91BA-A1997FD8D194}" srcOrd="0" destOrd="0" presId="urn:microsoft.com/office/officeart/2005/8/layout/hierarchy6"/>
-    <dgm:cxn modelId="{7B0AAED2-3450-4FB9-9CBB-2209712C7CD9}" type="presOf" srcId="{E48153EC-E2FA-408B-8E7C-22B22D651AAD}" destId="{85CDC8C9-66F5-477F-8620-D18C62C05FD8}" srcOrd="0" destOrd="0" presId="urn:microsoft.com/office/officeart/2005/8/layout/hierarchy6"/>
-    <dgm:cxn modelId="{61F41AFD-CDAC-4C09-8C4F-612F706B2167}" type="presOf" srcId="{CCF9276B-DD30-4A31-97E0-374BC2F33936}" destId="{41D334FC-DC88-4297-988A-B6A3A5BF7DD8}" srcOrd="0" destOrd="0" presId="urn:microsoft.com/office/officeart/2005/8/layout/hierarchy6"/>
-    <dgm:cxn modelId="{A6607A16-C5C8-4B8F-B392-782E9B6D2A1C}" type="presOf" srcId="{4029C3B0-0896-45B8-8180-9AF91F9BB120}" destId="{7D20DB9F-D5B1-4696-ACEA-D430084773AA}" srcOrd="0" destOrd="0" presId="urn:microsoft.com/office/officeart/2005/8/layout/hierarchy6"/>
-    <dgm:cxn modelId="{161F3D0C-EF08-4AD9-A64D-BAD34F4BF803}" type="presOf" srcId="{577A5865-3120-46AD-84D7-B481646DDA51}" destId="{D3916319-D670-48BE-8E7C-73EFD501C140}" srcOrd="0" destOrd="0" presId="urn:microsoft.com/office/officeart/2005/8/layout/hierarchy6"/>
-    <dgm:cxn modelId="{13E1E6C9-782D-4B5A-93B5-C0CF2AAE1EF3}" type="presOf" srcId="{936808E1-78FF-415A-8C6D-B8D366E7E94B}" destId="{D0C888DE-0CAA-4426-B613-BB51F6DAA8DF}" srcOrd="0" destOrd="0" presId="urn:microsoft.com/office/officeart/2005/8/layout/hierarchy6"/>
-    <dgm:cxn modelId="{22CF2E35-F00E-4A57-82FB-DA0CABD3360F}" type="presOf" srcId="{1153B68D-8017-4FD2-B763-2BE2FFBFC9C4}" destId="{F6D58E2E-40CE-4F2C-8885-5BDDD1172BE8}" srcOrd="0" destOrd="0" presId="urn:microsoft.com/office/officeart/2005/8/layout/hierarchy6"/>
-    <dgm:cxn modelId="{5E557175-EC6C-4467-ADA7-B8607C493CA4}" type="presOf" srcId="{F75DAD21-9BFC-4948-9203-F5848E0A8B96}" destId="{CD809B7E-A368-46C6-AAFB-1EDABED2B127}" srcOrd="0" destOrd="0" presId="urn:microsoft.com/office/officeart/2005/8/layout/hierarchy6"/>
-    <dgm:cxn modelId="{9DD7FAD5-F49C-4B8B-A49A-58E711DCA903}" type="presOf" srcId="{3380550B-F545-409E-8728-3E2080D1DE8E}" destId="{5962983C-0FD2-4E96-8C1C-E39F1E4C568F}" srcOrd="0" destOrd="0" presId="urn:microsoft.com/office/officeart/2005/8/layout/hierarchy6"/>
-    <dgm:cxn modelId="{2B6366A6-CE5C-4243-A6E8-54605E62E31B}" type="presOf" srcId="{35AF10B0-5D0C-488A-8DA7-F73BE8FC5D85}" destId="{535C48B3-87DE-4354-B7E8-FD38DC14560D}" srcOrd="0" destOrd="0" presId="urn:microsoft.com/office/officeart/2005/8/layout/hierarchy6"/>
-    <dgm:cxn modelId="{6E76E6FB-58E9-46C6-8744-B495C7F39F02}" srcId="{3152CBFA-D90F-4370-98D8-CBB96716A74F}" destId="{1CCD693B-DAB4-4D47-B7CC-492ACAC7B1DD}" srcOrd="1" destOrd="0" parTransId="{016EF344-7E15-4844-97F5-F8DC735DFEAA}" sibTransId="{4FEAB3D8-05EC-4606-8CF8-001A6A2CDE21}"/>
-    <dgm:cxn modelId="{835EE9B5-B185-4B8D-909B-865A90D9D03B}" srcId="{49000756-D061-4D71-8CA0-31F9974ECF1A}" destId="{35AF10B0-5D0C-488A-8DA7-F73BE8FC5D85}" srcOrd="0" destOrd="0" parTransId="{5148951C-C1B0-434D-90F2-1F2128DF3563}" sibTransId="{C862EED3-BF96-43F1-8671-B3A05E19D8F0}"/>
-    <dgm:cxn modelId="{25CF7C5E-5B26-4D19-9B68-FCF1F0136388}" srcId="{299EB561-97C7-4BAC-B7EB-DB28C33DA60A}" destId="{1153B68D-8017-4FD2-B763-2BE2FFBFC9C4}" srcOrd="1" destOrd="0" parTransId="{2A8D573A-B194-44E7-806C-4E7169F3ED3F}" sibTransId="{298039BD-8A67-4C84-8B34-18A6CE646C65}"/>
-    <dgm:cxn modelId="{0BAE7DFD-F964-4DFC-A375-71D2EB87BEAB}" srcId="{DD123432-B415-4B22-814C-D6B426117991}" destId="{299EB561-97C7-4BAC-B7EB-DB28C33DA60A}" srcOrd="0" destOrd="0" parTransId="{EA7FE5AF-FF75-442B-B746-865641E95FAD}" sibTransId="{C5CE8850-2156-436C-B62B-15537E575CB9}"/>
-    <dgm:cxn modelId="{1644F148-8C25-483D-8E8C-CEFF92406E02}" srcId="{62461A88-BE74-49D3-AC7E-AEE5A612166B}" destId="{936808E1-78FF-415A-8C6D-B8D366E7E94B}" srcOrd="0" destOrd="0" parTransId="{7A7E8FDD-A9C0-4725-BC34-3F5C43CB3CF9}" sibTransId="{41C6E207-932A-446C-BED6-6532EF373271}"/>
-    <dgm:cxn modelId="{51FC22CF-4DA7-4532-ADE2-5E9DD781BA57}" srcId="{299EB561-97C7-4BAC-B7EB-DB28C33DA60A}" destId="{B5616882-C45F-4116-A8B7-E0FF2BC78404}" srcOrd="0" destOrd="0" parTransId="{690B4BB5-43DB-4342-B5A4-23B9AC7FC042}" sibTransId="{8130ACB8-192A-48F7-B311-73CF415BD6AF}"/>
-    <dgm:cxn modelId="{CDC12802-18B7-4C39-AEB4-9451B29096AB}" type="presOf" srcId="{3152CBFA-D90F-4370-98D8-CBB96716A74F}" destId="{DE52B5AB-E58B-46E6-9C09-E32ABFBD8A69}" srcOrd="0" destOrd="0" presId="urn:microsoft.com/office/officeart/2005/8/layout/hierarchy6"/>
-    <dgm:cxn modelId="{E229B6AD-E60D-4C66-857E-C2034F959486}" type="presOf" srcId="{2E82ED61-2C38-4B5F-BBA6-C193A1299B2B}" destId="{712470A4-8189-46E3-8952-B9DFA4D0FD5B}" srcOrd="0" destOrd="0" presId="urn:microsoft.com/office/officeart/2005/8/layout/hierarchy6"/>
-    <dgm:cxn modelId="{B1978F76-7C1F-4341-A399-C6056FD97662}" type="presOf" srcId="{60AFF6D8-66C2-4ABA-9ACB-2D4DD35559D1}" destId="{4694D937-0134-4A93-9211-341C9D99867A}" srcOrd="0" destOrd="0" presId="urn:microsoft.com/office/officeart/2005/8/layout/hierarchy6"/>
-    <dgm:cxn modelId="{D2A430F1-8FBB-4131-9B41-DF297C34C52B}" type="presOf" srcId="{299EB561-97C7-4BAC-B7EB-DB28C33DA60A}" destId="{C4FAC167-4C6C-4E30-956B-62E586336272}" srcOrd="0" destOrd="0" presId="urn:microsoft.com/office/officeart/2005/8/layout/hierarchy6"/>
-    <dgm:cxn modelId="{9C4F6D87-2627-4E1F-B1A2-60BBA220C37B}" type="presOf" srcId="{FF1E3CB0-BAF2-4ADD-8990-0573B415F378}" destId="{F2D53BBD-D4ED-4E64-8C17-98D5B8879CBF}" srcOrd="0" destOrd="0" presId="urn:microsoft.com/office/officeart/2005/8/layout/hierarchy6"/>
-    <dgm:cxn modelId="{A932358F-721F-47ED-B8E1-0CE7D336A7A7}" type="presOf" srcId="{4895BF14-2446-4B8C-B1A9-9780BC55D8B3}" destId="{E257627A-BB36-4F01-A617-C92E4B946BE3}" srcOrd="0" destOrd="0" presId="urn:microsoft.com/office/officeart/2005/8/layout/hierarchy6"/>
-    <dgm:cxn modelId="{201F5D71-86A4-4FF2-B0F2-7C2A24CB4A5F}" type="presOf" srcId="{2A8D573A-B194-44E7-806C-4E7169F3ED3F}" destId="{4697DA84-ECF6-4003-9834-CE181F277FBB}" srcOrd="0" destOrd="0" presId="urn:microsoft.com/office/officeart/2005/8/layout/hierarchy6"/>
-    <dgm:cxn modelId="{72B2A304-F408-4776-BB76-40A4C38A433A}" type="presOf" srcId="{DD123432-B415-4B22-814C-D6B426117991}" destId="{B9277DAC-F9CA-4E71-B63F-3F16B430F309}" srcOrd="0" destOrd="0" presId="urn:microsoft.com/office/officeart/2005/8/layout/hierarchy6"/>
-    <dgm:cxn modelId="{C3FF5911-6747-4743-AE6C-863F32F5B0E2}" srcId="{174B66DE-A4C5-4262-B9FF-3DB70DD760B4}" destId="{59ECBF1E-327F-4C3E-A1AC-C8ADD56A60A6}" srcOrd="0" destOrd="0" parTransId="{4C2075A7-8E8D-4212-AEF2-FA2BFC036D54}" sibTransId="{AD56F4E0-33B2-4CFD-B0FE-7E9084C10718}"/>
-    <dgm:cxn modelId="{B84ECF1D-A6CB-4A74-93B0-8833CAC3DD2C}" srcId="{62461A88-BE74-49D3-AC7E-AEE5A612166B}" destId="{6F9C22BB-A951-4593-904B-133B05B88043}" srcOrd="1" destOrd="0" parTransId="{CCF9276B-DD30-4A31-97E0-374BC2F33936}" sibTransId="{8A4F2D8F-12C0-41E0-A37F-E5C90C9E13B5}"/>
-    <dgm:cxn modelId="{3C878166-0A9A-4A22-8F4C-BF882CDB14B6}" type="presOf" srcId="{A0836253-59AD-4823-969B-C27091CC6D31}" destId="{288A98C4-8794-4D98-9D7E-6D757471075D}" srcOrd="0" destOrd="0" presId="urn:microsoft.com/office/officeart/2005/8/layout/hierarchy6"/>
-    <dgm:cxn modelId="{420784FE-7DA6-4920-A0DA-B993152B0C0D}" srcId="{936808E1-78FF-415A-8C6D-B8D366E7E94B}" destId="{DD123432-B415-4B22-814C-D6B426117991}" srcOrd="0" destOrd="0" parTransId="{BFFCE8B3-4141-4F92-BE7A-A1EAF853840D}" sibTransId="{0726F1BA-C470-42B0-9598-FCC87F422C27}"/>
-    <dgm:cxn modelId="{F5987033-F94E-4179-91EB-56E0B7E6DEFB}" type="presOf" srcId="{1565F46A-33E8-4FDB-836B-D3F88AA217D6}" destId="{8BE94AF5-9234-41C9-8505-87E9ECE3D97A}" srcOrd="0" destOrd="0" presId="urn:microsoft.com/office/officeart/2005/8/layout/hierarchy6"/>
-    <dgm:cxn modelId="{E728E43E-2491-4591-B4EA-106453CBEF00}" type="presOf" srcId="{7261F8F1-733F-4542-93C9-75D3C32A9639}" destId="{72A1B322-E366-4DB2-B1F2-D6E2B08456E6}" srcOrd="0" destOrd="0" presId="urn:microsoft.com/office/officeart/2005/8/layout/hierarchy6"/>
-    <dgm:cxn modelId="{9DF437E5-3046-4BE6-B752-8B97A9BC9078}" type="presOf" srcId="{4C2075A7-8E8D-4212-AEF2-FA2BFC036D54}" destId="{6FF85653-6460-4756-A629-C1326052BA6B}" srcOrd="0" destOrd="0" presId="urn:microsoft.com/office/officeart/2005/8/layout/hierarchy6"/>
-    <dgm:cxn modelId="{3F0A6D4D-072A-4A91-A9E7-0B548D888292}" srcId="{49000756-D061-4D71-8CA0-31F9974ECF1A}" destId="{7261F8F1-733F-4542-93C9-75D3C32A9639}" srcOrd="1" destOrd="0" parTransId="{60AFF6D8-66C2-4ABA-9ACB-2D4DD35559D1}" sibTransId="{FA44700B-C9E2-4012-B96F-040BCB7FA66C}"/>
-    <dgm:cxn modelId="{DCC80803-3D97-49AC-84B5-2FDC8AB5D01E}" type="presOf" srcId="{F1C739AF-6551-4FE4-9091-30A25A3579C1}" destId="{ECACF06E-0D77-42BB-B120-CAE787F5BE8E}" srcOrd="0" destOrd="0" presId="urn:microsoft.com/office/officeart/2005/8/layout/hierarchy6"/>
     <dgm:cxn modelId="{2410C736-99F3-4696-913C-ED9552E51816}" type="presParOf" srcId="{8BE94AF5-9234-41C9-8505-87E9ECE3D97A}" destId="{0B5EB589-F308-4085-A615-37DFB01BFF2B}" srcOrd="0" destOrd="0" presId="urn:microsoft.com/office/officeart/2005/8/layout/hierarchy6"/>
     <dgm:cxn modelId="{F4472480-CDE3-4B45-98B2-65319334AFD2}" type="presParOf" srcId="{0B5EB589-F308-4085-A615-37DFB01BFF2B}" destId="{9751861A-E76C-472D-9BF9-872A13EEDD3C}" srcOrd="0" destOrd="0" presId="urn:microsoft.com/office/officeart/2005/8/layout/hierarchy6"/>
     <dgm:cxn modelId="{1527D214-85CD-4469-8372-93516F105693}" type="presParOf" srcId="{9751861A-E76C-472D-9BF9-872A13EEDD3C}" destId="{53047A2B-5843-4B88-8160-4F56C0181CD5}" srcOrd="0" destOrd="0" presId="urn:microsoft.com/office/officeart/2005/8/layout/hierarchy6"/>
@@ -9614,7 +9902,7 @@
             <a:fld id="{0E0FD8BF-4915-47C0-982D-E1A4592E6198}" type="datetimeFigureOut">
               <a:rPr lang="en-US" smtClean="0"/>
               <a:pPr/>
-              <a:t>2/21/2012</a:t>
+              <a:t>2/25/2012</a:t>
             </a:fld>
             <a:endParaRPr lang="en-US"/>
           </a:p>
@@ -9962,6 +10250,88 @@
 </p:notes>
 </file>
 
+<file path=ppt/notesSlides/notesSlide2.xml><?xml version="1.0" encoding="utf-8"?>
+<p:notes xmlns:a="http://schemas.openxmlformats.org/drawingml/2006/main" xmlns:r="http://schemas.openxmlformats.org/officeDocument/2006/relationships" xmlns:p="http://schemas.openxmlformats.org/presentationml/2006/main">
+  <p:cSld>
+    <p:spTree>
+      <p:nvGrpSpPr>
+        <p:cNvPr id="1" name=""/>
+        <p:cNvGrpSpPr/>
+        <p:nvPr/>
+      </p:nvGrpSpPr>
+      <p:grpSpPr>
+        <a:xfrm>
+          <a:off x="0" y="0"/>
+          <a:ext cx="0" cy="0"/>
+          <a:chOff x="0" y="0"/>
+          <a:chExt cx="0" cy="0"/>
+        </a:xfrm>
+      </p:grpSpPr>
+      <p:sp>
+        <p:nvSpPr>
+          <p:cNvPr id="2" name="Slide Image Placeholder 1"/>
+          <p:cNvSpPr>
+            <a:spLocks noGrp="1" noRot="1" noChangeAspect="1"/>
+          </p:cNvSpPr>
+          <p:nvPr>
+            <p:ph type="sldImg"/>
+          </p:nvPr>
+        </p:nvSpPr>
+        <p:spPr/>
+      </p:sp>
+      <p:sp>
+        <p:nvSpPr>
+          <p:cNvPr id="3" name="Notes Placeholder 2"/>
+          <p:cNvSpPr>
+            <a:spLocks noGrp="1"/>
+          </p:cNvSpPr>
+          <p:nvPr>
+            <p:ph type="body" idx="1"/>
+          </p:nvPr>
+        </p:nvSpPr>
+        <p:spPr/>
+        <p:txBody>
+          <a:bodyPr>
+            <a:normAutofit/>
+          </a:bodyPr>
+          <a:lstStyle/>
+          <a:p>
+            <a:endParaRPr lang="en-US" dirty="0"/>
+          </a:p>
+        </p:txBody>
+      </p:sp>
+      <p:sp>
+        <p:nvSpPr>
+          <p:cNvPr id="4" name="Slide Number Placeholder 3"/>
+          <p:cNvSpPr>
+            <a:spLocks noGrp="1"/>
+          </p:cNvSpPr>
+          <p:nvPr>
+            <p:ph type="sldNum" sz="quarter" idx="10"/>
+          </p:nvPr>
+        </p:nvSpPr>
+        <p:spPr/>
+        <p:txBody>
+          <a:bodyPr/>
+          <a:lstStyle/>
+          <a:p>
+            <a:fld id="{A7DB1122-458A-4FFA-AE6C-1CB8E92A3C76}" type="slidenum">
+              <a:rPr lang="en-US" smtClean="0"/>
+              <a:pPr/>
+              <a:t>13</a:t>
+            </a:fld>
+            <a:endParaRPr lang="en-US"/>
+          </a:p>
+        </p:txBody>
+      </p:sp>
+    </p:spTree>
+  </p:cSld>
+  <p:clrMapOvr>
+    <a:masterClrMapping/>
+  </p:clrMapOvr>
+</p:notes>
+</file>
+
 <file path=ppt/slideLayouts/slideLayout1.xml><?xml version="1.0" encoding="utf-8"?>
 <p:sldLayout xmlns:a="http://schemas.openxmlformats.org/drawingml/2006/main" xmlns:r="http://schemas.openxmlformats.org/officeDocument/2006/relationships" xmlns:p="http://schemas.openxmlformats.org/presentationml/2006/main" type="title" preserve="1">
   <p:cSld name="Title Slide">
@@ -10144,7 +10514,7 @@
             <a:fld id="{3A0C61A8-A647-4A83-B149-729257AFD983}" type="datetimeFigureOut">
               <a:rPr lang="en-US" smtClean="0"/>
               <a:pPr/>
-              <a:t>2/21/2012</a:t>
+              <a:t>2/25/2012</a:t>
             </a:fld>
             <a:endParaRPr lang="en-US"/>
           </a:p>
@@ -10311,7 +10681,7 @@
             <a:fld id="{3A0C61A8-A647-4A83-B149-729257AFD983}" type="datetimeFigureOut">
               <a:rPr lang="en-US" smtClean="0"/>
               <a:pPr/>
-              <a:t>2/21/2012</a:t>
+              <a:t>2/25/2012</a:t>
             </a:fld>
             <a:endParaRPr lang="en-US"/>
           </a:p>
@@ -10488,7 +10858,7 @@
             <a:fld id="{3A0C61A8-A647-4A83-B149-729257AFD983}" type="datetimeFigureOut">
               <a:rPr lang="en-US" smtClean="0"/>
               <a:pPr/>
-              <a:t>2/21/2012</a:t>
+              <a:t>2/25/2012</a:t>
             </a:fld>
             <a:endParaRPr lang="en-US"/>
           </a:p>
@@ -10655,7 +11025,7 @@
             <a:fld id="{3A0C61A8-A647-4A83-B149-729257AFD983}" type="datetimeFigureOut">
               <a:rPr lang="en-US" smtClean="0"/>
               <a:pPr/>
-              <a:t>2/21/2012</a:t>
+              <a:t>2/25/2012</a:t>
             </a:fld>
             <a:endParaRPr lang="en-US"/>
           </a:p>
@@ -10898,7 +11268,7 @@
             <a:fld id="{3A0C61A8-A647-4A83-B149-729257AFD983}" type="datetimeFigureOut">
               <a:rPr lang="en-US" smtClean="0"/>
               <a:pPr/>
-              <a:t>2/21/2012</a:t>
+              <a:t>2/25/2012</a:t>
             </a:fld>
             <a:endParaRPr lang="en-US"/>
           </a:p>
@@ -11183,7 +11553,7 @@
             <a:fld id="{3A0C61A8-A647-4A83-B149-729257AFD983}" type="datetimeFigureOut">
               <a:rPr lang="en-US" smtClean="0"/>
               <a:pPr/>
-              <a:t>2/21/2012</a:t>
+              <a:t>2/25/2012</a:t>
             </a:fld>
             <a:endParaRPr lang="en-US"/>
           </a:p>
@@ -11602,7 +11972,7 @@
             <a:fld id="{3A0C61A8-A647-4A83-B149-729257AFD983}" type="datetimeFigureOut">
               <a:rPr lang="en-US" smtClean="0"/>
               <a:pPr/>
-              <a:t>2/21/2012</a:t>
+              <a:t>2/25/2012</a:t>
             </a:fld>
             <a:endParaRPr lang="en-US"/>
           </a:p>
@@ -11717,7 +12087,7 @@
             <a:fld id="{3A0C61A8-A647-4A83-B149-729257AFD983}" type="datetimeFigureOut">
               <a:rPr lang="en-US" smtClean="0"/>
               <a:pPr/>
-              <a:t>2/21/2012</a:t>
+              <a:t>2/25/2012</a:t>
             </a:fld>
             <a:endParaRPr lang="en-US"/>
           </a:p>
@@ -11809,7 +12179,7 @@
             <a:fld id="{3A0C61A8-A647-4A83-B149-729257AFD983}" type="datetimeFigureOut">
               <a:rPr lang="en-US" smtClean="0"/>
               <a:pPr/>
-              <a:t>2/21/2012</a:t>
+              <a:t>2/25/2012</a:t>
             </a:fld>
             <a:endParaRPr lang="en-US"/>
           </a:p>
@@ -12083,7 +12453,7 @@
             <a:fld id="{3A0C61A8-A647-4A83-B149-729257AFD983}" type="datetimeFigureOut">
               <a:rPr lang="en-US" smtClean="0"/>
               <a:pPr/>
-              <a:t>2/21/2012</a:t>
+              <a:t>2/25/2012</a:t>
             </a:fld>
             <a:endParaRPr lang="en-US"/>
           </a:p>
@@ -12333,7 +12703,7 @@
             <a:fld id="{3A0C61A8-A647-4A83-B149-729257AFD983}" type="datetimeFigureOut">
               <a:rPr lang="en-US" smtClean="0"/>
               <a:pPr/>
-              <a:t>2/21/2012</a:t>
+              <a:t>2/25/2012</a:t>
             </a:fld>
             <a:endParaRPr lang="en-US"/>
           </a:p>
@@ -12543,7 +12913,7 @@
             <a:fld id="{3A0C61A8-A647-4A83-B149-729257AFD983}" type="datetimeFigureOut">
               <a:rPr lang="en-US" smtClean="0"/>
               <a:pPr/>
-              <a:t>2/21/2012</a:t>
+              <a:t>2/25/2012</a:t>
             </a:fld>
             <a:endParaRPr lang="en-US"/>
           </a:p>
@@ -13849,6 +14219,237 @@
           </a:p>
         </p:txBody>
       </p:sp>
+      <p:pic>
+        <p:nvPicPr>
+          <p:cNvPr id="7" name="suitingUp.avi">
+            <a:hlinkClick r:id="" action="ppaction://media"/>
+          </p:cNvPr>
+          <p:cNvPicPr>
+            <a:picLocks noRot="1" noChangeAspect="1"/>
+          </p:cNvPicPr>
+          <p:nvPr>
+            <a:videoFile r:link="rId1"/>
+          </p:nvPr>
+        </p:nvPicPr>
+        <p:blipFill>
+          <a:blip r:embed="rId4" cstate="print"/>
+          <a:stretch>
+            <a:fillRect/>
+          </a:stretch>
+        </p:blipFill>
+        <p:spPr>
+          <a:xfrm>
+            <a:off x="2133600" y="1828800"/>
+            <a:ext cx="4991100" cy="4572000"/>
+          </a:xfrm>
+          <a:prstGeom prst="rect">
+            <a:avLst/>
+          </a:prstGeom>
+        </p:spPr>
+      </p:pic>
+    </p:spTree>
+  </p:cSld>
+  <p:clrMapOvr>
+    <a:masterClrMapping/>
+  </p:clrMapOvr>
+  <p:timing>
+    <p:tnLst>
+      <p:par>
+        <p:cTn id="1" dur="indefinite" restart="never" nodeType="tmRoot">
+          <p:childTnLst>
+            <p:seq concurrent="1" nextAc="seek">
+              <p:cTn id="2" restart="whenNotActive" fill="hold" evtFilter="cancelBubble" nodeType="interactiveSeq">
+                <p:stCondLst>
+                  <p:cond evt="onClick" delay="0">
+                    <p:tgtEl>
+                      <p:spTgt spid="7"/>
+                    </p:tgtEl>
+                  </p:cond>
+                </p:stCondLst>
+                <p:endSync evt="end" delay="0">
+                  <p:rtn val="all"/>
+                </p:endSync>
+                <p:childTnLst>
+                  <p:par>
+                    <p:cTn id="3" fill="hold">
+                      <p:stCondLst>
+                        <p:cond delay="0"/>
+                      </p:stCondLst>
+                      <p:childTnLst>
+                        <p:par>
+                          <p:cTn id="4" fill="hold">
+                            <p:stCondLst>
+                              <p:cond delay="0"/>
+                            </p:stCondLst>
+                            <p:childTnLst>
+                              <p:par>
+                                <p:cTn id="5" presetID="2" presetClass="mediacall" presetSubtype="0" fill="hold" nodeType="clickEffect">
+                                  <p:stCondLst>
+                                    <p:cond delay="0"/>
+                                  </p:stCondLst>
+                                  <p:childTnLst>
+                                    <p:cmd type="call" cmd="togglePause">
+                                      <p:cBhvr>
+                                        <p:cTn id="6" dur="1" fill="hold"/>
+                                        <p:tgtEl>
+                                          <p:spTgt spid="7"/>
+                                        </p:tgtEl>
+                                      </p:cBhvr>
+                                    </p:cmd>
+                                  </p:childTnLst>
+                                </p:cTn>
+                              </p:par>
+                            </p:childTnLst>
+                          </p:cTn>
+                        </p:par>
+                      </p:childTnLst>
+                    </p:cTn>
+                  </p:par>
+                </p:childTnLst>
+              </p:cTn>
+              <p:nextCondLst>
+                <p:cond evt="onClick" delay="0">
+                  <p:tgtEl>
+                    <p:spTgt spid="7"/>
+                  </p:tgtEl>
+                </p:cond>
+              </p:nextCondLst>
+            </p:seq>
+            <p:video>
+              <p:cMediaNode>
+                <p:cTn id="7" fill="hold" display="0">
+                  <p:stCondLst>
+                    <p:cond delay="indefinite"/>
+                  </p:stCondLst>
+                  <p:endCondLst>
+                    <p:cond evt="onNext" delay="0">
+                      <p:tgtEl>
+                        <p:sldTgt/>
+                      </p:tgtEl>
+                    </p:cond>
+                    <p:cond evt="onPrev" delay="0">
+                      <p:tgtEl>
+                        <p:sldTgt/>
+                      </p:tgtEl>
+                    </p:cond>
+                  </p:endCondLst>
+                </p:cTn>
+                <p:tgtEl>
+                  <p:spTgt spid="7"/>
+                </p:tgtEl>
+              </p:cMediaNode>
+            </p:video>
+          </p:childTnLst>
+        </p:cTn>
+      </p:par>
+    </p:tnLst>
+  </p:timing>
+</p:sld>
+</file>
+
+<file path=ppt/slides/slide13.xml><?xml version="1.0" encoding="utf-8"?>
+<p:sld xmlns:a="http://schemas.openxmlformats.org/drawingml/2006/main" xmlns:r="http://schemas.openxmlformats.org/officeDocument/2006/relationships" xmlns:p="http://schemas.openxmlformats.org/presentationml/2006/main">
+  <p:cSld>
+    <p:bg>
+      <p:bgPr>
+        <a:solidFill>
+          <a:srgbClr val="1B325F"/>
+        </a:solidFill>
+        <a:effectLst/>
+      </p:bgPr>
+    </p:bg>
+    <p:spTree>
+      <p:nvGrpSpPr>
+        <p:cNvPr id="1" name=""/>
+        <p:cNvGrpSpPr/>
+        <p:nvPr/>
+      </p:nvGrpSpPr>
+      <p:grpSpPr>
+        <a:xfrm>
+          <a:off x="0" y="0"/>
+          <a:ext cx="0" cy="0"/>
+          <a:chOff x="0" y="0"/>
+          <a:chExt cx="0" cy="0"/>
+        </a:xfrm>
+      </p:grpSpPr>
+      <p:sp>
+        <p:nvSpPr>
+          <p:cNvPr id="2" name="Rectangle 1"/>
+          <p:cNvSpPr/>
+          <p:nvPr/>
+        </p:nvSpPr>
+        <p:spPr>
+          <a:xfrm>
+            <a:off x="304800" y="228600"/>
+            <a:ext cx="5527603" cy="1384995"/>
+          </a:xfrm>
+          <a:prstGeom prst="rect">
+            <a:avLst/>
+          </a:prstGeom>
+          <a:noFill/>
+          <a:ln>
+            <a:noFill/>
+          </a:ln>
+        </p:spPr>
+        <p:txBody>
+          <a:bodyPr wrap="none" lIns="91440" tIns="45720" rIns="91440" bIns="45720">
+            <a:spAutoFit/>
+          </a:bodyPr>
+          <a:lstStyle/>
+          <a:p>
+            <a:r>
+              <a:rPr lang="bg-BG" sz="4200" b="1" dirty="0" smtClean="0">
+                <a:ln w="12700">
+                  <a:solidFill>
+                    <a:schemeClr val="tx1">
+                      <a:lumMod val="95000"/>
+                      <a:lumOff val="5000"/>
+                    </a:schemeClr>
+                  </a:solidFill>
+                  <a:prstDash val="solid"/>
+                </a:ln>
+                <a:solidFill>
+                  <a:srgbClr val="9CC4E4"/>
+                </a:solidFill>
+                <a:effectLst>
+                  <a:outerShdw blurRad="41275" dist="20320" dir="1800000" algn="tl" rotWithShape="0">
+                    <a:srgbClr val="000000">
+                      <a:alpha val="40000"/>
+                    </a:srgbClr>
+                  </a:outerShdw>
+                </a:effectLst>
+              </a:rPr>
+              <a:t>Къде е приложим </a:t>
+            </a:r>
+          </a:p>
+          <a:p>
+            <a:r>
+              <a:rPr lang="bg-BG" sz="4200" b="1" dirty="0" smtClean="0">
+                <a:ln w="12700">
+                  <a:solidFill>
+                    <a:schemeClr val="tx1">
+                      <a:lumMod val="95000"/>
+                      <a:lumOff val="5000"/>
+                    </a:schemeClr>
+                  </a:solidFill>
+                  <a:prstDash val="solid"/>
+                </a:ln>
+                <a:solidFill>
+                  <a:srgbClr val="9CC4E4"/>
+                </a:solidFill>
+                <a:effectLst>
+                  <a:outerShdw blurRad="41275" dist="20320" dir="1800000" algn="tl" rotWithShape="0">
+                    <a:srgbClr val="000000">
+                      <a:alpha val="40000"/>
+                    </a:srgbClr>
+                  </a:outerShdw>
+                </a:effectLst>
+              </a:rPr>
+              <a:t>“Модерният иконом”?</a:t>
+            </a:r>
+          </a:p>
+        </p:txBody>
+      </p:sp>
       <p:sp>
         <p:nvSpPr>
           <p:cNvPr id="6" name="TextBox 5"/>
@@ -14115,7 +14716,7 @@
 </p:sld>
 </file>
 
-<file path=ppt/slides/slide13.xml><?xml version="1.0" encoding="utf-8"?>
+<file path=ppt/slides/slide14.xml><?xml version="1.0" encoding="utf-8"?>
 <p:sld xmlns:a="http://schemas.openxmlformats.org/drawingml/2006/main" xmlns:r="http://schemas.openxmlformats.org/officeDocument/2006/relationships" xmlns:p="http://schemas.openxmlformats.org/presentationml/2006/main">
   <p:cSld>
     <p:bg>
@@ -14223,7 +14824,7 @@
 </p:sld>
 </file>
 
-<file path=ppt/slides/slide14.xml><?xml version="1.0" encoding="utf-8"?>
+<file path=ppt/slides/slide15.xml><?xml version="1.0" encoding="utf-8"?>
 <p:sld xmlns:a="http://schemas.openxmlformats.org/drawingml/2006/main" xmlns:r="http://schemas.openxmlformats.org/officeDocument/2006/relationships" xmlns:p="http://schemas.openxmlformats.org/presentationml/2006/main">
   <p:cSld>
     <p:bg>
@@ -14341,7 +14942,7 @@
 </p:sld>
 </file>
 
-<file path=ppt/slides/slide15.xml><?xml version="1.0" encoding="utf-8"?>
+<file path=ppt/slides/slide16.xml><?xml version="1.0" encoding="utf-8"?>
 <p:sld xmlns:a="http://schemas.openxmlformats.org/drawingml/2006/main" xmlns:r="http://schemas.openxmlformats.org/officeDocument/2006/relationships" xmlns:p="http://schemas.openxmlformats.org/presentationml/2006/main">
   <p:cSld>
     <p:bg>
@@ -14651,7 +15252,7 @@
                   <a:srgbClr val="E9F2F9"/>
                 </a:solidFill>
               </a:rPr>
-              <a:t>CCLang</a:t>
+              <a:t>CULang</a:t>
             </a:r>
           </a:p>
         </p:txBody>
@@ -14671,7 +15272,7 @@
 </p:sld>
 </file>
 
-<file path=ppt/slides/slide16.xml><?xml version="1.0" encoding="utf-8"?>
+<file path=ppt/slides/slide17.xml><?xml version="1.0" encoding="utf-8"?>
 <p:sld xmlns:a="http://schemas.openxmlformats.org/drawingml/2006/main" xmlns:r="http://schemas.openxmlformats.org/officeDocument/2006/relationships" xmlns:p="http://schemas.openxmlformats.org/presentationml/2006/main">
   <p:cSld>
     <p:bg>
@@ -14946,7 +15547,7 @@
         <p:spPr>
           <a:xfrm>
             <a:off x="609600" y="3352800"/>
-            <a:ext cx="7924800" cy="2585323"/>
+            <a:ext cx="7924800" cy="2862322"/>
           </a:xfrm>
           <a:prstGeom prst="rect">
             <a:avLst/>
@@ -15234,6 +15835,49 @@
               <a:t>http://en.wikipedia.org/wiki/File:NET_h_rgb_2.png</a:t>
             </a:r>
           </a:p>
+          <a:p>
+            <a:pPr marL="287338" lvl="1">
+              <a:tabLst>
+                <a:tab pos="287338" algn="l"/>
+              </a:tabLst>
+            </a:pPr>
+            <a:r>
+              <a:rPr lang="en-US" sz="1200" b="1" dirty="0" smtClean="0">
+                <a:solidFill>
+                  <a:srgbClr val="E9F2F9"/>
+                </a:solidFill>
+              </a:rPr>
+              <a:t>Kiln Logo</a:t>
+            </a:r>
+          </a:p>
+          <a:p>
+            <a:pPr marL="287338" lvl="1">
+              <a:tabLst>
+                <a:tab pos="287338" algn="l"/>
+              </a:tabLst>
+            </a:pPr>
+            <a:r>
+              <a:rPr lang="en-US" sz="1200" b="1" dirty="0" smtClean="0">
+                <a:solidFill>
+                  <a:srgbClr val="E9F2F9"/>
+                </a:solidFill>
+              </a:rPr>
+              <a:t>    </a:t>
+            </a:r>
+            <a:r>
+              <a:rPr lang="en-US" sz="1200" dirty="0" smtClean="0">
+                <a:solidFill>
+                  <a:srgbClr val="9CC4E4"/>
+                </a:solidFill>
+              </a:rPr>
+              <a:t>http://kiln.stackexchange.com/questions/4651/can-i-use-the-kiln-logo-for-my-presentation</a:t>
+            </a:r>
+            <a:endParaRPr lang="en-US" sz="1200" b="1" dirty="0" smtClean="0">
+              <a:solidFill>
+                <a:srgbClr val="9CC4E4"/>
+              </a:solidFill>
+            </a:endParaRPr>
+          </a:p>
         </p:txBody>
       </p:sp>
       <p:pic>
@@ -15252,7 +15896,7 @@
         </p:blipFill>
         <p:spPr>
           <a:xfrm rot="326531">
-            <a:off x="7191485" y="1526954"/>
+            <a:off x="6277086" y="1603155"/>
             <a:ext cx="1701800" cy="685800"/>
           </a:xfrm>
           <a:prstGeom prst="rect">
@@ -15276,7 +15920,7 @@
         </p:blipFill>
         <p:spPr>
           <a:xfrm rot="21309058">
-            <a:off x="2908779" y="901939"/>
+            <a:off x="2451579" y="901939"/>
             <a:ext cx="1524000" cy="376353"/>
           </a:xfrm>
           <a:prstGeom prst="rect">
@@ -15299,8 +15943,8 @@
           </a:stretch>
         </p:blipFill>
         <p:spPr>
-          <a:xfrm rot="254079">
-            <a:off x="5369187" y="851071"/>
+          <a:xfrm rot="21035981">
+            <a:off x="4715738" y="628238"/>
             <a:ext cx="1237655" cy="928760"/>
           </a:xfrm>
           <a:prstGeom prst="rect">
@@ -15323,7 +15967,7 @@
 </p:sld>
 </file>
 
-<file path=ppt/slides/slide17.xml><?xml version="1.0" encoding="utf-8"?>
+<file path=ppt/slides/slide18.xml><?xml version="1.0" encoding="utf-8"?>
 <p:sld xmlns:a="http://schemas.openxmlformats.org/drawingml/2006/main" xmlns:r="http://schemas.openxmlformats.org/officeDocument/2006/relationships" xmlns:p="http://schemas.openxmlformats.org/presentationml/2006/main">
   <p:cSld>
     <p:bg>
@@ -15429,6 +16073,13 @@
   <p:clrMapOvr>
     <a:masterClrMapping/>
   </p:clrMapOvr>
+  <p:timing>
+    <p:tnLst>
+      <p:par>
+        <p:cTn id="1" dur="indefinite" restart="never" nodeType="tmRoot"/>
+      </p:par>
+    </p:tnLst>
+  </p:timing>
 </p:sld>
 </file>
 
@@ -16022,55 +16673,30 @@
           <a:chExt cx="0" cy="0"/>
         </a:xfrm>
       </p:grpSpPr>
-      <p:sp>
-        <p:nvSpPr>
-          <p:cNvPr id="2" name="Title 1"/>
-          <p:cNvSpPr>
-            <a:spLocks noGrp="1"/>
-          </p:cNvSpPr>
-          <p:nvPr>
-            <p:ph type="ctrTitle"/>
-          </p:nvPr>
-        </p:nvSpPr>
+      <p:pic>
+        <p:nvPicPr>
+          <p:cNvPr id="12" name="Picture 11" descr="logo.jpg"/>
+          <p:cNvPicPr>
+            <a:picLocks noChangeAspect="1"/>
+          </p:cNvPicPr>
+          <p:nvPr/>
+        </p:nvPicPr>
+        <p:blipFill>
+          <a:blip r:embed="rId2" cstate="print"/>
+          <a:stretch>
+            <a:fillRect/>
+          </a:stretch>
+        </p:blipFill>
         <p:spPr>
           <a:xfrm>
-            <a:off x="533400" y="609600"/>
-            <a:ext cx="7772400" cy="1470025"/>
+            <a:off x="1219200" y="0"/>
+            <a:ext cx="6565900" cy="3911600"/>
           </a:xfrm>
+          <a:prstGeom prst="rect">
+            <a:avLst/>
+          </a:prstGeom>
         </p:spPr>
-        <p:txBody>
-          <a:bodyPr>
-            <a:noAutofit/>
-          </a:bodyPr>
-          <a:lstStyle/>
-          <a:p>
-            <a:r>
-              <a:rPr lang="en-US" sz="9600" dirty="0" smtClean="0">
-                <a:solidFill>
-                  <a:srgbClr val="9CC4E4"/>
-                </a:solidFill>
-                <a:latin typeface="Bookman Old Style" pitchFamily="18" charset="0"/>
-              </a:rPr>
-              <a:t> </a:t>
-            </a:r>
-            <a:r>
-              <a:rPr lang="bg-BG" sz="9600" dirty="0" smtClean="0">
-                <a:solidFill>
-                  <a:srgbClr val="9CC4E4"/>
-                </a:solidFill>
-                <a:latin typeface="Bookman Old Style" pitchFamily="18" charset="0"/>
-              </a:rPr>
-              <a:t>Модерният иконом</a:t>
-            </a:r>
-            <a:endParaRPr lang="en-US" sz="9600" dirty="0">
-              <a:solidFill>
-                <a:srgbClr val="9CC4E4"/>
-              </a:solidFill>
-              <a:latin typeface="Bookman Old Style" pitchFamily="18" charset="0"/>
-            </a:endParaRPr>
-          </a:p>
-        </p:txBody>
-      </p:sp>
+      </p:pic>
       <p:sp>
         <p:nvSpPr>
           <p:cNvPr id="3" name="TextBox 2"/>
@@ -17268,27 +17894,6 @@
               </a:rPr>
               <a:t>Какво е граматиката?</a:t>
             </a:r>
-            <a:endParaRPr lang="bg-BG" sz="4200" b="1" dirty="0" smtClean="0">
-              <a:ln w="12700">
-                <a:solidFill>
-                  <a:schemeClr val="tx1">
-                    <a:lumMod val="95000"/>
-                    <a:lumOff val="5000"/>
-                  </a:schemeClr>
-                </a:solidFill>
-                <a:prstDash val="solid"/>
-              </a:ln>
-              <a:solidFill>
-                <a:srgbClr val="9CC4E4"/>
-              </a:solidFill>
-              <a:effectLst>
-                <a:outerShdw blurRad="41275" dist="20320" dir="1800000" algn="tl" rotWithShape="0">
-                  <a:srgbClr val="000000">
-                    <a:alpha val="40000"/>
-                  </a:srgbClr>
-                </a:outerShdw>
-              </a:effectLst>
-            </a:endParaRPr>
           </a:p>
         </p:txBody>
       </p:sp>

</xml_diff>

<commit_message>
Small change on the 9th slide of the presentation (Grammar example) made
</commit_message>
<xml_diff>
--- a/Presentation/Presentation new style.pptx
+++ b/Presentation/Presentation new style.pptx
@@ -1751,14 +1751,18 @@
     </dgm:pt>
     <dgm:pt modelId="{6F9C22BB-A951-4593-904B-133B05B88043}">
       <dgm:prSet phldrT="[Text]"/>
-      <dgm:spPr/>
+      <dgm:spPr>
+        <a:solidFill>
+          <a:srgbClr val="1B325F"/>
+        </a:solidFill>
+      </dgm:spPr>
       <dgm:t>
         <a:bodyPr/>
         <a:lstStyle/>
         <a:p>
           <a:r>
             <a:rPr lang="en-US" dirty="0" smtClean="0"/>
-            <a:t>hamburger</a:t>
+            <a:t>food</a:t>
           </a:r>
           <a:endParaRPr lang="en-US" dirty="0"/>
         </a:p>
@@ -2248,16 +2252,20 @@
     </dgm:pt>
     <dgm:pt modelId="{35AF10B0-5D0C-488A-8DA7-F73BE8FC5D85}">
       <dgm:prSet phldrT="[Text]"/>
-      <dgm:spPr/>
+      <dgm:spPr>
+        <a:solidFill>
+          <a:srgbClr val="1B325F"/>
+        </a:solidFill>
+      </dgm:spPr>
       <dgm:t>
         <a:bodyPr/>
         <a:lstStyle/>
         <a:p>
           <a:r>
-            <a:rPr lang="en-US" dirty="0" smtClean="0"/>
-            <a:t>cheese</a:t>
+            <a:rPr lang="en-US" b="0" dirty="0" smtClean="0"/>
+            <a:t>spice</a:t>
           </a:r>
-          <a:endParaRPr lang="en-US" dirty="0"/>
+          <a:endParaRPr lang="en-US" b="0" dirty="0"/>
         </a:p>
       </dgm:t>
     </dgm:pt>
@@ -2283,53 +2291,20 @@
         </a:p>
       </dgm:t>
     </dgm:pt>
-    <dgm:pt modelId="{7261F8F1-733F-4542-93C9-75D3C32A9639}">
+    <dgm:pt modelId="{A0836253-59AD-4823-969B-C27091CC6D31}">
       <dgm:prSet phldrT="[Text]"/>
-      <dgm:spPr/>
+      <dgm:spPr>
+        <a:solidFill>
+          <a:srgbClr val="1B325F"/>
+        </a:solidFill>
+      </dgm:spPr>
       <dgm:t>
         <a:bodyPr/>
         <a:lstStyle/>
         <a:p>
           <a:r>
             <a:rPr lang="en-US" dirty="0" smtClean="0"/>
-            <a:t>meat</a:t>
-          </a:r>
-          <a:endParaRPr lang="en-US" dirty="0"/>
-        </a:p>
-      </dgm:t>
-    </dgm:pt>
-    <dgm:pt modelId="{60AFF6D8-66C2-4ABA-9ACB-2D4DD35559D1}" type="parTrans" cxnId="{3F0A6D4D-072A-4A91-A9E7-0B548D888292}">
-      <dgm:prSet/>
-      <dgm:spPr/>
-      <dgm:t>
-        <a:bodyPr/>
-        <a:lstStyle/>
-        <a:p>
-          <a:endParaRPr lang="en-US"/>
-        </a:p>
-      </dgm:t>
-    </dgm:pt>
-    <dgm:pt modelId="{FA44700B-C9E2-4012-B96F-040BCB7FA66C}" type="sibTrans" cxnId="{3F0A6D4D-072A-4A91-A9E7-0B548D888292}">
-      <dgm:prSet/>
-      <dgm:spPr/>
-      <dgm:t>
-        <a:bodyPr/>
-        <a:lstStyle/>
-        <a:p>
-          <a:endParaRPr lang="en-US"/>
-        </a:p>
-      </dgm:t>
-    </dgm:pt>
-    <dgm:pt modelId="{A0836253-59AD-4823-969B-C27091CC6D31}">
-      <dgm:prSet phldrT="[Text]"/>
-      <dgm:spPr/>
-      <dgm:t>
-        <a:bodyPr/>
-        <a:lstStyle/>
-        <a:p>
-          <a:r>
-            <a:rPr lang="en-US" dirty="0" smtClean="0"/>
-            <a:t>cheese</a:t>
+            <a:t>spice</a:t>
           </a:r>
           <a:endParaRPr lang="en-US" dirty="0"/>
         </a:p>
@@ -2347,84 +2322,6 @@
       </dgm:t>
     </dgm:pt>
     <dgm:pt modelId="{C52AF91B-87E7-4CFB-A4B1-9C351C99B152}" type="sibTrans" cxnId="{F6FE52B9-5E83-4752-93FE-F01D16574890}">
-      <dgm:prSet/>
-      <dgm:spPr/>
-      <dgm:t>
-        <a:bodyPr/>
-        <a:lstStyle/>
-        <a:p>
-          <a:endParaRPr lang="en-US"/>
-        </a:p>
-      </dgm:t>
-    </dgm:pt>
-    <dgm:pt modelId="{1CCD693B-DAB4-4D47-B7CC-492ACAC7B1DD}">
-      <dgm:prSet phldrT="[Text]"/>
-      <dgm:spPr/>
-      <dgm:t>
-        <a:bodyPr/>
-        <a:lstStyle/>
-        <a:p>
-          <a:r>
-            <a:rPr lang="en-US" dirty="0" smtClean="0"/>
-            <a:t>meat</a:t>
-          </a:r>
-          <a:endParaRPr lang="en-US" dirty="0"/>
-        </a:p>
-      </dgm:t>
-    </dgm:pt>
-    <dgm:pt modelId="{016EF344-7E15-4844-97F5-F8DC735DFEAA}" type="parTrans" cxnId="{6E76E6FB-58E9-46C6-8744-B495C7F39F02}">
-      <dgm:prSet/>
-      <dgm:spPr/>
-      <dgm:t>
-        <a:bodyPr/>
-        <a:lstStyle/>
-        <a:p>
-          <a:endParaRPr lang="en-US"/>
-        </a:p>
-      </dgm:t>
-    </dgm:pt>
-    <dgm:pt modelId="{4FEAB3D8-05EC-4606-8CF8-001A6A2CDE21}" type="sibTrans" cxnId="{6E76E6FB-58E9-46C6-8744-B495C7F39F02}">
-      <dgm:prSet/>
-      <dgm:spPr/>
-      <dgm:t>
-        <a:bodyPr/>
-        <a:lstStyle/>
-        <a:p>
-          <a:endParaRPr lang="en-US"/>
-        </a:p>
-      </dgm:t>
-    </dgm:pt>
-    <dgm:pt modelId="{FF1E3CB0-BAF2-4ADD-8990-0573B415F378}">
-      <dgm:prSet phldrT="[Text]"/>
-      <dgm:spPr>
-        <a:solidFill>
-          <a:srgbClr val="1B325F"/>
-        </a:solidFill>
-      </dgm:spPr>
-      <dgm:t>
-        <a:bodyPr/>
-        <a:lstStyle/>
-        <a:p>
-          <a:r>
-            <a:rPr lang="de-DE" dirty="0" smtClean="0"/>
-            <a:t>item</a:t>
-          </a:r>
-          <a:endParaRPr lang="en-US" dirty="0"/>
-        </a:p>
-      </dgm:t>
-    </dgm:pt>
-    <dgm:pt modelId="{38C43D82-97EB-4B2F-BBE6-E7BEF32D4865}" type="parTrans" cxnId="{C3A2A93F-57A7-4ED5-8AF6-6941E4C31CFA}">
-      <dgm:prSet/>
-      <dgm:spPr/>
-      <dgm:t>
-        <a:bodyPr/>
-        <a:lstStyle/>
-        <a:p>
-          <a:endParaRPr lang="en-US"/>
-        </a:p>
-      </dgm:t>
-    </dgm:pt>
-    <dgm:pt modelId="{86C4E3F9-7F37-4BDE-8DFB-AE2CE79C71A7}" type="sibTrans" cxnId="{C3A2A93F-57A7-4ED5-8AF6-6941E4C31CFA}">
       <dgm:prSet/>
       <dgm:spPr/>
       <dgm:t>
@@ -2522,7 +2419,7 @@
       <dgm:spPr/>
     </dgm:pt>
     <dgm:pt modelId="{3ED92A81-5FF7-4BBB-AE0A-29442DBAFA8B}" type="pres">
-      <dgm:prSet presAssocID="{7A7E8FDD-A9C0-4725-BC34-3F5C43CB3CF9}" presName="Name19" presStyleLbl="parChTrans1D3" presStyleIdx="0" presStyleCnt="3"/>
+      <dgm:prSet presAssocID="{7A7E8FDD-A9C0-4725-BC34-3F5C43CB3CF9}" presName="Name19" presStyleLbl="parChTrans1D3" presStyleIdx="0" presStyleCnt="2"/>
       <dgm:spPr/>
       <dgm:t>
         <a:bodyPr/>
@@ -2537,7 +2434,7 @@
       <dgm:spPr/>
     </dgm:pt>
     <dgm:pt modelId="{D0C888DE-0CAA-4426-B613-BB51F6DAA8DF}" type="pres">
-      <dgm:prSet presAssocID="{936808E1-78FF-415A-8C6D-B8D366E7E94B}" presName="level2Shape" presStyleLbl="node3" presStyleIdx="0" presStyleCnt="3"/>
+      <dgm:prSet presAssocID="{936808E1-78FF-415A-8C6D-B8D366E7E94B}" presName="level2Shape" presStyleLbl="node3" presStyleIdx="0" presStyleCnt="2"/>
       <dgm:spPr/>
       <dgm:t>
         <a:bodyPr/>
@@ -2552,7 +2449,7 @@
       <dgm:spPr/>
     </dgm:pt>
     <dgm:pt modelId="{30DEC963-A63E-4CF4-8BC8-BCCC54B50307}" type="pres">
-      <dgm:prSet presAssocID="{BFFCE8B3-4141-4F92-BE7A-A1EAF853840D}" presName="Name19" presStyleLbl="parChTrans1D4" presStyleIdx="0" presStyleCnt="16"/>
+      <dgm:prSet presAssocID="{BFFCE8B3-4141-4F92-BE7A-A1EAF853840D}" presName="Name19" presStyleLbl="parChTrans1D4" presStyleIdx="0" presStyleCnt="14"/>
       <dgm:spPr/>
       <dgm:t>
         <a:bodyPr/>
@@ -2567,7 +2464,7 @@
       <dgm:spPr/>
     </dgm:pt>
     <dgm:pt modelId="{B9277DAC-F9CA-4E71-B63F-3F16B430F309}" type="pres">
-      <dgm:prSet presAssocID="{DD123432-B415-4B22-814C-D6B426117991}" presName="level2Shape" presStyleLbl="node4" presStyleIdx="0" presStyleCnt="16"/>
+      <dgm:prSet presAssocID="{DD123432-B415-4B22-814C-D6B426117991}" presName="level2Shape" presStyleLbl="node4" presStyleIdx="0" presStyleCnt="14"/>
       <dgm:spPr/>
       <dgm:t>
         <a:bodyPr/>
@@ -2582,7 +2479,7 @@
       <dgm:spPr/>
     </dgm:pt>
     <dgm:pt modelId="{55BDA48D-D577-402D-B265-2D98DC9968AF}" type="pres">
-      <dgm:prSet presAssocID="{EA7FE5AF-FF75-442B-B746-865641E95FAD}" presName="Name19" presStyleLbl="parChTrans1D4" presStyleIdx="1" presStyleCnt="16"/>
+      <dgm:prSet presAssocID="{EA7FE5AF-FF75-442B-B746-865641E95FAD}" presName="Name19" presStyleLbl="parChTrans1D4" presStyleIdx="1" presStyleCnt="14"/>
       <dgm:spPr/>
       <dgm:t>
         <a:bodyPr/>
@@ -2597,7 +2494,7 @@
       <dgm:spPr/>
     </dgm:pt>
     <dgm:pt modelId="{C4FAC167-4C6C-4E30-956B-62E586336272}" type="pres">
-      <dgm:prSet presAssocID="{299EB561-97C7-4BAC-B7EB-DB28C33DA60A}" presName="level2Shape" presStyleLbl="node4" presStyleIdx="1" presStyleCnt="16"/>
+      <dgm:prSet presAssocID="{299EB561-97C7-4BAC-B7EB-DB28C33DA60A}" presName="level2Shape" presStyleLbl="node4" presStyleIdx="1" presStyleCnt="14"/>
       <dgm:spPr/>
       <dgm:t>
         <a:bodyPr/>
@@ -2612,7 +2509,7 @@
       <dgm:spPr/>
     </dgm:pt>
     <dgm:pt modelId="{A89A8AFA-C3FB-40F4-A8F8-026146D78588}" type="pres">
-      <dgm:prSet presAssocID="{690B4BB5-43DB-4342-B5A4-23B9AC7FC042}" presName="Name19" presStyleLbl="parChTrans1D4" presStyleIdx="2" presStyleCnt="16"/>
+      <dgm:prSet presAssocID="{690B4BB5-43DB-4342-B5A4-23B9AC7FC042}" presName="Name19" presStyleLbl="parChTrans1D4" presStyleIdx="2" presStyleCnt="14"/>
       <dgm:spPr/>
       <dgm:t>
         <a:bodyPr/>
@@ -2627,7 +2524,7 @@
       <dgm:spPr/>
     </dgm:pt>
     <dgm:pt modelId="{5E06239B-1E51-4EB4-BAEB-09F5EF1F334C}" type="pres">
-      <dgm:prSet presAssocID="{B5616882-C45F-4116-A8B7-E0FF2BC78404}" presName="level2Shape" presStyleLbl="node4" presStyleIdx="2" presStyleCnt="16"/>
+      <dgm:prSet presAssocID="{B5616882-C45F-4116-A8B7-E0FF2BC78404}" presName="level2Shape" presStyleLbl="node4" presStyleIdx="2" presStyleCnt="14"/>
       <dgm:spPr/>
       <dgm:t>
         <a:bodyPr/>
@@ -2642,7 +2539,7 @@
       <dgm:spPr/>
     </dgm:pt>
     <dgm:pt modelId="{4697DA84-ECF6-4003-9834-CE181F277FBB}" type="pres">
-      <dgm:prSet presAssocID="{2A8D573A-B194-44E7-806C-4E7169F3ED3F}" presName="Name19" presStyleLbl="parChTrans1D4" presStyleIdx="3" presStyleCnt="16"/>
+      <dgm:prSet presAssocID="{2A8D573A-B194-44E7-806C-4E7169F3ED3F}" presName="Name19" presStyleLbl="parChTrans1D4" presStyleIdx="3" presStyleCnt="14"/>
       <dgm:spPr/>
       <dgm:t>
         <a:bodyPr/>
@@ -2657,7 +2554,7 @@
       <dgm:spPr/>
     </dgm:pt>
     <dgm:pt modelId="{F6D58E2E-40CE-4F2C-8885-5BDDD1172BE8}" type="pres">
-      <dgm:prSet presAssocID="{1153B68D-8017-4FD2-B763-2BE2FFBFC9C4}" presName="level2Shape" presStyleLbl="node4" presStyleIdx="3" presStyleCnt="16"/>
+      <dgm:prSet presAssocID="{1153B68D-8017-4FD2-B763-2BE2FFBFC9C4}" presName="level2Shape" presStyleLbl="node4" presStyleIdx="3" presStyleCnt="14"/>
       <dgm:spPr/>
       <dgm:t>
         <a:bodyPr/>
@@ -2672,7 +2569,7 @@
       <dgm:spPr/>
     </dgm:pt>
     <dgm:pt modelId="{5962983C-0FD2-4E96-8C1C-E39F1E4C568F}" type="pres">
-      <dgm:prSet presAssocID="{3380550B-F545-409E-8728-3E2080D1DE8E}" presName="Name19" presStyleLbl="parChTrans1D4" presStyleIdx="4" presStyleCnt="16"/>
+      <dgm:prSet presAssocID="{3380550B-F545-409E-8728-3E2080D1DE8E}" presName="Name19" presStyleLbl="parChTrans1D4" presStyleIdx="4" presStyleCnt="14"/>
       <dgm:spPr/>
       <dgm:t>
         <a:bodyPr/>
@@ -2687,7 +2584,7 @@
       <dgm:spPr/>
     </dgm:pt>
     <dgm:pt modelId="{E257627A-BB36-4F01-A617-C92E4B946BE3}" type="pres">
-      <dgm:prSet presAssocID="{4895BF14-2446-4B8C-B1A9-9780BC55D8B3}" presName="level2Shape" presStyleLbl="node4" presStyleIdx="4" presStyleCnt="16"/>
+      <dgm:prSet presAssocID="{4895BF14-2446-4B8C-B1A9-9780BC55D8B3}" presName="level2Shape" presStyleLbl="node4" presStyleIdx="4" presStyleCnt="14"/>
       <dgm:spPr/>
       <dgm:t>
         <a:bodyPr/>
@@ -2702,7 +2599,7 @@
       <dgm:spPr/>
     </dgm:pt>
     <dgm:pt modelId="{CD809B7E-A368-46C6-AAFB-1EDABED2B127}" type="pres">
-      <dgm:prSet presAssocID="{F75DAD21-9BFC-4948-9203-F5848E0A8B96}" presName="Name19" presStyleLbl="parChTrans1D4" presStyleIdx="5" presStyleCnt="16"/>
+      <dgm:prSet presAssocID="{F75DAD21-9BFC-4948-9203-F5848E0A8B96}" presName="Name19" presStyleLbl="parChTrans1D4" presStyleIdx="5" presStyleCnt="14"/>
       <dgm:spPr/>
       <dgm:t>
         <a:bodyPr/>
@@ -2717,7 +2614,7 @@
       <dgm:spPr/>
     </dgm:pt>
     <dgm:pt modelId="{B215FB30-8694-4C29-B7FC-A88B9190FB5A}" type="pres">
-      <dgm:prSet presAssocID="{174B66DE-A4C5-4262-B9FF-3DB70DD760B4}" presName="level2Shape" presStyleLbl="node4" presStyleIdx="5" presStyleCnt="16"/>
+      <dgm:prSet presAssocID="{174B66DE-A4C5-4262-B9FF-3DB70DD760B4}" presName="level2Shape" presStyleLbl="node4" presStyleIdx="5" presStyleCnt="14"/>
       <dgm:spPr/>
       <dgm:t>
         <a:bodyPr/>
@@ -2732,7 +2629,7 @@
       <dgm:spPr/>
     </dgm:pt>
     <dgm:pt modelId="{6FF85653-6460-4756-A629-C1326052BA6B}" type="pres">
-      <dgm:prSet presAssocID="{4C2075A7-8E8D-4212-AEF2-FA2BFC036D54}" presName="Name19" presStyleLbl="parChTrans1D4" presStyleIdx="6" presStyleCnt="16"/>
+      <dgm:prSet presAssocID="{4C2075A7-8E8D-4212-AEF2-FA2BFC036D54}" presName="Name19" presStyleLbl="parChTrans1D4" presStyleIdx="6" presStyleCnt="14"/>
       <dgm:spPr/>
       <dgm:t>
         <a:bodyPr/>
@@ -2747,7 +2644,7 @@
       <dgm:spPr/>
     </dgm:pt>
     <dgm:pt modelId="{43337737-EF2B-4E98-84B4-D16409A4EA80}" type="pres">
-      <dgm:prSet presAssocID="{59ECBF1E-327F-4C3E-A1AC-C8ADD56A60A6}" presName="level2Shape" presStyleLbl="node4" presStyleIdx="6" presStyleCnt="16"/>
+      <dgm:prSet presAssocID="{59ECBF1E-327F-4C3E-A1AC-C8ADD56A60A6}" presName="level2Shape" presStyleLbl="node4" presStyleIdx="6" presStyleCnt="14"/>
       <dgm:spPr/>
       <dgm:t>
         <a:bodyPr/>
@@ -2762,7 +2659,7 @@
       <dgm:spPr/>
     </dgm:pt>
     <dgm:pt modelId="{54588B55-EECC-466F-9237-F2D13FCF3C12}" type="pres">
-      <dgm:prSet presAssocID="{DFCC83F9-0185-4FAC-9C8B-DC9E59A90181}" presName="Name19" presStyleLbl="parChTrans1D4" presStyleIdx="7" presStyleCnt="16"/>
+      <dgm:prSet presAssocID="{DFCC83F9-0185-4FAC-9C8B-DC9E59A90181}" presName="Name19" presStyleLbl="parChTrans1D4" presStyleIdx="7" presStyleCnt="14"/>
       <dgm:spPr/>
       <dgm:t>
         <a:bodyPr/>
@@ -2777,7 +2674,7 @@
       <dgm:spPr/>
     </dgm:pt>
     <dgm:pt modelId="{1D6A2535-EE4C-47C7-BB0B-B5758CDDC053}" type="pres">
-      <dgm:prSet presAssocID="{C7CF69AB-CFAF-42DF-807F-2486B4A2B61E}" presName="level2Shape" presStyleLbl="node4" presStyleIdx="7" presStyleCnt="16"/>
+      <dgm:prSet presAssocID="{C7CF69AB-CFAF-42DF-807F-2486B4A2B61E}" presName="level2Shape" presStyleLbl="node4" presStyleIdx="7" presStyleCnt="14"/>
       <dgm:spPr/>
       <dgm:t>
         <a:bodyPr/>
@@ -2792,7 +2689,7 @@
       <dgm:spPr/>
     </dgm:pt>
     <dgm:pt modelId="{41D334FC-DC88-4297-988A-B6A3A5BF7DD8}" type="pres">
-      <dgm:prSet presAssocID="{CCF9276B-DD30-4A31-97E0-374BC2F33936}" presName="Name19" presStyleLbl="parChTrans1D3" presStyleIdx="1" presStyleCnt="3"/>
+      <dgm:prSet presAssocID="{CCF9276B-DD30-4A31-97E0-374BC2F33936}" presName="Name19" presStyleLbl="parChTrans1D3" presStyleIdx="1" presStyleCnt="2"/>
       <dgm:spPr/>
       <dgm:t>
         <a:bodyPr/>
@@ -2807,7 +2704,7 @@
       <dgm:spPr/>
     </dgm:pt>
     <dgm:pt modelId="{B8E2EB32-E5D0-4D49-BCD7-A48568B971EC}" type="pres">
-      <dgm:prSet presAssocID="{6F9C22BB-A951-4593-904B-133B05B88043}" presName="level2Shape" presStyleLbl="node3" presStyleIdx="1" presStyleCnt="3"/>
+      <dgm:prSet presAssocID="{6F9C22BB-A951-4593-904B-133B05B88043}" presName="level2Shape" presStyleLbl="node3" presStyleIdx="1" presStyleCnt="2"/>
       <dgm:spPr/>
       <dgm:t>
         <a:bodyPr/>
@@ -2822,7 +2719,7 @@
       <dgm:spPr/>
     </dgm:pt>
     <dgm:pt modelId="{857F7289-7B4E-4003-AC3D-69AFF400B1F1}" type="pres">
-      <dgm:prSet presAssocID="{971CF5ED-AFF3-482E-A74A-0BF989CA19A9}" presName="Name19" presStyleLbl="parChTrans1D4" presStyleIdx="8" presStyleCnt="16"/>
+      <dgm:prSet presAssocID="{971CF5ED-AFF3-482E-A74A-0BF989CA19A9}" presName="Name19" presStyleLbl="parChTrans1D4" presStyleIdx="8" presStyleCnt="14"/>
       <dgm:spPr/>
       <dgm:t>
         <a:bodyPr/>
@@ -2837,7 +2734,7 @@
       <dgm:spPr/>
     </dgm:pt>
     <dgm:pt modelId="{712470A4-8189-46E3-8952-B9DFA4D0FD5B}" type="pres">
-      <dgm:prSet presAssocID="{2E82ED61-2C38-4B5F-BBA6-C193A1299B2B}" presName="level2Shape" presStyleLbl="node4" presStyleIdx="8" presStyleCnt="16"/>
+      <dgm:prSet presAssocID="{2E82ED61-2C38-4B5F-BBA6-C193A1299B2B}" presName="level2Shape" presStyleLbl="node4" presStyleIdx="8" presStyleCnt="14"/>
       <dgm:spPr/>
       <dgm:t>
         <a:bodyPr/>
@@ -2852,7 +2749,7 @@
       <dgm:spPr/>
     </dgm:pt>
     <dgm:pt modelId="{7D20DB9F-D5B1-4696-ACEA-D430084773AA}" type="pres">
-      <dgm:prSet presAssocID="{4029C3B0-0896-45B8-8180-9AF91F9BB120}" presName="Name19" presStyleLbl="parChTrans1D4" presStyleIdx="9" presStyleCnt="16"/>
+      <dgm:prSet presAssocID="{4029C3B0-0896-45B8-8180-9AF91F9BB120}" presName="Name19" presStyleLbl="parChTrans1D4" presStyleIdx="9" presStyleCnt="14"/>
       <dgm:spPr/>
       <dgm:t>
         <a:bodyPr/>
@@ -2867,7 +2764,7 @@
       <dgm:spPr/>
     </dgm:pt>
     <dgm:pt modelId="{F1F1265C-A072-48C6-85E4-0B0E9EEBF7A9}" type="pres">
-      <dgm:prSet presAssocID="{49000756-D061-4D71-8CA0-31F9974ECF1A}" presName="level2Shape" presStyleLbl="node4" presStyleIdx="9" presStyleCnt="16"/>
+      <dgm:prSet presAssocID="{49000756-D061-4D71-8CA0-31F9974ECF1A}" presName="level2Shape" presStyleLbl="node4" presStyleIdx="9" presStyleCnt="14"/>
       <dgm:spPr/>
       <dgm:t>
         <a:bodyPr/>
@@ -2882,7 +2779,7 @@
       <dgm:spPr/>
     </dgm:pt>
     <dgm:pt modelId="{4051F676-1C76-472E-B793-42A16DDEB179}" type="pres">
-      <dgm:prSet presAssocID="{5148951C-C1B0-434D-90F2-1F2128DF3563}" presName="Name19" presStyleLbl="parChTrans1D4" presStyleIdx="10" presStyleCnt="16"/>
+      <dgm:prSet presAssocID="{5148951C-C1B0-434D-90F2-1F2128DF3563}" presName="Name19" presStyleLbl="parChTrans1D4" presStyleIdx="10" presStyleCnt="14"/>
       <dgm:spPr/>
       <dgm:t>
         <a:bodyPr/>
@@ -2897,7 +2794,7 @@
       <dgm:spPr/>
     </dgm:pt>
     <dgm:pt modelId="{535C48B3-87DE-4354-B7E8-FD38DC14560D}" type="pres">
-      <dgm:prSet presAssocID="{35AF10B0-5D0C-488A-8DA7-F73BE8FC5D85}" presName="level2Shape" presStyleLbl="node4" presStyleIdx="10" presStyleCnt="16"/>
+      <dgm:prSet presAssocID="{35AF10B0-5D0C-488A-8DA7-F73BE8FC5D85}" presName="level2Shape" presStyleLbl="node4" presStyleIdx="10" presStyleCnt="14"/>
       <dgm:spPr/>
       <dgm:t>
         <a:bodyPr/>
@@ -2911,38 +2808,8 @@
       <dgm:prSet presAssocID="{35AF10B0-5D0C-488A-8DA7-F73BE8FC5D85}" presName="hierChild3" presStyleCnt="0"/>
       <dgm:spPr/>
     </dgm:pt>
-    <dgm:pt modelId="{4694D937-0134-4A93-9211-341C9D99867A}" type="pres">
-      <dgm:prSet presAssocID="{60AFF6D8-66C2-4ABA-9ACB-2D4DD35559D1}" presName="Name19" presStyleLbl="parChTrans1D4" presStyleIdx="11" presStyleCnt="16"/>
-      <dgm:spPr/>
-      <dgm:t>
-        <a:bodyPr/>
-        <a:lstStyle/>
-        <a:p>
-          <a:endParaRPr lang="en-US"/>
-        </a:p>
-      </dgm:t>
-    </dgm:pt>
-    <dgm:pt modelId="{2EAC0003-0D68-4513-8419-232C13573B40}" type="pres">
-      <dgm:prSet presAssocID="{7261F8F1-733F-4542-93C9-75D3C32A9639}" presName="Name21" presStyleCnt="0"/>
-      <dgm:spPr/>
-    </dgm:pt>
-    <dgm:pt modelId="{72A1B322-E366-4DB2-B1F2-D6E2B08456E6}" type="pres">
-      <dgm:prSet presAssocID="{7261F8F1-733F-4542-93C9-75D3C32A9639}" presName="level2Shape" presStyleLbl="node4" presStyleIdx="11" presStyleCnt="16"/>
-      <dgm:spPr/>
-      <dgm:t>
-        <a:bodyPr/>
-        <a:lstStyle/>
-        <a:p>
-          <a:endParaRPr lang="en-US"/>
-        </a:p>
-      </dgm:t>
-    </dgm:pt>
-    <dgm:pt modelId="{1A74468D-4C13-441D-B478-C80DD82D9E1F}" type="pres">
-      <dgm:prSet presAssocID="{7261F8F1-733F-4542-93C9-75D3C32A9639}" presName="hierChild3" presStyleCnt="0"/>
-      <dgm:spPr/>
-    </dgm:pt>
     <dgm:pt modelId="{D3916319-D670-48BE-8E7C-73EFD501C140}" type="pres">
-      <dgm:prSet presAssocID="{577A5865-3120-46AD-84D7-B481646DDA51}" presName="Name19" presStyleLbl="parChTrans1D4" presStyleIdx="12" presStyleCnt="16"/>
+      <dgm:prSet presAssocID="{577A5865-3120-46AD-84D7-B481646DDA51}" presName="Name19" presStyleLbl="parChTrans1D4" presStyleIdx="11" presStyleCnt="14"/>
       <dgm:spPr/>
       <dgm:t>
         <a:bodyPr/>
@@ -2957,7 +2824,7 @@
       <dgm:spPr/>
     </dgm:pt>
     <dgm:pt modelId="{ECACF06E-0D77-42BB-B120-CAE787F5BE8E}" type="pres">
-      <dgm:prSet presAssocID="{F1C739AF-6551-4FE4-9091-30A25A3579C1}" presName="level2Shape" presStyleLbl="node4" presStyleIdx="12" presStyleCnt="16"/>
+      <dgm:prSet presAssocID="{F1C739AF-6551-4FE4-9091-30A25A3579C1}" presName="level2Shape" presStyleLbl="node4" presStyleIdx="11" presStyleCnt="14"/>
       <dgm:spPr/>
       <dgm:t>
         <a:bodyPr/>
@@ -2972,7 +2839,7 @@
       <dgm:spPr/>
     </dgm:pt>
     <dgm:pt modelId="{F064F509-5960-48D4-BB13-231EDCC76B94}" type="pres">
-      <dgm:prSet presAssocID="{E5010613-837B-41EE-B31B-DA18AD9AB298}" presName="Name19" presStyleLbl="parChTrans1D4" presStyleIdx="13" presStyleCnt="16"/>
+      <dgm:prSet presAssocID="{E5010613-837B-41EE-B31B-DA18AD9AB298}" presName="Name19" presStyleLbl="parChTrans1D4" presStyleIdx="12" presStyleCnt="14"/>
       <dgm:spPr/>
       <dgm:t>
         <a:bodyPr/>
@@ -2987,7 +2854,7 @@
       <dgm:spPr/>
     </dgm:pt>
     <dgm:pt modelId="{DE52B5AB-E58B-46E6-9C09-E32ABFBD8A69}" type="pres">
-      <dgm:prSet presAssocID="{3152CBFA-D90F-4370-98D8-CBB96716A74F}" presName="level2Shape" presStyleLbl="node4" presStyleIdx="13" presStyleCnt="16"/>
+      <dgm:prSet presAssocID="{3152CBFA-D90F-4370-98D8-CBB96716A74F}" presName="level2Shape" presStyleLbl="node4" presStyleIdx="12" presStyleCnt="14"/>
       <dgm:spPr/>
       <dgm:t>
         <a:bodyPr/>
@@ -3002,7 +2869,7 @@
       <dgm:spPr/>
     </dgm:pt>
     <dgm:pt modelId="{D19A60F2-8B64-4F9B-B220-0126805DB7E3}" type="pres">
-      <dgm:prSet presAssocID="{0C638C6E-8B89-484E-99A7-0F0008F44C1B}" presName="Name19" presStyleLbl="parChTrans1D4" presStyleIdx="14" presStyleCnt="16"/>
+      <dgm:prSet presAssocID="{0C638C6E-8B89-484E-99A7-0F0008F44C1B}" presName="Name19" presStyleLbl="parChTrans1D4" presStyleIdx="13" presStyleCnt="14"/>
       <dgm:spPr/>
       <dgm:t>
         <a:bodyPr/>
@@ -3017,7 +2884,7 @@
       <dgm:spPr/>
     </dgm:pt>
     <dgm:pt modelId="{288A98C4-8794-4D98-9D7E-6D757471075D}" type="pres">
-      <dgm:prSet presAssocID="{A0836253-59AD-4823-969B-C27091CC6D31}" presName="level2Shape" presStyleLbl="node4" presStyleIdx="14" presStyleCnt="16"/>
+      <dgm:prSet presAssocID="{A0836253-59AD-4823-969B-C27091CC6D31}" presName="level2Shape" presStyleLbl="node4" presStyleIdx="13" presStyleCnt="14"/>
       <dgm:spPr/>
       <dgm:t>
         <a:bodyPr/>
@@ -3031,66 +2898,6 @@
       <dgm:prSet presAssocID="{A0836253-59AD-4823-969B-C27091CC6D31}" presName="hierChild3" presStyleCnt="0"/>
       <dgm:spPr/>
     </dgm:pt>
-    <dgm:pt modelId="{1E3B8822-CBE7-4FB4-91BA-A1997FD8D194}" type="pres">
-      <dgm:prSet presAssocID="{016EF344-7E15-4844-97F5-F8DC735DFEAA}" presName="Name19" presStyleLbl="parChTrans1D4" presStyleIdx="15" presStyleCnt="16"/>
-      <dgm:spPr/>
-      <dgm:t>
-        <a:bodyPr/>
-        <a:lstStyle/>
-        <a:p>
-          <a:endParaRPr lang="en-US"/>
-        </a:p>
-      </dgm:t>
-    </dgm:pt>
-    <dgm:pt modelId="{E8996980-9BA7-4F55-AE8A-1D3E2ACCFB5F}" type="pres">
-      <dgm:prSet presAssocID="{1CCD693B-DAB4-4D47-B7CC-492ACAC7B1DD}" presName="Name21" presStyleCnt="0"/>
-      <dgm:spPr/>
-    </dgm:pt>
-    <dgm:pt modelId="{33A0C656-9415-4F4D-9065-7D26BDA0B663}" type="pres">
-      <dgm:prSet presAssocID="{1CCD693B-DAB4-4D47-B7CC-492ACAC7B1DD}" presName="level2Shape" presStyleLbl="node4" presStyleIdx="15" presStyleCnt="16"/>
-      <dgm:spPr/>
-      <dgm:t>
-        <a:bodyPr/>
-        <a:lstStyle/>
-        <a:p>
-          <a:endParaRPr lang="en-US"/>
-        </a:p>
-      </dgm:t>
-    </dgm:pt>
-    <dgm:pt modelId="{D094AAA5-3647-480B-8880-A1D8F8A58319}" type="pres">
-      <dgm:prSet presAssocID="{1CCD693B-DAB4-4D47-B7CC-492ACAC7B1DD}" presName="hierChild3" presStyleCnt="0"/>
-      <dgm:spPr/>
-    </dgm:pt>
-    <dgm:pt modelId="{FE466D77-DD52-415A-921F-5B6F5A281D0A}" type="pres">
-      <dgm:prSet presAssocID="{38C43D82-97EB-4B2F-BBE6-E7BEF32D4865}" presName="Name19" presStyleLbl="parChTrans1D3" presStyleIdx="2" presStyleCnt="3"/>
-      <dgm:spPr/>
-      <dgm:t>
-        <a:bodyPr/>
-        <a:lstStyle/>
-        <a:p>
-          <a:endParaRPr lang="en-US"/>
-        </a:p>
-      </dgm:t>
-    </dgm:pt>
-    <dgm:pt modelId="{482A201E-D9FF-46E2-8D9D-C129E856AD3B}" type="pres">
-      <dgm:prSet presAssocID="{FF1E3CB0-BAF2-4ADD-8990-0573B415F378}" presName="Name21" presStyleCnt="0"/>
-      <dgm:spPr/>
-    </dgm:pt>
-    <dgm:pt modelId="{F2D53BBD-D4ED-4E64-8C17-98D5B8879CBF}" type="pres">
-      <dgm:prSet presAssocID="{FF1E3CB0-BAF2-4ADD-8990-0573B415F378}" presName="level2Shape" presStyleLbl="node3" presStyleIdx="2" presStyleCnt="3" custLinFactNeighborX="50981"/>
-      <dgm:spPr/>
-      <dgm:t>
-        <a:bodyPr/>
-        <a:lstStyle/>
-        <a:p>
-          <a:endParaRPr lang="en-US"/>
-        </a:p>
-      </dgm:t>
-    </dgm:pt>
-    <dgm:pt modelId="{476F76A9-A04B-438E-9C99-300F0160B332}" type="pres">
-      <dgm:prSet presAssocID="{FF1E3CB0-BAF2-4ADD-8990-0573B415F378}" presName="hierChild3" presStyleCnt="0"/>
-      <dgm:spPr/>
-    </dgm:pt>
     <dgm:pt modelId="{F1E8F9B1-EED8-42C2-98B9-FE464B7FBC71}" type="pres">
       <dgm:prSet presAssocID="{1565F46A-33E8-4FDB-836B-D3F88AA217D6}" presName="bgShapesFlow" presStyleCnt="0"/>
       <dgm:spPr/>
@@ -3101,7 +2908,6 @@
     <dgm:cxn modelId="{D2D279A0-4C6C-4C4E-8E56-41F0631352C7}" srcId="{6F9C22BB-A951-4593-904B-133B05B88043}" destId="{2E82ED61-2C38-4B5F-BBA6-C193A1299B2B}" srcOrd="0" destOrd="0" parTransId="{971CF5ED-AFF3-482E-A74A-0BF989CA19A9}" sibTransId="{7D73BB3C-F02E-4D32-8C3F-AABB7D49AB2A}"/>
     <dgm:cxn modelId="{25CF7C5E-5B26-4D19-9B68-FCF1F0136388}" srcId="{299EB561-97C7-4BAC-B7EB-DB28C33DA60A}" destId="{1153B68D-8017-4FD2-B763-2BE2FFBFC9C4}" srcOrd="1" destOrd="0" parTransId="{2A8D573A-B194-44E7-806C-4E7169F3ED3F}" sibTransId="{298039BD-8A67-4C84-8B34-18A6CE646C65}"/>
     <dgm:cxn modelId="{D95C32C0-9E86-43A3-B632-26C922CD11EA}" type="presOf" srcId="{174B66DE-A4C5-4262-B9FF-3DB70DD760B4}" destId="{B215FB30-8694-4C29-B7FC-A88B9190FB5A}" srcOrd="0" destOrd="0" presId="urn:microsoft.com/office/officeart/2005/8/layout/hierarchy6"/>
-    <dgm:cxn modelId="{3F0A6D4D-072A-4A91-A9E7-0B548D888292}" srcId="{49000756-D061-4D71-8CA0-31F9974ECF1A}" destId="{7261F8F1-733F-4542-93C9-75D3C32A9639}" srcOrd="1" destOrd="0" parTransId="{60AFF6D8-66C2-4ABA-9ACB-2D4DD35559D1}" sibTransId="{FA44700B-C9E2-4012-B96F-040BCB7FA66C}"/>
     <dgm:cxn modelId="{86A0356E-AC14-45EC-B127-08EF57FDA833}" srcId="{4895BF14-2446-4B8C-B1A9-9780BC55D8B3}" destId="{174B66DE-A4C5-4262-B9FF-3DB70DD760B4}" srcOrd="0" destOrd="0" parTransId="{F75DAD21-9BFC-4948-9203-F5848E0A8B96}" sibTransId="{8C8068DF-3B6B-44FE-B536-A1297581E869}"/>
     <dgm:cxn modelId="{B84ECF1D-A6CB-4A74-93B0-8833CAC3DD2C}" srcId="{62461A88-BE74-49D3-AC7E-AEE5A612166B}" destId="{6F9C22BB-A951-4593-904B-133B05B88043}" srcOrd="1" destOrd="0" parTransId="{CCF9276B-DD30-4A31-97E0-374BC2F33936}" sibTransId="{8A4F2D8F-12C0-41E0-A37F-E5C90C9E13B5}"/>
     <dgm:cxn modelId="{E3B1A65A-DB8F-4728-B949-8C8B3DF5A367}" type="presOf" srcId="{6F9C22BB-A951-4593-904B-133B05B88043}" destId="{B8E2EB32-E5D0-4D49-BCD7-A48568B971EC}" srcOrd="0" destOrd="0" presId="urn:microsoft.com/office/officeart/2005/8/layout/hierarchy6"/>
@@ -3110,29 +2916,25 @@
     <dgm:cxn modelId="{78FEDABF-5AD0-4AD9-B82B-6C575BD4B9DB}" srcId="{29ED1BD8-A9E7-4C67-873E-405A4AF25EE9}" destId="{62461A88-BE74-49D3-AC7E-AEE5A612166B}" srcOrd="0" destOrd="0" parTransId="{E48153EC-E2FA-408B-8E7C-22B22D651AAD}" sibTransId="{86D73EE1-2C83-4EE2-9590-2C2EAE653F54}"/>
     <dgm:cxn modelId="{A6607A16-C5C8-4B8F-B392-782E9B6D2A1C}" type="presOf" srcId="{4029C3B0-0896-45B8-8180-9AF91F9BB120}" destId="{7D20DB9F-D5B1-4696-ACEA-D430084773AA}" srcOrd="0" destOrd="0" presId="urn:microsoft.com/office/officeart/2005/8/layout/hierarchy6"/>
     <dgm:cxn modelId="{F623D2E4-4CA9-4C3F-962B-F864AE6CF11D}" srcId="{936808E1-78FF-415A-8C6D-B8D366E7E94B}" destId="{4895BF14-2446-4B8C-B1A9-9780BC55D8B3}" srcOrd="1" destOrd="0" parTransId="{3380550B-F545-409E-8728-3E2080D1DE8E}" sibTransId="{64C3886D-ADEC-45CC-8A16-B91E3EDBC043}"/>
-    <dgm:cxn modelId="{6E76E6FB-58E9-46C6-8744-B495C7F39F02}" srcId="{3152CBFA-D90F-4370-98D8-CBB96716A74F}" destId="{1CCD693B-DAB4-4D47-B7CC-492ACAC7B1DD}" srcOrd="1" destOrd="0" parTransId="{016EF344-7E15-4844-97F5-F8DC735DFEAA}" sibTransId="{4FEAB3D8-05EC-4606-8CF8-001A6A2CDE21}"/>
+    <dgm:cxn modelId="{4C4C7B88-7AD7-4323-BA12-1B9BFBAEF9B0}" type="presOf" srcId="{3152CBFA-D90F-4370-98D8-CBB96716A74F}" destId="{DE52B5AB-E58B-46E6-9C09-E32ABFBD8A69}" srcOrd="0" destOrd="0" presId="urn:microsoft.com/office/officeart/2005/8/layout/hierarchy6"/>
     <dgm:cxn modelId="{2B6366A6-CE5C-4243-A6E8-54605E62E31B}" type="presOf" srcId="{35AF10B0-5D0C-488A-8DA7-F73BE8FC5D85}" destId="{535C48B3-87DE-4354-B7E8-FD38DC14560D}" srcOrd="0" destOrd="0" presId="urn:microsoft.com/office/officeart/2005/8/layout/hierarchy6"/>
-    <dgm:cxn modelId="{DCC80803-3D97-49AC-84B5-2FDC8AB5D01E}" type="presOf" srcId="{F1C739AF-6551-4FE4-9091-30A25A3579C1}" destId="{ECACF06E-0D77-42BB-B120-CAE787F5BE8E}" srcOrd="0" destOrd="0" presId="urn:microsoft.com/office/officeart/2005/8/layout/hierarchy6"/>
     <dgm:cxn modelId="{D2A430F1-8FBB-4131-9B41-DF297C34C52B}" type="presOf" srcId="{299EB561-97C7-4BAC-B7EB-DB28C33DA60A}" destId="{C4FAC167-4C6C-4E30-956B-62E586336272}" srcOrd="0" destOrd="0" presId="urn:microsoft.com/office/officeart/2005/8/layout/hierarchy6"/>
     <dgm:cxn modelId="{0BAE7DFD-F964-4DFC-A375-71D2EB87BEAB}" srcId="{DD123432-B415-4B22-814C-D6B426117991}" destId="{299EB561-97C7-4BAC-B7EB-DB28C33DA60A}" srcOrd="0" destOrd="0" parTransId="{EA7FE5AF-FF75-442B-B746-865641E95FAD}" sibTransId="{C5CE8850-2156-436C-B62B-15537E575CB9}"/>
     <dgm:cxn modelId="{5E557175-EC6C-4467-ADA7-B8607C493CA4}" type="presOf" srcId="{F75DAD21-9BFC-4948-9203-F5848E0A8B96}" destId="{CD809B7E-A368-46C6-AAFB-1EDABED2B127}" srcOrd="0" destOrd="0" presId="urn:microsoft.com/office/officeart/2005/8/layout/hierarchy6"/>
-    <dgm:cxn modelId="{5C4E60E0-1AAE-47E7-B184-880644FC4FA7}" type="presOf" srcId="{1CCD693B-DAB4-4D47-B7CC-492ACAC7B1DD}" destId="{33A0C656-9415-4F4D-9065-7D26BDA0B663}" srcOrd="0" destOrd="0" presId="urn:microsoft.com/office/officeart/2005/8/layout/hierarchy6"/>
+    <dgm:cxn modelId="{2BAC1006-5854-4F6D-95AD-736286F3AB5F}" type="presOf" srcId="{0C638C6E-8B89-484E-99A7-0F0008F44C1B}" destId="{D19A60F2-8B64-4F9B-B220-0126805DB7E3}" srcOrd="0" destOrd="0" presId="urn:microsoft.com/office/officeart/2005/8/layout/hierarchy6"/>
     <dgm:cxn modelId="{72B2A304-F408-4776-BB76-40A4C38A433A}" type="presOf" srcId="{DD123432-B415-4B22-814C-D6B426117991}" destId="{B9277DAC-F9CA-4E71-B63F-3F16B430F309}" srcOrd="0" destOrd="0" presId="urn:microsoft.com/office/officeart/2005/8/layout/hierarchy6"/>
-    <dgm:cxn modelId="{C3A2A93F-57A7-4ED5-8AF6-6941E4C31CFA}" srcId="{62461A88-BE74-49D3-AC7E-AEE5A612166B}" destId="{FF1E3CB0-BAF2-4ADD-8990-0573B415F378}" srcOrd="2" destOrd="0" parTransId="{38C43D82-97EB-4B2F-BBE6-E7BEF32D4865}" sibTransId="{86C4E3F9-7F37-4BDE-8DFB-AE2CE79C71A7}"/>
     <dgm:cxn modelId="{8F2364D8-EB83-4C73-B29E-8B7EE1CEC84E}" srcId="{1565F46A-33E8-4FDB-836B-D3F88AA217D6}" destId="{29ED1BD8-A9E7-4C67-873E-405A4AF25EE9}" srcOrd="0" destOrd="0" parTransId="{011F36AE-F9DC-4279-9D0A-C5A84D645C9C}" sibTransId="{A5009B00-7923-40A4-B24B-4FF0A4275F7D}"/>
+    <dgm:cxn modelId="{46514169-8D05-488D-B6A3-82FB7DEC9663}" type="presOf" srcId="{E5010613-837B-41EE-B31B-DA18AD9AB298}" destId="{F064F509-5960-48D4-BB13-231EDCC76B94}" srcOrd="0" destOrd="0" presId="urn:microsoft.com/office/officeart/2005/8/layout/hierarchy6"/>
     <dgm:cxn modelId="{201F5D71-86A4-4FF2-B0F2-7C2A24CB4A5F}" type="presOf" srcId="{2A8D573A-B194-44E7-806C-4E7169F3ED3F}" destId="{4697DA84-ECF6-4003-9834-CE181F277FBB}" srcOrd="0" destOrd="0" presId="urn:microsoft.com/office/officeart/2005/8/layout/hierarchy6"/>
+    <dgm:cxn modelId="{2ED8A1EA-C9B3-44B0-9E88-503BAB18FFEC}" type="presOf" srcId="{577A5865-3120-46AD-84D7-B481646DDA51}" destId="{D3916319-D670-48BE-8E7C-73EFD501C140}" srcOrd="0" destOrd="0" presId="urn:microsoft.com/office/officeart/2005/8/layout/hierarchy6"/>
     <dgm:cxn modelId="{49F56405-A866-40F7-A502-8C10781A4A19}" type="presOf" srcId="{29ED1BD8-A9E7-4C67-873E-405A4AF25EE9}" destId="{F486E78D-8AE6-4C6E-873C-B84E22BEDAEE}" srcOrd="0" destOrd="0" presId="urn:microsoft.com/office/officeart/2005/8/layout/hierarchy6"/>
     <dgm:cxn modelId="{9DF437E5-3046-4BE6-B752-8B97A9BC9078}" type="presOf" srcId="{4C2075A7-8E8D-4212-AEF2-FA2BFC036D54}" destId="{6FF85653-6460-4756-A629-C1326052BA6B}" srcOrd="0" destOrd="0" presId="urn:microsoft.com/office/officeart/2005/8/layout/hierarchy6"/>
     <dgm:cxn modelId="{420784FE-7DA6-4920-A0DA-B993152B0C0D}" srcId="{936808E1-78FF-415A-8C6D-B8D366E7E94B}" destId="{DD123432-B415-4B22-814C-D6B426117991}" srcOrd="0" destOrd="0" parTransId="{BFFCE8B3-4141-4F92-BE7A-A1EAF853840D}" sibTransId="{0726F1BA-C470-42B0-9598-FCC87F422C27}"/>
     <dgm:cxn modelId="{22CF2E35-F00E-4A57-82FB-DA0CABD3360F}" type="presOf" srcId="{1153B68D-8017-4FD2-B763-2BE2FFBFC9C4}" destId="{F6D58E2E-40CE-4F2C-8885-5BDDD1172BE8}" srcOrd="0" destOrd="0" presId="urn:microsoft.com/office/officeart/2005/8/layout/hierarchy6"/>
-    <dgm:cxn modelId="{B1978F76-7C1F-4341-A399-C6056FD97662}" type="presOf" srcId="{60AFF6D8-66C2-4ABA-9ACB-2D4DD35559D1}" destId="{4694D937-0134-4A93-9211-341C9D99867A}" srcOrd="0" destOrd="0" presId="urn:microsoft.com/office/officeart/2005/8/layout/hierarchy6"/>
+    <dgm:cxn modelId="{7482EA66-784D-48EF-A58A-5A9B877A23F1}" type="presOf" srcId="{F1C739AF-6551-4FE4-9091-30A25A3579C1}" destId="{ECACF06E-0D77-42BB-B120-CAE787F5BE8E}" srcOrd="0" destOrd="0" presId="urn:microsoft.com/office/officeart/2005/8/layout/hierarchy6"/>
     <dgm:cxn modelId="{9DD7FAD5-F49C-4B8B-A49A-58E711DCA903}" type="presOf" srcId="{3380550B-F545-409E-8728-3E2080D1DE8E}" destId="{5962983C-0FD2-4E96-8C1C-E39F1E4C568F}" srcOrd="0" destOrd="0" presId="urn:microsoft.com/office/officeart/2005/8/layout/hierarchy6"/>
-    <dgm:cxn modelId="{CDC12802-18B7-4C39-AEB4-9451B29096AB}" type="presOf" srcId="{3152CBFA-D90F-4370-98D8-CBB96716A74F}" destId="{DE52B5AB-E58B-46E6-9C09-E32ABFBD8A69}" srcOrd="0" destOrd="0" presId="urn:microsoft.com/office/officeart/2005/8/layout/hierarchy6"/>
-    <dgm:cxn modelId="{956ED43B-CF59-48BF-A994-C00DF476202B}" type="presOf" srcId="{E5010613-837B-41EE-B31B-DA18AD9AB298}" destId="{F064F509-5960-48D4-BB13-231EDCC76B94}" srcOrd="0" destOrd="0" presId="urn:microsoft.com/office/officeart/2005/8/layout/hierarchy6"/>
     <dgm:cxn modelId="{7BE8DFC3-CFB9-4598-9973-8AAB8C0E76B7}" type="presOf" srcId="{971CF5ED-AFF3-482E-A74A-0BF989CA19A9}" destId="{857F7289-7B4E-4003-AC3D-69AFF400B1F1}" srcOrd="0" destOrd="0" presId="urn:microsoft.com/office/officeart/2005/8/layout/hierarchy6"/>
     <dgm:cxn modelId="{A932358F-721F-47ED-B8E1-0CE7D336A7A7}" type="presOf" srcId="{4895BF14-2446-4B8C-B1A9-9780BC55D8B3}" destId="{E257627A-BB36-4F01-A617-C92E4B946BE3}" srcOrd="0" destOrd="0" presId="urn:microsoft.com/office/officeart/2005/8/layout/hierarchy6"/>
-    <dgm:cxn modelId="{161F3D0C-EF08-4AD9-A64D-BAD34F4BF803}" type="presOf" srcId="{577A5865-3120-46AD-84D7-B481646DDA51}" destId="{D3916319-D670-48BE-8E7C-73EFD501C140}" srcOrd="0" destOrd="0" presId="urn:microsoft.com/office/officeart/2005/8/layout/hierarchy6"/>
-    <dgm:cxn modelId="{79842A2A-6046-40D7-B058-C5A40EF11B30}" type="presOf" srcId="{0C638C6E-8B89-484E-99A7-0F0008F44C1B}" destId="{D19A60F2-8B64-4F9B-B220-0126805DB7E3}" srcOrd="0" destOrd="0" presId="urn:microsoft.com/office/officeart/2005/8/layout/hierarchy6"/>
     <dgm:cxn modelId="{D14D06FD-C82E-4CCB-9A47-153F8CB5D937}" type="presOf" srcId="{BFFCE8B3-4141-4F92-BE7A-A1EAF853840D}" destId="{30DEC963-A63E-4CF4-8BC8-BCCC54B50307}" srcOrd="0" destOrd="0" presId="urn:microsoft.com/office/officeart/2005/8/layout/hierarchy6"/>
     <dgm:cxn modelId="{E229B6AD-E60D-4C66-857E-C2034F959486}" type="presOf" srcId="{2E82ED61-2C38-4B5F-BBA6-C193A1299B2B}" destId="{712470A4-8189-46E3-8952-B9DFA4D0FD5B}" srcOrd="0" destOrd="0" presId="urn:microsoft.com/office/officeart/2005/8/layout/hierarchy6"/>
     <dgm:cxn modelId="{1644F148-8C25-483D-8E8C-CEFF92406E02}" srcId="{62461A88-BE74-49D3-AC7E-AEE5A612166B}" destId="{936808E1-78FF-415A-8C6D-B8D366E7E94B}" srcOrd="0" destOrd="0" parTransId="{7A7E8FDD-A9C0-4725-BC34-3F5C43CB3CF9}" sibTransId="{41C6E207-932A-446C-BED6-6532EF373271}"/>
@@ -3141,23 +2943,19 @@
     <dgm:cxn modelId="{2B6DE801-D737-4C50-A815-E41BDA356FD0}" srcId="{174B66DE-A4C5-4262-B9FF-3DB70DD760B4}" destId="{C7CF69AB-CFAF-42DF-807F-2486B4A2B61E}" srcOrd="1" destOrd="0" parTransId="{DFCC83F9-0185-4FAC-9C8B-DC9E59A90181}" sibTransId="{F11F8D29-D862-41A4-A441-237B83759010}"/>
     <dgm:cxn modelId="{03E410BF-18FA-49A6-8E94-6DFC92388C18}" type="presOf" srcId="{62461A88-BE74-49D3-AC7E-AEE5A612166B}" destId="{7FFE00B5-FB63-4647-B86D-7F6898C2ABAF}" srcOrd="0" destOrd="0" presId="urn:microsoft.com/office/officeart/2005/8/layout/hierarchy6"/>
     <dgm:cxn modelId="{7ADCB353-3418-49AF-AEAA-730E1AA8024A}" type="presOf" srcId="{49000756-D061-4D71-8CA0-31F9974ECF1A}" destId="{F1F1265C-A072-48C6-85E4-0B0E9EEBF7A9}" srcOrd="0" destOrd="0" presId="urn:microsoft.com/office/officeart/2005/8/layout/hierarchy6"/>
-    <dgm:cxn modelId="{40BC4807-C2DB-4739-853E-EBB894390EB0}" type="presOf" srcId="{38C43D82-97EB-4B2F-BBE6-E7BEF32D4865}" destId="{FE466D77-DD52-415A-921F-5B6F5A281D0A}" srcOrd="0" destOrd="0" presId="urn:microsoft.com/office/officeart/2005/8/layout/hierarchy6"/>
-    <dgm:cxn modelId="{3C878166-0A9A-4A22-8F4C-BF882CDB14B6}" type="presOf" srcId="{A0836253-59AD-4823-969B-C27091CC6D31}" destId="{288A98C4-8794-4D98-9D7E-6D757471075D}" srcOrd="0" destOrd="0" presId="urn:microsoft.com/office/officeart/2005/8/layout/hierarchy6"/>
     <dgm:cxn modelId="{3FE7DF85-7176-45EC-8F0C-A4317BD0714D}" type="presOf" srcId="{690B4BB5-43DB-4342-B5A4-23B9AC7FC042}" destId="{A89A8AFA-C3FB-40F4-A8F8-026146D78588}" srcOrd="0" destOrd="0" presId="urn:microsoft.com/office/officeart/2005/8/layout/hierarchy6"/>
     <dgm:cxn modelId="{835EE9B5-B185-4B8D-909B-865A90D9D03B}" srcId="{49000756-D061-4D71-8CA0-31F9974ECF1A}" destId="{35AF10B0-5D0C-488A-8DA7-F73BE8FC5D85}" srcOrd="0" destOrd="0" parTransId="{5148951C-C1B0-434D-90F2-1F2128DF3563}" sibTransId="{C862EED3-BF96-43F1-8671-B3A05E19D8F0}"/>
     <dgm:cxn modelId="{13E1E6C9-782D-4B5A-93B5-C0CF2AAE1EF3}" type="presOf" srcId="{936808E1-78FF-415A-8C6D-B8D366E7E94B}" destId="{D0C888DE-0CAA-4426-B613-BB51F6DAA8DF}" srcOrd="0" destOrd="0" presId="urn:microsoft.com/office/officeart/2005/8/layout/hierarchy6"/>
     <dgm:cxn modelId="{91491415-3C28-4151-9272-716089DA1524}" type="presOf" srcId="{EA7FE5AF-FF75-442B-B746-865641E95FAD}" destId="{55BDA48D-D577-402D-B265-2D98DC9968AF}" srcOrd="0" destOrd="0" presId="urn:microsoft.com/office/officeart/2005/8/layout/hierarchy6"/>
     <dgm:cxn modelId="{2BC76922-BACF-4B39-9A5A-6652060A7CFC}" type="presOf" srcId="{C7CF69AB-CFAF-42DF-807F-2486B4A2B61E}" destId="{1D6A2535-EE4C-47C7-BB0B-B5758CDDC053}" srcOrd="0" destOrd="0" presId="urn:microsoft.com/office/officeart/2005/8/layout/hierarchy6"/>
     <dgm:cxn modelId="{00344D45-D33F-4371-8639-FEC63EAF7505}" type="presOf" srcId="{59ECBF1E-327F-4C3E-A1AC-C8ADD56A60A6}" destId="{43337737-EF2B-4E98-84B4-D16409A4EA80}" srcOrd="0" destOrd="0" presId="urn:microsoft.com/office/officeart/2005/8/layout/hierarchy6"/>
-    <dgm:cxn modelId="{9C4F6D87-2627-4E1F-B1A2-60BBA220C37B}" type="presOf" srcId="{FF1E3CB0-BAF2-4ADD-8990-0573B415F378}" destId="{F2D53BBD-D4ED-4E64-8C17-98D5B8879CBF}" srcOrd="0" destOrd="0" presId="urn:microsoft.com/office/officeart/2005/8/layout/hierarchy6"/>
     <dgm:cxn modelId="{F6FE52B9-5E83-4752-93FE-F01D16574890}" srcId="{3152CBFA-D90F-4370-98D8-CBB96716A74F}" destId="{A0836253-59AD-4823-969B-C27091CC6D31}" srcOrd="0" destOrd="0" parTransId="{0C638C6E-8B89-484E-99A7-0F0008F44C1B}" sibTransId="{C52AF91B-87E7-4CFB-A4B1-9C351C99B152}"/>
-    <dgm:cxn modelId="{E728E43E-2491-4591-B4EA-106453CBEF00}" type="presOf" srcId="{7261F8F1-733F-4542-93C9-75D3C32A9639}" destId="{72A1B322-E366-4DB2-B1F2-D6E2B08456E6}" srcOrd="0" destOrd="0" presId="urn:microsoft.com/office/officeart/2005/8/layout/hierarchy6"/>
     <dgm:cxn modelId="{D593B8FC-BE41-47B1-A178-A5B641C03169}" type="presOf" srcId="{B5616882-C45F-4116-A8B7-E0FF2BC78404}" destId="{5E06239B-1E51-4EB4-BAEB-09F5EF1F334C}" srcOrd="0" destOrd="0" presId="urn:microsoft.com/office/officeart/2005/8/layout/hierarchy6"/>
     <dgm:cxn modelId="{F8D94765-8E0D-4D47-A5DD-1F48CBDDEA29}" type="presOf" srcId="{7A7E8FDD-A9C0-4725-BC34-3F5C43CB3CF9}" destId="{3ED92A81-5FF7-4BBB-AE0A-29442DBAFA8B}" srcOrd="0" destOrd="0" presId="urn:microsoft.com/office/officeart/2005/8/layout/hierarchy6"/>
-    <dgm:cxn modelId="{42180F2B-3212-44A9-B532-89ED5CAC0D99}" type="presOf" srcId="{016EF344-7E15-4844-97F5-F8DC735DFEAA}" destId="{1E3B8822-CBE7-4FB4-91BA-A1997FD8D194}" srcOrd="0" destOrd="0" presId="urn:microsoft.com/office/officeart/2005/8/layout/hierarchy6"/>
     <dgm:cxn modelId="{0A06234C-3240-4F9B-9F28-DC34D36A966B}" type="presOf" srcId="{5148951C-C1B0-434D-90F2-1F2128DF3563}" destId="{4051F676-1C76-472E-B793-42A16DDEB179}" srcOrd="0" destOrd="0" presId="urn:microsoft.com/office/officeart/2005/8/layout/hierarchy6"/>
     <dgm:cxn modelId="{5B4B2E33-DBC3-495B-9AB8-2919CDFF8376}" srcId="{6F9C22BB-A951-4593-904B-133B05B88043}" destId="{F1C739AF-6551-4FE4-9091-30A25A3579C1}" srcOrd="1" destOrd="0" parTransId="{577A5865-3120-46AD-84D7-B481646DDA51}" sibTransId="{8D3704BA-B5FB-4734-9A57-BEEAB9C053D1}"/>
     <dgm:cxn modelId="{61F41AFD-CDAC-4C09-8C4F-612F706B2167}" type="presOf" srcId="{CCF9276B-DD30-4A31-97E0-374BC2F33936}" destId="{41D334FC-DC88-4297-988A-B6A3A5BF7DD8}" srcOrd="0" destOrd="0" presId="urn:microsoft.com/office/officeart/2005/8/layout/hierarchy6"/>
+    <dgm:cxn modelId="{8DB3BC73-105F-4995-83F6-C303BFDD42DB}" type="presOf" srcId="{A0836253-59AD-4823-969B-C27091CC6D31}" destId="{288A98C4-8794-4D98-9D7E-6D757471075D}" srcOrd="0" destOrd="0" presId="urn:microsoft.com/office/officeart/2005/8/layout/hierarchy6"/>
     <dgm:cxn modelId="{F5987033-F94E-4179-91EB-56E0B7E6DEFB}" type="presOf" srcId="{1565F46A-33E8-4FDB-836B-D3F88AA217D6}" destId="{8BE94AF5-9234-41C9-8505-87E9ECE3D97A}" srcOrd="0" destOrd="0" presId="urn:microsoft.com/office/officeart/2005/8/layout/hierarchy6"/>
     <dgm:cxn modelId="{AB602225-58AD-450B-9A62-E9CB769391F3}" srcId="{2E82ED61-2C38-4B5F-BBA6-C193A1299B2B}" destId="{49000756-D061-4D71-8CA0-31F9974ECF1A}" srcOrd="0" destOrd="0" parTransId="{4029C3B0-0896-45B8-8180-9AF91F9BB120}" sibTransId="{AF8E81E6-DE3C-4549-975B-359FD53157DB}"/>
     <dgm:cxn modelId="{2410C736-99F3-4696-913C-ED9552E51816}" type="presParOf" srcId="{8BE94AF5-9234-41C9-8505-87E9ECE3D97A}" destId="{0B5EB589-F308-4085-A615-37DFB01BFF2B}" srcOrd="0" destOrd="0" presId="urn:microsoft.com/office/officeart/2005/8/layout/hierarchy6"/>
@@ -3221,30 +3019,18 @@
     <dgm:cxn modelId="{A5C7A694-4296-4897-A4F0-FBBC1A154C40}" type="presParOf" srcId="{3EA4173A-D89A-4720-80D6-EE0317D504ED}" destId="{E7898B7A-884B-49C8-B590-44DAA9793239}" srcOrd="1" destOrd="0" presId="urn:microsoft.com/office/officeart/2005/8/layout/hierarchy6"/>
     <dgm:cxn modelId="{09E3A3C3-1369-4A5D-9A0E-BFBDF0770794}" type="presParOf" srcId="{E7898B7A-884B-49C8-B590-44DAA9793239}" destId="{535C48B3-87DE-4354-B7E8-FD38DC14560D}" srcOrd="0" destOrd="0" presId="urn:microsoft.com/office/officeart/2005/8/layout/hierarchy6"/>
     <dgm:cxn modelId="{B0E022A7-5F76-46BB-B67A-A1CB55F95FA8}" type="presParOf" srcId="{E7898B7A-884B-49C8-B590-44DAA9793239}" destId="{52BE81F7-1D92-4FE3-8DCA-38183B6059B5}" srcOrd="1" destOrd="0" presId="urn:microsoft.com/office/officeart/2005/8/layout/hierarchy6"/>
-    <dgm:cxn modelId="{C72B4CD1-F0CA-4B3E-93A4-91422F326B66}" type="presParOf" srcId="{3EA4173A-D89A-4720-80D6-EE0317D504ED}" destId="{4694D937-0134-4A93-9211-341C9D99867A}" srcOrd="2" destOrd="0" presId="urn:microsoft.com/office/officeart/2005/8/layout/hierarchy6"/>
-    <dgm:cxn modelId="{F5D7DDDC-C287-4696-8417-BB3F542D6FC6}" type="presParOf" srcId="{3EA4173A-D89A-4720-80D6-EE0317D504ED}" destId="{2EAC0003-0D68-4513-8419-232C13573B40}" srcOrd="3" destOrd="0" presId="urn:microsoft.com/office/officeart/2005/8/layout/hierarchy6"/>
-    <dgm:cxn modelId="{6B5BDABF-02B9-424D-83C6-E1E0DDE7605D}" type="presParOf" srcId="{2EAC0003-0D68-4513-8419-232C13573B40}" destId="{72A1B322-E366-4DB2-B1F2-D6E2B08456E6}" srcOrd="0" destOrd="0" presId="urn:microsoft.com/office/officeart/2005/8/layout/hierarchy6"/>
-    <dgm:cxn modelId="{F117D1C9-3751-4605-8314-D01EC5161714}" type="presParOf" srcId="{2EAC0003-0D68-4513-8419-232C13573B40}" destId="{1A74468D-4C13-441D-B478-C80DD82D9E1F}" srcOrd="1" destOrd="0" presId="urn:microsoft.com/office/officeart/2005/8/layout/hierarchy6"/>
-    <dgm:cxn modelId="{D701B899-695A-403C-A00F-A22033FAFAA7}" type="presParOf" srcId="{F6CA198E-1ACF-4862-A543-93A1004095AA}" destId="{D3916319-D670-48BE-8E7C-73EFD501C140}" srcOrd="2" destOrd="0" presId="urn:microsoft.com/office/officeart/2005/8/layout/hierarchy6"/>
-    <dgm:cxn modelId="{1F595C74-06DC-4CE9-973C-A7BDC278459C}" type="presParOf" srcId="{F6CA198E-1ACF-4862-A543-93A1004095AA}" destId="{1DB0B725-3A65-4205-9916-99A8AFC716F8}" srcOrd="3" destOrd="0" presId="urn:microsoft.com/office/officeart/2005/8/layout/hierarchy6"/>
-    <dgm:cxn modelId="{B549F3FE-93BF-4471-A860-6223ABA92FD5}" type="presParOf" srcId="{1DB0B725-3A65-4205-9916-99A8AFC716F8}" destId="{ECACF06E-0D77-42BB-B120-CAE787F5BE8E}" srcOrd="0" destOrd="0" presId="urn:microsoft.com/office/officeart/2005/8/layout/hierarchy6"/>
-    <dgm:cxn modelId="{614658A2-A09A-49F3-8B28-34304DE9B670}" type="presParOf" srcId="{1DB0B725-3A65-4205-9916-99A8AFC716F8}" destId="{F7939D3D-516E-49E7-81CD-A7CD770C11B5}" srcOrd="1" destOrd="0" presId="urn:microsoft.com/office/officeart/2005/8/layout/hierarchy6"/>
-    <dgm:cxn modelId="{E8EF0460-1066-4094-B1B5-FE3A6D8EF568}" type="presParOf" srcId="{F7939D3D-516E-49E7-81CD-A7CD770C11B5}" destId="{F064F509-5960-48D4-BB13-231EDCC76B94}" srcOrd="0" destOrd="0" presId="urn:microsoft.com/office/officeart/2005/8/layout/hierarchy6"/>
-    <dgm:cxn modelId="{416620CD-79A7-4F79-8767-0C53960812FA}" type="presParOf" srcId="{F7939D3D-516E-49E7-81CD-A7CD770C11B5}" destId="{3E59E307-AAD7-41EF-A97B-112AA4CAA33F}" srcOrd="1" destOrd="0" presId="urn:microsoft.com/office/officeart/2005/8/layout/hierarchy6"/>
-    <dgm:cxn modelId="{E105E78E-BB9A-4CAB-9539-918550599B7B}" type="presParOf" srcId="{3E59E307-AAD7-41EF-A97B-112AA4CAA33F}" destId="{DE52B5AB-E58B-46E6-9C09-E32ABFBD8A69}" srcOrd="0" destOrd="0" presId="urn:microsoft.com/office/officeart/2005/8/layout/hierarchy6"/>
-    <dgm:cxn modelId="{C8B4AC2A-5D58-4D88-B3E5-723414FCCF4F}" type="presParOf" srcId="{3E59E307-AAD7-41EF-A97B-112AA4CAA33F}" destId="{058F4737-0BFF-4464-BF09-8D1DB030260A}" srcOrd="1" destOrd="0" presId="urn:microsoft.com/office/officeart/2005/8/layout/hierarchy6"/>
-    <dgm:cxn modelId="{C2D04B08-5C7E-4653-9F7A-44808C0D0905}" type="presParOf" srcId="{058F4737-0BFF-4464-BF09-8D1DB030260A}" destId="{D19A60F2-8B64-4F9B-B220-0126805DB7E3}" srcOrd="0" destOrd="0" presId="urn:microsoft.com/office/officeart/2005/8/layout/hierarchy6"/>
-    <dgm:cxn modelId="{D0D5032F-B261-43CA-B0B6-27FBBEC7B967}" type="presParOf" srcId="{058F4737-0BFF-4464-BF09-8D1DB030260A}" destId="{216836E7-FD4A-4094-BC14-A39ACB5EFB70}" srcOrd="1" destOrd="0" presId="urn:microsoft.com/office/officeart/2005/8/layout/hierarchy6"/>
-    <dgm:cxn modelId="{71948F2C-4C13-475A-BBCD-2F7BB8196F07}" type="presParOf" srcId="{216836E7-FD4A-4094-BC14-A39ACB5EFB70}" destId="{288A98C4-8794-4D98-9D7E-6D757471075D}" srcOrd="0" destOrd="0" presId="urn:microsoft.com/office/officeart/2005/8/layout/hierarchy6"/>
-    <dgm:cxn modelId="{1F5AFC30-CCB2-44E3-B376-4B473D3EF27A}" type="presParOf" srcId="{216836E7-FD4A-4094-BC14-A39ACB5EFB70}" destId="{383C281D-1146-49A5-AFA5-42B5C76597A1}" srcOrd="1" destOrd="0" presId="urn:microsoft.com/office/officeart/2005/8/layout/hierarchy6"/>
-    <dgm:cxn modelId="{3B998259-3B00-422B-8FA8-8ED8B4ECEC2D}" type="presParOf" srcId="{058F4737-0BFF-4464-BF09-8D1DB030260A}" destId="{1E3B8822-CBE7-4FB4-91BA-A1997FD8D194}" srcOrd="2" destOrd="0" presId="urn:microsoft.com/office/officeart/2005/8/layout/hierarchy6"/>
-    <dgm:cxn modelId="{D44AEE12-A380-49D8-9033-59AB9704223D}" type="presParOf" srcId="{058F4737-0BFF-4464-BF09-8D1DB030260A}" destId="{E8996980-9BA7-4F55-AE8A-1D3E2ACCFB5F}" srcOrd="3" destOrd="0" presId="urn:microsoft.com/office/officeart/2005/8/layout/hierarchy6"/>
-    <dgm:cxn modelId="{5CB88680-6FEC-48D0-99F5-764FC95258CE}" type="presParOf" srcId="{E8996980-9BA7-4F55-AE8A-1D3E2ACCFB5F}" destId="{33A0C656-9415-4F4D-9065-7D26BDA0B663}" srcOrd="0" destOrd="0" presId="urn:microsoft.com/office/officeart/2005/8/layout/hierarchy6"/>
-    <dgm:cxn modelId="{2B3E62B1-4824-432C-B1E7-27AA7C51ADF9}" type="presParOf" srcId="{E8996980-9BA7-4F55-AE8A-1D3E2ACCFB5F}" destId="{D094AAA5-3647-480B-8880-A1D8F8A58319}" srcOrd="1" destOrd="0" presId="urn:microsoft.com/office/officeart/2005/8/layout/hierarchy6"/>
-    <dgm:cxn modelId="{7E7B3333-1485-4324-9CA7-0F464BFDE958}" type="presParOf" srcId="{AD809608-331E-4009-B75F-C4F9FFC72EF4}" destId="{FE466D77-DD52-415A-921F-5B6F5A281D0A}" srcOrd="4" destOrd="0" presId="urn:microsoft.com/office/officeart/2005/8/layout/hierarchy6"/>
-    <dgm:cxn modelId="{856A2CED-636D-4E0F-AAE2-C532FF31482C}" type="presParOf" srcId="{AD809608-331E-4009-B75F-C4F9FFC72EF4}" destId="{482A201E-D9FF-46E2-8D9D-C129E856AD3B}" srcOrd="5" destOrd="0" presId="urn:microsoft.com/office/officeart/2005/8/layout/hierarchy6"/>
-    <dgm:cxn modelId="{002152C3-A170-4FEB-99BE-F61F6A5ECAEC}" type="presParOf" srcId="{482A201E-D9FF-46E2-8D9D-C129E856AD3B}" destId="{F2D53BBD-D4ED-4E64-8C17-98D5B8879CBF}" srcOrd="0" destOrd="0" presId="urn:microsoft.com/office/officeart/2005/8/layout/hierarchy6"/>
-    <dgm:cxn modelId="{CC1B1212-9CA7-441E-97E8-B5DAE176D408}" type="presParOf" srcId="{482A201E-D9FF-46E2-8D9D-C129E856AD3B}" destId="{476F76A9-A04B-438E-9C99-300F0160B332}" srcOrd="1" destOrd="0" presId="urn:microsoft.com/office/officeart/2005/8/layout/hierarchy6"/>
+    <dgm:cxn modelId="{3FEED115-E033-4AE0-BC43-ABB6C3FE43B2}" type="presParOf" srcId="{F6CA198E-1ACF-4862-A543-93A1004095AA}" destId="{D3916319-D670-48BE-8E7C-73EFD501C140}" srcOrd="2" destOrd="0" presId="urn:microsoft.com/office/officeart/2005/8/layout/hierarchy6"/>
+    <dgm:cxn modelId="{0BE2E3CE-807D-4D7D-A9EF-BB5B2E2DEA9F}" type="presParOf" srcId="{F6CA198E-1ACF-4862-A543-93A1004095AA}" destId="{1DB0B725-3A65-4205-9916-99A8AFC716F8}" srcOrd="3" destOrd="0" presId="urn:microsoft.com/office/officeart/2005/8/layout/hierarchy6"/>
+    <dgm:cxn modelId="{472872DA-5059-44EA-93BA-CD2C591EAD7F}" type="presParOf" srcId="{1DB0B725-3A65-4205-9916-99A8AFC716F8}" destId="{ECACF06E-0D77-42BB-B120-CAE787F5BE8E}" srcOrd="0" destOrd="0" presId="urn:microsoft.com/office/officeart/2005/8/layout/hierarchy6"/>
+    <dgm:cxn modelId="{B1AB91E3-68C0-41EE-90ED-C56A1168C55D}" type="presParOf" srcId="{1DB0B725-3A65-4205-9916-99A8AFC716F8}" destId="{F7939D3D-516E-49E7-81CD-A7CD770C11B5}" srcOrd="1" destOrd="0" presId="urn:microsoft.com/office/officeart/2005/8/layout/hierarchy6"/>
+    <dgm:cxn modelId="{C6740551-D58B-4D60-BB02-BFCF438F9385}" type="presParOf" srcId="{F7939D3D-516E-49E7-81CD-A7CD770C11B5}" destId="{F064F509-5960-48D4-BB13-231EDCC76B94}" srcOrd="0" destOrd="0" presId="urn:microsoft.com/office/officeart/2005/8/layout/hierarchy6"/>
+    <dgm:cxn modelId="{B4C17871-1EAE-4FBE-BCEC-FAEB687928E8}" type="presParOf" srcId="{F7939D3D-516E-49E7-81CD-A7CD770C11B5}" destId="{3E59E307-AAD7-41EF-A97B-112AA4CAA33F}" srcOrd="1" destOrd="0" presId="urn:microsoft.com/office/officeart/2005/8/layout/hierarchy6"/>
+    <dgm:cxn modelId="{9DE874CD-B914-4821-BF99-BF46A937B75E}" type="presParOf" srcId="{3E59E307-AAD7-41EF-A97B-112AA4CAA33F}" destId="{DE52B5AB-E58B-46E6-9C09-E32ABFBD8A69}" srcOrd="0" destOrd="0" presId="urn:microsoft.com/office/officeart/2005/8/layout/hierarchy6"/>
+    <dgm:cxn modelId="{3626376F-888A-400D-89F0-E2ACA06E7A6C}" type="presParOf" srcId="{3E59E307-AAD7-41EF-A97B-112AA4CAA33F}" destId="{058F4737-0BFF-4464-BF09-8D1DB030260A}" srcOrd="1" destOrd="0" presId="urn:microsoft.com/office/officeart/2005/8/layout/hierarchy6"/>
+    <dgm:cxn modelId="{4D7E09E9-0DC3-48CD-9A95-A0809A059F64}" type="presParOf" srcId="{058F4737-0BFF-4464-BF09-8D1DB030260A}" destId="{D19A60F2-8B64-4F9B-B220-0126805DB7E3}" srcOrd="0" destOrd="0" presId="urn:microsoft.com/office/officeart/2005/8/layout/hierarchy6"/>
+    <dgm:cxn modelId="{79177FE3-AC29-46ED-A3F5-C70F5B5A9023}" type="presParOf" srcId="{058F4737-0BFF-4464-BF09-8D1DB030260A}" destId="{216836E7-FD4A-4094-BC14-A39ACB5EFB70}" srcOrd="1" destOrd="0" presId="urn:microsoft.com/office/officeart/2005/8/layout/hierarchy6"/>
+    <dgm:cxn modelId="{19B7F354-986A-420E-B630-6F8035A586E2}" type="presParOf" srcId="{216836E7-FD4A-4094-BC14-A39ACB5EFB70}" destId="{288A98C4-8794-4D98-9D7E-6D757471075D}" srcOrd="0" destOrd="0" presId="urn:microsoft.com/office/officeart/2005/8/layout/hierarchy6"/>
+    <dgm:cxn modelId="{0D0237E4-A0F7-4489-92C0-D69FCD764A4C}" type="presParOf" srcId="{216836E7-FD4A-4094-BC14-A39ACB5EFB70}" destId="{383C281D-1146-49A5-AFA5-42B5C76597A1}" srcOrd="1" destOrd="0" presId="urn:microsoft.com/office/officeart/2005/8/layout/hierarchy6"/>
     <dgm:cxn modelId="{8766B0C3-B50C-434B-83AB-EF7D765E6E1B}" type="presParOf" srcId="{8BE94AF5-9234-41C9-8505-87E9ECE3D97A}" destId="{F1E8F9B1-EED8-42C2-98B9-FE464B7FBC71}" srcOrd="1" destOrd="0" presId="urn:microsoft.com/office/officeart/2005/8/layout/hierarchy6"/>
   </dgm:cxnLst>
   <dgm:bg/>
@@ -3644,8 +3430,8 @@
       </dsp:nvSpPr>
       <dsp:spPr>
         <a:xfrm>
-          <a:off x="4590092" y="580057"/>
-          <a:ext cx="882615" cy="588410"/>
+          <a:off x="4622578" y="2530"/>
+          <a:ext cx="1099188" cy="732792"/>
         </a:xfrm>
         <a:prstGeom prst="roundRect">
           <a:avLst>
@@ -3688,12 +3474,12 @@
         </a:fontRef>
       </dsp:style>
       <dsp:txBody>
-        <a:bodyPr spcFirstLastPara="0" vert="horz" wrap="square" lIns="49530" tIns="49530" rIns="49530" bIns="49530" numCol="1" spcCol="1270" anchor="ctr" anchorCtr="0">
+        <a:bodyPr spcFirstLastPara="0" vert="horz" wrap="square" lIns="64770" tIns="64770" rIns="64770" bIns="64770" numCol="1" spcCol="1270" anchor="ctr" anchorCtr="0">
           <a:noAutofit/>
         </a:bodyPr>
         <a:lstStyle/>
         <a:p>
-          <a:pPr lvl="0" algn="ctr" defTabSz="577850">
+          <a:pPr lvl="0" algn="ctr" defTabSz="755650">
             <a:lnSpc>
               <a:spcPct val="90000"/>
             </a:lnSpc>
@@ -3705,14 +3491,14 @@
             </a:spcAft>
           </a:pPr>
           <a:r>
-            <a:rPr lang="en-US" sz="1300" kern="1200" dirty="0" smtClean="0"/>
+            <a:rPr lang="en-US" sz="1700" kern="1200" dirty="0" smtClean="0"/>
             <a:t>Order</a:t>
           </a:r>
         </a:p>
       </dsp:txBody>
       <dsp:txXfrm>
-        <a:off x="4590092" y="580057"/>
-        <a:ext cx="882615" cy="588410"/>
+        <a:off x="4622578" y="2530"/>
+        <a:ext cx="1099188" cy="732792"/>
       </dsp:txXfrm>
     </dsp:sp>
     <dsp:sp modelId="{85CDC8C9-66F5-477F-8620-D18C62C05FD8}">
@@ -3722,8 +3508,8 @@
       </dsp:nvSpPr>
       <dsp:spPr>
         <a:xfrm>
-          <a:off x="4985680" y="1168468"/>
-          <a:ext cx="91440" cy="235364"/>
+          <a:off x="5126452" y="735322"/>
+          <a:ext cx="91440" cy="293116"/>
         </a:xfrm>
         <a:custGeom>
           <a:avLst/>
@@ -3737,7 +3523,7 @@
                 <a:pt x="45720" y="0"/>
               </a:moveTo>
               <a:lnTo>
-                <a:pt x="45720" y="235364"/>
+                <a:pt x="45720" y="293116"/>
               </a:lnTo>
             </a:path>
           </a:pathLst>
@@ -3777,8 +3563,8 @@
       </dsp:nvSpPr>
       <dsp:spPr>
         <a:xfrm>
-          <a:off x="4590092" y="1403832"/>
-          <a:ext cx="882615" cy="588410"/>
+          <a:off x="4622578" y="1028439"/>
+          <a:ext cx="1099188" cy="732792"/>
         </a:xfrm>
         <a:prstGeom prst="roundRect">
           <a:avLst>
@@ -3816,12 +3602,12 @@
         </a:fontRef>
       </dsp:style>
       <dsp:txBody>
-        <a:bodyPr spcFirstLastPara="0" vert="horz" wrap="square" lIns="49530" tIns="49530" rIns="49530" bIns="49530" numCol="1" spcCol="1270" anchor="ctr" anchorCtr="0">
+        <a:bodyPr spcFirstLastPara="0" vert="horz" wrap="square" lIns="64770" tIns="64770" rIns="64770" bIns="64770" numCol="1" spcCol="1270" anchor="ctr" anchorCtr="0">
           <a:noAutofit/>
         </a:bodyPr>
         <a:lstStyle/>
         <a:p>
-          <a:pPr lvl="0" algn="ctr" defTabSz="577850">
+          <a:pPr lvl="0" algn="ctr" defTabSz="755650">
             <a:lnSpc>
               <a:spcPct val="90000"/>
             </a:lnSpc>
@@ -3833,15 +3619,15 @@
             </a:spcAft>
           </a:pPr>
           <a:r>
-            <a:rPr lang="en-US" sz="1300" kern="1200" dirty="0" smtClean="0"/>
+            <a:rPr lang="en-US" sz="1700" kern="1200" dirty="0" smtClean="0"/>
             <a:t>a</a:t>
           </a:r>
-          <a:endParaRPr lang="en-US" sz="1300" kern="1200" dirty="0"/>
+          <a:endParaRPr lang="en-US" sz="1700" kern="1200" dirty="0"/>
         </a:p>
       </dsp:txBody>
       <dsp:txXfrm>
-        <a:off x="4590092" y="1403832"/>
-        <a:ext cx="882615" cy="588410"/>
+        <a:off x="4622578" y="1028439"/>
+        <a:ext cx="1099188" cy="732792"/>
       </dsp:txXfrm>
     </dsp:sp>
     <dsp:sp modelId="{3ED92A81-5FF7-4BBB-AE0A-29442DBAFA8B}">
@@ -3851,8 +3637,8 @@
       </dsp:nvSpPr>
       <dsp:spPr>
         <a:xfrm>
-          <a:off x="2162898" y="1992243"/>
-          <a:ext cx="2868501" cy="235364"/>
+          <a:off x="3028754" y="1761232"/>
+          <a:ext cx="2143418" cy="293116"/>
         </a:xfrm>
         <a:custGeom>
           <a:avLst/>
@@ -3863,16 +3649,16 @@
           <a:pathLst>
             <a:path>
               <a:moveTo>
-                <a:pt x="2868501" y="0"/>
+                <a:pt x="2143418" y="0"/>
               </a:moveTo>
               <a:lnTo>
-                <a:pt x="2868501" y="117682"/>
+                <a:pt x="2143418" y="146558"/>
               </a:lnTo>
               <a:lnTo>
-                <a:pt x="0" y="117682"/>
+                <a:pt x="0" y="146558"/>
               </a:lnTo>
               <a:lnTo>
-                <a:pt x="0" y="235364"/>
+                <a:pt x="0" y="293116"/>
               </a:lnTo>
             </a:path>
           </a:pathLst>
@@ -3912,8 +3698,8 @@
       </dsp:nvSpPr>
       <dsp:spPr>
         <a:xfrm>
-          <a:off x="1721590" y="2227607"/>
-          <a:ext cx="882615" cy="588410"/>
+          <a:off x="2479160" y="2054349"/>
+          <a:ext cx="1099188" cy="732792"/>
         </a:xfrm>
         <a:prstGeom prst="roundRect">
           <a:avLst>
@@ -3956,12 +3742,12 @@
         </a:fontRef>
       </dsp:style>
       <dsp:txBody>
-        <a:bodyPr spcFirstLastPara="0" vert="horz" wrap="square" lIns="49530" tIns="49530" rIns="49530" bIns="49530" numCol="1" spcCol="1270" anchor="ctr" anchorCtr="0">
+        <a:bodyPr spcFirstLastPara="0" vert="horz" wrap="square" lIns="64770" tIns="64770" rIns="64770" bIns="64770" numCol="1" spcCol="1270" anchor="ctr" anchorCtr="0">
           <a:noAutofit/>
         </a:bodyPr>
         <a:lstStyle/>
         <a:p>
-          <a:pPr lvl="0" algn="ctr" defTabSz="577850">
+          <a:pPr lvl="0" algn="ctr" defTabSz="755650">
             <a:lnSpc>
               <a:spcPct val="90000"/>
             </a:lnSpc>
@@ -3973,15 +3759,15 @@
             </a:spcAft>
           </a:pPr>
           <a:r>
-            <a:rPr lang="en-US" sz="1300" kern="1200" dirty="0" smtClean="0"/>
+            <a:rPr lang="en-US" sz="1700" kern="1200" dirty="0" smtClean="0"/>
             <a:t>pizza</a:t>
           </a:r>
-          <a:endParaRPr lang="en-US" sz="1300" kern="1200" dirty="0"/>
+          <a:endParaRPr lang="en-US" sz="1700" kern="1200" dirty="0"/>
         </a:p>
       </dsp:txBody>
       <dsp:txXfrm>
-        <a:off x="1721590" y="2227607"/>
-        <a:ext cx="882615" cy="588410"/>
+        <a:off x="2479160" y="2054349"/>
+        <a:ext cx="1099188" cy="732792"/>
       </dsp:txXfrm>
     </dsp:sp>
     <dsp:sp modelId="{30DEC963-A63E-4CF4-8BC8-BCCC54B50307}">
@@ -3991,8 +3777,8 @@
       </dsp:nvSpPr>
       <dsp:spPr>
         <a:xfrm>
-          <a:off x="1015498" y="2816017"/>
-          <a:ext cx="1147400" cy="235364"/>
+          <a:off x="1599809" y="2787141"/>
+          <a:ext cx="1428945" cy="293116"/>
         </a:xfrm>
         <a:custGeom>
           <a:avLst/>
@@ -4003,16 +3789,16 @@
           <a:pathLst>
             <a:path>
               <a:moveTo>
-                <a:pt x="1147400" y="0"/>
+                <a:pt x="1428945" y="0"/>
               </a:moveTo>
               <a:lnTo>
-                <a:pt x="1147400" y="117682"/>
+                <a:pt x="1428945" y="146558"/>
               </a:lnTo>
               <a:lnTo>
-                <a:pt x="0" y="117682"/>
+                <a:pt x="0" y="146558"/>
               </a:lnTo>
               <a:lnTo>
-                <a:pt x="0" y="235364"/>
+                <a:pt x="0" y="293116"/>
               </a:lnTo>
             </a:path>
           </a:pathLst>
@@ -4052,8 +3838,8 @@
       </dsp:nvSpPr>
       <dsp:spPr>
         <a:xfrm>
-          <a:off x="574190" y="3051382"/>
-          <a:ext cx="882615" cy="588410"/>
+          <a:off x="1050214" y="3080258"/>
+          <a:ext cx="1099188" cy="732792"/>
         </a:xfrm>
         <a:prstGeom prst="roundRect">
           <a:avLst>
@@ -4096,12 +3882,12 @@
         </a:fontRef>
       </dsp:style>
       <dsp:txBody>
-        <a:bodyPr spcFirstLastPara="0" vert="horz" wrap="square" lIns="49530" tIns="49530" rIns="49530" bIns="49530" numCol="1" spcCol="1270" anchor="ctr" anchorCtr="0">
+        <a:bodyPr spcFirstLastPara="0" vert="horz" wrap="square" lIns="64770" tIns="64770" rIns="64770" bIns="64770" numCol="1" spcCol="1270" anchor="ctr" anchorCtr="0">
           <a:noAutofit/>
         </a:bodyPr>
         <a:lstStyle/>
         <a:p>
-          <a:pPr lvl="0" algn="ctr" defTabSz="577850">
+          <a:pPr lvl="0" algn="ctr" defTabSz="755650">
             <a:lnSpc>
               <a:spcPct val="90000"/>
             </a:lnSpc>
@@ -4113,15 +3899,15 @@
             </a:spcAft>
           </a:pPr>
           <a:r>
-            <a:rPr lang="en-US" sz="1300" kern="1200" dirty="0" smtClean="0"/>
+            <a:rPr lang="en-US" sz="1700" kern="1200" dirty="0" smtClean="0"/>
             <a:t>with</a:t>
           </a:r>
-          <a:endParaRPr lang="en-US" sz="1300" kern="1200" dirty="0"/>
+          <a:endParaRPr lang="en-US" sz="1700" kern="1200" dirty="0"/>
         </a:p>
       </dsp:txBody>
       <dsp:txXfrm>
-        <a:off x="574190" y="3051382"/>
-        <a:ext cx="882615" cy="588410"/>
+        <a:off x="1050214" y="3080258"/>
+        <a:ext cx="1099188" cy="732792"/>
       </dsp:txXfrm>
     </dsp:sp>
     <dsp:sp modelId="{55BDA48D-D577-402D-B265-2D98DC9968AF}">
@@ -4131,8 +3917,8 @@
       </dsp:nvSpPr>
       <dsp:spPr>
         <a:xfrm>
-          <a:off x="969778" y="3639792"/>
-          <a:ext cx="91440" cy="235364"/>
+          <a:off x="1554089" y="3813050"/>
+          <a:ext cx="91440" cy="293116"/>
         </a:xfrm>
         <a:custGeom>
           <a:avLst/>
@@ -4146,7 +3932,7 @@
                 <a:pt x="45720" y="0"/>
               </a:moveTo>
               <a:lnTo>
-                <a:pt x="45720" y="235364"/>
+                <a:pt x="45720" y="293116"/>
               </a:lnTo>
             </a:path>
           </a:pathLst>
@@ -4186,8 +3972,8 @@
       </dsp:nvSpPr>
       <dsp:spPr>
         <a:xfrm>
-          <a:off x="574190" y="3875156"/>
-          <a:ext cx="882615" cy="588410"/>
+          <a:off x="1050214" y="4106167"/>
+          <a:ext cx="1099188" cy="732792"/>
         </a:xfrm>
         <a:prstGeom prst="roundRect">
           <a:avLst>
@@ -4225,12 +4011,12 @@
         </a:fontRef>
       </dsp:style>
       <dsp:txBody>
-        <a:bodyPr spcFirstLastPara="0" vert="horz" wrap="square" lIns="49530" tIns="49530" rIns="49530" bIns="49530" numCol="1" spcCol="1270" anchor="ctr" anchorCtr="0">
+        <a:bodyPr spcFirstLastPara="0" vert="horz" wrap="square" lIns="64770" tIns="64770" rIns="64770" bIns="64770" numCol="1" spcCol="1270" anchor="ctr" anchorCtr="0">
           <a:noAutofit/>
         </a:bodyPr>
         <a:lstStyle/>
         <a:p>
-          <a:pPr lvl="0" algn="ctr" defTabSz="577850">
+          <a:pPr lvl="0" algn="ctr" defTabSz="755650">
             <a:lnSpc>
               <a:spcPct val="90000"/>
             </a:lnSpc>
@@ -4242,15 +4028,15 @@
             </a:spcAft>
           </a:pPr>
           <a:r>
-            <a:rPr lang="en-US" sz="1300" kern="1200" dirty="0" smtClean="0"/>
+            <a:rPr lang="en-US" sz="1700" kern="1200" dirty="0" smtClean="0"/>
             <a:t>extra</a:t>
           </a:r>
-          <a:endParaRPr lang="en-US" sz="1300" kern="1200" dirty="0"/>
+          <a:endParaRPr lang="en-US" sz="1700" kern="1200" dirty="0"/>
         </a:p>
       </dsp:txBody>
       <dsp:txXfrm>
-        <a:off x="574190" y="3875156"/>
-        <a:ext cx="882615" cy="588410"/>
+        <a:off x="1050214" y="4106167"/>
+        <a:ext cx="1099188" cy="732792"/>
       </dsp:txXfrm>
     </dsp:sp>
     <dsp:sp modelId="{A89A8AFA-C3FB-40F4-A8F8-026146D78588}">
@@ -4260,8 +4046,8 @@
       </dsp:nvSpPr>
       <dsp:spPr>
         <a:xfrm>
-          <a:off x="441797" y="4463567"/>
-          <a:ext cx="573700" cy="235364"/>
+          <a:off x="885336" y="4838960"/>
+          <a:ext cx="714472" cy="293116"/>
         </a:xfrm>
         <a:custGeom>
           <a:avLst/>
@@ -4272,16 +4058,16 @@
           <a:pathLst>
             <a:path>
               <a:moveTo>
-                <a:pt x="573700" y="0"/>
+                <a:pt x="714472" y="0"/>
               </a:moveTo>
               <a:lnTo>
-                <a:pt x="573700" y="117682"/>
+                <a:pt x="714472" y="146558"/>
               </a:lnTo>
               <a:lnTo>
-                <a:pt x="0" y="117682"/>
+                <a:pt x="0" y="146558"/>
               </a:lnTo>
               <a:lnTo>
-                <a:pt x="0" y="235364"/>
+                <a:pt x="0" y="293116"/>
               </a:lnTo>
             </a:path>
           </a:pathLst>
@@ -4321,8 +4107,8 @@
       </dsp:nvSpPr>
       <dsp:spPr>
         <a:xfrm>
-          <a:off x="489" y="4698931"/>
-          <a:ext cx="882615" cy="588410"/>
+          <a:off x="335742" y="5132077"/>
+          <a:ext cx="1099188" cy="732792"/>
         </a:xfrm>
         <a:prstGeom prst="roundRect">
           <a:avLst>
@@ -4365,12 +4151,12 @@
         </a:fontRef>
       </dsp:style>
       <dsp:txBody>
-        <a:bodyPr spcFirstLastPara="0" vert="horz" wrap="square" lIns="49530" tIns="49530" rIns="49530" bIns="49530" numCol="1" spcCol="1270" anchor="ctr" anchorCtr="0">
+        <a:bodyPr spcFirstLastPara="0" vert="horz" wrap="square" lIns="64770" tIns="64770" rIns="64770" bIns="64770" numCol="1" spcCol="1270" anchor="ctr" anchorCtr="0">
           <a:noAutofit/>
         </a:bodyPr>
         <a:lstStyle/>
         <a:p>
-          <a:pPr lvl="0" algn="ctr" defTabSz="577850">
+          <a:pPr lvl="0" algn="ctr" defTabSz="755650">
             <a:lnSpc>
               <a:spcPct val="90000"/>
             </a:lnSpc>
@@ -4382,15 +4168,15 @@
             </a:spcAft>
           </a:pPr>
           <a:r>
-            <a:rPr lang="en-US" sz="1300" kern="1200" dirty="0" smtClean="0"/>
+            <a:rPr lang="en-US" sz="1700" kern="1200" dirty="0" smtClean="0"/>
             <a:t>pepperoni</a:t>
           </a:r>
-          <a:endParaRPr lang="en-US" sz="1300" kern="1200" dirty="0"/>
+          <a:endParaRPr lang="en-US" sz="1700" kern="1200" dirty="0"/>
         </a:p>
       </dsp:txBody>
       <dsp:txXfrm>
-        <a:off x="489" y="4698931"/>
-        <a:ext cx="882615" cy="588410"/>
+        <a:off x="335742" y="5132077"/>
+        <a:ext cx="1099188" cy="732792"/>
       </dsp:txXfrm>
     </dsp:sp>
     <dsp:sp modelId="{4697DA84-ECF6-4003-9834-CE181F277FBB}">
@@ -4400,8 +4186,8 @@
       </dsp:nvSpPr>
       <dsp:spPr>
         <a:xfrm>
-          <a:off x="1015498" y="4463567"/>
-          <a:ext cx="573700" cy="235364"/>
+          <a:off x="1599809" y="4838960"/>
+          <a:ext cx="714472" cy="293116"/>
         </a:xfrm>
         <a:custGeom>
           <a:avLst/>
@@ -4415,13 +4201,13 @@
                 <a:pt x="0" y="0"/>
               </a:moveTo>
               <a:lnTo>
-                <a:pt x="0" y="117682"/>
+                <a:pt x="0" y="146558"/>
               </a:lnTo>
               <a:lnTo>
-                <a:pt x="573700" y="117682"/>
+                <a:pt x="714472" y="146558"/>
               </a:lnTo>
               <a:lnTo>
-                <a:pt x="573700" y="235364"/>
+                <a:pt x="714472" y="293116"/>
               </a:lnTo>
             </a:path>
           </a:pathLst>
@@ -4461,8 +4247,8 @@
       </dsp:nvSpPr>
       <dsp:spPr>
         <a:xfrm>
-          <a:off x="1147890" y="4698931"/>
-          <a:ext cx="882615" cy="588410"/>
+          <a:off x="1764687" y="5132077"/>
+          <a:ext cx="1099188" cy="732792"/>
         </a:xfrm>
         <a:prstGeom prst="roundRect">
           <a:avLst>
@@ -4505,12 +4291,12 @@
         </a:fontRef>
       </dsp:style>
       <dsp:txBody>
-        <a:bodyPr spcFirstLastPara="0" vert="horz" wrap="square" lIns="49530" tIns="49530" rIns="49530" bIns="49530" numCol="1" spcCol="1270" anchor="ctr" anchorCtr="0">
+        <a:bodyPr spcFirstLastPara="0" vert="horz" wrap="square" lIns="64770" tIns="64770" rIns="64770" bIns="64770" numCol="1" spcCol="1270" anchor="ctr" anchorCtr="0">
           <a:noAutofit/>
         </a:bodyPr>
         <a:lstStyle/>
         <a:p>
-          <a:pPr lvl="0" algn="ctr" defTabSz="577850">
+          <a:pPr lvl="0" algn="ctr" defTabSz="755650">
             <a:lnSpc>
               <a:spcPct val="90000"/>
             </a:lnSpc>
@@ -4522,15 +4308,15 @@
             </a:spcAft>
           </a:pPr>
           <a:r>
-            <a:rPr lang="en-US" sz="1300" kern="1200" dirty="0" smtClean="0"/>
+            <a:rPr lang="en-US" sz="1700" kern="1200" dirty="0" smtClean="0"/>
             <a:t>tomato</a:t>
           </a:r>
-          <a:endParaRPr lang="en-US" sz="1300" kern="1200" dirty="0"/>
+          <a:endParaRPr lang="en-US" sz="1700" kern="1200" dirty="0"/>
         </a:p>
       </dsp:txBody>
       <dsp:txXfrm>
-        <a:off x="1147890" y="4698931"/>
-        <a:ext cx="882615" cy="588410"/>
+        <a:off x="1764687" y="5132077"/>
+        <a:ext cx="1099188" cy="732792"/>
       </dsp:txXfrm>
     </dsp:sp>
     <dsp:sp modelId="{5962983C-0FD2-4E96-8C1C-E39F1E4C568F}">
@@ -4540,8 +4326,8 @@
       </dsp:nvSpPr>
       <dsp:spPr>
         <a:xfrm>
-          <a:off x="2162898" y="2816017"/>
-          <a:ext cx="1147400" cy="235364"/>
+          <a:off x="3028754" y="2787141"/>
+          <a:ext cx="1428945" cy="293116"/>
         </a:xfrm>
         <a:custGeom>
           <a:avLst/>
@@ -4555,13 +4341,13 @@
                 <a:pt x="0" y="0"/>
               </a:moveTo>
               <a:lnTo>
-                <a:pt x="0" y="117682"/>
+                <a:pt x="0" y="146558"/>
               </a:lnTo>
               <a:lnTo>
-                <a:pt x="1147400" y="117682"/>
+                <a:pt x="1428945" y="146558"/>
               </a:lnTo>
               <a:lnTo>
-                <a:pt x="1147400" y="235364"/>
+                <a:pt x="1428945" y="293116"/>
               </a:lnTo>
             </a:path>
           </a:pathLst>
@@ -4601,8 +4387,8 @@
       </dsp:nvSpPr>
       <dsp:spPr>
         <a:xfrm>
-          <a:off x="2868991" y="3051382"/>
-          <a:ext cx="882615" cy="588410"/>
+          <a:off x="3908105" y="3080258"/>
+          <a:ext cx="1099188" cy="732792"/>
         </a:xfrm>
         <a:prstGeom prst="roundRect">
           <a:avLst>
@@ -4645,12 +4431,12 @@
         </a:fontRef>
       </dsp:style>
       <dsp:txBody>
-        <a:bodyPr spcFirstLastPara="0" vert="horz" wrap="square" lIns="49530" tIns="49530" rIns="49530" bIns="49530" numCol="1" spcCol="1270" anchor="ctr" anchorCtr="0">
+        <a:bodyPr spcFirstLastPara="0" vert="horz" wrap="square" lIns="64770" tIns="64770" rIns="64770" bIns="64770" numCol="1" spcCol="1270" anchor="ctr" anchorCtr="0">
           <a:noAutofit/>
         </a:bodyPr>
         <a:lstStyle/>
         <a:p>
-          <a:pPr lvl="0" algn="ctr" defTabSz="577850">
+          <a:pPr lvl="0" algn="ctr" defTabSz="755650">
             <a:lnSpc>
               <a:spcPct val="90000"/>
             </a:lnSpc>
@@ -4662,15 +4448,15 @@
             </a:spcAft>
           </a:pPr>
           <a:r>
-            <a:rPr lang="en-US" sz="1300" kern="1200" dirty="0" smtClean="0"/>
+            <a:rPr lang="en-US" sz="1700" kern="1200" dirty="0" smtClean="0"/>
             <a:t>without</a:t>
           </a:r>
-          <a:endParaRPr lang="en-US" sz="1300" kern="1200" dirty="0"/>
+          <a:endParaRPr lang="en-US" sz="1700" kern="1200" dirty="0"/>
         </a:p>
       </dsp:txBody>
       <dsp:txXfrm>
-        <a:off x="2868991" y="3051382"/>
-        <a:ext cx="882615" cy="588410"/>
+        <a:off x="3908105" y="3080258"/>
+        <a:ext cx="1099188" cy="732792"/>
       </dsp:txXfrm>
     </dsp:sp>
     <dsp:sp modelId="{CD809B7E-A368-46C6-AAFB-1EDABED2B127}">
@@ -4680,8 +4466,8 @@
       </dsp:nvSpPr>
       <dsp:spPr>
         <a:xfrm>
-          <a:off x="3264579" y="3639792"/>
-          <a:ext cx="91440" cy="235364"/>
+          <a:off x="4411980" y="3813050"/>
+          <a:ext cx="91440" cy="293116"/>
         </a:xfrm>
         <a:custGeom>
           <a:avLst/>
@@ -4695,7 +4481,7 @@
                 <a:pt x="45720" y="0"/>
               </a:moveTo>
               <a:lnTo>
-                <a:pt x="45720" y="235364"/>
+                <a:pt x="45720" y="293116"/>
               </a:lnTo>
             </a:path>
           </a:pathLst>
@@ -4735,8 +4521,8 @@
       </dsp:nvSpPr>
       <dsp:spPr>
         <a:xfrm>
-          <a:off x="2868991" y="3875156"/>
-          <a:ext cx="882615" cy="588410"/>
+          <a:off x="3908105" y="4106167"/>
+          <a:ext cx="1099188" cy="732792"/>
         </a:xfrm>
         <a:prstGeom prst="roundRect">
           <a:avLst>
@@ -4774,12 +4560,12 @@
         </a:fontRef>
       </dsp:style>
       <dsp:txBody>
-        <a:bodyPr spcFirstLastPara="0" vert="horz" wrap="square" lIns="49530" tIns="49530" rIns="49530" bIns="49530" numCol="1" spcCol="1270" anchor="ctr" anchorCtr="0">
+        <a:bodyPr spcFirstLastPara="0" vert="horz" wrap="square" lIns="64770" tIns="64770" rIns="64770" bIns="64770" numCol="1" spcCol="1270" anchor="ctr" anchorCtr="0">
           <a:noAutofit/>
         </a:bodyPr>
         <a:lstStyle/>
         <a:p>
-          <a:pPr lvl="0" algn="ctr" defTabSz="577850">
+          <a:pPr lvl="0" algn="ctr" defTabSz="755650">
             <a:lnSpc>
               <a:spcPct val="90000"/>
             </a:lnSpc>
@@ -4791,15 +4577,15 @@
             </a:spcAft>
           </a:pPr>
           <a:r>
-            <a:rPr lang="en-US" sz="1300" kern="1200" dirty="0" smtClean="0"/>
+            <a:rPr lang="en-US" sz="1700" kern="1200" dirty="0" smtClean="0"/>
             <a:t>extra</a:t>
           </a:r>
-          <a:endParaRPr lang="en-US" sz="1300" kern="1200" dirty="0"/>
+          <a:endParaRPr lang="en-US" sz="1700" kern="1200" dirty="0"/>
         </a:p>
       </dsp:txBody>
       <dsp:txXfrm>
-        <a:off x="2868991" y="3875156"/>
-        <a:ext cx="882615" cy="588410"/>
+        <a:off x="3908105" y="4106167"/>
+        <a:ext cx="1099188" cy="732792"/>
       </dsp:txXfrm>
     </dsp:sp>
     <dsp:sp modelId="{6FF85653-6460-4756-A629-C1326052BA6B}">
@@ -4809,8 +4595,8 @@
       </dsp:nvSpPr>
       <dsp:spPr>
         <a:xfrm>
-          <a:off x="2736599" y="4463567"/>
-          <a:ext cx="573700" cy="235364"/>
+          <a:off x="3743227" y="4838960"/>
+          <a:ext cx="714472" cy="293116"/>
         </a:xfrm>
         <a:custGeom>
           <a:avLst/>
@@ -4821,16 +4607,16 @@
           <a:pathLst>
             <a:path>
               <a:moveTo>
-                <a:pt x="573700" y="0"/>
+                <a:pt x="714472" y="0"/>
               </a:moveTo>
               <a:lnTo>
-                <a:pt x="573700" y="117682"/>
+                <a:pt x="714472" y="146558"/>
               </a:lnTo>
               <a:lnTo>
-                <a:pt x="0" y="117682"/>
+                <a:pt x="0" y="146558"/>
               </a:lnTo>
               <a:lnTo>
-                <a:pt x="0" y="235364"/>
+                <a:pt x="0" y="293116"/>
               </a:lnTo>
             </a:path>
           </a:pathLst>
@@ -4870,8 +4656,8 @@
       </dsp:nvSpPr>
       <dsp:spPr>
         <a:xfrm>
-          <a:off x="2295291" y="4698931"/>
-          <a:ext cx="882615" cy="588410"/>
+          <a:off x="3193632" y="5132077"/>
+          <a:ext cx="1099188" cy="732792"/>
         </a:xfrm>
         <a:prstGeom prst="roundRect">
           <a:avLst>
@@ -4914,12 +4700,12 @@
         </a:fontRef>
       </dsp:style>
       <dsp:txBody>
-        <a:bodyPr spcFirstLastPara="0" vert="horz" wrap="square" lIns="49530" tIns="49530" rIns="49530" bIns="49530" numCol="1" spcCol="1270" anchor="ctr" anchorCtr="0">
+        <a:bodyPr spcFirstLastPara="0" vert="horz" wrap="square" lIns="64770" tIns="64770" rIns="64770" bIns="64770" numCol="1" spcCol="1270" anchor="ctr" anchorCtr="0">
           <a:noAutofit/>
         </a:bodyPr>
         <a:lstStyle/>
         <a:p>
-          <a:pPr lvl="0" algn="ctr" defTabSz="577850">
+          <a:pPr lvl="0" algn="ctr" defTabSz="755650">
             <a:lnSpc>
               <a:spcPct val="90000"/>
             </a:lnSpc>
@@ -4931,15 +4717,15 @@
             </a:spcAft>
           </a:pPr>
           <a:r>
-            <a:rPr lang="en-US" sz="1300" kern="1200" dirty="0" smtClean="0"/>
+            <a:rPr lang="en-US" sz="1700" kern="1200" dirty="0" smtClean="0"/>
             <a:t>pepperoni</a:t>
           </a:r>
-          <a:endParaRPr lang="en-US" sz="1300" kern="1200" dirty="0"/>
+          <a:endParaRPr lang="en-US" sz="1700" kern="1200" dirty="0"/>
         </a:p>
       </dsp:txBody>
       <dsp:txXfrm>
-        <a:off x="2295291" y="4698931"/>
-        <a:ext cx="882615" cy="588410"/>
+        <a:off x="3193632" y="5132077"/>
+        <a:ext cx="1099188" cy="732792"/>
       </dsp:txXfrm>
     </dsp:sp>
     <dsp:sp modelId="{54588B55-EECC-466F-9237-F2D13FCF3C12}">
@@ -4949,8 +4735,8 @@
       </dsp:nvSpPr>
       <dsp:spPr>
         <a:xfrm>
-          <a:off x="3310299" y="4463567"/>
-          <a:ext cx="573700" cy="235364"/>
+          <a:off x="4457700" y="4838960"/>
+          <a:ext cx="714472" cy="293116"/>
         </a:xfrm>
         <a:custGeom>
           <a:avLst/>
@@ -4964,13 +4750,13 @@
                 <a:pt x="0" y="0"/>
               </a:moveTo>
               <a:lnTo>
-                <a:pt x="0" y="117682"/>
+                <a:pt x="0" y="146558"/>
               </a:lnTo>
               <a:lnTo>
-                <a:pt x="573700" y="117682"/>
+                <a:pt x="714472" y="146558"/>
               </a:lnTo>
               <a:lnTo>
-                <a:pt x="573700" y="235364"/>
+                <a:pt x="714472" y="293116"/>
               </a:lnTo>
             </a:path>
           </a:pathLst>
@@ -5010,8 +4796,8 @@
       </dsp:nvSpPr>
       <dsp:spPr>
         <a:xfrm>
-          <a:off x="3442691" y="4698931"/>
-          <a:ext cx="882615" cy="588410"/>
+          <a:off x="4622578" y="5132077"/>
+          <a:ext cx="1099188" cy="732792"/>
         </a:xfrm>
         <a:prstGeom prst="roundRect">
           <a:avLst>
@@ -5054,12 +4840,12 @@
         </a:fontRef>
       </dsp:style>
       <dsp:txBody>
-        <a:bodyPr spcFirstLastPara="0" vert="horz" wrap="square" lIns="49530" tIns="49530" rIns="49530" bIns="49530" numCol="1" spcCol="1270" anchor="ctr" anchorCtr="0">
+        <a:bodyPr spcFirstLastPara="0" vert="horz" wrap="square" lIns="64770" tIns="64770" rIns="64770" bIns="64770" numCol="1" spcCol="1270" anchor="ctr" anchorCtr="0">
           <a:noAutofit/>
         </a:bodyPr>
         <a:lstStyle/>
         <a:p>
-          <a:pPr lvl="0" algn="ctr" defTabSz="577850">
+          <a:pPr lvl="0" algn="ctr" defTabSz="755650">
             <a:lnSpc>
               <a:spcPct val="90000"/>
             </a:lnSpc>
@@ -5071,15 +4857,15 @@
             </a:spcAft>
           </a:pPr>
           <a:r>
-            <a:rPr lang="en-US" sz="1300" kern="1200" dirty="0" smtClean="0"/>
+            <a:rPr lang="en-US" sz="1700" kern="1200" dirty="0" smtClean="0"/>
             <a:t>tomato</a:t>
           </a:r>
-          <a:endParaRPr lang="en-US" sz="1300" kern="1200" dirty="0"/>
+          <a:endParaRPr lang="en-US" sz="1700" kern="1200" dirty="0"/>
         </a:p>
       </dsp:txBody>
       <dsp:txXfrm>
-        <a:off x="3442691" y="4698931"/>
-        <a:ext cx="882615" cy="588410"/>
+        <a:off x="4622578" y="5132077"/>
+        <a:ext cx="1099188" cy="732792"/>
       </dsp:txXfrm>
     </dsp:sp>
     <dsp:sp modelId="{41D334FC-DC88-4297-988A-B6A3A5BF7DD8}">
@@ -5089,8 +4875,8 @@
       </dsp:nvSpPr>
       <dsp:spPr>
         <a:xfrm>
-          <a:off x="5031400" y="1992243"/>
-          <a:ext cx="1721100" cy="235364"/>
+          <a:off x="5172172" y="1761232"/>
+          <a:ext cx="2143418" cy="293116"/>
         </a:xfrm>
         <a:custGeom>
           <a:avLst/>
@@ -5104,13 +4890,13 @@
                 <a:pt x="0" y="0"/>
               </a:moveTo>
               <a:lnTo>
-                <a:pt x="0" y="117682"/>
+                <a:pt x="0" y="146558"/>
               </a:lnTo>
               <a:lnTo>
-                <a:pt x="1721100" y="117682"/>
+                <a:pt x="2143418" y="146558"/>
               </a:lnTo>
               <a:lnTo>
-                <a:pt x="1721100" y="235364"/>
+                <a:pt x="2143418" y="293116"/>
               </a:lnTo>
             </a:path>
           </a:pathLst>
@@ -5150,8 +4936,143 @@
       </dsp:nvSpPr>
       <dsp:spPr>
         <a:xfrm>
-          <a:off x="6311193" y="2227607"/>
-          <a:ext cx="882615" cy="588410"/>
+          <a:off x="6765996" y="2054349"/>
+          <a:ext cx="1099188" cy="732792"/>
+        </a:xfrm>
+        <a:prstGeom prst="roundRect">
+          <a:avLst>
+            <a:gd name="adj" fmla="val 10000"/>
+          </a:avLst>
+        </a:prstGeom>
+        <a:solidFill>
+          <a:srgbClr val="1B325F"/>
+        </a:solidFill>
+        <a:ln w="25400" cap="flat" cmpd="sng" algn="ctr">
+          <a:solidFill>
+            <a:schemeClr val="lt1">
+              <a:hueOff val="0"/>
+              <a:satOff val="0"/>
+              <a:lumOff val="0"/>
+              <a:alphaOff val="0"/>
+            </a:schemeClr>
+          </a:solidFill>
+          <a:prstDash val="solid"/>
+        </a:ln>
+        <a:effectLst/>
+      </dsp:spPr>
+      <dsp:style>
+        <a:lnRef idx="2">
+          <a:scrgbClr r="0" g="0" b="0"/>
+        </a:lnRef>
+        <a:fillRef idx="1">
+          <a:scrgbClr r="0" g="0" b="0"/>
+        </a:fillRef>
+        <a:effectRef idx="0">
+          <a:scrgbClr r="0" g="0" b="0"/>
+        </a:effectRef>
+        <a:fontRef idx="minor">
+          <a:schemeClr val="lt1"/>
+        </a:fontRef>
+      </dsp:style>
+      <dsp:txBody>
+        <a:bodyPr spcFirstLastPara="0" vert="horz" wrap="square" lIns="64770" tIns="64770" rIns="64770" bIns="64770" numCol="1" spcCol="1270" anchor="ctr" anchorCtr="0">
+          <a:noAutofit/>
+        </a:bodyPr>
+        <a:lstStyle/>
+        <a:p>
+          <a:pPr lvl="0" algn="ctr" defTabSz="755650">
+            <a:lnSpc>
+              <a:spcPct val="90000"/>
+            </a:lnSpc>
+            <a:spcBef>
+              <a:spcPct val="0"/>
+            </a:spcBef>
+            <a:spcAft>
+              <a:spcPct val="35000"/>
+            </a:spcAft>
+          </a:pPr>
+          <a:r>
+            <a:rPr lang="en-US" sz="1700" kern="1200" dirty="0" smtClean="0"/>
+            <a:t>food</a:t>
+          </a:r>
+          <a:endParaRPr lang="en-US" sz="1700" kern="1200" dirty="0"/>
+        </a:p>
+      </dsp:txBody>
+      <dsp:txXfrm>
+        <a:off x="6765996" y="2054349"/>
+        <a:ext cx="1099188" cy="732792"/>
+      </dsp:txXfrm>
+    </dsp:sp>
+    <dsp:sp modelId="{857F7289-7B4E-4003-AC3D-69AFF400B1F1}">
+      <dsp:nvSpPr>
+        <dsp:cNvPr id="0" name=""/>
+        <dsp:cNvSpPr/>
+      </dsp:nvSpPr>
+      <dsp:spPr>
+        <a:xfrm>
+          <a:off x="6601118" y="2787141"/>
+          <a:ext cx="714472" cy="293116"/>
+        </a:xfrm>
+        <a:custGeom>
+          <a:avLst/>
+          <a:gdLst/>
+          <a:ahLst/>
+          <a:cxnLst/>
+          <a:rect l="0" t="0" r="0" b="0"/>
+          <a:pathLst>
+            <a:path>
+              <a:moveTo>
+                <a:pt x="714472" y="0"/>
+              </a:moveTo>
+              <a:lnTo>
+                <a:pt x="714472" y="146558"/>
+              </a:lnTo>
+              <a:lnTo>
+                <a:pt x="0" y="146558"/>
+              </a:lnTo>
+              <a:lnTo>
+                <a:pt x="0" y="293116"/>
+              </a:lnTo>
+            </a:path>
+          </a:pathLst>
+        </a:custGeom>
+        <a:noFill/>
+        <a:ln w="25400" cap="flat" cmpd="sng" algn="ctr">
+          <a:solidFill>
+            <a:schemeClr val="accent1">
+              <a:shade val="80000"/>
+              <a:hueOff val="0"/>
+              <a:satOff val="0"/>
+              <a:lumOff val="0"/>
+              <a:alphaOff val="0"/>
+            </a:schemeClr>
+          </a:solidFill>
+          <a:prstDash val="solid"/>
+        </a:ln>
+        <a:effectLst/>
+      </dsp:spPr>
+      <dsp:style>
+        <a:lnRef idx="2">
+          <a:scrgbClr r="0" g="0" b="0"/>
+        </a:lnRef>
+        <a:fillRef idx="0">
+          <a:scrgbClr r="0" g="0" b="0"/>
+        </a:fillRef>
+        <a:effectRef idx="0">
+          <a:scrgbClr r="0" g="0" b="0"/>
+        </a:effectRef>
+        <a:fontRef idx="minor"/>
+      </dsp:style>
+    </dsp:sp>
+    <dsp:sp modelId="{712470A4-8189-46E3-8952-B9DFA4D0FD5B}">
+      <dsp:nvSpPr>
+        <dsp:cNvPr id="0" name=""/>
+        <dsp:cNvSpPr/>
+      </dsp:nvSpPr>
+      <dsp:spPr>
+        <a:xfrm>
+          <a:off x="6051523" y="3080258"/>
+          <a:ext cx="1099188" cy="732792"/>
         </a:xfrm>
         <a:prstGeom prst="roundRect">
           <a:avLst>
@@ -5194,12 +5115,12 @@
         </a:fontRef>
       </dsp:style>
       <dsp:txBody>
-        <a:bodyPr spcFirstLastPara="0" vert="horz" wrap="square" lIns="49530" tIns="49530" rIns="49530" bIns="49530" numCol="1" spcCol="1270" anchor="ctr" anchorCtr="0">
+        <a:bodyPr spcFirstLastPara="0" vert="horz" wrap="square" lIns="64770" tIns="64770" rIns="64770" bIns="64770" numCol="1" spcCol="1270" anchor="ctr" anchorCtr="0">
           <a:noAutofit/>
         </a:bodyPr>
         <a:lstStyle/>
         <a:p>
-          <a:pPr lvl="0" algn="ctr" defTabSz="577850">
+          <a:pPr lvl="0" algn="ctr" defTabSz="755650">
             <a:lnSpc>
               <a:spcPct val="90000"/>
             </a:lnSpc>
@@ -5211,26 +5132,26 @@
             </a:spcAft>
           </a:pPr>
           <a:r>
-            <a:rPr lang="en-US" sz="1300" kern="1200" dirty="0" smtClean="0"/>
-            <a:t>hamburger</a:t>
+            <a:rPr lang="en-US" sz="1700" kern="1200" dirty="0" smtClean="0"/>
+            <a:t>with</a:t>
           </a:r>
-          <a:endParaRPr lang="en-US" sz="1300" kern="1200" dirty="0"/>
+          <a:endParaRPr lang="en-US" sz="1700" kern="1200" dirty="0"/>
         </a:p>
       </dsp:txBody>
       <dsp:txXfrm>
-        <a:off x="6311193" y="2227607"/>
-        <a:ext cx="882615" cy="588410"/>
+        <a:off x="6051523" y="3080258"/>
+        <a:ext cx="1099188" cy="732792"/>
       </dsp:txXfrm>
     </dsp:sp>
-    <dsp:sp modelId="{857F7289-7B4E-4003-AC3D-69AFF400B1F1}">
+    <dsp:sp modelId="{7D20DB9F-D5B1-4696-ACEA-D430084773AA}">
       <dsp:nvSpPr>
         <dsp:cNvPr id="0" name=""/>
         <dsp:cNvSpPr/>
       </dsp:nvSpPr>
       <dsp:spPr>
         <a:xfrm>
-          <a:off x="5605100" y="2816017"/>
-          <a:ext cx="1147400" cy="235364"/>
+          <a:off x="6555398" y="3813050"/>
+          <a:ext cx="91440" cy="293116"/>
         </a:xfrm>
         <a:custGeom>
           <a:avLst/>
@@ -5241,16 +5162,10 @@
           <a:pathLst>
             <a:path>
               <a:moveTo>
-                <a:pt x="1147400" y="0"/>
+                <a:pt x="45720" y="0"/>
               </a:moveTo>
               <a:lnTo>
-                <a:pt x="1147400" y="117682"/>
-              </a:lnTo>
-              <a:lnTo>
-                <a:pt x="0" y="117682"/>
-              </a:lnTo>
-              <a:lnTo>
-                <a:pt x="0" y="235364"/>
+                <a:pt x="45720" y="293116"/>
               </a:lnTo>
             </a:path>
           </a:pathLst>
@@ -5283,15 +5198,279 @@
         <a:fontRef idx="minor"/>
       </dsp:style>
     </dsp:sp>
-    <dsp:sp modelId="{712470A4-8189-46E3-8952-B9DFA4D0FD5B}">
+    <dsp:sp modelId="{F1F1265C-A072-48C6-85E4-0B0E9EEBF7A9}">
       <dsp:nvSpPr>
         <dsp:cNvPr id="0" name=""/>
         <dsp:cNvSpPr/>
       </dsp:nvSpPr>
       <dsp:spPr>
         <a:xfrm>
-          <a:off x="5163792" y="3051382"/>
-          <a:ext cx="882615" cy="588410"/>
+          <a:off x="6051523" y="4106167"/>
+          <a:ext cx="1099188" cy="732792"/>
+        </a:xfrm>
+        <a:prstGeom prst="roundRect">
+          <a:avLst>
+            <a:gd name="adj" fmla="val 10000"/>
+          </a:avLst>
+        </a:prstGeom>
+        <a:solidFill>
+          <a:srgbClr val="9CC4E4"/>
+        </a:solidFill>
+        <a:ln w="25400" cap="flat" cmpd="sng" algn="ctr">
+          <a:solidFill>
+            <a:schemeClr val="lt1">
+              <a:hueOff val="0"/>
+              <a:satOff val="0"/>
+              <a:lumOff val="0"/>
+              <a:alphaOff val="0"/>
+            </a:schemeClr>
+          </a:solidFill>
+          <a:prstDash val="solid"/>
+        </a:ln>
+        <a:effectLst/>
+      </dsp:spPr>
+      <dsp:style>
+        <a:lnRef idx="2">
+          <a:scrgbClr r="0" g="0" b="0"/>
+        </a:lnRef>
+        <a:fillRef idx="1">
+          <a:scrgbClr r="0" g="0" b="0"/>
+        </a:fillRef>
+        <a:effectRef idx="0">
+          <a:scrgbClr r="0" g="0" b="0"/>
+        </a:effectRef>
+        <a:fontRef idx="minor">
+          <a:schemeClr val="lt1"/>
+        </a:fontRef>
+      </dsp:style>
+      <dsp:txBody>
+        <a:bodyPr spcFirstLastPara="0" vert="horz" wrap="square" lIns="64770" tIns="64770" rIns="64770" bIns="64770" numCol="1" spcCol="1270" anchor="ctr" anchorCtr="0">
+          <a:noAutofit/>
+        </a:bodyPr>
+        <a:lstStyle/>
+        <a:p>
+          <a:pPr lvl="0" algn="ctr" defTabSz="755650">
+            <a:lnSpc>
+              <a:spcPct val="90000"/>
+            </a:lnSpc>
+            <a:spcBef>
+              <a:spcPct val="0"/>
+            </a:spcBef>
+            <a:spcAft>
+              <a:spcPct val="35000"/>
+            </a:spcAft>
+          </a:pPr>
+          <a:r>
+            <a:rPr lang="en-US" sz="1700" kern="1200" dirty="0" smtClean="0"/>
+            <a:t>extra</a:t>
+          </a:r>
+          <a:endParaRPr lang="en-US" sz="1700" kern="1200" dirty="0"/>
+        </a:p>
+      </dsp:txBody>
+      <dsp:txXfrm>
+        <a:off x="6051523" y="4106167"/>
+        <a:ext cx="1099188" cy="732792"/>
+      </dsp:txXfrm>
+    </dsp:sp>
+    <dsp:sp modelId="{4051F676-1C76-472E-B793-42A16DDEB179}">
+      <dsp:nvSpPr>
+        <dsp:cNvPr id="0" name=""/>
+        <dsp:cNvSpPr/>
+      </dsp:nvSpPr>
+      <dsp:spPr>
+        <a:xfrm>
+          <a:off x="6555398" y="4838960"/>
+          <a:ext cx="91440" cy="293116"/>
+        </a:xfrm>
+        <a:custGeom>
+          <a:avLst/>
+          <a:gdLst/>
+          <a:ahLst/>
+          <a:cxnLst/>
+          <a:rect l="0" t="0" r="0" b="0"/>
+          <a:pathLst>
+            <a:path>
+              <a:moveTo>
+                <a:pt x="45720" y="0"/>
+              </a:moveTo>
+              <a:lnTo>
+                <a:pt x="45720" y="293116"/>
+              </a:lnTo>
+            </a:path>
+          </a:pathLst>
+        </a:custGeom>
+        <a:noFill/>
+        <a:ln w="25400" cap="flat" cmpd="sng" algn="ctr">
+          <a:solidFill>
+            <a:schemeClr val="accent1">
+              <a:shade val="80000"/>
+              <a:hueOff val="0"/>
+              <a:satOff val="0"/>
+              <a:lumOff val="0"/>
+              <a:alphaOff val="0"/>
+            </a:schemeClr>
+          </a:solidFill>
+          <a:prstDash val="solid"/>
+        </a:ln>
+        <a:effectLst/>
+      </dsp:spPr>
+      <dsp:style>
+        <a:lnRef idx="2">
+          <a:scrgbClr r="0" g="0" b="0"/>
+        </a:lnRef>
+        <a:fillRef idx="0">
+          <a:scrgbClr r="0" g="0" b="0"/>
+        </a:fillRef>
+        <a:effectRef idx="0">
+          <a:scrgbClr r="0" g="0" b="0"/>
+        </a:effectRef>
+        <a:fontRef idx="minor"/>
+      </dsp:style>
+    </dsp:sp>
+    <dsp:sp modelId="{535C48B3-87DE-4354-B7E8-FD38DC14560D}">
+      <dsp:nvSpPr>
+        <dsp:cNvPr id="0" name=""/>
+        <dsp:cNvSpPr/>
+      </dsp:nvSpPr>
+      <dsp:spPr>
+        <a:xfrm>
+          <a:off x="6051523" y="5132077"/>
+          <a:ext cx="1099188" cy="732792"/>
+        </a:xfrm>
+        <a:prstGeom prst="roundRect">
+          <a:avLst>
+            <a:gd name="adj" fmla="val 10000"/>
+          </a:avLst>
+        </a:prstGeom>
+        <a:solidFill>
+          <a:srgbClr val="1B325F"/>
+        </a:solidFill>
+        <a:ln w="25400" cap="flat" cmpd="sng" algn="ctr">
+          <a:solidFill>
+            <a:schemeClr val="lt1">
+              <a:hueOff val="0"/>
+              <a:satOff val="0"/>
+              <a:lumOff val="0"/>
+              <a:alphaOff val="0"/>
+            </a:schemeClr>
+          </a:solidFill>
+          <a:prstDash val="solid"/>
+        </a:ln>
+        <a:effectLst/>
+      </dsp:spPr>
+      <dsp:style>
+        <a:lnRef idx="2">
+          <a:scrgbClr r="0" g="0" b="0"/>
+        </a:lnRef>
+        <a:fillRef idx="1">
+          <a:scrgbClr r="0" g="0" b="0"/>
+        </a:fillRef>
+        <a:effectRef idx="0">
+          <a:scrgbClr r="0" g="0" b="0"/>
+        </a:effectRef>
+        <a:fontRef idx="minor">
+          <a:schemeClr val="lt1"/>
+        </a:fontRef>
+      </dsp:style>
+      <dsp:txBody>
+        <a:bodyPr spcFirstLastPara="0" vert="horz" wrap="square" lIns="64770" tIns="64770" rIns="64770" bIns="64770" numCol="1" spcCol="1270" anchor="ctr" anchorCtr="0">
+          <a:noAutofit/>
+        </a:bodyPr>
+        <a:lstStyle/>
+        <a:p>
+          <a:pPr lvl="0" algn="ctr" defTabSz="755650">
+            <a:lnSpc>
+              <a:spcPct val="90000"/>
+            </a:lnSpc>
+            <a:spcBef>
+              <a:spcPct val="0"/>
+            </a:spcBef>
+            <a:spcAft>
+              <a:spcPct val="35000"/>
+            </a:spcAft>
+          </a:pPr>
+          <a:r>
+            <a:rPr lang="en-US" sz="1700" b="0" kern="1200" dirty="0" smtClean="0"/>
+            <a:t>spice</a:t>
+          </a:r>
+          <a:endParaRPr lang="en-US" sz="1700" b="0" kern="1200" dirty="0"/>
+        </a:p>
+      </dsp:txBody>
+      <dsp:txXfrm>
+        <a:off x="6051523" y="5132077"/>
+        <a:ext cx="1099188" cy="732792"/>
+      </dsp:txXfrm>
+    </dsp:sp>
+    <dsp:sp modelId="{D3916319-D670-48BE-8E7C-73EFD501C140}">
+      <dsp:nvSpPr>
+        <dsp:cNvPr id="0" name=""/>
+        <dsp:cNvSpPr/>
+      </dsp:nvSpPr>
+      <dsp:spPr>
+        <a:xfrm>
+          <a:off x="7315590" y="2787141"/>
+          <a:ext cx="714472" cy="293116"/>
+        </a:xfrm>
+        <a:custGeom>
+          <a:avLst/>
+          <a:gdLst/>
+          <a:ahLst/>
+          <a:cxnLst/>
+          <a:rect l="0" t="0" r="0" b="0"/>
+          <a:pathLst>
+            <a:path>
+              <a:moveTo>
+                <a:pt x="0" y="0"/>
+              </a:moveTo>
+              <a:lnTo>
+                <a:pt x="0" y="146558"/>
+              </a:lnTo>
+              <a:lnTo>
+                <a:pt x="714472" y="146558"/>
+              </a:lnTo>
+              <a:lnTo>
+                <a:pt x="714472" y="293116"/>
+              </a:lnTo>
+            </a:path>
+          </a:pathLst>
+        </a:custGeom>
+        <a:noFill/>
+        <a:ln w="25400" cap="flat" cmpd="sng" algn="ctr">
+          <a:solidFill>
+            <a:schemeClr val="accent1">
+              <a:shade val="80000"/>
+              <a:hueOff val="0"/>
+              <a:satOff val="0"/>
+              <a:lumOff val="0"/>
+              <a:alphaOff val="0"/>
+            </a:schemeClr>
+          </a:solidFill>
+          <a:prstDash val="solid"/>
+        </a:ln>
+        <a:effectLst/>
+      </dsp:spPr>
+      <dsp:style>
+        <a:lnRef idx="2">
+          <a:scrgbClr r="0" g="0" b="0"/>
+        </a:lnRef>
+        <a:fillRef idx="0">
+          <a:scrgbClr r="0" g="0" b="0"/>
+        </a:fillRef>
+        <a:effectRef idx="0">
+          <a:scrgbClr r="0" g="0" b="0"/>
+        </a:effectRef>
+        <a:fontRef idx="minor"/>
+      </dsp:style>
+    </dsp:sp>
+    <dsp:sp modelId="{ECACF06E-0D77-42BB-B120-CAE787F5BE8E}">
+      <dsp:nvSpPr>
+        <dsp:cNvPr id="0" name=""/>
+        <dsp:cNvSpPr/>
+      </dsp:nvSpPr>
+      <dsp:spPr>
+        <a:xfrm>
+          <a:off x="7480468" y="3080258"/>
+          <a:ext cx="1099188" cy="732792"/>
         </a:xfrm>
         <a:prstGeom prst="roundRect">
           <a:avLst>
@@ -5334,12 +5513,12 @@
         </a:fontRef>
       </dsp:style>
       <dsp:txBody>
-        <a:bodyPr spcFirstLastPara="0" vert="horz" wrap="square" lIns="49530" tIns="49530" rIns="49530" bIns="49530" numCol="1" spcCol="1270" anchor="ctr" anchorCtr="0">
+        <a:bodyPr spcFirstLastPara="0" vert="horz" wrap="square" lIns="64770" tIns="64770" rIns="64770" bIns="64770" numCol="1" spcCol="1270" anchor="ctr" anchorCtr="0">
           <a:noAutofit/>
         </a:bodyPr>
         <a:lstStyle/>
         <a:p>
-          <a:pPr lvl="0" algn="ctr" defTabSz="577850">
+          <a:pPr lvl="0" algn="ctr" defTabSz="755650">
             <a:lnSpc>
               <a:spcPct val="90000"/>
             </a:lnSpc>
@@ -5351,26 +5530,26 @@
             </a:spcAft>
           </a:pPr>
           <a:r>
-            <a:rPr lang="en-US" sz="1300" kern="1200" dirty="0" smtClean="0"/>
-            <a:t>with</a:t>
+            <a:rPr lang="en-US" sz="1700" kern="1200" dirty="0" smtClean="0"/>
+            <a:t>without</a:t>
           </a:r>
-          <a:endParaRPr lang="en-US" sz="1300" kern="1200" dirty="0"/>
+          <a:endParaRPr lang="en-US" sz="1700" kern="1200" dirty="0"/>
         </a:p>
       </dsp:txBody>
       <dsp:txXfrm>
-        <a:off x="5163792" y="3051382"/>
-        <a:ext cx="882615" cy="588410"/>
+        <a:off x="7480468" y="3080258"/>
+        <a:ext cx="1099188" cy="732792"/>
       </dsp:txXfrm>
     </dsp:sp>
-    <dsp:sp modelId="{7D20DB9F-D5B1-4696-ACEA-D430084773AA}">
+    <dsp:sp modelId="{F064F509-5960-48D4-BB13-231EDCC76B94}">
       <dsp:nvSpPr>
         <dsp:cNvPr id="0" name=""/>
         <dsp:cNvSpPr/>
       </dsp:nvSpPr>
       <dsp:spPr>
         <a:xfrm>
-          <a:off x="5559380" y="3639792"/>
-          <a:ext cx="91440" cy="235364"/>
+          <a:off x="7984343" y="3813050"/>
+          <a:ext cx="91440" cy="293116"/>
         </a:xfrm>
         <a:custGeom>
           <a:avLst/>
@@ -5384,556 +5563,7 @@
                 <a:pt x="45720" y="0"/>
               </a:moveTo>
               <a:lnTo>
-                <a:pt x="45720" y="235364"/>
-              </a:lnTo>
-            </a:path>
-          </a:pathLst>
-        </a:custGeom>
-        <a:noFill/>
-        <a:ln w="25400" cap="flat" cmpd="sng" algn="ctr">
-          <a:solidFill>
-            <a:schemeClr val="accent1">
-              <a:shade val="80000"/>
-              <a:hueOff val="0"/>
-              <a:satOff val="0"/>
-              <a:lumOff val="0"/>
-              <a:alphaOff val="0"/>
-            </a:schemeClr>
-          </a:solidFill>
-          <a:prstDash val="solid"/>
-        </a:ln>
-        <a:effectLst/>
-      </dsp:spPr>
-      <dsp:style>
-        <a:lnRef idx="2">
-          <a:scrgbClr r="0" g="0" b="0"/>
-        </a:lnRef>
-        <a:fillRef idx="0">
-          <a:scrgbClr r="0" g="0" b="0"/>
-        </a:fillRef>
-        <a:effectRef idx="0">
-          <a:scrgbClr r="0" g="0" b="0"/>
-        </a:effectRef>
-        <a:fontRef idx="minor"/>
-      </dsp:style>
-    </dsp:sp>
-    <dsp:sp modelId="{F1F1265C-A072-48C6-85E4-0B0E9EEBF7A9}">
-      <dsp:nvSpPr>
-        <dsp:cNvPr id="0" name=""/>
-        <dsp:cNvSpPr/>
-      </dsp:nvSpPr>
-      <dsp:spPr>
-        <a:xfrm>
-          <a:off x="5163792" y="3875156"/>
-          <a:ext cx="882615" cy="588410"/>
-        </a:xfrm>
-        <a:prstGeom prst="roundRect">
-          <a:avLst>
-            <a:gd name="adj" fmla="val 10000"/>
-          </a:avLst>
-        </a:prstGeom>
-        <a:solidFill>
-          <a:srgbClr val="9CC4E4"/>
-        </a:solidFill>
-        <a:ln w="25400" cap="flat" cmpd="sng" algn="ctr">
-          <a:solidFill>
-            <a:schemeClr val="lt1">
-              <a:hueOff val="0"/>
-              <a:satOff val="0"/>
-              <a:lumOff val="0"/>
-              <a:alphaOff val="0"/>
-            </a:schemeClr>
-          </a:solidFill>
-          <a:prstDash val="solid"/>
-        </a:ln>
-        <a:effectLst/>
-      </dsp:spPr>
-      <dsp:style>
-        <a:lnRef idx="2">
-          <a:scrgbClr r="0" g="0" b="0"/>
-        </a:lnRef>
-        <a:fillRef idx="1">
-          <a:scrgbClr r="0" g="0" b="0"/>
-        </a:fillRef>
-        <a:effectRef idx="0">
-          <a:scrgbClr r="0" g="0" b="0"/>
-        </a:effectRef>
-        <a:fontRef idx="minor">
-          <a:schemeClr val="lt1"/>
-        </a:fontRef>
-      </dsp:style>
-      <dsp:txBody>
-        <a:bodyPr spcFirstLastPara="0" vert="horz" wrap="square" lIns="49530" tIns="49530" rIns="49530" bIns="49530" numCol="1" spcCol="1270" anchor="ctr" anchorCtr="0">
-          <a:noAutofit/>
-        </a:bodyPr>
-        <a:lstStyle/>
-        <a:p>
-          <a:pPr lvl="0" algn="ctr" defTabSz="577850">
-            <a:lnSpc>
-              <a:spcPct val="90000"/>
-            </a:lnSpc>
-            <a:spcBef>
-              <a:spcPct val="0"/>
-            </a:spcBef>
-            <a:spcAft>
-              <a:spcPct val="35000"/>
-            </a:spcAft>
-          </a:pPr>
-          <a:r>
-            <a:rPr lang="en-US" sz="1300" kern="1200" dirty="0" smtClean="0"/>
-            <a:t>extra</a:t>
-          </a:r>
-          <a:endParaRPr lang="en-US" sz="1300" kern="1200" dirty="0"/>
-        </a:p>
-      </dsp:txBody>
-      <dsp:txXfrm>
-        <a:off x="5163792" y="3875156"/>
-        <a:ext cx="882615" cy="588410"/>
-      </dsp:txXfrm>
-    </dsp:sp>
-    <dsp:sp modelId="{4051F676-1C76-472E-B793-42A16DDEB179}">
-      <dsp:nvSpPr>
-        <dsp:cNvPr id="0" name=""/>
-        <dsp:cNvSpPr/>
-      </dsp:nvSpPr>
-      <dsp:spPr>
-        <a:xfrm>
-          <a:off x="5031400" y="4463567"/>
-          <a:ext cx="573700" cy="235364"/>
-        </a:xfrm>
-        <a:custGeom>
-          <a:avLst/>
-          <a:gdLst/>
-          <a:ahLst/>
-          <a:cxnLst/>
-          <a:rect l="0" t="0" r="0" b="0"/>
-          <a:pathLst>
-            <a:path>
-              <a:moveTo>
-                <a:pt x="573700" y="0"/>
-              </a:moveTo>
-              <a:lnTo>
-                <a:pt x="573700" y="117682"/>
-              </a:lnTo>
-              <a:lnTo>
-                <a:pt x="0" y="117682"/>
-              </a:lnTo>
-              <a:lnTo>
-                <a:pt x="0" y="235364"/>
-              </a:lnTo>
-            </a:path>
-          </a:pathLst>
-        </a:custGeom>
-        <a:noFill/>
-        <a:ln w="25400" cap="flat" cmpd="sng" algn="ctr">
-          <a:solidFill>
-            <a:schemeClr val="accent1">
-              <a:shade val="80000"/>
-              <a:hueOff val="0"/>
-              <a:satOff val="0"/>
-              <a:lumOff val="0"/>
-              <a:alphaOff val="0"/>
-            </a:schemeClr>
-          </a:solidFill>
-          <a:prstDash val="solid"/>
-        </a:ln>
-        <a:effectLst/>
-      </dsp:spPr>
-      <dsp:style>
-        <a:lnRef idx="2">
-          <a:scrgbClr r="0" g="0" b="0"/>
-        </a:lnRef>
-        <a:fillRef idx="0">
-          <a:scrgbClr r="0" g="0" b="0"/>
-        </a:fillRef>
-        <a:effectRef idx="0">
-          <a:scrgbClr r="0" g="0" b="0"/>
-        </a:effectRef>
-        <a:fontRef idx="minor"/>
-      </dsp:style>
-    </dsp:sp>
-    <dsp:sp modelId="{535C48B3-87DE-4354-B7E8-FD38DC14560D}">
-      <dsp:nvSpPr>
-        <dsp:cNvPr id="0" name=""/>
-        <dsp:cNvSpPr/>
-      </dsp:nvSpPr>
-      <dsp:spPr>
-        <a:xfrm>
-          <a:off x="4590092" y="4698931"/>
-          <a:ext cx="882615" cy="588410"/>
-        </a:xfrm>
-        <a:prstGeom prst="roundRect">
-          <a:avLst>
-            <a:gd name="adj" fmla="val 10000"/>
-          </a:avLst>
-        </a:prstGeom>
-        <a:solidFill>
-          <a:schemeClr val="accent1">
-            <a:hueOff val="0"/>
-            <a:satOff val="0"/>
-            <a:lumOff val="0"/>
-            <a:alphaOff val="0"/>
-          </a:schemeClr>
-        </a:solidFill>
-        <a:ln w="25400" cap="flat" cmpd="sng" algn="ctr">
-          <a:solidFill>
-            <a:schemeClr val="lt1">
-              <a:hueOff val="0"/>
-              <a:satOff val="0"/>
-              <a:lumOff val="0"/>
-              <a:alphaOff val="0"/>
-            </a:schemeClr>
-          </a:solidFill>
-          <a:prstDash val="solid"/>
-        </a:ln>
-        <a:effectLst/>
-      </dsp:spPr>
-      <dsp:style>
-        <a:lnRef idx="2">
-          <a:scrgbClr r="0" g="0" b="0"/>
-        </a:lnRef>
-        <a:fillRef idx="1">
-          <a:scrgbClr r="0" g="0" b="0"/>
-        </a:fillRef>
-        <a:effectRef idx="0">
-          <a:scrgbClr r="0" g="0" b="0"/>
-        </a:effectRef>
-        <a:fontRef idx="minor">
-          <a:schemeClr val="lt1"/>
-        </a:fontRef>
-      </dsp:style>
-      <dsp:txBody>
-        <a:bodyPr spcFirstLastPara="0" vert="horz" wrap="square" lIns="49530" tIns="49530" rIns="49530" bIns="49530" numCol="1" spcCol="1270" anchor="ctr" anchorCtr="0">
-          <a:noAutofit/>
-        </a:bodyPr>
-        <a:lstStyle/>
-        <a:p>
-          <a:pPr lvl="0" algn="ctr" defTabSz="577850">
-            <a:lnSpc>
-              <a:spcPct val="90000"/>
-            </a:lnSpc>
-            <a:spcBef>
-              <a:spcPct val="0"/>
-            </a:spcBef>
-            <a:spcAft>
-              <a:spcPct val="35000"/>
-            </a:spcAft>
-          </a:pPr>
-          <a:r>
-            <a:rPr lang="en-US" sz="1300" kern="1200" dirty="0" smtClean="0"/>
-            <a:t>cheese</a:t>
-          </a:r>
-          <a:endParaRPr lang="en-US" sz="1300" kern="1200" dirty="0"/>
-        </a:p>
-      </dsp:txBody>
-      <dsp:txXfrm>
-        <a:off x="4590092" y="4698931"/>
-        <a:ext cx="882615" cy="588410"/>
-      </dsp:txXfrm>
-    </dsp:sp>
-    <dsp:sp modelId="{4694D937-0134-4A93-9211-341C9D99867A}">
-      <dsp:nvSpPr>
-        <dsp:cNvPr id="0" name=""/>
-        <dsp:cNvSpPr/>
-      </dsp:nvSpPr>
-      <dsp:spPr>
-        <a:xfrm>
-          <a:off x="5605100" y="4463567"/>
-          <a:ext cx="573700" cy="235364"/>
-        </a:xfrm>
-        <a:custGeom>
-          <a:avLst/>
-          <a:gdLst/>
-          <a:ahLst/>
-          <a:cxnLst/>
-          <a:rect l="0" t="0" r="0" b="0"/>
-          <a:pathLst>
-            <a:path>
-              <a:moveTo>
-                <a:pt x="0" y="0"/>
-              </a:moveTo>
-              <a:lnTo>
-                <a:pt x="0" y="117682"/>
-              </a:lnTo>
-              <a:lnTo>
-                <a:pt x="573700" y="117682"/>
-              </a:lnTo>
-              <a:lnTo>
-                <a:pt x="573700" y="235364"/>
-              </a:lnTo>
-            </a:path>
-          </a:pathLst>
-        </a:custGeom>
-        <a:noFill/>
-        <a:ln w="25400" cap="flat" cmpd="sng" algn="ctr">
-          <a:solidFill>
-            <a:schemeClr val="accent1">
-              <a:shade val="80000"/>
-              <a:hueOff val="0"/>
-              <a:satOff val="0"/>
-              <a:lumOff val="0"/>
-              <a:alphaOff val="0"/>
-            </a:schemeClr>
-          </a:solidFill>
-          <a:prstDash val="solid"/>
-        </a:ln>
-        <a:effectLst/>
-      </dsp:spPr>
-      <dsp:style>
-        <a:lnRef idx="2">
-          <a:scrgbClr r="0" g="0" b="0"/>
-        </a:lnRef>
-        <a:fillRef idx="0">
-          <a:scrgbClr r="0" g="0" b="0"/>
-        </a:fillRef>
-        <a:effectRef idx="0">
-          <a:scrgbClr r="0" g="0" b="0"/>
-        </a:effectRef>
-        <a:fontRef idx="minor"/>
-      </dsp:style>
-    </dsp:sp>
-    <dsp:sp modelId="{72A1B322-E366-4DB2-B1F2-D6E2B08456E6}">
-      <dsp:nvSpPr>
-        <dsp:cNvPr id="0" name=""/>
-        <dsp:cNvSpPr/>
-      </dsp:nvSpPr>
-      <dsp:spPr>
-        <a:xfrm>
-          <a:off x="5737493" y="4698931"/>
-          <a:ext cx="882615" cy="588410"/>
-        </a:xfrm>
-        <a:prstGeom prst="roundRect">
-          <a:avLst>
-            <a:gd name="adj" fmla="val 10000"/>
-          </a:avLst>
-        </a:prstGeom>
-        <a:solidFill>
-          <a:schemeClr val="accent1">
-            <a:hueOff val="0"/>
-            <a:satOff val="0"/>
-            <a:lumOff val="0"/>
-            <a:alphaOff val="0"/>
-          </a:schemeClr>
-        </a:solidFill>
-        <a:ln w="25400" cap="flat" cmpd="sng" algn="ctr">
-          <a:solidFill>
-            <a:schemeClr val="lt1">
-              <a:hueOff val="0"/>
-              <a:satOff val="0"/>
-              <a:lumOff val="0"/>
-              <a:alphaOff val="0"/>
-            </a:schemeClr>
-          </a:solidFill>
-          <a:prstDash val="solid"/>
-        </a:ln>
-        <a:effectLst/>
-      </dsp:spPr>
-      <dsp:style>
-        <a:lnRef idx="2">
-          <a:scrgbClr r="0" g="0" b="0"/>
-        </a:lnRef>
-        <a:fillRef idx="1">
-          <a:scrgbClr r="0" g="0" b="0"/>
-        </a:fillRef>
-        <a:effectRef idx="0">
-          <a:scrgbClr r="0" g="0" b="0"/>
-        </a:effectRef>
-        <a:fontRef idx="minor">
-          <a:schemeClr val="lt1"/>
-        </a:fontRef>
-      </dsp:style>
-      <dsp:txBody>
-        <a:bodyPr spcFirstLastPara="0" vert="horz" wrap="square" lIns="49530" tIns="49530" rIns="49530" bIns="49530" numCol="1" spcCol="1270" anchor="ctr" anchorCtr="0">
-          <a:noAutofit/>
-        </a:bodyPr>
-        <a:lstStyle/>
-        <a:p>
-          <a:pPr lvl="0" algn="ctr" defTabSz="577850">
-            <a:lnSpc>
-              <a:spcPct val="90000"/>
-            </a:lnSpc>
-            <a:spcBef>
-              <a:spcPct val="0"/>
-            </a:spcBef>
-            <a:spcAft>
-              <a:spcPct val="35000"/>
-            </a:spcAft>
-          </a:pPr>
-          <a:r>
-            <a:rPr lang="en-US" sz="1300" kern="1200" dirty="0" smtClean="0"/>
-            <a:t>meat</a:t>
-          </a:r>
-          <a:endParaRPr lang="en-US" sz="1300" kern="1200" dirty="0"/>
-        </a:p>
-      </dsp:txBody>
-      <dsp:txXfrm>
-        <a:off x="5737493" y="4698931"/>
-        <a:ext cx="882615" cy="588410"/>
-      </dsp:txXfrm>
-    </dsp:sp>
-    <dsp:sp modelId="{D3916319-D670-48BE-8E7C-73EFD501C140}">
-      <dsp:nvSpPr>
-        <dsp:cNvPr id="0" name=""/>
-        <dsp:cNvSpPr/>
-      </dsp:nvSpPr>
-      <dsp:spPr>
-        <a:xfrm>
-          <a:off x="6752501" y="2816017"/>
-          <a:ext cx="1147400" cy="235364"/>
-        </a:xfrm>
-        <a:custGeom>
-          <a:avLst/>
-          <a:gdLst/>
-          <a:ahLst/>
-          <a:cxnLst/>
-          <a:rect l="0" t="0" r="0" b="0"/>
-          <a:pathLst>
-            <a:path>
-              <a:moveTo>
-                <a:pt x="0" y="0"/>
-              </a:moveTo>
-              <a:lnTo>
-                <a:pt x="0" y="117682"/>
-              </a:lnTo>
-              <a:lnTo>
-                <a:pt x="1147400" y="117682"/>
-              </a:lnTo>
-              <a:lnTo>
-                <a:pt x="1147400" y="235364"/>
-              </a:lnTo>
-            </a:path>
-          </a:pathLst>
-        </a:custGeom>
-        <a:noFill/>
-        <a:ln w="25400" cap="flat" cmpd="sng" algn="ctr">
-          <a:solidFill>
-            <a:schemeClr val="accent1">
-              <a:shade val="80000"/>
-              <a:hueOff val="0"/>
-              <a:satOff val="0"/>
-              <a:lumOff val="0"/>
-              <a:alphaOff val="0"/>
-            </a:schemeClr>
-          </a:solidFill>
-          <a:prstDash val="solid"/>
-        </a:ln>
-        <a:effectLst/>
-      </dsp:spPr>
-      <dsp:style>
-        <a:lnRef idx="2">
-          <a:scrgbClr r="0" g="0" b="0"/>
-        </a:lnRef>
-        <a:fillRef idx="0">
-          <a:scrgbClr r="0" g="0" b="0"/>
-        </a:fillRef>
-        <a:effectRef idx="0">
-          <a:scrgbClr r="0" g="0" b="0"/>
-        </a:effectRef>
-        <a:fontRef idx="minor"/>
-      </dsp:style>
-    </dsp:sp>
-    <dsp:sp modelId="{ECACF06E-0D77-42BB-B120-CAE787F5BE8E}">
-      <dsp:nvSpPr>
-        <dsp:cNvPr id="0" name=""/>
-        <dsp:cNvSpPr/>
-      </dsp:nvSpPr>
-      <dsp:spPr>
-        <a:xfrm>
-          <a:off x="7458594" y="3051382"/>
-          <a:ext cx="882615" cy="588410"/>
-        </a:xfrm>
-        <a:prstGeom prst="roundRect">
-          <a:avLst>
-            <a:gd name="adj" fmla="val 10000"/>
-          </a:avLst>
-        </a:prstGeom>
-        <a:solidFill>
-          <a:schemeClr val="accent1">
-            <a:hueOff val="0"/>
-            <a:satOff val="0"/>
-            <a:lumOff val="0"/>
-            <a:alphaOff val="0"/>
-          </a:schemeClr>
-        </a:solidFill>
-        <a:ln w="25400" cap="flat" cmpd="sng" algn="ctr">
-          <a:solidFill>
-            <a:schemeClr val="lt1">
-              <a:hueOff val="0"/>
-              <a:satOff val="0"/>
-              <a:lumOff val="0"/>
-              <a:alphaOff val="0"/>
-            </a:schemeClr>
-          </a:solidFill>
-          <a:prstDash val="solid"/>
-        </a:ln>
-        <a:effectLst/>
-      </dsp:spPr>
-      <dsp:style>
-        <a:lnRef idx="2">
-          <a:scrgbClr r="0" g="0" b="0"/>
-        </a:lnRef>
-        <a:fillRef idx="1">
-          <a:scrgbClr r="0" g="0" b="0"/>
-        </a:fillRef>
-        <a:effectRef idx="0">
-          <a:scrgbClr r="0" g="0" b="0"/>
-        </a:effectRef>
-        <a:fontRef idx="minor">
-          <a:schemeClr val="lt1"/>
-        </a:fontRef>
-      </dsp:style>
-      <dsp:txBody>
-        <a:bodyPr spcFirstLastPara="0" vert="horz" wrap="square" lIns="49530" tIns="49530" rIns="49530" bIns="49530" numCol="1" spcCol="1270" anchor="ctr" anchorCtr="0">
-          <a:noAutofit/>
-        </a:bodyPr>
-        <a:lstStyle/>
-        <a:p>
-          <a:pPr lvl="0" algn="ctr" defTabSz="577850">
-            <a:lnSpc>
-              <a:spcPct val="90000"/>
-            </a:lnSpc>
-            <a:spcBef>
-              <a:spcPct val="0"/>
-            </a:spcBef>
-            <a:spcAft>
-              <a:spcPct val="35000"/>
-            </a:spcAft>
-          </a:pPr>
-          <a:r>
-            <a:rPr lang="en-US" sz="1300" kern="1200" dirty="0" smtClean="0"/>
-            <a:t>without</a:t>
-          </a:r>
-          <a:endParaRPr lang="en-US" sz="1300" kern="1200" dirty="0"/>
-        </a:p>
-      </dsp:txBody>
-      <dsp:txXfrm>
-        <a:off x="7458594" y="3051382"/>
-        <a:ext cx="882615" cy="588410"/>
-      </dsp:txXfrm>
-    </dsp:sp>
-    <dsp:sp modelId="{F064F509-5960-48D4-BB13-231EDCC76B94}">
-      <dsp:nvSpPr>
-        <dsp:cNvPr id="0" name=""/>
-        <dsp:cNvSpPr/>
-      </dsp:nvSpPr>
-      <dsp:spPr>
-        <a:xfrm>
-          <a:off x="7854181" y="3639792"/>
-          <a:ext cx="91440" cy="235364"/>
-        </a:xfrm>
-        <a:custGeom>
-          <a:avLst/>
-          <a:gdLst/>
-          <a:ahLst/>
-          <a:cxnLst/>
-          <a:rect l="0" t="0" r="0" b="0"/>
-          <a:pathLst>
-            <a:path>
-              <a:moveTo>
-                <a:pt x="45720" y="0"/>
-              </a:moveTo>
-              <a:lnTo>
-                <a:pt x="45720" y="235364"/>
+                <a:pt x="45720" y="293116"/>
               </a:lnTo>
             </a:path>
           </a:pathLst>
@@ -5973,8 +5603,8 @@
       </dsp:nvSpPr>
       <dsp:spPr>
         <a:xfrm>
-          <a:off x="7458594" y="3875156"/>
-          <a:ext cx="882615" cy="588410"/>
+          <a:off x="7480468" y="4106167"/>
+          <a:ext cx="1099188" cy="732792"/>
         </a:xfrm>
         <a:prstGeom prst="roundRect">
           <a:avLst>
@@ -6012,12 +5642,12 @@
         </a:fontRef>
       </dsp:style>
       <dsp:txBody>
-        <a:bodyPr spcFirstLastPara="0" vert="horz" wrap="square" lIns="49530" tIns="49530" rIns="49530" bIns="49530" numCol="1" spcCol="1270" anchor="ctr" anchorCtr="0">
+        <a:bodyPr spcFirstLastPara="0" vert="horz" wrap="square" lIns="64770" tIns="64770" rIns="64770" bIns="64770" numCol="1" spcCol="1270" anchor="ctr" anchorCtr="0">
           <a:noAutofit/>
         </a:bodyPr>
         <a:lstStyle/>
         <a:p>
-          <a:pPr lvl="0" algn="ctr" defTabSz="577850">
+          <a:pPr lvl="0" algn="ctr" defTabSz="755650">
             <a:lnSpc>
               <a:spcPct val="90000"/>
             </a:lnSpc>
@@ -6029,15 +5659,15 @@
             </a:spcAft>
           </a:pPr>
           <a:r>
-            <a:rPr lang="en-US" sz="1300" kern="1200" dirty="0" smtClean="0"/>
+            <a:rPr lang="en-US" sz="1700" kern="1200" dirty="0" smtClean="0"/>
             <a:t>extra</a:t>
           </a:r>
-          <a:endParaRPr lang="en-US" sz="1300" kern="1200" dirty="0"/>
+          <a:endParaRPr lang="en-US" sz="1700" kern="1200" dirty="0"/>
         </a:p>
       </dsp:txBody>
       <dsp:txXfrm>
-        <a:off x="7458594" y="3875156"/>
-        <a:ext cx="882615" cy="588410"/>
+        <a:off x="7480468" y="4106167"/>
+        <a:ext cx="1099188" cy="732792"/>
       </dsp:txXfrm>
     </dsp:sp>
     <dsp:sp modelId="{D19A60F2-8B64-4F9B-B220-0126805DB7E3}">
@@ -6047,8 +5677,8 @@
       </dsp:nvSpPr>
       <dsp:spPr>
         <a:xfrm>
-          <a:off x="7326201" y="4463567"/>
-          <a:ext cx="573700" cy="235364"/>
+          <a:off x="7984343" y="4838960"/>
+          <a:ext cx="91440" cy="293116"/>
         </a:xfrm>
         <a:custGeom>
           <a:avLst/>
@@ -6059,16 +5689,10 @@
           <a:pathLst>
             <a:path>
               <a:moveTo>
-                <a:pt x="573700" y="0"/>
+                <a:pt x="45720" y="0"/>
               </a:moveTo>
               <a:lnTo>
-                <a:pt x="573700" y="117682"/>
-              </a:lnTo>
-              <a:lnTo>
-                <a:pt x="0" y="117682"/>
-              </a:lnTo>
-              <a:lnTo>
-                <a:pt x="0" y="235364"/>
+                <a:pt x="45720" y="293116"/>
               </a:lnTo>
             </a:path>
           </a:pathLst>
@@ -6108,288 +5732,8 @@
       </dsp:nvSpPr>
       <dsp:spPr>
         <a:xfrm>
-          <a:off x="6884893" y="4698931"/>
-          <a:ext cx="882615" cy="588410"/>
-        </a:xfrm>
-        <a:prstGeom prst="roundRect">
-          <a:avLst>
-            <a:gd name="adj" fmla="val 10000"/>
-          </a:avLst>
-        </a:prstGeom>
-        <a:solidFill>
-          <a:schemeClr val="accent1">
-            <a:hueOff val="0"/>
-            <a:satOff val="0"/>
-            <a:lumOff val="0"/>
-            <a:alphaOff val="0"/>
-          </a:schemeClr>
-        </a:solidFill>
-        <a:ln w="25400" cap="flat" cmpd="sng" algn="ctr">
-          <a:solidFill>
-            <a:schemeClr val="lt1">
-              <a:hueOff val="0"/>
-              <a:satOff val="0"/>
-              <a:lumOff val="0"/>
-              <a:alphaOff val="0"/>
-            </a:schemeClr>
-          </a:solidFill>
-          <a:prstDash val="solid"/>
-        </a:ln>
-        <a:effectLst/>
-      </dsp:spPr>
-      <dsp:style>
-        <a:lnRef idx="2">
-          <a:scrgbClr r="0" g="0" b="0"/>
-        </a:lnRef>
-        <a:fillRef idx="1">
-          <a:scrgbClr r="0" g="0" b="0"/>
-        </a:fillRef>
-        <a:effectRef idx="0">
-          <a:scrgbClr r="0" g="0" b="0"/>
-        </a:effectRef>
-        <a:fontRef idx="minor">
-          <a:schemeClr val="lt1"/>
-        </a:fontRef>
-      </dsp:style>
-      <dsp:txBody>
-        <a:bodyPr spcFirstLastPara="0" vert="horz" wrap="square" lIns="49530" tIns="49530" rIns="49530" bIns="49530" numCol="1" spcCol="1270" anchor="ctr" anchorCtr="0">
-          <a:noAutofit/>
-        </a:bodyPr>
-        <a:lstStyle/>
-        <a:p>
-          <a:pPr lvl="0" algn="ctr" defTabSz="577850">
-            <a:lnSpc>
-              <a:spcPct val="90000"/>
-            </a:lnSpc>
-            <a:spcBef>
-              <a:spcPct val="0"/>
-            </a:spcBef>
-            <a:spcAft>
-              <a:spcPct val="35000"/>
-            </a:spcAft>
-          </a:pPr>
-          <a:r>
-            <a:rPr lang="en-US" sz="1300" kern="1200" dirty="0" smtClean="0"/>
-            <a:t>cheese</a:t>
-          </a:r>
-          <a:endParaRPr lang="en-US" sz="1300" kern="1200" dirty="0"/>
-        </a:p>
-      </dsp:txBody>
-      <dsp:txXfrm>
-        <a:off x="6884893" y="4698931"/>
-        <a:ext cx="882615" cy="588410"/>
-      </dsp:txXfrm>
-    </dsp:sp>
-    <dsp:sp modelId="{1E3B8822-CBE7-4FB4-91BA-A1997FD8D194}">
-      <dsp:nvSpPr>
-        <dsp:cNvPr id="0" name=""/>
-        <dsp:cNvSpPr/>
-      </dsp:nvSpPr>
-      <dsp:spPr>
-        <a:xfrm>
-          <a:off x="7899901" y="4463567"/>
-          <a:ext cx="573700" cy="235364"/>
-        </a:xfrm>
-        <a:custGeom>
-          <a:avLst/>
-          <a:gdLst/>
-          <a:ahLst/>
-          <a:cxnLst/>
-          <a:rect l="0" t="0" r="0" b="0"/>
-          <a:pathLst>
-            <a:path>
-              <a:moveTo>
-                <a:pt x="0" y="0"/>
-              </a:moveTo>
-              <a:lnTo>
-                <a:pt x="0" y="117682"/>
-              </a:lnTo>
-              <a:lnTo>
-                <a:pt x="573700" y="117682"/>
-              </a:lnTo>
-              <a:lnTo>
-                <a:pt x="573700" y="235364"/>
-              </a:lnTo>
-            </a:path>
-          </a:pathLst>
-        </a:custGeom>
-        <a:noFill/>
-        <a:ln w="25400" cap="flat" cmpd="sng" algn="ctr">
-          <a:solidFill>
-            <a:schemeClr val="accent1">
-              <a:shade val="80000"/>
-              <a:hueOff val="0"/>
-              <a:satOff val="0"/>
-              <a:lumOff val="0"/>
-              <a:alphaOff val="0"/>
-            </a:schemeClr>
-          </a:solidFill>
-          <a:prstDash val="solid"/>
-        </a:ln>
-        <a:effectLst/>
-      </dsp:spPr>
-      <dsp:style>
-        <a:lnRef idx="2">
-          <a:scrgbClr r="0" g="0" b="0"/>
-        </a:lnRef>
-        <a:fillRef idx="0">
-          <a:scrgbClr r="0" g="0" b="0"/>
-        </a:fillRef>
-        <a:effectRef idx="0">
-          <a:scrgbClr r="0" g="0" b="0"/>
-        </a:effectRef>
-        <a:fontRef idx="minor"/>
-      </dsp:style>
-    </dsp:sp>
-    <dsp:sp modelId="{33A0C656-9415-4F4D-9065-7D26BDA0B663}">
-      <dsp:nvSpPr>
-        <dsp:cNvPr id="0" name=""/>
-        <dsp:cNvSpPr/>
-      </dsp:nvSpPr>
-      <dsp:spPr>
-        <a:xfrm>
-          <a:off x="8032294" y="4698931"/>
-          <a:ext cx="882615" cy="588410"/>
-        </a:xfrm>
-        <a:prstGeom prst="roundRect">
-          <a:avLst>
-            <a:gd name="adj" fmla="val 10000"/>
-          </a:avLst>
-        </a:prstGeom>
-        <a:solidFill>
-          <a:schemeClr val="accent1">
-            <a:hueOff val="0"/>
-            <a:satOff val="0"/>
-            <a:lumOff val="0"/>
-            <a:alphaOff val="0"/>
-          </a:schemeClr>
-        </a:solidFill>
-        <a:ln w="25400" cap="flat" cmpd="sng" algn="ctr">
-          <a:solidFill>
-            <a:schemeClr val="lt1">
-              <a:hueOff val="0"/>
-              <a:satOff val="0"/>
-              <a:lumOff val="0"/>
-              <a:alphaOff val="0"/>
-            </a:schemeClr>
-          </a:solidFill>
-          <a:prstDash val="solid"/>
-        </a:ln>
-        <a:effectLst/>
-      </dsp:spPr>
-      <dsp:style>
-        <a:lnRef idx="2">
-          <a:scrgbClr r="0" g="0" b="0"/>
-        </a:lnRef>
-        <a:fillRef idx="1">
-          <a:scrgbClr r="0" g="0" b="0"/>
-        </a:fillRef>
-        <a:effectRef idx="0">
-          <a:scrgbClr r="0" g="0" b="0"/>
-        </a:effectRef>
-        <a:fontRef idx="minor">
-          <a:schemeClr val="lt1"/>
-        </a:fontRef>
-      </dsp:style>
-      <dsp:txBody>
-        <a:bodyPr spcFirstLastPara="0" vert="horz" wrap="square" lIns="49530" tIns="49530" rIns="49530" bIns="49530" numCol="1" spcCol="1270" anchor="ctr" anchorCtr="0">
-          <a:noAutofit/>
-        </a:bodyPr>
-        <a:lstStyle/>
-        <a:p>
-          <a:pPr lvl="0" algn="ctr" defTabSz="577850">
-            <a:lnSpc>
-              <a:spcPct val="90000"/>
-            </a:lnSpc>
-            <a:spcBef>
-              <a:spcPct val="0"/>
-            </a:spcBef>
-            <a:spcAft>
-              <a:spcPct val="35000"/>
-            </a:spcAft>
-          </a:pPr>
-          <a:r>
-            <a:rPr lang="en-US" sz="1300" kern="1200" dirty="0" smtClean="0"/>
-            <a:t>meat</a:t>
-          </a:r>
-          <a:endParaRPr lang="en-US" sz="1300" kern="1200" dirty="0"/>
-        </a:p>
-      </dsp:txBody>
-      <dsp:txXfrm>
-        <a:off x="8032294" y="4698931"/>
-        <a:ext cx="882615" cy="588410"/>
-      </dsp:txXfrm>
-    </dsp:sp>
-    <dsp:sp modelId="{FE466D77-DD52-415A-921F-5B6F5A281D0A}">
-      <dsp:nvSpPr>
-        <dsp:cNvPr id="0" name=""/>
-        <dsp:cNvSpPr/>
-      </dsp:nvSpPr>
-      <dsp:spPr>
-        <a:xfrm>
-          <a:off x="5031400" y="1992243"/>
-          <a:ext cx="3318468" cy="235364"/>
-        </a:xfrm>
-        <a:custGeom>
-          <a:avLst/>
-          <a:gdLst/>
-          <a:ahLst/>
-          <a:cxnLst/>
-          <a:rect l="0" t="0" r="0" b="0"/>
-          <a:pathLst>
-            <a:path>
-              <a:moveTo>
-                <a:pt x="0" y="0"/>
-              </a:moveTo>
-              <a:lnTo>
-                <a:pt x="0" y="117682"/>
-              </a:lnTo>
-              <a:lnTo>
-                <a:pt x="3318468" y="117682"/>
-              </a:lnTo>
-              <a:lnTo>
-                <a:pt x="3318468" y="235364"/>
-              </a:lnTo>
-            </a:path>
-          </a:pathLst>
-        </a:custGeom>
-        <a:noFill/>
-        <a:ln w="25400" cap="flat" cmpd="sng" algn="ctr">
-          <a:solidFill>
-            <a:schemeClr val="accent1">
-              <a:shade val="80000"/>
-              <a:hueOff val="0"/>
-              <a:satOff val="0"/>
-              <a:lumOff val="0"/>
-              <a:alphaOff val="0"/>
-            </a:schemeClr>
-          </a:solidFill>
-          <a:prstDash val="solid"/>
-        </a:ln>
-        <a:effectLst/>
-      </dsp:spPr>
-      <dsp:style>
-        <a:lnRef idx="2">
-          <a:scrgbClr r="0" g="0" b="0"/>
-        </a:lnRef>
-        <a:fillRef idx="0">
-          <a:scrgbClr r="0" g="0" b="0"/>
-        </a:fillRef>
-        <a:effectRef idx="0">
-          <a:scrgbClr r="0" g="0" b="0"/>
-        </a:effectRef>
-        <a:fontRef idx="minor"/>
-      </dsp:style>
-    </dsp:sp>
-    <dsp:sp modelId="{F2D53BBD-D4ED-4E64-8C17-98D5B8879CBF}">
-      <dsp:nvSpPr>
-        <dsp:cNvPr id="0" name=""/>
-        <dsp:cNvSpPr/>
-      </dsp:nvSpPr>
-      <dsp:spPr>
-        <a:xfrm>
-          <a:off x="7908560" y="2227607"/>
-          <a:ext cx="882615" cy="588410"/>
+          <a:off x="7480468" y="5132077"/>
+          <a:ext cx="1099188" cy="732792"/>
         </a:xfrm>
         <a:prstGeom prst="roundRect">
           <a:avLst>
@@ -6427,12 +5771,12 @@
         </a:fontRef>
       </dsp:style>
       <dsp:txBody>
-        <a:bodyPr spcFirstLastPara="0" vert="horz" wrap="square" lIns="49530" tIns="49530" rIns="49530" bIns="49530" numCol="1" spcCol="1270" anchor="ctr" anchorCtr="0">
+        <a:bodyPr spcFirstLastPara="0" vert="horz" wrap="square" lIns="64770" tIns="64770" rIns="64770" bIns="64770" numCol="1" spcCol="1270" anchor="ctr" anchorCtr="0">
           <a:noAutofit/>
         </a:bodyPr>
         <a:lstStyle/>
         <a:p>
-          <a:pPr lvl="0" algn="ctr" defTabSz="577850">
+          <a:pPr lvl="0" algn="ctr" defTabSz="755650">
             <a:lnSpc>
               <a:spcPct val="90000"/>
             </a:lnSpc>
@@ -6444,15 +5788,15 @@
             </a:spcAft>
           </a:pPr>
           <a:r>
-            <a:rPr lang="de-DE" sz="1300" kern="1200" dirty="0" smtClean="0"/>
-            <a:t>item</a:t>
+            <a:rPr lang="en-US" sz="1700" kern="1200" dirty="0" smtClean="0"/>
+            <a:t>spice</a:t>
           </a:r>
-          <a:endParaRPr lang="en-US" sz="1300" kern="1200" dirty="0"/>
+          <a:endParaRPr lang="en-US" sz="1700" kern="1200" dirty="0"/>
         </a:p>
       </dsp:txBody>
       <dsp:txXfrm>
-        <a:off x="7908560" y="2227607"/>
-        <a:ext cx="882615" cy="588410"/>
+        <a:off x="7480468" y="5132077"/>
+        <a:ext cx="1099188" cy="732792"/>
       </dsp:txXfrm>
     </dsp:sp>
   </dsp:spTree>
@@ -9902,7 +9246,7 @@
             <a:fld id="{0E0FD8BF-4915-47C0-982D-E1A4592E6198}" type="datetimeFigureOut">
               <a:rPr lang="en-US" smtClean="0"/>
               <a:pPr/>
-              <a:t>2/25/2012</a:t>
+              <a:t>2/26/2012</a:t>
             </a:fld>
             <a:endParaRPr lang="en-US"/>
           </a:p>
@@ -10514,7 +9858,7 @@
             <a:fld id="{3A0C61A8-A647-4A83-B149-729257AFD983}" type="datetimeFigureOut">
               <a:rPr lang="en-US" smtClean="0"/>
               <a:pPr/>
-              <a:t>2/25/2012</a:t>
+              <a:t>2/26/2012</a:t>
             </a:fld>
             <a:endParaRPr lang="en-US"/>
           </a:p>
@@ -10681,7 +10025,7 @@
             <a:fld id="{3A0C61A8-A647-4A83-B149-729257AFD983}" type="datetimeFigureOut">
               <a:rPr lang="en-US" smtClean="0"/>
               <a:pPr/>
-              <a:t>2/25/2012</a:t>
+              <a:t>2/26/2012</a:t>
             </a:fld>
             <a:endParaRPr lang="en-US"/>
           </a:p>
@@ -10858,7 +10202,7 @@
             <a:fld id="{3A0C61A8-A647-4A83-B149-729257AFD983}" type="datetimeFigureOut">
               <a:rPr lang="en-US" smtClean="0"/>
               <a:pPr/>
-              <a:t>2/25/2012</a:t>
+              <a:t>2/26/2012</a:t>
             </a:fld>
             <a:endParaRPr lang="en-US"/>
           </a:p>
@@ -11025,7 +10369,7 @@
             <a:fld id="{3A0C61A8-A647-4A83-B149-729257AFD983}" type="datetimeFigureOut">
               <a:rPr lang="en-US" smtClean="0"/>
               <a:pPr/>
-              <a:t>2/25/2012</a:t>
+              <a:t>2/26/2012</a:t>
             </a:fld>
             <a:endParaRPr lang="en-US"/>
           </a:p>
@@ -11268,7 +10612,7 @@
             <a:fld id="{3A0C61A8-A647-4A83-B149-729257AFD983}" type="datetimeFigureOut">
               <a:rPr lang="en-US" smtClean="0"/>
               <a:pPr/>
-              <a:t>2/25/2012</a:t>
+              <a:t>2/26/2012</a:t>
             </a:fld>
             <a:endParaRPr lang="en-US"/>
           </a:p>
@@ -11553,7 +10897,7 @@
             <a:fld id="{3A0C61A8-A647-4A83-B149-729257AFD983}" type="datetimeFigureOut">
               <a:rPr lang="en-US" smtClean="0"/>
               <a:pPr/>
-              <a:t>2/25/2012</a:t>
+              <a:t>2/26/2012</a:t>
             </a:fld>
             <a:endParaRPr lang="en-US"/>
           </a:p>
@@ -11972,7 +11316,7 @@
             <a:fld id="{3A0C61A8-A647-4A83-B149-729257AFD983}" type="datetimeFigureOut">
               <a:rPr lang="en-US" smtClean="0"/>
               <a:pPr/>
-              <a:t>2/25/2012</a:t>
+              <a:t>2/26/2012</a:t>
             </a:fld>
             <a:endParaRPr lang="en-US"/>
           </a:p>
@@ -12087,7 +11431,7 @@
             <a:fld id="{3A0C61A8-A647-4A83-B149-729257AFD983}" type="datetimeFigureOut">
               <a:rPr lang="en-US" smtClean="0"/>
               <a:pPr/>
-              <a:t>2/25/2012</a:t>
+              <a:t>2/26/2012</a:t>
             </a:fld>
             <a:endParaRPr lang="en-US"/>
           </a:p>
@@ -12179,7 +11523,7 @@
             <a:fld id="{3A0C61A8-A647-4A83-B149-729257AFD983}" type="datetimeFigureOut">
               <a:rPr lang="en-US" smtClean="0"/>
               <a:pPr/>
-              <a:t>2/25/2012</a:t>
+              <a:t>2/26/2012</a:t>
             </a:fld>
             <a:endParaRPr lang="en-US"/>
           </a:p>
@@ -12453,7 +11797,7 @@
             <a:fld id="{3A0C61A8-A647-4A83-B149-729257AFD983}" type="datetimeFigureOut">
               <a:rPr lang="en-US" smtClean="0"/>
               <a:pPr/>
-              <a:t>2/25/2012</a:t>
+              <a:t>2/26/2012</a:t>
             </a:fld>
             <a:endParaRPr lang="en-US"/>
           </a:p>
@@ -12703,7 +12047,7 @@
             <a:fld id="{3A0C61A8-A647-4A83-B149-729257AFD983}" type="datetimeFigureOut">
               <a:rPr lang="en-US" smtClean="0"/>
               <a:pPr/>
-              <a:t>2/25/2012</a:t>
+              <a:t>2/26/2012</a:t>
             </a:fld>
             <a:endParaRPr lang="en-US"/>
           </a:p>
@@ -12913,7 +12257,7 @@
             <a:fld id="{3A0C61A8-A647-4A83-B149-729257AFD983}" type="datetimeFigureOut">
               <a:rPr lang="en-US" smtClean="0"/>
               <a:pPr/>
-              <a:t>2/25/2012</a:t>
+              <a:t>2/26/2012</a:t>
             </a:fld>
             <a:endParaRPr lang="en-US"/>
           </a:p>
@@ -13389,6 +12733,26 @@
           </a:p>
         </p:txBody>
       </p:sp>
+      <p:graphicFrame>
+        <p:nvGraphicFramePr>
+          <p:cNvPr id="1026" name="Object 2"/>
+          <p:cNvGraphicFramePr>
+            <a:graphicFrameLocks noChangeAspect="1"/>
+          </p:cNvGraphicFramePr>
+          <p:nvPr/>
+        </p:nvGraphicFramePr>
+        <p:xfrm>
+          <a:off x="639763" y="2247900"/>
+          <a:ext cx="4570412" cy="3427413"/>
+        </p:xfrm>
+        <a:graphic>
+          <a:graphicData uri="http://schemas.openxmlformats.org/presentationml/2006/ole">
+            <p:oleObj spid="_x0000_s1026" name="Presentation" r:id="rId3" imgW="4570603" imgH="3427427" progId="PowerPoint.Show.12">
+              <p:embed/>
+            </p:oleObj>
+          </a:graphicData>
+        </a:graphic>
+      </p:graphicFrame>
     </p:spTree>
   </p:cSld>
   <p:clrMapOvr>

</xml_diff>

<commit_message>
Last commit before start implementing new way to load plugins - through archive which contains all the dependencies...
</commit_message>
<xml_diff>
--- a/Presentation/Presentation new style.pptx
+++ b/Presentation/Presentation new style.pptx
@@ -2904,60 +2904,60 @@
     </dgm:pt>
   </dgm:ptLst>
   <dgm:cxnLst>
+    <dgm:cxn modelId="{D2D279A0-4C6C-4C4E-8E56-41F0631352C7}" srcId="{6F9C22BB-A951-4593-904B-133B05B88043}" destId="{2E82ED61-2C38-4B5F-BBA6-C193A1299B2B}" srcOrd="0" destOrd="0" parTransId="{971CF5ED-AFF3-482E-A74A-0BF989CA19A9}" sibTransId="{7D73BB3C-F02E-4D32-8C3F-AABB7D49AB2A}"/>
+    <dgm:cxn modelId="{D2A430F1-8FBB-4131-9B41-DF297C34C52B}" type="presOf" srcId="{299EB561-97C7-4BAC-B7EB-DB28C33DA60A}" destId="{C4FAC167-4C6C-4E30-956B-62E586336272}" srcOrd="0" destOrd="0" presId="urn:microsoft.com/office/officeart/2005/8/layout/hierarchy6"/>
+    <dgm:cxn modelId="{2ED8A1EA-C9B3-44B0-9E88-503BAB18FFEC}" type="presOf" srcId="{577A5865-3120-46AD-84D7-B481646DDA51}" destId="{D3916319-D670-48BE-8E7C-73EFD501C140}" srcOrd="0" destOrd="0" presId="urn:microsoft.com/office/officeart/2005/8/layout/hierarchy6"/>
+    <dgm:cxn modelId="{7ADCB353-3418-49AF-AEAA-730E1AA8024A}" type="presOf" srcId="{49000756-D061-4D71-8CA0-31F9974ECF1A}" destId="{F1F1265C-A072-48C6-85E4-0B0E9EEBF7A9}" srcOrd="0" destOrd="0" presId="urn:microsoft.com/office/officeart/2005/8/layout/hierarchy6"/>
+    <dgm:cxn modelId="{7BE8DFC3-CFB9-4598-9973-8AAB8C0E76B7}" type="presOf" srcId="{971CF5ED-AFF3-482E-A74A-0BF989CA19A9}" destId="{857F7289-7B4E-4003-AC3D-69AFF400B1F1}" srcOrd="0" destOrd="0" presId="urn:microsoft.com/office/officeart/2005/8/layout/hierarchy6"/>
+    <dgm:cxn modelId="{03E410BF-18FA-49A6-8E94-6DFC92388C18}" type="presOf" srcId="{62461A88-BE74-49D3-AC7E-AEE5A612166B}" destId="{7FFE00B5-FB63-4647-B86D-7F6898C2ABAF}" srcOrd="0" destOrd="0" presId="urn:microsoft.com/office/officeart/2005/8/layout/hierarchy6"/>
+    <dgm:cxn modelId="{0BAE7DFD-F964-4DFC-A375-71D2EB87BEAB}" srcId="{DD123432-B415-4B22-814C-D6B426117991}" destId="{299EB561-97C7-4BAC-B7EB-DB28C33DA60A}" srcOrd="0" destOrd="0" parTransId="{EA7FE5AF-FF75-442B-B746-865641E95FAD}" sibTransId="{C5CE8850-2156-436C-B62B-15537E575CB9}"/>
+    <dgm:cxn modelId="{34C104DB-041C-433F-A6E2-353333FECE96}" type="presOf" srcId="{DFCC83F9-0185-4FAC-9C8B-DC9E59A90181}" destId="{54588B55-EECC-466F-9237-F2D13FCF3C12}" srcOrd="0" destOrd="0" presId="urn:microsoft.com/office/officeart/2005/8/layout/hierarchy6"/>
+    <dgm:cxn modelId="{A932358F-721F-47ED-B8E1-0CE7D336A7A7}" type="presOf" srcId="{4895BF14-2446-4B8C-B1A9-9780BC55D8B3}" destId="{E257627A-BB36-4F01-A617-C92E4B946BE3}" srcOrd="0" destOrd="0" presId="urn:microsoft.com/office/officeart/2005/8/layout/hierarchy6"/>
+    <dgm:cxn modelId="{86A0356E-AC14-45EC-B127-08EF57FDA833}" srcId="{4895BF14-2446-4B8C-B1A9-9780BC55D8B3}" destId="{174B66DE-A4C5-4262-B9FF-3DB70DD760B4}" srcOrd="0" destOrd="0" parTransId="{F75DAD21-9BFC-4948-9203-F5848E0A8B96}" sibTransId="{8C8068DF-3B6B-44FE-B536-A1297581E869}"/>
+    <dgm:cxn modelId="{4C4C7B88-7AD7-4323-BA12-1B9BFBAEF9B0}" type="presOf" srcId="{3152CBFA-D90F-4370-98D8-CBB96716A74F}" destId="{DE52B5AB-E58B-46E6-9C09-E32ABFBD8A69}" srcOrd="0" destOrd="0" presId="urn:microsoft.com/office/officeart/2005/8/layout/hierarchy6"/>
+    <dgm:cxn modelId="{E3B1A65A-DB8F-4728-B949-8C8B3DF5A367}" type="presOf" srcId="{6F9C22BB-A951-4593-904B-133B05B88043}" destId="{B8E2EB32-E5D0-4D49-BCD7-A48568B971EC}" srcOrd="0" destOrd="0" presId="urn:microsoft.com/office/officeart/2005/8/layout/hierarchy6"/>
+    <dgm:cxn modelId="{61F41AFD-CDAC-4C09-8C4F-612F706B2167}" type="presOf" srcId="{CCF9276B-DD30-4A31-97E0-374BC2F33936}" destId="{41D334FC-DC88-4297-988A-B6A3A5BF7DD8}" srcOrd="0" destOrd="0" presId="urn:microsoft.com/office/officeart/2005/8/layout/hierarchy6"/>
     <dgm:cxn modelId="{51FC22CF-4DA7-4532-ADE2-5E9DD781BA57}" srcId="{299EB561-97C7-4BAC-B7EB-DB28C33DA60A}" destId="{B5616882-C45F-4116-A8B7-E0FF2BC78404}" srcOrd="0" destOrd="0" parTransId="{690B4BB5-43DB-4342-B5A4-23B9AC7FC042}" sibTransId="{8130ACB8-192A-48F7-B311-73CF415BD6AF}"/>
-    <dgm:cxn modelId="{D2D279A0-4C6C-4C4E-8E56-41F0631352C7}" srcId="{6F9C22BB-A951-4593-904B-133B05B88043}" destId="{2E82ED61-2C38-4B5F-BBA6-C193A1299B2B}" srcOrd="0" destOrd="0" parTransId="{971CF5ED-AFF3-482E-A74A-0BF989CA19A9}" sibTransId="{7D73BB3C-F02E-4D32-8C3F-AABB7D49AB2A}"/>
+    <dgm:cxn modelId="{5B4B2E33-DBC3-495B-9AB8-2919CDFF8376}" srcId="{6F9C22BB-A951-4593-904B-133B05B88043}" destId="{F1C739AF-6551-4FE4-9091-30A25A3579C1}" srcOrd="1" destOrd="0" parTransId="{577A5865-3120-46AD-84D7-B481646DDA51}" sibTransId="{8D3704BA-B5FB-4734-9A57-BEEAB9C053D1}"/>
+    <dgm:cxn modelId="{9DF437E5-3046-4BE6-B752-8B97A9BC9078}" type="presOf" srcId="{4C2075A7-8E8D-4212-AEF2-FA2BFC036D54}" destId="{6FF85653-6460-4756-A629-C1326052BA6B}" srcOrd="0" destOrd="0" presId="urn:microsoft.com/office/officeart/2005/8/layout/hierarchy6"/>
+    <dgm:cxn modelId="{F6FE52B9-5E83-4752-93FE-F01D16574890}" srcId="{3152CBFA-D90F-4370-98D8-CBB96716A74F}" destId="{A0836253-59AD-4823-969B-C27091CC6D31}" srcOrd="0" destOrd="0" parTransId="{0C638C6E-8B89-484E-99A7-0F0008F44C1B}" sibTransId="{C52AF91B-87E7-4CFB-A4B1-9C351C99B152}"/>
+    <dgm:cxn modelId="{9DD7FAD5-F49C-4B8B-A49A-58E711DCA903}" type="presOf" srcId="{3380550B-F545-409E-8728-3E2080D1DE8E}" destId="{5962983C-0FD2-4E96-8C1C-E39F1E4C568F}" srcOrd="0" destOrd="0" presId="urn:microsoft.com/office/officeart/2005/8/layout/hierarchy6"/>
+    <dgm:cxn modelId="{5E557175-EC6C-4467-ADA7-B8607C493CA4}" type="presOf" srcId="{F75DAD21-9BFC-4948-9203-F5848E0A8B96}" destId="{CD809B7E-A368-46C6-AAFB-1EDABED2B127}" srcOrd="0" destOrd="0" presId="urn:microsoft.com/office/officeart/2005/8/layout/hierarchy6"/>
+    <dgm:cxn modelId="{835EE9B5-B185-4B8D-909B-865A90D9D03B}" srcId="{49000756-D061-4D71-8CA0-31F9974ECF1A}" destId="{35AF10B0-5D0C-488A-8DA7-F73BE8FC5D85}" srcOrd="0" destOrd="0" parTransId="{5148951C-C1B0-434D-90F2-1F2128DF3563}" sibTransId="{C862EED3-BF96-43F1-8671-B3A05E19D8F0}"/>
+    <dgm:cxn modelId="{201F5D71-86A4-4FF2-B0F2-7C2A24CB4A5F}" type="presOf" srcId="{2A8D573A-B194-44E7-806C-4E7169F3ED3F}" destId="{4697DA84-ECF6-4003-9834-CE181F277FBB}" srcOrd="0" destOrd="0" presId="urn:microsoft.com/office/officeart/2005/8/layout/hierarchy6"/>
+    <dgm:cxn modelId="{F8D94765-8E0D-4D47-A5DD-1F48CBDDEA29}" type="presOf" srcId="{7A7E8FDD-A9C0-4725-BC34-3F5C43CB3CF9}" destId="{3ED92A81-5FF7-4BBB-AE0A-29442DBAFA8B}" srcOrd="0" destOrd="0" presId="urn:microsoft.com/office/officeart/2005/8/layout/hierarchy6"/>
+    <dgm:cxn modelId="{F5987033-F94E-4179-91EB-56E0B7E6DEFB}" type="presOf" srcId="{1565F46A-33E8-4FDB-836B-D3F88AA217D6}" destId="{8BE94AF5-9234-41C9-8505-87E9ECE3D97A}" srcOrd="0" destOrd="0" presId="urn:microsoft.com/office/officeart/2005/8/layout/hierarchy6"/>
+    <dgm:cxn modelId="{72B2A304-F408-4776-BB76-40A4C38A433A}" type="presOf" srcId="{DD123432-B415-4B22-814C-D6B426117991}" destId="{B9277DAC-F9CA-4E71-B63F-3F16B430F309}" srcOrd="0" destOrd="0" presId="urn:microsoft.com/office/officeart/2005/8/layout/hierarchy6"/>
+    <dgm:cxn modelId="{8DB3BC73-105F-4995-83F6-C303BFDD42DB}" type="presOf" srcId="{A0836253-59AD-4823-969B-C27091CC6D31}" destId="{288A98C4-8794-4D98-9D7E-6D757471075D}" srcOrd="0" destOrd="0" presId="urn:microsoft.com/office/officeart/2005/8/layout/hierarchy6"/>
+    <dgm:cxn modelId="{8F2364D8-EB83-4C73-B29E-8B7EE1CEC84E}" srcId="{1565F46A-33E8-4FDB-836B-D3F88AA217D6}" destId="{29ED1BD8-A9E7-4C67-873E-405A4AF25EE9}" srcOrd="0" destOrd="0" parTransId="{011F36AE-F9DC-4279-9D0A-C5A84D645C9C}" sibTransId="{A5009B00-7923-40A4-B24B-4FF0A4275F7D}"/>
+    <dgm:cxn modelId="{00344D45-D33F-4371-8639-FEC63EAF7505}" type="presOf" srcId="{59ECBF1E-327F-4C3E-A1AC-C8ADD56A60A6}" destId="{43337737-EF2B-4E98-84B4-D16409A4EA80}" srcOrd="0" destOrd="0" presId="urn:microsoft.com/office/officeart/2005/8/layout/hierarchy6"/>
+    <dgm:cxn modelId="{2BAC1006-5854-4F6D-95AD-736286F3AB5F}" type="presOf" srcId="{0C638C6E-8B89-484E-99A7-0F0008F44C1B}" destId="{D19A60F2-8B64-4F9B-B220-0126805DB7E3}" srcOrd="0" destOrd="0" presId="urn:microsoft.com/office/officeart/2005/8/layout/hierarchy6"/>
+    <dgm:cxn modelId="{420784FE-7DA6-4920-A0DA-B993152B0C0D}" srcId="{936808E1-78FF-415A-8C6D-B8D366E7E94B}" destId="{DD123432-B415-4B22-814C-D6B426117991}" srcOrd="0" destOrd="0" parTransId="{BFFCE8B3-4141-4F92-BE7A-A1EAF853840D}" sibTransId="{0726F1BA-C470-42B0-9598-FCC87F422C27}"/>
+    <dgm:cxn modelId="{7B0AAED2-3450-4FB9-9CBB-2209712C7CD9}" type="presOf" srcId="{E48153EC-E2FA-408B-8E7C-22B22D651AAD}" destId="{85CDC8C9-66F5-477F-8620-D18C62C05FD8}" srcOrd="0" destOrd="0" presId="urn:microsoft.com/office/officeart/2005/8/layout/hierarchy6"/>
+    <dgm:cxn modelId="{13E1E6C9-782D-4B5A-93B5-C0CF2AAE1EF3}" type="presOf" srcId="{936808E1-78FF-415A-8C6D-B8D366E7E94B}" destId="{D0C888DE-0CAA-4426-B613-BB51F6DAA8DF}" srcOrd="0" destOrd="0" presId="urn:microsoft.com/office/officeart/2005/8/layout/hierarchy6"/>
+    <dgm:cxn modelId="{78FEDABF-5AD0-4AD9-B82B-6C575BD4B9DB}" srcId="{29ED1BD8-A9E7-4C67-873E-405A4AF25EE9}" destId="{62461A88-BE74-49D3-AC7E-AEE5A612166B}" srcOrd="0" destOrd="0" parTransId="{E48153EC-E2FA-408B-8E7C-22B22D651AAD}" sibTransId="{86D73EE1-2C83-4EE2-9590-2C2EAE653F54}"/>
+    <dgm:cxn modelId="{B84ECF1D-A6CB-4A74-93B0-8833CAC3DD2C}" srcId="{62461A88-BE74-49D3-AC7E-AEE5A612166B}" destId="{6F9C22BB-A951-4593-904B-133B05B88043}" srcOrd="1" destOrd="0" parTransId="{CCF9276B-DD30-4A31-97E0-374BC2F33936}" sibTransId="{8A4F2D8F-12C0-41E0-A37F-E5C90C9E13B5}"/>
     <dgm:cxn modelId="{25CF7C5E-5B26-4D19-9B68-FCF1F0136388}" srcId="{299EB561-97C7-4BAC-B7EB-DB28C33DA60A}" destId="{1153B68D-8017-4FD2-B763-2BE2FFBFC9C4}" srcOrd="1" destOrd="0" parTransId="{2A8D573A-B194-44E7-806C-4E7169F3ED3F}" sibTransId="{298039BD-8A67-4C84-8B34-18A6CE646C65}"/>
+    <dgm:cxn modelId="{A6607A16-C5C8-4B8F-B392-782E9B6D2A1C}" type="presOf" srcId="{4029C3B0-0896-45B8-8180-9AF91F9BB120}" destId="{7D20DB9F-D5B1-4696-ACEA-D430084773AA}" srcOrd="0" destOrd="0" presId="urn:microsoft.com/office/officeart/2005/8/layout/hierarchy6"/>
+    <dgm:cxn modelId="{AB602225-58AD-450B-9A62-E9CB769391F3}" srcId="{2E82ED61-2C38-4B5F-BBA6-C193A1299B2B}" destId="{49000756-D061-4D71-8CA0-31F9974ECF1A}" srcOrd="0" destOrd="0" parTransId="{4029C3B0-0896-45B8-8180-9AF91F9BB120}" sibTransId="{AF8E81E6-DE3C-4549-975B-359FD53157DB}"/>
+    <dgm:cxn modelId="{D14D06FD-C82E-4CCB-9A47-153F8CB5D937}" type="presOf" srcId="{BFFCE8B3-4141-4F92-BE7A-A1EAF853840D}" destId="{30DEC963-A63E-4CF4-8BC8-BCCC54B50307}" srcOrd="0" destOrd="0" presId="urn:microsoft.com/office/officeart/2005/8/layout/hierarchy6"/>
+    <dgm:cxn modelId="{F623D2E4-4CA9-4C3F-962B-F864AE6CF11D}" srcId="{936808E1-78FF-415A-8C6D-B8D366E7E94B}" destId="{4895BF14-2446-4B8C-B1A9-9780BC55D8B3}" srcOrd="1" destOrd="0" parTransId="{3380550B-F545-409E-8728-3E2080D1DE8E}" sibTransId="{64C3886D-ADEC-45CC-8A16-B91E3EDBC043}"/>
+    <dgm:cxn modelId="{2B6366A6-CE5C-4243-A6E8-54605E62E31B}" type="presOf" srcId="{35AF10B0-5D0C-488A-8DA7-F73BE8FC5D85}" destId="{535C48B3-87DE-4354-B7E8-FD38DC14560D}" srcOrd="0" destOrd="0" presId="urn:microsoft.com/office/officeart/2005/8/layout/hierarchy6"/>
+    <dgm:cxn modelId="{E229B6AD-E60D-4C66-857E-C2034F959486}" type="presOf" srcId="{2E82ED61-2C38-4B5F-BBA6-C193A1299B2B}" destId="{712470A4-8189-46E3-8952-B9DFA4D0FD5B}" srcOrd="0" destOrd="0" presId="urn:microsoft.com/office/officeart/2005/8/layout/hierarchy6"/>
+    <dgm:cxn modelId="{2B6DE801-D737-4C50-A815-E41BDA356FD0}" srcId="{174B66DE-A4C5-4262-B9FF-3DB70DD760B4}" destId="{C7CF69AB-CFAF-42DF-807F-2486B4A2B61E}" srcOrd="1" destOrd="0" parTransId="{DFCC83F9-0185-4FAC-9C8B-DC9E59A90181}" sibTransId="{F11F8D29-D862-41A4-A441-237B83759010}"/>
+    <dgm:cxn modelId="{3FE7DF85-7176-45EC-8F0C-A4317BD0714D}" type="presOf" srcId="{690B4BB5-43DB-4342-B5A4-23B9AC7FC042}" destId="{A89A8AFA-C3FB-40F4-A8F8-026146D78588}" srcOrd="0" destOrd="0" presId="urn:microsoft.com/office/officeart/2005/8/layout/hierarchy6"/>
+    <dgm:cxn modelId="{22CF2E35-F00E-4A57-82FB-DA0CABD3360F}" type="presOf" srcId="{1153B68D-8017-4FD2-B763-2BE2FFBFC9C4}" destId="{F6D58E2E-40CE-4F2C-8885-5BDDD1172BE8}" srcOrd="0" destOrd="0" presId="urn:microsoft.com/office/officeart/2005/8/layout/hierarchy6"/>
+    <dgm:cxn modelId="{46514169-8D05-488D-B6A3-82FB7DEC9663}" type="presOf" srcId="{E5010613-837B-41EE-B31B-DA18AD9AB298}" destId="{F064F509-5960-48D4-BB13-231EDCC76B94}" srcOrd="0" destOrd="0" presId="urn:microsoft.com/office/officeart/2005/8/layout/hierarchy6"/>
+    <dgm:cxn modelId="{C3FF5911-6747-4743-AE6C-863F32F5B0E2}" srcId="{174B66DE-A4C5-4262-B9FF-3DB70DD760B4}" destId="{59ECBF1E-327F-4C3E-A1AC-C8ADD56A60A6}" srcOrd="0" destOrd="0" parTransId="{4C2075A7-8E8D-4212-AEF2-FA2BFC036D54}" sibTransId="{AD56F4E0-33B2-4CFD-B0FE-7E9084C10718}"/>
     <dgm:cxn modelId="{D95C32C0-9E86-43A3-B632-26C922CD11EA}" type="presOf" srcId="{174B66DE-A4C5-4262-B9FF-3DB70DD760B4}" destId="{B215FB30-8694-4C29-B7FC-A88B9190FB5A}" srcOrd="0" destOrd="0" presId="urn:microsoft.com/office/officeart/2005/8/layout/hierarchy6"/>
-    <dgm:cxn modelId="{86A0356E-AC14-45EC-B127-08EF57FDA833}" srcId="{4895BF14-2446-4B8C-B1A9-9780BC55D8B3}" destId="{174B66DE-A4C5-4262-B9FF-3DB70DD760B4}" srcOrd="0" destOrd="0" parTransId="{F75DAD21-9BFC-4948-9203-F5848E0A8B96}" sibTransId="{8C8068DF-3B6B-44FE-B536-A1297581E869}"/>
-    <dgm:cxn modelId="{B84ECF1D-A6CB-4A74-93B0-8833CAC3DD2C}" srcId="{62461A88-BE74-49D3-AC7E-AEE5A612166B}" destId="{6F9C22BB-A951-4593-904B-133B05B88043}" srcOrd="1" destOrd="0" parTransId="{CCF9276B-DD30-4A31-97E0-374BC2F33936}" sibTransId="{8A4F2D8F-12C0-41E0-A37F-E5C90C9E13B5}"/>
-    <dgm:cxn modelId="{E3B1A65A-DB8F-4728-B949-8C8B3DF5A367}" type="presOf" srcId="{6F9C22BB-A951-4593-904B-133B05B88043}" destId="{B8E2EB32-E5D0-4D49-BCD7-A48568B971EC}" srcOrd="0" destOrd="0" presId="urn:microsoft.com/office/officeart/2005/8/layout/hierarchy6"/>
+    <dgm:cxn modelId="{7482EA66-784D-48EF-A58A-5A9B877A23F1}" type="presOf" srcId="{F1C739AF-6551-4FE4-9091-30A25A3579C1}" destId="{ECACF06E-0D77-42BB-B120-CAE787F5BE8E}" srcOrd="0" destOrd="0" presId="urn:microsoft.com/office/officeart/2005/8/layout/hierarchy6"/>
+    <dgm:cxn modelId="{1644F148-8C25-483D-8E8C-CEFF92406E02}" srcId="{62461A88-BE74-49D3-AC7E-AEE5A612166B}" destId="{936808E1-78FF-415A-8C6D-B8D366E7E94B}" srcOrd="0" destOrd="0" parTransId="{7A7E8FDD-A9C0-4725-BC34-3F5C43CB3CF9}" sibTransId="{41C6E207-932A-446C-BED6-6532EF373271}"/>
+    <dgm:cxn modelId="{2BC76922-BACF-4B39-9A5A-6652060A7CFC}" type="presOf" srcId="{C7CF69AB-CFAF-42DF-807F-2486B4A2B61E}" destId="{1D6A2535-EE4C-47C7-BB0B-B5758CDDC053}" srcOrd="0" destOrd="0" presId="urn:microsoft.com/office/officeart/2005/8/layout/hierarchy6"/>
     <dgm:cxn modelId="{865A41CC-0A8A-4C12-AFB0-614771B25982}" srcId="{F1C739AF-6551-4FE4-9091-30A25A3579C1}" destId="{3152CBFA-D90F-4370-98D8-CBB96716A74F}" srcOrd="0" destOrd="0" parTransId="{E5010613-837B-41EE-B31B-DA18AD9AB298}" sibTransId="{2CC84CC8-915A-415D-B845-A5F35975D5C6}"/>
-    <dgm:cxn modelId="{34C104DB-041C-433F-A6E2-353333FECE96}" type="presOf" srcId="{DFCC83F9-0185-4FAC-9C8B-DC9E59A90181}" destId="{54588B55-EECC-466F-9237-F2D13FCF3C12}" srcOrd="0" destOrd="0" presId="urn:microsoft.com/office/officeart/2005/8/layout/hierarchy6"/>
-    <dgm:cxn modelId="{78FEDABF-5AD0-4AD9-B82B-6C575BD4B9DB}" srcId="{29ED1BD8-A9E7-4C67-873E-405A4AF25EE9}" destId="{62461A88-BE74-49D3-AC7E-AEE5A612166B}" srcOrd="0" destOrd="0" parTransId="{E48153EC-E2FA-408B-8E7C-22B22D651AAD}" sibTransId="{86D73EE1-2C83-4EE2-9590-2C2EAE653F54}"/>
-    <dgm:cxn modelId="{A6607A16-C5C8-4B8F-B392-782E9B6D2A1C}" type="presOf" srcId="{4029C3B0-0896-45B8-8180-9AF91F9BB120}" destId="{7D20DB9F-D5B1-4696-ACEA-D430084773AA}" srcOrd="0" destOrd="0" presId="urn:microsoft.com/office/officeart/2005/8/layout/hierarchy6"/>
-    <dgm:cxn modelId="{F623D2E4-4CA9-4C3F-962B-F864AE6CF11D}" srcId="{936808E1-78FF-415A-8C6D-B8D366E7E94B}" destId="{4895BF14-2446-4B8C-B1A9-9780BC55D8B3}" srcOrd="1" destOrd="0" parTransId="{3380550B-F545-409E-8728-3E2080D1DE8E}" sibTransId="{64C3886D-ADEC-45CC-8A16-B91E3EDBC043}"/>
-    <dgm:cxn modelId="{4C4C7B88-7AD7-4323-BA12-1B9BFBAEF9B0}" type="presOf" srcId="{3152CBFA-D90F-4370-98D8-CBB96716A74F}" destId="{DE52B5AB-E58B-46E6-9C09-E32ABFBD8A69}" srcOrd="0" destOrd="0" presId="urn:microsoft.com/office/officeart/2005/8/layout/hierarchy6"/>
-    <dgm:cxn modelId="{2B6366A6-CE5C-4243-A6E8-54605E62E31B}" type="presOf" srcId="{35AF10B0-5D0C-488A-8DA7-F73BE8FC5D85}" destId="{535C48B3-87DE-4354-B7E8-FD38DC14560D}" srcOrd="0" destOrd="0" presId="urn:microsoft.com/office/officeart/2005/8/layout/hierarchy6"/>
-    <dgm:cxn modelId="{D2A430F1-8FBB-4131-9B41-DF297C34C52B}" type="presOf" srcId="{299EB561-97C7-4BAC-B7EB-DB28C33DA60A}" destId="{C4FAC167-4C6C-4E30-956B-62E586336272}" srcOrd="0" destOrd="0" presId="urn:microsoft.com/office/officeart/2005/8/layout/hierarchy6"/>
-    <dgm:cxn modelId="{0BAE7DFD-F964-4DFC-A375-71D2EB87BEAB}" srcId="{DD123432-B415-4B22-814C-D6B426117991}" destId="{299EB561-97C7-4BAC-B7EB-DB28C33DA60A}" srcOrd="0" destOrd="0" parTransId="{EA7FE5AF-FF75-442B-B746-865641E95FAD}" sibTransId="{C5CE8850-2156-436C-B62B-15537E575CB9}"/>
-    <dgm:cxn modelId="{5E557175-EC6C-4467-ADA7-B8607C493CA4}" type="presOf" srcId="{F75DAD21-9BFC-4948-9203-F5848E0A8B96}" destId="{CD809B7E-A368-46C6-AAFB-1EDABED2B127}" srcOrd="0" destOrd="0" presId="urn:microsoft.com/office/officeart/2005/8/layout/hierarchy6"/>
-    <dgm:cxn modelId="{2BAC1006-5854-4F6D-95AD-736286F3AB5F}" type="presOf" srcId="{0C638C6E-8B89-484E-99A7-0F0008F44C1B}" destId="{D19A60F2-8B64-4F9B-B220-0126805DB7E3}" srcOrd="0" destOrd="0" presId="urn:microsoft.com/office/officeart/2005/8/layout/hierarchy6"/>
-    <dgm:cxn modelId="{72B2A304-F408-4776-BB76-40A4C38A433A}" type="presOf" srcId="{DD123432-B415-4B22-814C-D6B426117991}" destId="{B9277DAC-F9CA-4E71-B63F-3F16B430F309}" srcOrd="0" destOrd="0" presId="urn:microsoft.com/office/officeart/2005/8/layout/hierarchy6"/>
-    <dgm:cxn modelId="{8F2364D8-EB83-4C73-B29E-8B7EE1CEC84E}" srcId="{1565F46A-33E8-4FDB-836B-D3F88AA217D6}" destId="{29ED1BD8-A9E7-4C67-873E-405A4AF25EE9}" srcOrd="0" destOrd="0" parTransId="{011F36AE-F9DC-4279-9D0A-C5A84D645C9C}" sibTransId="{A5009B00-7923-40A4-B24B-4FF0A4275F7D}"/>
-    <dgm:cxn modelId="{46514169-8D05-488D-B6A3-82FB7DEC9663}" type="presOf" srcId="{E5010613-837B-41EE-B31B-DA18AD9AB298}" destId="{F064F509-5960-48D4-BB13-231EDCC76B94}" srcOrd="0" destOrd="0" presId="urn:microsoft.com/office/officeart/2005/8/layout/hierarchy6"/>
-    <dgm:cxn modelId="{201F5D71-86A4-4FF2-B0F2-7C2A24CB4A5F}" type="presOf" srcId="{2A8D573A-B194-44E7-806C-4E7169F3ED3F}" destId="{4697DA84-ECF6-4003-9834-CE181F277FBB}" srcOrd="0" destOrd="0" presId="urn:microsoft.com/office/officeart/2005/8/layout/hierarchy6"/>
-    <dgm:cxn modelId="{2ED8A1EA-C9B3-44B0-9E88-503BAB18FFEC}" type="presOf" srcId="{577A5865-3120-46AD-84D7-B481646DDA51}" destId="{D3916319-D670-48BE-8E7C-73EFD501C140}" srcOrd="0" destOrd="0" presId="urn:microsoft.com/office/officeart/2005/8/layout/hierarchy6"/>
+    <dgm:cxn modelId="{91491415-3C28-4151-9272-716089DA1524}" type="presOf" srcId="{EA7FE5AF-FF75-442B-B746-865641E95FAD}" destId="{55BDA48D-D577-402D-B265-2D98DC9968AF}" srcOrd="0" destOrd="0" presId="urn:microsoft.com/office/officeart/2005/8/layout/hierarchy6"/>
+    <dgm:cxn modelId="{D593B8FC-BE41-47B1-A178-A5B641C03169}" type="presOf" srcId="{B5616882-C45F-4116-A8B7-E0FF2BC78404}" destId="{5E06239B-1E51-4EB4-BAEB-09F5EF1F334C}" srcOrd="0" destOrd="0" presId="urn:microsoft.com/office/officeart/2005/8/layout/hierarchy6"/>
     <dgm:cxn modelId="{49F56405-A866-40F7-A502-8C10781A4A19}" type="presOf" srcId="{29ED1BD8-A9E7-4C67-873E-405A4AF25EE9}" destId="{F486E78D-8AE6-4C6E-873C-B84E22BEDAEE}" srcOrd="0" destOrd="0" presId="urn:microsoft.com/office/officeart/2005/8/layout/hierarchy6"/>
-    <dgm:cxn modelId="{9DF437E5-3046-4BE6-B752-8B97A9BC9078}" type="presOf" srcId="{4C2075A7-8E8D-4212-AEF2-FA2BFC036D54}" destId="{6FF85653-6460-4756-A629-C1326052BA6B}" srcOrd="0" destOrd="0" presId="urn:microsoft.com/office/officeart/2005/8/layout/hierarchy6"/>
-    <dgm:cxn modelId="{420784FE-7DA6-4920-A0DA-B993152B0C0D}" srcId="{936808E1-78FF-415A-8C6D-B8D366E7E94B}" destId="{DD123432-B415-4B22-814C-D6B426117991}" srcOrd="0" destOrd="0" parTransId="{BFFCE8B3-4141-4F92-BE7A-A1EAF853840D}" sibTransId="{0726F1BA-C470-42B0-9598-FCC87F422C27}"/>
-    <dgm:cxn modelId="{22CF2E35-F00E-4A57-82FB-DA0CABD3360F}" type="presOf" srcId="{1153B68D-8017-4FD2-B763-2BE2FFBFC9C4}" destId="{F6D58E2E-40CE-4F2C-8885-5BDDD1172BE8}" srcOrd="0" destOrd="0" presId="urn:microsoft.com/office/officeart/2005/8/layout/hierarchy6"/>
-    <dgm:cxn modelId="{7482EA66-784D-48EF-A58A-5A9B877A23F1}" type="presOf" srcId="{F1C739AF-6551-4FE4-9091-30A25A3579C1}" destId="{ECACF06E-0D77-42BB-B120-CAE787F5BE8E}" srcOrd="0" destOrd="0" presId="urn:microsoft.com/office/officeart/2005/8/layout/hierarchy6"/>
-    <dgm:cxn modelId="{9DD7FAD5-F49C-4B8B-A49A-58E711DCA903}" type="presOf" srcId="{3380550B-F545-409E-8728-3E2080D1DE8E}" destId="{5962983C-0FD2-4E96-8C1C-E39F1E4C568F}" srcOrd="0" destOrd="0" presId="urn:microsoft.com/office/officeart/2005/8/layout/hierarchy6"/>
-    <dgm:cxn modelId="{7BE8DFC3-CFB9-4598-9973-8AAB8C0E76B7}" type="presOf" srcId="{971CF5ED-AFF3-482E-A74A-0BF989CA19A9}" destId="{857F7289-7B4E-4003-AC3D-69AFF400B1F1}" srcOrd="0" destOrd="0" presId="urn:microsoft.com/office/officeart/2005/8/layout/hierarchy6"/>
-    <dgm:cxn modelId="{A932358F-721F-47ED-B8E1-0CE7D336A7A7}" type="presOf" srcId="{4895BF14-2446-4B8C-B1A9-9780BC55D8B3}" destId="{E257627A-BB36-4F01-A617-C92E4B946BE3}" srcOrd="0" destOrd="0" presId="urn:microsoft.com/office/officeart/2005/8/layout/hierarchy6"/>
-    <dgm:cxn modelId="{D14D06FD-C82E-4CCB-9A47-153F8CB5D937}" type="presOf" srcId="{BFFCE8B3-4141-4F92-BE7A-A1EAF853840D}" destId="{30DEC963-A63E-4CF4-8BC8-BCCC54B50307}" srcOrd="0" destOrd="0" presId="urn:microsoft.com/office/officeart/2005/8/layout/hierarchy6"/>
-    <dgm:cxn modelId="{E229B6AD-E60D-4C66-857E-C2034F959486}" type="presOf" srcId="{2E82ED61-2C38-4B5F-BBA6-C193A1299B2B}" destId="{712470A4-8189-46E3-8952-B9DFA4D0FD5B}" srcOrd="0" destOrd="0" presId="urn:microsoft.com/office/officeart/2005/8/layout/hierarchy6"/>
-    <dgm:cxn modelId="{1644F148-8C25-483D-8E8C-CEFF92406E02}" srcId="{62461A88-BE74-49D3-AC7E-AEE5A612166B}" destId="{936808E1-78FF-415A-8C6D-B8D366E7E94B}" srcOrd="0" destOrd="0" parTransId="{7A7E8FDD-A9C0-4725-BC34-3F5C43CB3CF9}" sibTransId="{41C6E207-932A-446C-BED6-6532EF373271}"/>
-    <dgm:cxn modelId="{C3FF5911-6747-4743-AE6C-863F32F5B0E2}" srcId="{174B66DE-A4C5-4262-B9FF-3DB70DD760B4}" destId="{59ECBF1E-327F-4C3E-A1AC-C8ADD56A60A6}" srcOrd="0" destOrd="0" parTransId="{4C2075A7-8E8D-4212-AEF2-FA2BFC036D54}" sibTransId="{AD56F4E0-33B2-4CFD-B0FE-7E9084C10718}"/>
-    <dgm:cxn modelId="{7B0AAED2-3450-4FB9-9CBB-2209712C7CD9}" type="presOf" srcId="{E48153EC-E2FA-408B-8E7C-22B22D651AAD}" destId="{85CDC8C9-66F5-477F-8620-D18C62C05FD8}" srcOrd="0" destOrd="0" presId="urn:microsoft.com/office/officeart/2005/8/layout/hierarchy6"/>
-    <dgm:cxn modelId="{2B6DE801-D737-4C50-A815-E41BDA356FD0}" srcId="{174B66DE-A4C5-4262-B9FF-3DB70DD760B4}" destId="{C7CF69AB-CFAF-42DF-807F-2486B4A2B61E}" srcOrd="1" destOrd="0" parTransId="{DFCC83F9-0185-4FAC-9C8B-DC9E59A90181}" sibTransId="{F11F8D29-D862-41A4-A441-237B83759010}"/>
-    <dgm:cxn modelId="{03E410BF-18FA-49A6-8E94-6DFC92388C18}" type="presOf" srcId="{62461A88-BE74-49D3-AC7E-AEE5A612166B}" destId="{7FFE00B5-FB63-4647-B86D-7F6898C2ABAF}" srcOrd="0" destOrd="0" presId="urn:microsoft.com/office/officeart/2005/8/layout/hierarchy6"/>
-    <dgm:cxn modelId="{7ADCB353-3418-49AF-AEAA-730E1AA8024A}" type="presOf" srcId="{49000756-D061-4D71-8CA0-31F9974ECF1A}" destId="{F1F1265C-A072-48C6-85E4-0B0E9EEBF7A9}" srcOrd="0" destOrd="0" presId="urn:microsoft.com/office/officeart/2005/8/layout/hierarchy6"/>
-    <dgm:cxn modelId="{3FE7DF85-7176-45EC-8F0C-A4317BD0714D}" type="presOf" srcId="{690B4BB5-43DB-4342-B5A4-23B9AC7FC042}" destId="{A89A8AFA-C3FB-40F4-A8F8-026146D78588}" srcOrd="0" destOrd="0" presId="urn:microsoft.com/office/officeart/2005/8/layout/hierarchy6"/>
-    <dgm:cxn modelId="{835EE9B5-B185-4B8D-909B-865A90D9D03B}" srcId="{49000756-D061-4D71-8CA0-31F9974ECF1A}" destId="{35AF10B0-5D0C-488A-8DA7-F73BE8FC5D85}" srcOrd="0" destOrd="0" parTransId="{5148951C-C1B0-434D-90F2-1F2128DF3563}" sibTransId="{C862EED3-BF96-43F1-8671-B3A05E19D8F0}"/>
-    <dgm:cxn modelId="{13E1E6C9-782D-4B5A-93B5-C0CF2AAE1EF3}" type="presOf" srcId="{936808E1-78FF-415A-8C6D-B8D366E7E94B}" destId="{D0C888DE-0CAA-4426-B613-BB51F6DAA8DF}" srcOrd="0" destOrd="0" presId="urn:microsoft.com/office/officeart/2005/8/layout/hierarchy6"/>
-    <dgm:cxn modelId="{91491415-3C28-4151-9272-716089DA1524}" type="presOf" srcId="{EA7FE5AF-FF75-442B-B746-865641E95FAD}" destId="{55BDA48D-D577-402D-B265-2D98DC9968AF}" srcOrd="0" destOrd="0" presId="urn:microsoft.com/office/officeart/2005/8/layout/hierarchy6"/>
-    <dgm:cxn modelId="{2BC76922-BACF-4B39-9A5A-6652060A7CFC}" type="presOf" srcId="{C7CF69AB-CFAF-42DF-807F-2486B4A2B61E}" destId="{1D6A2535-EE4C-47C7-BB0B-B5758CDDC053}" srcOrd="0" destOrd="0" presId="urn:microsoft.com/office/officeart/2005/8/layout/hierarchy6"/>
-    <dgm:cxn modelId="{00344D45-D33F-4371-8639-FEC63EAF7505}" type="presOf" srcId="{59ECBF1E-327F-4C3E-A1AC-C8ADD56A60A6}" destId="{43337737-EF2B-4E98-84B4-D16409A4EA80}" srcOrd="0" destOrd="0" presId="urn:microsoft.com/office/officeart/2005/8/layout/hierarchy6"/>
-    <dgm:cxn modelId="{F6FE52B9-5E83-4752-93FE-F01D16574890}" srcId="{3152CBFA-D90F-4370-98D8-CBB96716A74F}" destId="{A0836253-59AD-4823-969B-C27091CC6D31}" srcOrd="0" destOrd="0" parTransId="{0C638C6E-8B89-484E-99A7-0F0008F44C1B}" sibTransId="{C52AF91B-87E7-4CFB-A4B1-9C351C99B152}"/>
-    <dgm:cxn modelId="{D593B8FC-BE41-47B1-A178-A5B641C03169}" type="presOf" srcId="{B5616882-C45F-4116-A8B7-E0FF2BC78404}" destId="{5E06239B-1E51-4EB4-BAEB-09F5EF1F334C}" srcOrd="0" destOrd="0" presId="urn:microsoft.com/office/officeart/2005/8/layout/hierarchy6"/>
-    <dgm:cxn modelId="{F8D94765-8E0D-4D47-A5DD-1F48CBDDEA29}" type="presOf" srcId="{7A7E8FDD-A9C0-4725-BC34-3F5C43CB3CF9}" destId="{3ED92A81-5FF7-4BBB-AE0A-29442DBAFA8B}" srcOrd="0" destOrd="0" presId="urn:microsoft.com/office/officeart/2005/8/layout/hierarchy6"/>
     <dgm:cxn modelId="{0A06234C-3240-4F9B-9F28-DC34D36A966B}" type="presOf" srcId="{5148951C-C1B0-434D-90F2-1F2128DF3563}" destId="{4051F676-1C76-472E-B793-42A16DDEB179}" srcOrd="0" destOrd="0" presId="urn:microsoft.com/office/officeart/2005/8/layout/hierarchy6"/>
-    <dgm:cxn modelId="{5B4B2E33-DBC3-495B-9AB8-2919CDFF8376}" srcId="{6F9C22BB-A951-4593-904B-133B05B88043}" destId="{F1C739AF-6551-4FE4-9091-30A25A3579C1}" srcOrd="1" destOrd="0" parTransId="{577A5865-3120-46AD-84D7-B481646DDA51}" sibTransId="{8D3704BA-B5FB-4734-9A57-BEEAB9C053D1}"/>
-    <dgm:cxn modelId="{61F41AFD-CDAC-4C09-8C4F-612F706B2167}" type="presOf" srcId="{CCF9276B-DD30-4A31-97E0-374BC2F33936}" destId="{41D334FC-DC88-4297-988A-B6A3A5BF7DD8}" srcOrd="0" destOrd="0" presId="urn:microsoft.com/office/officeart/2005/8/layout/hierarchy6"/>
-    <dgm:cxn modelId="{8DB3BC73-105F-4995-83F6-C303BFDD42DB}" type="presOf" srcId="{A0836253-59AD-4823-969B-C27091CC6D31}" destId="{288A98C4-8794-4D98-9D7E-6D757471075D}" srcOrd="0" destOrd="0" presId="urn:microsoft.com/office/officeart/2005/8/layout/hierarchy6"/>
-    <dgm:cxn modelId="{F5987033-F94E-4179-91EB-56E0B7E6DEFB}" type="presOf" srcId="{1565F46A-33E8-4FDB-836B-D3F88AA217D6}" destId="{8BE94AF5-9234-41C9-8505-87E9ECE3D97A}" srcOrd="0" destOrd="0" presId="urn:microsoft.com/office/officeart/2005/8/layout/hierarchy6"/>
-    <dgm:cxn modelId="{AB602225-58AD-450B-9A62-E9CB769391F3}" srcId="{2E82ED61-2C38-4B5F-BBA6-C193A1299B2B}" destId="{49000756-D061-4D71-8CA0-31F9974ECF1A}" srcOrd="0" destOrd="0" parTransId="{4029C3B0-0896-45B8-8180-9AF91F9BB120}" sibTransId="{AF8E81E6-DE3C-4549-975B-359FD53157DB}"/>
     <dgm:cxn modelId="{2410C736-99F3-4696-913C-ED9552E51816}" type="presParOf" srcId="{8BE94AF5-9234-41C9-8505-87E9ECE3D97A}" destId="{0B5EB589-F308-4085-A615-37DFB01BFF2B}" srcOrd="0" destOrd="0" presId="urn:microsoft.com/office/officeart/2005/8/layout/hierarchy6"/>
     <dgm:cxn modelId="{F4472480-CDE3-4B45-98B2-65319334AFD2}" type="presParOf" srcId="{0B5EB589-F308-4085-A615-37DFB01BFF2B}" destId="{9751861A-E76C-472D-9BF9-872A13EEDD3C}" srcOrd="0" destOrd="0" presId="urn:microsoft.com/office/officeart/2005/8/layout/hierarchy6"/>
     <dgm:cxn modelId="{1527D214-85CD-4469-8372-93516F105693}" type="presParOf" srcId="{9751861A-E76C-472D-9BF9-872A13EEDD3C}" destId="{53047A2B-5843-4B88-8160-4F56C0181CD5}" srcOrd="0" destOrd="0" presId="urn:microsoft.com/office/officeart/2005/8/layout/hierarchy6"/>
@@ -5811,510 +5811,6 @@
       <dsp:cNvGrpSpPr/>
     </dsp:nvGrpSpPr>
     <dsp:grpSpPr/>
-    <dsp:sp modelId="{49AE4FB7-DE33-441D-98DF-87A073531280}">
-      <dsp:nvSpPr>
-        <dsp:cNvPr id="0" name=""/>
-        <dsp:cNvSpPr/>
-      </dsp:nvSpPr>
-      <dsp:spPr>
-        <a:xfrm>
-          <a:off x="136355" y="224123"/>
-          <a:ext cx="2095980" cy="2095980"/>
-        </a:xfrm>
-        <a:prstGeom prst="ellipse">
-          <a:avLst/>
-        </a:prstGeom>
-        <a:solidFill>
-          <a:srgbClr val="1B325F"/>
-        </a:solidFill>
-        <a:ln w="25400" cap="flat" cmpd="sng" algn="ctr">
-          <a:solidFill>
-            <a:schemeClr val="lt1">
-              <a:hueOff val="0"/>
-              <a:satOff val="0"/>
-              <a:lumOff val="0"/>
-              <a:alphaOff val="0"/>
-            </a:schemeClr>
-          </a:solidFill>
-          <a:prstDash val="solid"/>
-        </a:ln>
-        <a:effectLst/>
-      </dsp:spPr>
-      <dsp:style>
-        <a:lnRef idx="2">
-          <a:scrgbClr r="0" g="0" b="0"/>
-        </a:lnRef>
-        <a:fillRef idx="1">
-          <a:scrgbClr r="0" g="0" b="0"/>
-        </a:fillRef>
-        <a:effectRef idx="0">
-          <a:scrgbClr r="0" g="0" b="0"/>
-        </a:effectRef>
-        <a:fontRef idx="minor">
-          <a:schemeClr val="lt1"/>
-        </a:fontRef>
-      </dsp:style>
-      <dsp:txBody>
-        <a:bodyPr spcFirstLastPara="0" vert="horz" wrap="square" lIns="31750" tIns="31750" rIns="31750" bIns="31750" numCol="1" spcCol="1270" anchor="ctr" anchorCtr="0">
-          <a:noAutofit/>
-        </a:bodyPr>
-        <a:lstStyle/>
-        <a:p>
-          <a:pPr lvl="0" algn="ctr" defTabSz="1111250">
-            <a:lnSpc>
-              <a:spcPct val="90000"/>
-            </a:lnSpc>
-            <a:spcBef>
-              <a:spcPct val="0"/>
-            </a:spcBef>
-            <a:spcAft>
-              <a:spcPct val="35000"/>
-            </a:spcAft>
-          </a:pPr>
-          <a:r>
-            <a:rPr lang="bg-BG" sz="2500" kern="1200" dirty="0" smtClean="0"/>
-            <a:t>граматика</a:t>
-          </a:r>
-        </a:p>
-      </dsp:txBody>
-      <dsp:txXfrm>
-        <a:off x="136355" y="224123"/>
-        <a:ext cx="2095980" cy="2095980"/>
-      </dsp:txXfrm>
-    </dsp:sp>
-    <dsp:sp modelId="{304946E5-8BED-4B93-84BE-58F9FAA59C58}">
-      <dsp:nvSpPr>
-        <dsp:cNvPr id="0" name=""/>
-        <dsp:cNvSpPr/>
-      </dsp:nvSpPr>
-      <dsp:spPr>
-        <a:xfrm>
-          <a:off x="1101788" y="2435892"/>
-          <a:ext cx="644165" cy="644165"/>
-        </a:xfrm>
-        <a:prstGeom prst="mathPlus">
-          <a:avLst/>
-        </a:prstGeom>
-        <a:solidFill>
-          <a:schemeClr val="accent1">
-            <a:tint val="60000"/>
-            <a:hueOff val="0"/>
-            <a:satOff val="0"/>
-            <a:lumOff val="0"/>
-            <a:alphaOff val="0"/>
-          </a:schemeClr>
-        </a:solidFill>
-        <a:ln>
-          <a:noFill/>
-        </a:ln>
-        <a:effectLst/>
-      </dsp:spPr>
-      <dsp:style>
-        <a:lnRef idx="0">
-          <a:scrgbClr r="0" g="0" b="0"/>
-        </a:lnRef>
-        <a:fillRef idx="1">
-          <a:scrgbClr r="0" g="0" b="0"/>
-        </a:fillRef>
-        <a:effectRef idx="0">
-          <a:scrgbClr r="0" g="0" b="0"/>
-        </a:effectRef>
-        <a:fontRef idx="minor">
-          <a:schemeClr val="lt1"/>
-        </a:fontRef>
-      </dsp:style>
-      <dsp:txBody>
-        <a:bodyPr spcFirstLastPara="0" vert="horz" wrap="square" lIns="0" tIns="0" rIns="0" bIns="0" numCol="1" spcCol="1270" anchor="ctr" anchorCtr="0">
-          <a:noAutofit/>
-        </a:bodyPr>
-        <a:lstStyle/>
-        <a:p>
-          <a:pPr lvl="0" algn="ctr" defTabSz="444500">
-            <a:lnSpc>
-              <a:spcPct val="90000"/>
-            </a:lnSpc>
-            <a:spcBef>
-              <a:spcPct val="0"/>
-            </a:spcBef>
-            <a:spcAft>
-              <a:spcPct val="35000"/>
-            </a:spcAft>
-          </a:pPr>
-          <a:endParaRPr lang="en-US" sz="1000" kern="1200"/>
-        </a:p>
-      </dsp:txBody>
-      <dsp:txXfrm>
-        <a:off x="1101788" y="2435892"/>
-        <a:ext cx="644165" cy="644165"/>
-      </dsp:txXfrm>
-    </dsp:sp>
-    <dsp:sp modelId="{F4BD5001-98BC-4CAF-A4B4-FE38A3578189}">
-      <dsp:nvSpPr>
-        <dsp:cNvPr id="0" name=""/>
-        <dsp:cNvSpPr/>
-      </dsp:nvSpPr>
-      <dsp:spPr>
-        <a:xfrm>
-          <a:off x="1345492" y="3129742"/>
-          <a:ext cx="749375" cy="749375"/>
-        </a:xfrm>
-        <a:prstGeom prst="ellipse">
-          <a:avLst/>
-        </a:prstGeom>
-        <a:solidFill>
-          <a:srgbClr val="3A89C9"/>
-        </a:solidFill>
-        <a:ln w="25400" cap="flat" cmpd="sng" algn="ctr">
-          <a:solidFill>
-            <a:schemeClr val="lt1">
-              <a:hueOff val="0"/>
-              <a:satOff val="0"/>
-              <a:lumOff val="0"/>
-              <a:alphaOff val="0"/>
-            </a:schemeClr>
-          </a:solidFill>
-          <a:prstDash val="solid"/>
-        </a:ln>
-        <a:effectLst/>
-      </dsp:spPr>
-      <dsp:style>
-        <a:lnRef idx="2">
-          <a:scrgbClr r="0" g="0" b="0"/>
-        </a:lnRef>
-        <a:fillRef idx="1">
-          <a:scrgbClr r="0" g="0" b="0"/>
-        </a:fillRef>
-        <a:effectRef idx="0">
-          <a:scrgbClr r="0" g="0" b="0"/>
-        </a:effectRef>
-        <a:fontRef idx="minor">
-          <a:schemeClr val="lt1"/>
-        </a:fontRef>
-      </dsp:style>
-      <dsp:txBody>
-        <a:bodyPr spcFirstLastPara="0" vert="horz" wrap="square" lIns="17780" tIns="17780" rIns="17780" bIns="17780" numCol="1" spcCol="1270" anchor="ctr" anchorCtr="0">
-          <a:noAutofit/>
-        </a:bodyPr>
-        <a:lstStyle/>
-        <a:p>
-          <a:pPr lvl="0" algn="ctr" defTabSz="622300">
-            <a:lnSpc>
-              <a:spcPct val="90000"/>
-            </a:lnSpc>
-            <a:spcBef>
-              <a:spcPct val="0"/>
-            </a:spcBef>
-            <a:spcAft>
-              <a:spcPct val="35000"/>
-            </a:spcAft>
-          </a:pPr>
-          <a:r>
-            <a:rPr lang="bg-BG" sz="1400" kern="1200" dirty="0" smtClean="0"/>
-            <a:t>екшън</a:t>
-          </a:r>
-          <a:endParaRPr lang="en-US" sz="1400" kern="1200" dirty="0"/>
-        </a:p>
-      </dsp:txBody>
-      <dsp:txXfrm>
-        <a:off x="1345492" y="3129742"/>
-        <a:ext cx="749375" cy="749375"/>
-      </dsp:txXfrm>
-    </dsp:sp>
-    <dsp:sp modelId="{03D53D0F-AAE4-48D7-91CE-E77947BCC36C}">
-      <dsp:nvSpPr>
-        <dsp:cNvPr id="0" name=""/>
-        <dsp:cNvSpPr/>
-      </dsp:nvSpPr>
-      <dsp:spPr>
-        <a:xfrm>
-          <a:off x="2111028" y="3777728"/>
-          <a:ext cx="644165" cy="644165"/>
-        </a:xfrm>
-        <a:prstGeom prst="mathPlus">
-          <a:avLst/>
-        </a:prstGeom>
-        <a:solidFill>
-          <a:schemeClr val="accent1">
-            <a:tint val="60000"/>
-            <a:hueOff val="0"/>
-            <a:satOff val="0"/>
-            <a:lumOff val="0"/>
-            <a:alphaOff val="0"/>
-          </a:schemeClr>
-        </a:solidFill>
-        <a:ln>
-          <a:noFill/>
-        </a:ln>
-        <a:effectLst/>
-      </dsp:spPr>
-      <dsp:style>
-        <a:lnRef idx="0">
-          <a:scrgbClr r="0" g="0" b="0"/>
-        </a:lnRef>
-        <a:fillRef idx="1">
-          <a:scrgbClr r="0" g="0" b="0"/>
-        </a:fillRef>
-        <a:effectRef idx="0">
-          <a:scrgbClr r="0" g="0" b="0"/>
-        </a:effectRef>
-        <a:fontRef idx="minor">
-          <a:schemeClr val="lt1"/>
-        </a:fontRef>
-      </dsp:style>
-      <dsp:txBody>
-        <a:bodyPr spcFirstLastPara="0" vert="horz" wrap="square" lIns="0" tIns="0" rIns="0" bIns="0" numCol="1" spcCol="1270" anchor="ctr" anchorCtr="0">
-          <a:noAutofit/>
-        </a:bodyPr>
-        <a:lstStyle/>
-        <a:p>
-          <a:pPr lvl="0" algn="ctr" defTabSz="444500">
-            <a:lnSpc>
-              <a:spcPct val="90000"/>
-            </a:lnSpc>
-            <a:spcBef>
-              <a:spcPct val="0"/>
-            </a:spcBef>
-            <a:spcAft>
-              <a:spcPct val="35000"/>
-            </a:spcAft>
-          </a:pPr>
-          <a:endParaRPr lang="en-US" sz="1000" kern="1200"/>
-        </a:p>
-      </dsp:txBody>
-      <dsp:txXfrm>
-        <a:off x="2111028" y="3777728"/>
-        <a:ext cx="644165" cy="644165"/>
-      </dsp:txXfrm>
-    </dsp:sp>
-    <dsp:sp modelId="{28ED2C84-C598-48FF-B846-8BE54247FCC0}">
-      <dsp:nvSpPr>
-        <dsp:cNvPr id="0" name=""/>
-        <dsp:cNvSpPr/>
-      </dsp:nvSpPr>
-      <dsp:spPr>
-        <a:xfrm>
-          <a:off x="2156802" y="4345426"/>
-          <a:ext cx="1523695" cy="1523695"/>
-        </a:xfrm>
-        <a:prstGeom prst="ellipse">
-          <a:avLst/>
-        </a:prstGeom>
-        <a:solidFill>
-          <a:srgbClr val="9CC4E4"/>
-        </a:solidFill>
-        <a:ln w="25400" cap="flat" cmpd="sng" algn="ctr">
-          <a:solidFill>
-            <a:schemeClr val="lt1">
-              <a:hueOff val="0"/>
-              <a:satOff val="0"/>
-              <a:lumOff val="0"/>
-              <a:alphaOff val="0"/>
-            </a:schemeClr>
-          </a:solidFill>
-          <a:prstDash val="solid"/>
-        </a:ln>
-        <a:effectLst/>
-      </dsp:spPr>
-      <dsp:style>
-        <a:lnRef idx="2">
-          <a:scrgbClr r="0" g="0" b="0"/>
-        </a:lnRef>
-        <a:fillRef idx="1">
-          <a:scrgbClr r="0" g="0" b="0"/>
-        </a:fillRef>
-        <a:effectRef idx="0">
-          <a:scrgbClr r="0" g="0" b="0"/>
-        </a:effectRef>
-        <a:fontRef idx="minor">
-          <a:schemeClr val="lt1"/>
-        </a:fontRef>
-      </dsp:style>
-      <dsp:txBody>
-        <a:bodyPr spcFirstLastPara="0" vert="horz" wrap="square" lIns="31750" tIns="31750" rIns="31750" bIns="31750" numCol="1" spcCol="1270" anchor="ctr" anchorCtr="0">
-          <a:noAutofit/>
-        </a:bodyPr>
-        <a:lstStyle/>
-        <a:p>
-          <a:pPr lvl="0" algn="ctr" defTabSz="1111250">
-            <a:lnSpc>
-              <a:spcPct val="90000"/>
-            </a:lnSpc>
-            <a:spcBef>
-              <a:spcPct val="0"/>
-            </a:spcBef>
-            <a:spcAft>
-              <a:spcPct val="35000"/>
-            </a:spcAft>
-          </a:pPr>
-          <a:r>
-            <a:rPr lang="bg-BG" sz="2500" kern="1200" dirty="0" smtClean="0">
-              <a:solidFill>
-                <a:srgbClr val="1B325F"/>
-              </a:solidFill>
-            </a:rPr>
-            <a:t>код</a:t>
-          </a:r>
-          <a:endParaRPr lang="en-US" sz="2500" kern="1200" dirty="0">
-            <a:solidFill>
-              <a:srgbClr val="1B325F"/>
-            </a:solidFill>
-          </a:endParaRPr>
-        </a:p>
-      </dsp:txBody>
-      <dsp:txXfrm>
-        <a:off x="2156802" y="4345426"/>
-        <a:ext cx="1523695" cy="1523695"/>
-      </dsp:txXfrm>
-    </dsp:sp>
-    <dsp:sp modelId="{556515D3-80A7-4A95-AE4C-7BCC53831641}">
-      <dsp:nvSpPr>
-        <dsp:cNvPr id="0" name=""/>
-        <dsp:cNvSpPr/>
-      </dsp:nvSpPr>
-      <dsp:spPr>
-        <a:xfrm rot="18792803">
-          <a:off x="3719022" y="3968090"/>
-          <a:ext cx="1210803" cy="413154"/>
-        </a:xfrm>
-        <a:prstGeom prst="rightArrow">
-          <a:avLst>
-            <a:gd name="adj1" fmla="val 60000"/>
-            <a:gd name="adj2" fmla="val 50000"/>
-          </a:avLst>
-        </a:prstGeom>
-        <a:solidFill>
-          <a:schemeClr val="accent1">
-            <a:tint val="60000"/>
-            <a:hueOff val="0"/>
-            <a:satOff val="0"/>
-            <a:lumOff val="0"/>
-            <a:alphaOff val="0"/>
-          </a:schemeClr>
-        </a:solidFill>
-        <a:ln>
-          <a:noFill/>
-        </a:ln>
-        <a:effectLst/>
-      </dsp:spPr>
-      <dsp:style>
-        <a:lnRef idx="0">
-          <a:scrgbClr r="0" g="0" b="0"/>
-        </a:lnRef>
-        <a:fillRef idx="1">
-          <a:scrgbClr r="0" g="0" b="0"/>
-        </a:fillRef>
-        <a:effectRef idx="0">
-          <a:scrgbClr r="0" g="0" b="0"/>
-        </a:effectRef>
-        <a:fontRef idx="minor">
-          <a:schemeClr val="lt1"/>
-        </a:fontRef>
-      </dsp:style>
-      <dsp:txBody>
-        <a:bodyPr spcFirstLastPara="0" vert="horz" wrap="square" lIns="0" tIns="0" rIns="0" bIns="0" numCol="1" spcCol="1270" anchor="ctr" anchorCtr="0">
-          <a:noAutofit/>
-        </a:bodyPr>
-        <a:lstStyle/>
-        <a:p>
-          <a:pPr lvl="0" algn="ctr" defTabSz="488950">
-            <a:lnSpc>
-              <a:spcPct val="90000"/>
-            </a:lnSpc>
-            <a:spcBef>
-              <a:spcPct val="0"/>
-            </a:spcBef>
-            <a:spcAft>
-              <a:spcPct val="35000"/>
-            </a:spcAft>
-          </a:pPr>
-          <a:endParaRPr lang="en-US" sz="1100" kern="1200"/>
-        </a:p>
-      </dsp:txBody>
-      <dsp:txXfrm rot="18792803">
-        <a:off x="3719022" y="3968090"/>
-        <a:ext cx="1210803" cy="413154"/>
-      </dsp:txXfrm>
-    </dsp:sp>
-    <dsp:sp modelId="{40E2E155-CB0B-48BC-8111-00B0B3FEBA0E}">
-      <dsp:nvSpPr>
-        <dsp:cNvPr id="0" name=""/>
-        <dsp:cNvSpPr/>
-      </dsp:nvSpPr>
-      <dsp:spPr>
-        <a:xfrm>
-          <a:off x="4712971" y="278339"/>
-          <a:ext cx="3737025" cy="3737025"/>
-        </a:xfrm>
-        <a:prstGeom prst="ellipse">
-          <a:avLst/>
-        </a:prstGeom>
-        <a:solidFill>
-          <a:srgbClr val="F26C4F"/>
-        </a:solidFill>
-        <a:ln w="25400" cap="flat" cmpd="sng" algn="ctr">
-          <a:solidFill>
-            <a:schemeClr val="lt1">
-              <a:hueOff val="0"/>
-              <a:satOff val="0"/>
-              <a:lumOff val="0"/>
-              <a:alphaOff val="0"/>
-            </a:schemeClr>
-          </a:solidFill>
-          <a:prstDash val="solid"/>
-        </a:ln>
-        <a:effectLst/>
-      </dsp:spPr>
-      <dsp:style>
-        <a:lnRef idx="2">
-          <a:scrgbClr r="0" g="0" b="0"/>
-        </a:lnRef>
-        <a:fillRef idx="1">
-          <a:scrgbClr r="0" g="0" b="0"/>
-        </a:fillRef>
-        <a:effectRef idx="0">
-          <a:scrgbClr r="0" g="0" b="0"/>
-        </a:effectRef>
-        <a:fontRef idx="minor">
-          <a:schemeClr val="lt1"/>
-        </a:fontRef>
-      </dsp:style>
-      <dsp:txBody>
-        <a:bodyPr spcFirstLastPara="0" vert="horz" wrap="square" lIns="82550" tIns="82550" rIns="82550" bIns="82550" numCol="1" spcCol="1270" anchor="ctr" anchorCtr="0">
-          <a:noAutofit/>
-        </a:bodyPr>
-        <a:lstStyle/>
-        <a:p>
-          <a:pPr lvl="0" algn="ctr" defTabSz="2889250">
-            <a:lnSpc>
-              <a:spcPct val="90000"/>
-            </a:lnSpc>
-            <a:spcBef>
-              <a:spcPct val="0"/>
-            </a:spcBef>
-            <a:spcAft>
-              <a:spcPct val="35000"/>
-            </a:spcAft>
-          </a:pPr>
-          <a:r>
-            <a:rPr lang="bg-BG" sz="6500" kern="1200" dirty="0" smtClean="0">
-              <a:solidFill>
-                <a:srgbClr val="E9F2F9"/>
-              </a:solidFill>
-            </a:rPr>
-            <a:t>плъгин</a:t>
-          </a:r>
-          <a:endParaRPr lang="en-US" sz="6500" kern="1200" dirty="0">
-            <a:solidFill>
-              <a:srgbClr val="E9F2F9"/>
-            </a:solidFill>
-          </a:endParaRPr>
-        </a:p>
-      </dsp:txBody>
-      <dsp:txXfrm>
-        <a:off x="4712971" y="278339"/>
-        <a:ext cx="3737025" cy="3737025"/>
-      </dsp:txXfrm>
-    </dsp:sp>
   </dsp:spTree>
 </dsp:drawing>
 </file>
@@ -9246,7 +8742,7 @@
             <a:fld id="{0E0FD8BF-4915-47C0-982D-E1A4592E6198}" type="datetimeFigureOut">
               <a:rPr lang="en-US" smtClean="0"/>
               <a:pPr/>
-              <a:t>2/26/2012</a:t>
+              <a:t>2/27/2012</a:t>
             </a:fld>
             <a:endParaRPr lang="en-US"/>
           </a:p>
@@ -9858,7 +9354,7 @@
             <a:fld id="{3A0C61A8-A647-4A83-B149-729257AFD983}" type="datetimeFigureOut">
               <a:rPr lang="en-US" smtClean="0"/>
               <a:pPr/>
-              <a:t>2/26/2012</a:t>
+              <a:t>2/27/2012</a:t>
             </a:fld>
             <a:endParaRPr lang="en-US"/>
           </a:p>
@@ -10025,7 +9521,7 @@
             <a:fld id="{3A0C61A8-A647-4A83-B149-729257AFD983}" type="datetimeFigureOut">
               <a:rPr lang="en-US" smtClean="0"/>
               <a:pPr/>
-              <a:t>2/26/2012</a:t>
+              <a:t>2/27/2012</a:t>
             </a:fld>
             <a:endParaRPr lang="en-US"/>
           </a:p>
@@ -10202,7 +9698,7 @@
             <a:fld id="{3A0C61A8-A647-4A83-B149-729257AFD983}" type="datetimeFigureOut">
               <a:rPr lang="en-US" smtClean="0"/>
               <a:pPr/>
-              <a:t>2/26/2012</a:t>
+              <a:t>2/27/2012</a:t>
             </a:fld>
             <a:endParaRPr lang="en-US"/>
           </a:p>
@@ -10369,7 +9865,7 @@
             <a:fld id="{3A0C61A8-A647-4A83-B149-729257AFD983}" type="datetimeFigureOut">
               <a:rPr lang="en-US" smtClean="0"/>
               <a:pPr/>
-              <a:t>2/26/2012</a:t>
+              <a:t>2/27/2012</a:t>
             </a:fld>
             <a:endParaRPr lang="en-US"/>
           </a:p>
@@ -10612,7 +10108,7 @@
             <a:fld id="{3A0C61A8-A647-4A83-B149-729257AFD983}" type="datetimeFigureOut">
               <a:rPr lang="en-US" smtClean="0"/>
               <a:pPr/>
-              <a:t>2/26/2012</a:t>
+              <a:t>2/27/2012</a:t>
             </a:fld>
             <a:endParaRPr lang="en-US"/>
           </a:p>
@@ -10897,7 +10393,7 @@
             <a:fld id="{3A0C61A8-A647-4A83-B149-729257AFD983}" type="datetimeFigureOut">
               <a:rPr lang="en-US" smtClean="0"/>
               <a:pPr/>
-              <a:t>2/26/2012</a:t>
+              <a:t>2/27/2012</a:t>
             </a:fld>
             <a:endParaRPr lang="en-US"/>
           </a:p>
@@ -11316,7 +10812,7 @@
             <a:fld id="{3A0C61A8-A647-4A83-B149-729257AFD983}" type="datetimeFigureOut">
               <a:rPr lang="en-US" smtClean="0"/>
               <a:pPr/>
-              <a:t>2/26/2012</a:t>
+              <a:t>2/27/2012</a:t>
             </a:fld>
             <a:endParaRPr lang="en-US"/>
           </a:p>
@@ -11431,7 +10927,7 @@
             <a:fld id="{3A0C61A8-A647-4A83-B149-729257AFD983}" type="datetimeFigureOut">
               <a:rPr lang="en-US" smtClean="0"/>
               <a:pPr/>
-              <a:t>2/26/2012</a:t>
+              <a:t>2/27/2012</a:t>
             </a:fld>
             <a:endParaRPr lang="en-US"/>
           </a:p>
@@ -11523,7 +11019,7 @@
             <a:fld id="{3A0C61A8-A647-4A83-B149-729257AFD983}" type="datetimeFigureOut">
               <a:rPr lang="en-US" smtClean="0"/>
               <a:pPr/>
-              <a:t>2/26/2012</a:t>
+              <a:t>2/27/2012</a:t>
             </a:fld>
             <a:endParaRPr lang="en-US"/>
           </a:p>
@@ -11797,7 +11293,7 @@
             <a:fld id="{3A0C61A8-A647-4A83-B149-729257AFD983}" type="datetimeFigureOut">
               <a:rPr lang="en-US" smtClean="0"/>
               <a:pPr/>
-              <a:t>2/26/2012</a:t>
+              <a:t>2/27/2012</a:t>
             </a:fld>
             <a:endParaRPr lang="en-US"/>
           </a:p>
@@ -12047,7 +11543,7 @@
             <a:fld id="{3A0C61A8-A647-4A83-B149-729257AFD983}" type="datetimeFigureOut">
               <a:rPr lang="en-US" smtClean="0"/>
               <a:pPr/>
-              <a:t>2/26/2012</a:t>
+              <a:t>2/27/2012</a:t>
             </a:fld>
             <a:endParaRPr lang="en-US"/>
           </a:p>
@@ -12257,7 +11753,7 @@
             <a:fld id="{3A0C61A8-A647-4A83-B149-729257AFD983}" type="datetimeFigureOut">
               <a:rPr lang="en-US" smtClean="0"/>
               <a:pPr/>
-              <a:t>2/26/2012</a:t>
+              <a:t>2/27/2012</a:t>
             </a:fld>
             <a:endParaRPr lang="en-US"/>
           </a:p>
@@ -12733,26 +12229,6 @@
           </a:p>
         </p:txBody>
       </p:sp>
-      <p:graphicFrame>
-        <p:nvGraphicFramePr>
-          <p:cNvPr id="1026" name="Object 2"/>
-          <p:cNvGraphicFramePr>
-            <a:graphicFrameLocks noChangeAspect="1"/>
-          </p:cNvGraphicFramePr>
-          <p:nvPr/>
-        </p:nvGraphicFramePr>
-        <p:xfrm>
-          <a:off x="639763" y="2247900"/>
-          <a:ext cx="4570412" cy="3427413"/>
-        </p:xfrm>
-        <a:graphic>
-          <a:graphicData uri="http://schemas.openxmlformats.org/presentationml/2006/ole">
-            <p:oleObj spid="_x0000_s1026" name="Presentation" r:id="rId3" imgW="4570603" imgH="3427427" progId="PowerPoint.Show.12">
-              <p:embed/>
-            </p:oleObj>
-          </a:graphicData>
-        </a:graphic>
-      </p:graphicFrame>
     </p:spTree>
   </p:cSld>
   <p:clrMapOvr>

</xml_diff>

<commit_message>
minor changes made; added Tasks Ico.txt
</commit_message>
<xml_diff>
--- a/Presentation/Presentation new style.pptx
+++ b/Presentation/Presentation new style.pptx
@@ -3385,8 +3385,8 @@
     <dgm:cxn modelId="{197980A2-F6C7-4436-86D0-A555692B4D62}" type="presOf" srcId="{7E09360A-0109-4556-ABBF-2F8710B5F41F}" destId="{304946E5-8BED-4B93-84BE-58F9FAA59C58}" srcOrd="0" destOrd="0" presId="urn:microsoft.com/office/officeart/2005/8/layout/equation2"/>
     <dgm:cxn modelId="{10957531-AB25-4F05-B184-02AA10877F27}" type="presOf" srcId="{78ECF61E-CBFF-4E50-BFF2-F222D05BE009}" destId="{F4BD5001-98BC-4CAF-A4B4-FE38A3578189}" srcOrd="0" destOrd="0" presId="urn:microsoft.com/office/officeart/2005/8/layout/equation2"/>
     <dgm:cxn modelId="{437A5A22-C988-43AA-B9A1-E6F9F242D529}" type="presOf" srcId="{581CEC73-21E6-4AB5-B834-EA2D52C29905}" destId="{03D53D0F-AAE4-48D7-91CE-E77947BCC36C}" srcOrd="0" destOrd="0" presId="urn:microsoft.com/office/officeart/2005/8/layout/equation2"/>
+    <dgm:cxn modelId="{F530B6AD-F734-4E73-A164-AEC08AF75352}" type="presOf" srcId="{C0CF3166-ED11-4259-921B-A4610FD18BF4}" destId="{02501D2C-622B-4345-9CB5-7188C1A5B2AF}" srcOrd="1" destOrd="0" presId="urn:microsoft.com/office/officeart/2005/8/layout/equation2"/>
     <dgm:cxn modelId="{7054B064-C515-4DF4-B969-C1B362A1B895}" srcId="{96F52D17-C89A-4D45-B6F6-8333BDBD40FA}" destId="{20CDA44D-C0C4-4723-B1DC-10A474BAF97E}" srcOrd="2" destOrd="0" parTransId="{60767CD1-0A42-472D-AA77-275399564B6A}" sibTransId="{C0CF3166-ED11-4259-921B-A4610FD18BF4}"/>
-    <dgm:cxn modelId="{F530B6AD-F734-4E73-A164-AEC08AF75352}" type="presOf" srcId="{C0CF3166-ED11-4259-921B-A4610FD18BF4}" destId="{02501D2C-622B-4345-9CB5-7188C1A5B2AF}" srcOrd="1" destOrd="0" presId="urn:microsoft.com/office/officeart/2005/8/layout/equation2"/>
     <dgm:cxn modelId="{FA43E27F-52F8-4E88-9409-A19C90D4B86F}" type="presOf" srcId="{56EED3BA-025F-4048-9561-952881CB8F9E}" destId="{40E2E155-CB0B-48BC-8111-00B0B3FEBA0E}" srcOrd="0" destOrd="0" presId="urn:microsoft.com/office/officeart/2005/8/layout/equation2"/>
     <dgm:cxn modelId="{B9E4C260-0816-4753-A4C2-4314846D4018}" srcId="{96F52D17-C89A-4D45-B6F6-8333BDBD40FA}" destId="{78ECF61E-CBFF-4E50-BFF2-F222D05BE009}" srcOrd="1" destOrd="0" parTransId="{CAC25EDC-63C0-47ED-BC98-477FDCB1E189}" sibTransId="{581CEC73-21E6-4AB5-B834-EA2D52C29905}"/>
     <dgm:cxn modelId="{5519AEC8-4ED5-4B86-9910-C0B8711D13BC}" type="presOf" srcId="{C0CF3166-ED11-4259-921B-A4610FD18BF4}" destId="{556515D3-80A7-4A95-AE4C-7BCC53831641}" srcOrd="0" destOrd="0" presId="urn:microsoft.com/office/officeart/2005/8/layout/equation2"/>
@@ -5811,6 +5811,510 @@
       <dsp:cNvGrpSpPr/>
     </dsp:nvGrpSpPr>
     <dsp:grpSpPr/>
+    <dsp:sp modelId="{49AE4FB7-DE33-441D-98DF-87A073531280}">
+      <dsp:nvSpPr>
+        <dsp:cNvPr id="0" name=""/>
+        <dsp:cNvSpPr/>
+      </dsp:nvSpPr>
+      <dsp:spPr>
+        <a:xfrm>
+          <a:off x="136355" y="224123"/>
+          <a:ext cx="2095980" cy="2095980"/>
+        </a:xfrm>
+        <a:prstGeom prst="ellipse">
+          <a:avLst/>
+        </a:prstGeom>
+        <a:solidFill>
+          <a:srgbClr val="1B325F"/>
+        </a:solidFill>
+        <a:ln w="25400" cap="flat" cmpd="sng" algn="ctr">
+          <a:solidFill>
+            <a:schemeClr val="lt1">
+              <a:hueOff val="0"/>
+              <a:satOff val="0"/>
+              <a:lumOff val="0"/>
+              <a:alphaOff val="0"/>
+            </a:schemeClr>
+          </a:solidFill>
+          <a:prstDash val="solid"/>
+        </a:ln>
+        <a:effectLst/>
+      </dsp:spPr>
+      <dsp:style>
+        <a:lnRef idx="2">
+          <a:scrgbClr r="0" g="0" b="0"/>
+        </a:lnRef>
+        <a:fillRef idx="1">
+          <a:scrgbClr r="0" g="0" b="0"/>
+        </a:fillRef>
+        <a:effectRef idx="0">
+          <a:scrgbClr r="0" g="0" b="0"/>
+        </a:effectRef>
+        <a:fontRef idx="minor">
+          <a:schemeClr val="lt1"/>
+        </a:fontRef>
+      </dsp:style>
+      <dsp:txBody>
+        <a:bodyPr spcFirstLastPara="0" vert="horz" wrap="square" lIns="31750" tIns="31750" rIns="31750" bIns="31750" numCol="1" spcCol="1270" anchor="ctr" anchorCtr="0">
+          <a:noAutofit/>
+        </a:bodyPr>
+        <a:lstStyle/>
+        <a:p>
+          <a:pPr lvl="0" algn="ctr" defTabSz="1111250">
+            <a:lnSpc>
+              <a:spcPct val="90000"/>
+            </a:lnSpc>
+            <a:spcBef>
+              <a:spcPct val="0"/>
+            </a:spcBef>
+            <a:spcAft>
+              <a:spcPct val="35000"/>
+            </a:spcAft>
+          </a:pPr>
+          <a:r>
+            <a:rPr lang="bg-BG" sz="2500" kern="1200" dirty="0" smtClean="0"/>
+            <a:t>граматика</a:t>
+          </a:r>
+        </a:p>
+      </dsp:txBody>
+      <dsp:txXfrm>
+        <a:off x="136355" y="224123"/>
+        <a:ext cx="2095980" cy="2095980"/>
+      </dsp:txXfrm>
+    </dsp:sp>
+    <dsp:sp modelId="{304946E5-8BED-4B93-84BE-58F9FAA59C58}">
+      <dsp:nvSpPr>
+        <dsp:cNvPr id="0" name=""/>
+        <dsp:cNvSpPr/>
+      </dsp:nvSpPr>
+      <dsp:spPr>
+        <a:xfrm>
+          <a:off x="1101788" y="2435892"/>
+          <a:ext cx="644165" cy="644165"/>
+        </a:xfrm>
+        <a:prstGeom prst="mathPlus">
+          <a:avLst/>
+        </a:prstGeom>
+        <a:solidFill>
+          <a:schemeClr val="accent1">
+            <a:tint val="60000"/>
+            <a:hueOff val="0"/>
+            <a:satOff val="0"/>
+            <a:lumOff val="0"/>
+            <a:alphaOff val="0"/>
+          </a:schemeClr>
+        </a:solidFill>
+        <a:ln>
+          <a:noFill/>
+        </a:ln>
+        <a:effectLst/>
+      </dsp:spPr>
+      <dsp:style>
+        <a:lnRef idx="0">
+          <a:scrgbClr r="0" g="0" b="0"/>
+        </a:lnRef>
+        <a:fillRef idx="1">
+          <a:scrgbClr r="0" g="0" b="0"/>
+        </a:fillRef>
+        <a:effectRef idx="0">
+          <a:scrgbClr r="0" g="0" b="0"/>
+        </a:effectRef>
+        <a:fontRef idx="minor">
+          <a:schemeClr val="lt1"/>
+        </a:fontRef>
+      </dsp:style>
+      <dsp:txBody>
+        <a:bodyPr spcFirstLastPara="0" vert="horz" wrap="square" lIns="0" tIns="0" rIns="0" bIns="0" numCol="1" spcCol="1270" anchor="ctr" anchorCtr="0">
+          <a:noAutofit/>
+        </a:bodyPr>
+        <a:lstStyle/>
+        <a:p>
+          <a:pPr lvl="0" algn="ctr" defTabSz="444500">
+            <a:lnSpc>
+              <a:spcPct val="90000"/>
+            </a:lnSpc>
+            <a:spcBef>
+              <a:spcPct val="0"/>
+            </a:spcBef>
+            <a:spcAft>
+              <a:spcPct val="35000"/>
+            </a:spcAft>
+          </a:pPr>
+          <a:endParaRPr lang="en-US" sz="1000" kern="1200"/>
+        </a:p>
+      </dsp:txBody>
+      <dsp:txXfrm>
+        <a:off x="1101788" y="2435892"/>
+        <a:ext cx="644165" cy="644165"/>
+      </dsp:txXfrm>
+    </dsp:sp>
+    <dsp:sp modelId="{F4BD5001-98BC-4CAF-A4B4-FE38A3578189}">
+      <dsp:nvSpPr>
+        <dsp:cNvPr id="0" name=""/>
+        <dsp:cNvSpPr/>
+      </dsp:nvSpPr>
+      <dsp:spPr>
+        <a:xfrm>
+          <a:off x="1345492" y="3129742"/>
+          <a:ext cx="749375" cy="749375"/>
+        </a:xfrm>
+        <a:prstGeom prst="ellipse">
+          <a:avLst/>
+        </a:prstGeom>
+        <a:solidFill>
+          <a:srgbClr val="3A89C9"/>
+        </a:solidFill>
+        <a:ln w="25400" cap="flat" cmpd="sng" algn="ctr">
+          <a:solidFill>
+            <a:schemeClr val="lt1">
+              <a:hueOff val="0"/>
+              <a:satOff val="0"/>
+              <a:lumOff val="0"/>
+              <a:alphaOff val="0"/>
+            </a:schemeClr>
+          </a:solidFill>
+          <a:prstDash val="solid"/>
+        </a:ln>
+        <a:effectLst/>
+      </dsp:spPr>
+      <dsp:style>
+        <a:lnRef idx="2">
+          <a:scrgbClr r="0" g="0" b="0"/>
+        </a:lnRef>
+        <a:fillRef idx="1">
+          <a:scrgbClr r="0" g="0" b="0"/>
+        </a:fillRef>
+        <a:effectRef idx="0">
+          <a:scrgbClr r="0" g="0" b="0"/>
+        </a:effectRef>
+        <a:fontRef idx="minor">
+          <a:schemeClr val="lt1"/>
+        </a:fontRef>
+      </dsp:style>
+      <dsp:txBody>
+        <a:bodyPr spcFirstLastPara="0" vert="horz" wrap="square" lIns="17780" tIns="17780" rIns="17780" bIns="17780" numCol="1" spcCol="1270" anchor="ctr" anchorCtr="0">
+          <a:noAutofit/>
+        </a:bodyPr>
+        <a:lstStyle/>
+        <a:p>
+          <a:pPr lvl="0" algn="ctr" defTabSz="622300">
+            <a:lnSpc>
+              <a:spcPct val="90000"/>
+            </a:lnSpc>
+            <a:spcBef>
+              <a:spcPct val="0"/>
+            </a:spcBef>
+            <a:spcAft>
+              <a:spcPct val="35000"/>
+            </a:spcAft>
+          </a:pPr>
+          <a:r>
+            <a:rPr lang="bg-BG" sz="1400" kern="1200" dirty="0" smtClean="0"/>
+            <a:t>екшън</a:t>
+          </a:r>
+          <a:endParaRPr lang="en-US" sz="1400" kern="1200" dirty="0"/>
+        </a:p>
+      </dsp:txBody>
+      <dsp:txXfrm>
+        <a:off x="1345492" y="3129742"/>
+        <a:ext cx="749375" cy="749375"/>
+      </dsp:txXfrm>
+    </dsp:sp>
+    <dsp:sp modelId="{03D53D0F-AAE4-48D7-91CE-E77947BCC36C}">
+      <dsp:nvSpPr>
+        <dsp:cNvPr id="0" name=""/>
+        <dsp:cNvSpPr/>
+      </dsp:nvSpPr>
+      <dsp:spPr>
+        <a:xfrm>
+          <a:off x="2111028" y="3777728"/>
+          <a:ext cx="644165" cy="644165"/>
+        </a:xfrm>
+        <a:prstGeom prst="mathPlus">
+          <a:avLst/>
+        </a:prstGeom>
+        <a:solidFill>
+          <a:schemeClr val="accent1">
+            <a:tint val="60000"/>
+            <a:hueOff val="0"/>
+            <a:satOff val="0"/>
+            <a:lumOff val="0"/>
+            <a:alphaOff val="0"/>
+          </a:schemeClr>
+        </a:solidFill>
+        <a:ln>
+          <a:noFill/>
+        </a:ln>
+        <a:effectLst/>
+      </dsp:spPr>
+      <dsp:style>
+        <a:lnRef idx="0">
+          <a:scrgbClr r="0" g="0" b="0"/>
+        </a:lnRef>
+        <a:fillRef idx="1">
+          <a:scrgbClr r="0" g="0" b="0"/>
+        </a:fillRef>
+        <a:effectRef idx="0">
+          <a:scrgbClr r="0" g="0" b="0"/>
+        </a:effectRef>
+        <a:fontRef idx="minor">
+          <a:schemeClr val="lt1"/>
+        </a:fontRef>
+      </dsp:style>
+      <dsp:txBody>
+        <a:bodyPr spcFirstLastPara="0" vert="horz" wrap="square" lIns="0" tIns="0" rIns="0" bIns="0" numCol="1" spcCol="1270" anchor="ctr" anchorCtr="0">
+          <a:noAutofit/>
+        </a:bodyPr>
+        <a:lstStyle/>
+        <a:p>
+          <a:pPr lvl="0" algn="ctr" defTabSz="444500">
+            <a:lnSpc>
+              <a:spcPct val="90000"/>
+            </a:lnSpc>
+            <a:spcBef>
+              <a:spcPct val="0"/>
+            </a:spcBef>
+            <a:spcAft>
+              <a:spcPct val="35000"/>
+            </a:spcAft>
+          </a:pPr>
+          <a:endParaRPr lang="en-US" sz="1000" kern="1200"/>
+        </a:p>
+      </dsp:txBody>
+      <dsp:txXfrm>
+        <a:off x="2111028" y="3777728"/>
+        <a:ext cx="644165" cy="644165"/>
+      </dsp:txXfrm>
+    </dsp:sp>
+    <dsp:sp modelId="{28ED2C84-C598-48FF-B846-8BE54247FCC0}">
+      <dsp:nvSpPr>
+        <dsp:cNvPr id="0" name=""/>
+        <dsp:cNvSpPr/>
+      </dsp:nvSpPr>
+      <dsp:spPr>
+        <a:xfrm>
+          <a:off x="2156802" y="4345426"/>
+          <a:ext cx="1523695" cy="1523695"/>
+        </a:xfrm>
+        <a:prstGeom prst="ellipse">
+          <a:avLst/>
+        </a:prstGeom>
+        <a:solidFill>
+          <a:srgbClr val="9CC4E4"/>
+        </a:solidFill>
+        <a:ln w="25400" cap="flat" cmpd="sng" algn="ctr">
+          <a:solidFill>
+            <a:schemeClr val="lt1">
+              <a:hueOff val="0"/>
+              <a:satOff val="0"/>
+              <a:lumOff val="0"/>
+              <a:alphaOff val="0"/>
+            </a:schemeClr>
+          </a:solidFill>
+          <a:prstDash val="solid"/>
+        </a:ln>
+        <a:effectLst/>
+      </dsp:spPr>
+      <dsp:style>
+        <a:lnRef idx="2">
+          <a:scrgbClr r="0" g="0" b="0"/>
+        </a:lnRef>
+        <a:fillRef idx="1">
+          <a:scrgbClr r="0" g="0" b="0"/>
+        </a:fillRef>
+        <a:effectRef idx="0">
+          <a:scrgbClr r="0" g="0" b="0"/>
+        </a:effectRef>
+        <a:fontRef idx="minor">
+          <a:schemeClr val="lt1"/>
+        </a:fontRef>
+      </dsp:style>
+      <dsp:txBody>
+        <a:bodyPr spcFirstLastPara="0" vert="horz" wrap="square" lIns="31750" tIns="31750" rIns="31750" bIns="31750" numCol="1" spcCol="1270" anchor="ctr" anchorCtr="0">
+          <a:noAutofit/>
+        </a:bodyPr>
+        <a:lstStyle/>
+        <a:p>
+          <a:pPr lvl="0" algn="ctr" defTabSz="1111250">
+            <a:lnSpc>
+              <a:spcPct val="90000"/>
+            </a:lnSpc>
+            <a:spcBef>
+              <a:spcPct val="0"/>
+            </a:spcBef>
+            <a:spcAft>
+              <a:spcPct val="35000"/>
+            </a:spcAft>
+          </a:pPr>
+          <a:r>
+            <a:rPr lang="bg-BG" sz="2500" kern="1200" dirty="0" smtClean="0">
+              <a:solidFill>
+                <a:srgbClr val="1B325F"/>
+              </a:solidFill>
+            </a:rPr>
+            <a:t>код</a:t>
+          </a:r>
+          <a:endParaRPr lang="en-US" sz="2500" kern="1200" dirty="0">
+            <a:solidFill>
+              <a:srgbClr val="1B325F"/>
+            </a:solidFill>
+          </a:endParaRPr>
+        </a:p>
+      </dsp:txBody>
+      <dsp:txXfrm>
+        <a:off x="2156802" y="4345426"/>
+        <a:ext cx="1523695" cy="1523695"/>
+      </dsp:txXfrm>
+    </dsp:sp>
+    <dsp:sp modelId="{556515D3-80A7-4A95-AE4C-7BCC53831641}">
+      <dsp:nvSpPr>
+        <dsp:cNvPr id="0" name=""/>
+        <dsp:cNvSpPr/>
+      </dsp:nvSpPr>
+      <dsp:spPr>
+        <a:xfrm rot="18792803">
+          <a:off x="3719022" y="3968090"/>
+          <a:ext cx="1210803" cy="413154"/>
+        </a:xfrm>
+        <a:prstGeom prst="rightArrow">
+          <a:avLst>
+            <a:gd name="adj1" fmla="val 60000"/>
+            <a:gd name="adj2" fmla="val 50000"/>
+          </a:avLst>
+        </a:prstGeom>
+        <a:solidFill>
+          <a:schemeClr val="accent1">
+            <a:tint val="60000"/>
+            <a:hueOff val="0"/>
+            <a:satOff val="0"/>
+            <a:lumOff val="0"/>
+            <a:alphaOff val="0"/>
+          </a:schemeClr>
+        </a:solidFill>
+        <a:ln>
+          <a:noFill/>
+        </a:ln>
+        <a:effectLst/>
+      </dsp:spPr>
+      <dsp:style>
+        <a:lnRef idx="0">
+          <a:scrgbClr r="0" g="0" b="0"/>
+        </a:lnRef>
+        <a:fillRef idx="1">
+          <a:scrgbClr r="0" g="0" b="0"/>
+        </a:fillRef>
+        <a:effectRef idx="0">
+          <a:scrgbClr r="0" g="0" b="0"/>
+        </a:effectRef>
+        <a:fontRef idx="minor">
+          <a:schemeClr val="lt1"/>
+        </a:fontRef>
+      </dsp:style>
+      <dsp:txBody>
+        <a:bodyPr spcFirstLastPara="0" vert="horz" wrap="square" lIns="0" tIns="0" rIns="0" bIns="0" numCol="1" spcCol="1270" anchor="ctr" anchorCtr="0">
+          <a:noAutofit/>
+        </a:bodyPr>
+        <a:lstStyle/>
+        <a:p>
+          <a:pPr lvl="0" algn="ctr" defTabSz="488950">
+            <a:lnSpc>
+              <a:spcPct val="90000"/>
+            </a:lnSpc>
+            <a:spcBef>
+              <a:spcPct val="0"/>
+            </a:spcBef>
+            <a:spcAft>
+              <a:spcPct val="35000"/>
+            </a:spcAft>
+          </a:pPr>
+          <a:endParaRPr lang="en-US" sz="1100" kern="1200"/>
+        </a:p>
+      </dsp:txBody>
+      <dsp:txXfrm rot="18792803">
+        <a:off x="3719022" y="3968090"/>
+        <a:ext cx="1210803" cy="413154"/>
+      </dsp:txXfrm>
+    </dsp:sp>
+    <dsp:sp modelId="{40E2E155-CB0B-48BC-8111-00B0B3FEBA0E}">
+      <dsp:nvSpPr>
+        <dsp:cNvPr id="0" name=""/>
+        <dsp:cNvSpPr/>
+      </dsp:nvSpPr>
+      <dsp:spPr>
+        <a:xfrm>
+          <a:off x="4712971" y="278339"/>
+          <a:ext cx="3737025" cy="3737025"/>
+        </a:xfrm>
+        <a:prstGeom prst="ellipse">
+          <a:avLst/>
+        </a:prstGeom>
+        <a:solidFill>
+          <a:srgbClr val="F26C4F"/>
+        </a:solidFill>
+        <a:ln w="25400" cap="flat" cmpd="sng" algn="ctr">
+          <a:solidFill>
+            <a:schemeClr val="lt1">
+              <a:hueOff val="0"/>
+              <a:satOff val="0"/>
+              <a:lumOff val="0"/>
+              <a:alphaOff val="0"/>
+            </a:schemeClr>
+          </a:solidFill>
+          <a:prstDash val="solid"/>
+        </a:ln>
+        <a:effectLst/>
+      </dsp:spPr>
+      <dsp:style>
+        <a:lnRef idx="2">
+          <a:scrgbClr r="0" g="0" b="0"/>
+        </a:lnRef>
+        <a:fillRef idx="1">
+          <a:scrgbClr r="0" g="0" b="0"/>
+        </a:fillRef>
+        <a:effectRef idx="0">
+          <a:scrgbClr r="0" g="0" b="0"/>
+        </a:effectRef>
+        <a:fontRef idx="minor">
+          <a:schemeClr val="lt1"/>
+        </a:fontRef>
+      </dsp:style>
+      <dsp:txBody>
+        <a:bodyPr spcFirstLastPara="0" vert="horz" wrap="square" lIns="82550" tIns="82550" rIns="82550" bIns="82550" numCol="1" spcCol="1270" anchor="ctr" anchorCtr="0">
+          <a:noAutofit/>
+        </a:bodyPr>
+        <a:lstStyle/>
+        <a:p>
+          <a:pPr lvl="0" algn="ctr" defTabSz="2889250">
+            <a:lnSpc>
+              <a:spcPct val="90000"/>
+            </a:lnSpc>
+            <a:spcBef>
+              <a:spcPct val="0"/>
+            </a:spcBef>
+            <a:spcAft>
+              <a:spcPct val="35000"/>
+            </a:spcAft>
+          </a:pPr>
+          <a:r>
+            <a:rPr lang="bg-BG" sz="6500" kern="1200" dirty="0" smtClean="0">
+              <a:solidFill>
+                <a:srgbClr val="E9F2F9"/>
+              </a:solidFill>
+            </a:rPr>
+            <a:t>плъгин</a:t>
+          </a:r>
+          <a:endParaRPr lang="en-US" sz="6500" kern="1200" dirty="0">
+            <a:solidFill>
+              <a:srgbClr val="E9F2F9"/>
+            </a:solidFill>
+          </a:endParaRPr>
+        </a:p>
+      </dsp:txBody>
+      <dsp:txXfrm>
+        <a:off x="4712971" y="278339"/>
+        <a:ext cx="3737025" cy="3737025"/>
+      </dsp:txXfrm>
+    </dsp:sp>
   </dsp:spTree>
 </dsp:drawing>
 </file>
@@ -8742,7 +9246,7 @@
             <a:fld id="{0E0FD8BF-4915-47C0-982D-E1A4592E6198}" type="datetimeFigureOut">
               <a:rPr lang="en-US" smtClean="0"/>
               <a:pPr/>
-              <a:t>2/27/2012</a:t>
+              <a:t>3/5/2012</a:t>
             </a:fld>
             <a:endParaRPr lang="en-US"/>
           </a:p>
@@ -8911,6 +9415,11 @@
         </p:txBody>
       </p:sp>
     </p:spTree>
+    <p:extLst>
+      <p:ext uri="{BB962C8B-B14F-4D97-AF65-F5344CB8AC3E}">
+        <p14:creationId xmlns="" xmlns:p14="http://schemas.microsoft.com/office/powerpoint/2010/main" val="1288045321"/>
+      </p:ext>
+    </p:extLst>
   </p:cSld>
   <p:clrMap bg1="lt1" tx1="dk1" bg2="lt2" tx2="dk2" accent1="accent1" accent2="accent2" accent3="accent3" accent4="accent4" accent5="accent5" accent6="accent6" hlink="hlink" folHlink="folHlink"/>
   <p:notesStyle>
@@ -9354,7 +9863,7 @@
             <a:fld id="{3A0C61A8-A647-4A83-B149-729257AFD983}" type="datetimeFigureOut">
               <a:rPr lang="en-US" smtClean="0"/>
               <a:pPr/>
-              <a:t>2/27/2012</a:t>
+              <a:t>3/5/2012</a:t>
             </a:fld>
             <a:endParaRPr lang="en-US"/>
           </a:p>
@@ -9521,7 +10030,7 @@
             <a:fld id="{3A0C61A8-A647-4A83-B149-729257AFD983}" type="datetimeFigureOut">
               <a:rPr lang="en-US" smtClean="0"/>
               <a:pPr/>
-              <a:t>2/27/2012</a:t>
+              <a:t>3/5/2012</a:t>
             </a:fld>
             <a:endParaRPr lang="en-US"/>
           </a:p>
@@ -9698,7 +10207,7 @@
             <a:fld id="{3A0C61A8-A647-4A83-B149-729257AFD983}" type="datetimeFigureOut">
               <a:rPr lang="en-US" smtClean="0"/>
               <a:pPr/>
-              <a:t>2/27/2012</a:t>
+              <a:t>3/5/2012</a:t>
             </a:fld>
             <a:endParaRPr lang="en-US"/>
           </a:p>
@@ -9865,7 +10374,7 @@
             <a:fld id="{3A0C61A8-A647-4A83-B149-729257AFD983}" type="datetimeFigureOut">
               <a:rPr lang="en-US" smtClean="0"/>
               <a:pPr/>
-              <a:t>2/27/2012</a:t>
+              <a:t>3/5/2012</a:t>
             </a:fld>
             <a:endParaRPr lang="en-US"/>
           </a:p>
@@ -10108,7 +10617,7 @@
             <a:fld id="{3A0C61A8-A647-4A83-B149-729257AFD983}" type="datetimeFigureOut">
               <a:rPr lang="en-US" smtClean="0"/>
               <a:pPr/>
-              <a:t>2/27/2012</a:t>
+              <a:t>3/5/2012</a:t>
             </a:fld>
             <a:endParaRPr lang="en-US"/>
           </a:p>
@@ -10393,7 +10902,7 @@
             <a:fld id="{3A0C61A8-A647-4A83-B149-729257AFD983}" type="datetimeFigureOut">
               <a:rPr lang="en-US" smtClean="0"/>
               <a:pPr/>
-              <a:t>2/27/2012</a:t>
+              <a:t>3/5/2012</a:t>
             </a:fld>
             <a:endParaRPr lang="en-US"/>
           </a:p>
@@ -10812,7 +11321,7 @@
             <a:fld id="{3A0C61A8-A647-4A83-B149-729257AFD983}" type="datetimeFigureOut">
               <a:rPr lang="en-US" smtClean="0"/>
               <a:pPr/>
-              <a:t>2/27/2012</a:t>
+              <a:t>3/5/2012</a:t>
             </a:fld>
             <a:endParaRPr lang="en-US"/>
           </a:p>
@@ -10927,7 +11436,7 @@
             <a:fld id="{3A0C61A8-A647-4A83-B149-729257AFD983}" type="datetimeFigureOut">
               <a:rPr lang="en-US" smtClean="0"/>
               <a:pPr/>
-              <a:t>2/27/2012</a:t>
+              <a:t>3/5/2012</a:t>
             </a:fld>
             <a:endParaRPr lang="en-US"/>
           </a:p>
@@ -11019,7 +11528,7 @@
             <a:fld id="{3A0C61A8-A647-4A83-B149-729257AFD983}" type="datetimeFigureOut">
               <a:rPr lang="en-US" smtClean="0"/>
               <a:pPr/>
-              <a:t>2/27/2012</a:t>
+              <a:t>3/5/2012</a:t>
             </a:fld>
             <a:endParaRPr lang="en-US"/>
           </a:p>
@@ -11293,7 +11802,7 @@
             <a:fld id="{3A0C61A8-A647-4A83-B149-729257AFD983}" type="datetimeFigureOut">
               <a:rPr lang="en-US" smtClean="0"/>
               <a:pPr/>
-              <a:t>2/27/2012</a:t>
+              <a:t>3/5/2012</a:t>
             </a:fld>
             <a:endParaRPr lang="en-US"/>
           </a:p>
@@ -11543,7 +12052,7 @@
             <a:fld id="{3A0C61A8-A647-4A83-B149-729257AFD983}" type="datetimeFigureOut">
               <a:rPr lang="en-US" smtClean="0"/>
               <a:pPr/>
-              <a:t>2/27/2012</a:t>
+              <a:t>3/5/2012</a:t>
             </a:fld>
             <a:endParaRPr lang="en-US"/>
           </a:p>
@@ -11753,7 +12262,7 @@
             <a:fld id="{3A0C61A8-A647-4A83-B149-729257AFD983}" type="datetimeFigureOut">
               <a:rPr lang="en-US" smtClean="0"/>
               <a:pPr/>
-              <a:t>2/27/2012</a:t>
+              <a:t>3/5/2012</a:t>
             </a:fld>
             <a:endParaRPr lang="en-US"/>
           </a:p>
@@ -12171,8 +12680,8 @@
         </p:nvSpPr>
         <p:spPr>
           <a:xfrm>
-            <a:off x="6019800" y="5943600"/>
-            <a:ext cx="2971800" cy="762000"/>
+            <a:off x="4724400" y="5943600"/>
+            <a:ext cx="4267200" cy="762000"/>
           </a:xfrm>
         </p:spPr>
         <p:txBody>
@@ -12202,6 +12711,24 @@
                 <a:latin typeface="+mj-lt"/>
               </a:rPr>
               <a:t>Любомир Янчев</a:t>
+            </a:r>
+            <a:r>
+              <a:rPr lang="en-US" sz="1200" dirty="0" smtClean="0">
+                <a:solidFill>
+                  <a:schemeClr val="tx1"/>
+                </a:solidFill>
+                <a:latin typeface="+mj-lt"/>
+              </a:rPr>
+              <a:t>,  </a:t>
+            </a:r>
+            <a:r>
+              <a:rPr lang="bg-BG" sz="1200" dirty="0" smtClean="0">
+                <a:solidFill>
+                  <a:schemeClr val="tx1"/>
+                </a:solidFill>
+                <a:latin typeface="+mj-lt"/>
+              </a:rPr>
+              <a:t>ЧНГ “Ерих Кестнер”, 10 клас</a:t>
             </a:r>
             <a:br>
               <a:rPr lang="bg-BG" sz="1200" dirty="0" smtClean="0">
@@ -12218,7 +12745,7 @@
                 </a:solidFill>
                 <a:latin typeface="+mj-lt"/>
               </a:rPr>
-              <a:t>Христо Стоянов</a:t>
+              <a:t>Христо Стоянов, СМГ “Паисий Хилендарски”,  9 клас</a:t>
             </a:r>
             <a:endParaRPr lang="en-US" sz="1200" dirty="0">
               <a:solidFill>
@@ -13949,8 +14476,8 @@
           <p:nvPr/>
         </p:nvSpPr>
         <p:spPr>
-          <a:xfrm rot="21169483">
-            <a:off x="5038801" y="4637257"/>
+          <a:xfrm rot="280054">
+            <a:off x="5849886" y="3858262"/>
             <a:ext cx="3122956" cy="1569660"/>
           </a:xfrm>
           <a:prstGeom prst="rect">
@@ -13986,7 +14513,7 @@
         </p:nvSpPr>
         <p:spPr>
           <a:xfrm rot="375906">
-            <a:off x="303335" y="3090303"/>
+            <a:off x="303336" y="2937902"/>
             <a:ext cx="3654205" cy="1569660"/>
           </a:xfrm>
           <a:prstGeom prst="rect">
@@ -14026,8 +14553,8 @@
           <p:nvPr/>
         </p:nvSpPr>
         <p:spPr>
-          <a:xfrm rot="21130491">
-            <a:off x="1126674" y="5297160"/>
+          <a:xfrm rot="21388355">
+            <a:off x="30400" y="4812302"/>
             <a:ext cx="2890560" cy="1077218"/>
           </a:xfrm>
           <a:prstGeom prst="rect">
@@ -14068,7 +14595,7 @@
         </p:nvSpPr>
         <p:spPr>
           <a:xfrm rot="21215025">
-            <a:off x="4511386" y="3483531"/>
+            <a:off x="4216097" y="3105183"/>
             <a:ext cx="2419923" cy="584775"/>
           </a:xfrm>
           <a:prstGeom prst="rect">
@@ -14093,6 +14620,42 @@
                 </a:solidFill>
               </a:rPr>
               <a:t>CULang</a:t>
+            </a:r>
+          </a:p>
+        </p:txBody>
+      </p:sp>
+      <p:sp>
+        <p:nvSpPr>
+          <p:cNvPr id="11" name="TextBox 10"/>
+          <p:cNvSpPr txBox="1"/>
+          <p:nvPr/>
+        </p:nvSpPr>
+        <p:spPr>
+          <a:xfrm rot="21097766">
+            <a:off x="3111012" y="5576123"/>
+            <a:ext cx="2890560" cy="1077218"/>
+          </a:xfrm>
+          <a:prstGeom prst="rect">
+            <a:avLst/>
+          </a:prstGeom>
+          <a:solidFill>
+            <a:srgbClr val="F26C4F"/>
+          </a:solidFill>
+        </p:spPr>
+        <p:txBody>
+          <a:bodyPr wrap="square" rtlCol="0">
+            <a:spAutoFit/>
+          </a:bodyPr>
+          <a:lstStyle/>
+          <a:p>
+            <a:pPr algn="ctr"/>
+            <a:r>
+              <a:rPr lang="bg-BG" sz="3200" dirty="0" smtClean="0">
+                <a:solidFill>
+                  <a:srgbClr val="E9F2F9"/>
+                </a:solidFill>
+              </a:rPr>
+              <a:t>Лични профили</a:t>
             </a:r>
           </a:p>
         </p:txBody>
@@ -14145,8 +14708,8 @@
         </p:nvSpPr>
         <p:spPr>
           <a:xfrm>
-            <a:off x="304800" y="228600"/>
-            <a:ext cx="2900153" cy="738664"/>
+            <a:off x="276415" y="228600"/>
+            <a:ext cx="3369833" cy="738664"/>
           </a:xfrm>
           <a:prstGeom prst="rect">
             <a:avLst/>
@@ -14162,6 +14725,30 @@
           </a:bodyPr>
           <a:lstStyle/>
           <a:p>
+            <a:r>
+              <a:rPr lang="en-US" sz="4200" b="1" dirty="0" smtClean="0">
+                <a:ln w="12700">
+                  <a:solidFill>
+                    <a:schemeClr val="tx1">
+                      <a:lumMod val="95000"/>
+                      <a:lumOff val="5000"/>
+                    </a:schemeClr>
+                  </a:solidFill>
+                  <a:prstDash val="solid"/>
+                </a:ln>
+                <a:solidFill>
+                  <a:srgbClr val="9CC4E4"/>
+                </a:solidFill>
+                <a:effectLst>
+                  <a:outerShdw blurRad="41275" dist="20320" dir="1800000" algn="tl" rotWithShape="0">
+                    <a:srgbClr val="000000">
+                      <a:alpha val="40000"/>
+                    </a:srgbClr>
+                  </a:outerShdw>
+                </a:effectLst>
+              </a:rPr>
+              <a:t>“</a:t>
+            </a:r>
             <a:r>
               <a:rPr lang="bg-BG" sz="4200" b="1" dirty="0" smtClean="0">
                 <a:ln w="12700">
@@ -14186,6 +14773,51 @@
               </a:rPr>
               <a:t>Скучна част</a:t>
             </a:r>
+            <a:r>
+              <a:rPr lang="en-US" sz="4200" b="1" dirty="0" smtClean="0">
+                <a:ln w="12700">
+                  <a:solidFill>
+                    <a:schemeClr val="tx1">
+                      <a:lumMod val="95000"/>
+                      <a:lumOff val="5000"/>
+                    </a:schemeClr>
+                  </a:solidFill>
+                  <a:prstDash val="solid"/>
+                </a:ln>
+                <a:solidFill>
+                  <a:srgbClr val="9CC4E4"/>
+                </a:solidFill>
+                <a:effectLst>
+                  <a:outerShdw blurRad="41275" dist="20320" dir="1800000" algn="tl" rotWithShape="0">
+                    <a:srgbClr val="000000">
+                      <a:alpha val="40000"/>
+                    </a:srgbClr>
+                  </a:outerShdw>
+                </a:effectLst>
+              </a:rPr>
+              <a:t>”</a:t>
+            </a:r>
+            <a:endParaRPr lang="bg-BG" sz="4200" b="1" dirty="0" smtClean="0">
+              <a:ln w="12700">
+                <a:solidFill>
+                  <a:schemeClr val="tx1">
+                    <a:lumMod val="95000"/>
+                    <a:lumOff val="5000"/>
+                  </a:schemeClr>
+                </a:solidFill>
+                <a:prstDash val="solid"/>
+              </a:ln>
+              <a:solidFill>
+                <a:srgbClr val="9CC4E4"/>
+              </a:solidFill>
+              <a:effectLst>
+                <a:outerShdw blurRad="41275" dist="20320" dir="1800000" algn="tl" rotWithShape="0">
+                  <a:srgbClr val="000000">
+                    <a:alpha val="40000"/>
+                  </a:srgbClr>
+                </a:outerShdw>
+              </a:effectLst>
+            </a:endParaRPr>
           </a:p>
         </p:txBody>
       </p:sp>
@@ -15922,7 +16554,7 @@
               <a:t>Апликация, позволяваща </a:t>
             </a:r>
             <a:r>
-              <a:rPr lang="bg-BG" sz="4600" u="sng" dirty="0" smtClean="0">
+              <a:rPr lang="bg-BG" sz="4600" b="1" dirty="0" smtClean="0">
                 <a:solidFill>
                   <a:srgbClr val="E9F2F9"/>
                 </a:solidFill>
@@ -15938,7 +16570,7 @@
               <a:t> на отделни </a:t>
             </a:r>
             <a:r>
-              <a:rPr lang="bg-BG" sz="4600" u="sng" dirty="0" smtClean="0">
+              <a:rPr lang="bg-BG" sz="4600" b="1" dirty="0" smtClean="0">
                 <a:solidFill>
                   <a:srgbClr val="E9F2F9"/>
                 </a:solidFill>
@@ -15954,7 +16586,7 @@
               <a:t> и задействането им единствено чрез </a:t>
             </a:r>
             <a:r>
-              <a:rPr lang="bg-BG" sz="4600" u="sng" dirty="0" smtClean="0">
+              <a:rPr lang="bg-BG" sz="4600" b="1" dirty="0" smtClean="0">
                 <a:solidFill>
                   <a:srgbClr val="E9F2F9"/>
                 </a:solidFill>
@@ -15969,7 +16601,7 @@
               </a:rPr>
               <a:t>.</a:t>
             </a:r>
-            <a:endParaRPr lang="en-US" sz="4600" u="sng" dirty="0" smtClean="0">
+            <a:endParaRPr lang="en-US" sz="4600" dirty="0" smtClean="0">
               <a:solidFill>
                 <a:srgbClr val="E9F2F9"/>
               </a:solidFill>

</xml_diff>